<commit_message>
example instead of custom domain
</commit_message>
<xml_diff>
--- a/mkdocs/docs/images/src/illustration.pptx
+++ b/mkdocs/docs/images/src/illustration.pptx
@@ -197,7 +197,7 @@
           <a:p>
             <a:fld id="{38B78CBE-37FA-D241-BB4C-CAC5D3B25F49}" type="datetimeFigureOut">
               <a:rPr lang="en-US" smtClean="0"/>
-              <a:t>4/28/21</a:t>
+              <a:t>5/2/21</a:t>
             </a:fld>
             <a:endParaRPr lang="en-US"/>
           </a:p>
@@ -695,7 +695,7 @@
           <a:p>
             <a:fld id="{708812C5-0212-FD42-A0D4-E2E8FF4E3AF5}" type="datetime1">
               <a:rPr lang="en-US" smtClean="0"/>
-              <a:t>4/28/21</a:t>
+              <a:t>5/2/21</a:t>
             </a:fld>
             <a:endParaRPr lang="en-US"/>
           </a:p>
@@ -896,7 +896,7 @@
           <a:p>
             <a:fld id="{D232AC6F-41C3-B34B-9BAA-03ED2F3BC0F6}" type="datetime1">
               <a:rPr lang="en-US" smtClean="0"/>
-              <a:t>4/28/21</a:t>
+              <a:t>5/2/21</a:t>
             </a:fld>
             <a:endParaRPr lang="en-US"/>
           </a:p>
@@ -1107,7 +1107,7 @@
           <a:p>
             <a:fld id="{BEE140C2-F440-9D49-95CB-5965D64CC4A2}" type="datetime1">
               <a:rPr lang="en-US" smtClean="0"/>
-              <a:t>4/28/21</a:t>
+              <a:t>5/2/21</a:t>
             </a:fld>
             <a:endParaRPr lang="en-US"/>
           </a:p>
@@ -1308,7 +1308,7 @@
           <a:p>
             <a:fld id="{CC99F980-FB29-FD47-8508-150F73F1E8B0}" type="datetime1">
               <a:rPr lang="en-US" smtClean="0"/>
-              <a:t>4/28/21</a:t>
+              <a:t>5/2/21</a:t>
             </a:fld>
             <a:endParaRPr lang="en-US"/>
           </a:p>
@@ -1586,7 +1586,7 @@
           <a:p>
             <a:fld id="{D4510983-EA22-9643-8AC0-B3C6499B643B}" type="datetime1">
               <a:rPr lang="en-US" smtClean="0"/>
-              <a:t>4/28/21</a:t>
+              <a:t>5/2/21</a:t>
             </a:fld>
             <a:endParaRPr lang="en-US"/>
           </a:p>
@@ -1854,7 +1854,7 @@
           <a:p>
             <a:fld id="{D5A39195-967D-5D4E-8C6A-C99866996458}" type="datetime1">
               <a:rPr lang="en-US" smtClean="0"/>
-              <a:t>4/28/21</a:t>
+              <a:t>5/2/21</a:t>
             </a:fld>
             <a:endParaRPr lang="en-US"/>
           </a:p>
@@ -2269,7 +2269,7 @@
           <a:p>
             <a:fld id="{5AD771E9-C79D-684D-A158-5EB6E92DE947}" type="datetime1">
               <a:rPr lang="en-US" smtClean="0"/>
-              <a:t>4/28/21</a:t>
+              <a:t>5/2/21</a:t>
             </a:fld>
             <a:endParaRPr lang="en-US"/>
           </a:p>
@@ -2413,7 +2413,7 @@
           <a:p>
             <a:fld id="{693CA161-7E4C-5C4B-B799-DB602A0B9806}" type="datetime1">
               <a:rPr lang="en-US" smtClean="0"/>
-              <a:t>4/28/21</a:t>
+              <a:t>5/2/21</a:t>
             </a:fld>
             <a:endParaRPr lang="en-US"/>
           </a:p>
@@ -2529,7 +2529,7 @@
           <a:p>
             <a:fld id="{6D55FDF3-8BB2-6349-A5FA-057F3D78953D}" type="datetime1">
               <a:rPr lang="en-US" smtClean="0"/>
-              <a:t>4/28/21</a:t>
+              <a:t>5/2/21</a:t>
             </a:fld>
             <a:endParaRPr lang="en-US"/>
           </a:p>
@@ -2843,7 +2843,7 @@
           <a:p>
             <a:fld id="{EEDFACC0-3228-BA4B-942E-CEF38B0101FD}" type="datetime1">
               <a:rPr lang="en-US" smtClean="0"/>
-              <a:t>4/28/21</a:t>
+              <a:t>5/2/21</a:t>
             </a:fld>
             <a:endParaRPr lang="en-US"/>
           </a:p>
@@ -3134,7 +3134,7 @@
           <a:p>
             <a:fld id="{07EEEDBE-E24C-D140-B419-6D8D592D0F1C}" type="datetime1">
               <a:rPr lang="en-US" smtClean="0"/>
-              <a:t>4/28/21</a:t>
+              <a:t>5/2/21</a:t>
             </a:fld>
             <a:endParaRPr lang="en-US"/>
           </a:p>
@@ -3378,7 +3378,7 @@
           <a:p>
             <a:fld id="{E05781A2-A5EF-C54C-A3EF-F62483D37EDC}" type="datetime1">
               <a:rPr lang="en-US" smtClean="0"/>
-              <a:t>4/28/21</a:t>
+              <a:t>5/2/21</a:t>
             </a:fld>
             <a:endParaRPr lang="en-US"/>
           </a:p>
@@ -3914,7 +3914,7 @@
                   <a:srgbClr val="7A004A"/>
                 </a:solidFill>
               </a:rPr>
-              <a:t>Automate A/B, A/B/n, Canary, and Conformance experiments</a:t>
+              <a:t>Automate A/B(/n), Canary, and Conformance experiments</a:t>
             </a:r>
             <a:endParaRPr lang="en-US" sz="2000" dirty="0">
               <a:solidFill>
@@ -3982,7 +3982,7 @@
                   <a:srgbClr val="7A004A"/>
                 </a:solidFill>
               </a:rPr>
-              <a:t>Safely promote winning version </a:t>
+              <a:t>Find and promote winning version </a:t>
             </a:r>
             <a:r>
               <a:rPr lang="en-US" sz="2000" dirty="0">

</xml_diff>

<commit_message>
version promotion for Knative (#649)
* version promotion for Knative

* fixed version recommended for promotion

* canary progressive knative

* Fixed candidate names

* Removing books  purchased

* Removing start actions

* example instead of custom domain

* promotion yamls for kfserving

* quick start fixes

* Creating kfserving e2e test
</commit_message>
<xml_diff>
--- a/mkdocs/docs/images/src/illustration.pptx
+++ b/mkdocs/docs/images/src/illustration.pptx
@@ -197,7 +197,7 @@
           <a:p>
             <a:fld id="{38B78CBE-37FA-D241-BB4C-CAC5D3B25F49}" type="datetimeFigureOut">
               <a:rPr lang="en-US" smtClean="0"/>
-              <a:t>4/28/21</a:t>
+              <a:t>5/2/21</a:t>
             </a:fld>
             <a:endParaRPr lang="en-US"/>
           </a:p>
@@ -695,7 +695,7 @@
           <a:p>
             <a:fld id="{708812C5-0212-FD42-A0D4-E2E8FF4E3AF5}" type="datetime1">
               <a:rPr lang="en-US" smtClean="0"/>
-              <a:t>4/28/21</a:t>
+              <a:t>5/2/21</a:t>
             </a:fld>
             <a:endParaRPr lang="en-US"/>
           </a:p>
@@ -896,7 +896,7 @@
           <a:p>
             <a:fld id="{D232AC6F-41C3-B34B-9BAA-03ED2F3BC0F6}" type="datetime1">
               <a:rPr lang="en-US" smtClean="0"/>
-              <a:t>4/28/21</a:t>
+              <a:t>5/2/21</a:t>
             </a:fld>
             <a:endParaRPr lang="en-US"/>
           </a:p>
@@ -1107,7 +1107,7 @@
           <a:p>
             <a:fld id="{BEE140C2-F440-9D49-95CB-5965D64CC4A2}" type="datetime1">
               <a:rPr lang="en-US" smtClean="0"/>
-              <a:t>4/28/21</a:t>
+              <a:t>5/2/21</a:t>
             </a:fld>
             <a:endParaRPr lang="en-US"/>
           </a:p>
@@ -1308,7 +1308,7 @@
           <a:p>
             <a:fld id="{CC99F980-FB29-FD47-8508-150F73F1E8B0}" type="datetime1">
               <a:rPr lang="en-US" smtClean="0"/>
-              <a:t>4/28/21</a:t>
+              <a:t>5/2/21</a:t>
             </a:fld>
             <a:endParaRPr lang="en-US"/>
           </a:p>
@@ -1586,7 +1586,7 @@
           <a:p>
             <a:fld id="{D4510983-EA22-9643-8AC0-B3C6499B643B}" type="datetime1">
               <a:rPr lang="en-US" smtClean="0"/>
-              <a:t>4/28/21</a:t>
+              <a:t>5/2/21</a:t>
             </a:fld>
             <a:endParaRPr lang="en-US"/>
           </a:p>
@@ -1854,7 +1854,7 @@
           <a:p>
             <a:fld id="{D5A39195-967D-5D4E-8C6A-C99866996458}" type="datetime1">
               <a:rPr lang="en-US" smtClean="0"/>
-              <a:t>4/28/21</a:t>
+              <a:t>5/2/21</a:t>
             </a:fld>
             <a:endParaRPr lang="en-US"/>
           </a:p>
@@ -2269,7 +2269,7 @@
           <a:p>
             <a:fld id="{5AD771E9-C79D-684D-A158-5EB6E92DE947}" type="datetime1">
               <a:rPr lang="en-US" smtClean="0"/>
-              <a:t>4/28/21</a:t>
+              <a:t>5/2/21</a:t>
             </a:fld>
             <a:endParaRPr lang="en-US"/>
           </a:p>
@@ -2413,7 +2413,7 @@
           <a:p>
             <a:fld id="{693CA161-7E4C-5C4B-B799-DB602A0B9806}" type="datetime1">
               <a:rPr lang="en-US" smtClean="0"/>
-              <a:t>4/28/21</a:t>
+              <a:t>5/2/21</a:t>
             </a:fld>
             <a:endParaRPr lang="en-US"/>
           </a:p>
@@ -2529,7 +2529,7 @@
           <a:p>
             <a:fld id="{6D55FDF3-8BB2-6349-A5FA-057F3D78953D}" type="datetime1">
               <a:rPr lang="en-US" smtClean="0"/>
-              <a:t>4/28/21</a:t>
+              <a:t>5/2/21</a:t>
             </a:fld>
             <a:endParaRPr lang="en-US"/>
           </a:p>
@@ -2843,7 +2843,7 @@
           <a:p>
             <a:fld id="{EEDFACC0-3228-BA4B-942E-CEF38B0101FD}" type="datetime1">
               <a:rPr lang="en-US" smtClean="0"/>
-              <a:t>4/28/21</a:t>
+              <a:t>5/2/21</a:t>
             </a:fld>
             <a:endParaRPr lang="en-US"/>
           </a:p>
@@ -3134,7 +3134,7 @@
           <a:p>
             <a:fld id="{07EEEDBE-E24C-D140-B419-6D8D592D0F1C}" type="datetime1">
               <a:rPr lang="en-US" smtClean="0"/>
-              <a:t>4/28/21</a:t>
+              <a:t>5/2/21</a:t>
             </a:fld>
             <a:endParaRPr lang="en-US"/>
           </a:p>
@@ -3378,7 +3378,7 @@
           <a:p>
             <a:fld id="{E05781A2-A5EF-C54C-A3EF-F62483D37EDC}" type="datetime1">
               <a:rPr lang="en-US" smtClean="0"/>
-              <a:t>4/28/21</a:t>
+              <a:t>5/2/21</a:t>
             </a:fld>
             <a:endParaRPr lang="en-US"/>
           </a:p>
@@ -3914,7 +3914,7 @@
                   <a:srgbClr val="7A004A"/>
                 </a:solidFill>
               </a:rPr>
-              <a:t>Automate A/B, A/B/n, Canary, and Conformance experiments</a:t>
+              <a:t>Automate A/B(/n), Canary, and Conformance experiments</a:t>
             </a:r>
             <a:endParaRPr lang="en-US" sz="2000" dirty="0">
               <a:solidFill>
@@ -3982,7 +3982,7 @@
                   <a:srgbClr val="7A004A"/>
                 </a:solidFill>
               </a:rPr>
-              <a:t>Safely promote winning version </a:t>
+              <a:t>Find and promote winning version </a:t>
             </a:r>
             <a:r>
               <a:rPr lang="en-US" sz="2000" dirty="0">

</xml_diff>

<commit_message>
Improved landing page and slack unfurl
</commit_message>
<xml_diff>
--- a/mkdocs/docs/images/src/illustration.pptx
+++ b/mkdocs/docs/images/src/illustration.pptx
@@ -197,7 +197,7 @@
           <a:p>
             <a:fld id="{38B78CBE-37FA-D241-BB4C-CAC5D3B25F49}" type="datetimeFigureOut">
               <a:rPr lang="en-US" smtClean="0"/>
-              <a:t>5/2/21</a:t>
+              <a:t>5/27/21</a:t>
             </a:fld>
             <a:endParaRPr lang="en-US"/>
           </a:p>
@@ -695,7 +695,7 @@
           <a:p>
             <a:fld id="{708812C5-0212-FD42-A0D4-E2E8FF4E3AF5}" type="datetime1">
               <a:rPr lang="en-US" smtClean="0"/>
-              <a:t>5/2/21</a:t>
+              <a:t>5/27/21</a:t>
             </a:fld>
             <a:endParaRPr lang="en-US"/>
           </a:p>
@@ -896,7 +896,7 @@
           <a:p>
             <a:fld id="{D232AC6F-41C3-B34B-9BAA-03ED2F3BC0F6}" type="datetime1">
               <a:rPr lang="en-US" smtClean="0"/>
-              <a:t>5/2/21</a:t>
+              <a:t>5/27/21</a:t>
             </a:fld>
             <a:endParaRPr lang="en-US"/>
           </a:p>
@@ -1107,7 +1107,7 @@
           <a:p>
             <a:fld id="{BEE140C2-F440-9D49-95CB-5965D64CC4A2}" type="datetime1">
               <a:rPr lang="en-US" smtClean="0"/>
-              <a:t>5/2/21</a:t>
+              <a:t>5/27/21</a:t>
             </a:fld>
             <a:endParaRPr lang="en-US"/>
           </a:p>
@@ -1308,7 +1308,7 @@
           <a:p>
             <a:fld id="{CC99F980-FB29-FD47-8508-150F73F1E8B0}" type="datetime1">
               <a:rPr lang="en-US" smtClean="0"/>
-              <a:t>5/2/21</a:t>
+              <a:t>5/27/21</a:t>
             </a:fld>
             <a:endParaRPr lang="en-US"/>
           </a:p>
@@ -1586,7 +1586,7 @@
           <a:p>
             <a:fld id="{D4510983-EA22-9643-8AC0-B3C6499B643B}" type="datetime1">
               <a:rPr lang="en-US" smtClean="0"/>
-              <a:t>5/2/21</a:t>
+              <a:t>5/27/21</a:t>
             </a:fld>
             <a:endParaRPr lang="en-US"/>
           </a:p>
@@ -1854,7 +1854,7 @@
           <a:p>
             <a:fld id="{D5A39195-967D-5D4E-8C6A-C99866996458}" type="datetime1">
               <a:rPr lang="en-US" smtClean="0"/>
-              <a:t>5/2/21</a:t>
+              <a:t>5/27/21</a:t>
             </a:fld>
             <a:endParaRPr lang="en-US"/>
           </a:p>
@@ -2269,7 +2269,7 @@
           <a:p>
             <a:fld id="{5AD771E9-C79D-684D-A158-5EB6E92DE947}" type="datetime1">
               <a:rPr lang="en-US" smtClean="0"/>
-              <a:t>5/2/21</a:t>
+              <a:t>5/27/21</a:t>
             </a:fld>
             <a:endParaRPr lang="en-US"/>
           </a:p>
@@ -2413,7 +2413,7 @@
           <a:p>
             <a:fld id="{693CA161-7E4C-5C4B-B799-DB602A0B9806}" type="datetime1">
               <a:rPr lang="en-US" smtClean="0"/>
-              <a:t>5/2/21</a:t>
+              <a:t>5/27/21</a:t>
             </a:fld>
             <a:endParaRPr lang="en-US"/>
           </a:p>
@@ -2529,7 +2529,7 @@
           <a:p>
             <a:fld id="{6D55FDF3-8BB2-6349-A5FA-057F3D78953D}" type="datetime1">
               <a:rPr lang="en-US" smtClean="0"/>
-              <a:t>5/2/21</a:t>
+              <a:t>5/27/21</a:t>
             </a:fld>
             <a:endParaRPr lang="en-US"/>
           </a:p>
@@ -2843,7 +2843,7 @@
           <a:p>
             <a:fld id="{EEDFACC0-3228-BA4B-942E-CEF38B0101FD}" type="datetime1">
               <a:rPr lang="en-US" smtClean="0"/>
-              <a:t>5/2/21</a:t>
+              <a:t>5/27/21</a:t>
             </a:fld>
             <a:endParaRPr lang="en-US"/>
           </a:p>
@@ -3134,7 +3134,7 @@
           <a:p>
             <a:fld id="{07EEEDBE-E24C-D140-B419-6D8D592D0F1C}" type="datetime1">
               <a:rPr lang="en-US" smtClean="0"/>
-              <a:t>5/2/21</a:t>
+              <a:t>5/27/21</a:t>
             </a:fld>
             <a:endParaRPr lang="en-US"/>
           </a:p>
@@ -3378,7 +3378,7 @@
           <a:p>
             <a:fld id="{E05781A2-A5EF-C54C-A3EF-F62483D37EDC}" type="datetime1">
               <a:rPr lang="en-US" smtClean="0"/>
-              <a:t>5/2/21</a:t>
+              <a:t>5/27/21</a:t>
             </a:fld>
             <a:endParaRPr lang="en-US"/>
           </a:p>
@@ -3801,63 +3801,6 @@
       </p:grpSpPr>
       <p:sp>
         <p:nvSpPr>
-          <p:cNvPr id="2" name="Footer Placeholder 1">
-            <a:extLst>
-              <a:ext uri="{FF2B5EF4-FFF2-40B4-BE49-F238E27FC236}">
-                <a16:creationId xmlns:a16="http://schemas.microsoft.com/office/drawing/2014/main" id="{CAF876A6-21EF-6949-9DC3-C0A99675CD1E}"/>
-              </a:ext>
-            </a:extLst>
-          </p:cNvPr>
-          <p:cNvSpPr>
-            <a:spLocks noGrp="1"/>
-          </p:cNvSpPr>
-          <p:nvPr>
-            <p:ph type="ftr" sz="quarter" idx="11"/>
-          </p:nvPr>
-        </p:nvSpPr>
-        <p:spPr/>
-        <p:txBody>
-          <a:bodyPr/>
-          <a:lstStyle/>
-          <a:p>
-            <a:r>
-              <a:rPr lang="en-US" dirty="0"/>
-              <a:t>https://iter8.tools</a:t>
-            </a:r>
-          </a:p>
-        </p:txBody>
-      </p:sp>
-      <p:sp>
-        <p:nvSpPr>
-          <p:cNvPr id="3" name="Slide Number Placeholder 2">
-            <a:extLst>
-              <a:ext uri="{FF2B5EF4-FFF2-40B4-BE49-F238E27FC236}">
-                <a16:creationId xmlns:a16="http://schemas.microsoft.com/office/drawing/2014/main" id="{8986A4B5-D9A6-BA4A-AE84-82889CB87602}"/>
-              </a:ext>
-            </a:extLst>
-          </p:cNvPr>
-          <p:cNvSpPr>
-            <a:spLocks noGrp="1"/>
-          </p:cNvSpPr>
-          <p:nvPr>
-            <p:ph type="sldNum" sz="quarter" idx="12"/>
-          </p:nvPr>
-        </p:nvSpPr>
-        <p:spPr/>
-        <p:txBody>
-          <a:bodyPr/>
-          <a:lstStyle/>
-          <a:p>
-            <a:fld id="{B78E2DF1-CA0F-8745-8AE1-A3A61670CB1B}" type="slidenum">
-              <a:rPr lang="en-US" smtClean="0"/>
-              <a:t>1</a:t>
-            </a:fld>
-            <a:endParaRPr lang="en-US"/>
-          </a:p>
-        </p:txBody>
-      </p:sp>
-      <p:sp>
-        <p:nvSpPr>
           <p:cNvPr id="54" name="Rounded Rectangle 53">
             <a:extLst>
               <a:ext uri="{FF2B5EF4-FFF2-40B4-BE49-F238E27FC236}">
@@ -3870,8 +3813,8 @@
         </p:nvSpPr>
         <p:spPr>
           <a:xfrm>
-            <a:off x="4866290" y="3795607"/>
-            <a:ext cx="4376458" cy="1395986"/>
+            <a:off x="4581297" y="3364682"/>
+            <a:ext cx="5992110" cy="1489732"/>
           </a:xfrm>
           <a:prstGeom prst="roundRect">
             <a:avLst/>
@@ -3914,13 +3857,51 @@
                   <a:srgbClr val="7A004A"/>
                 </a:solidFill>
               </a:rPr>
-              <a:t>Automate A/B(/n), Canary, and Conformance experiments</a:t>
-            </a:r>
-            <a:endParaRPr lang="en-US" sz="2000" dirty="0">
-              <a:solidFill>
-                <a:schemeClr val="tx1"/>
-              </a:solidFill>
-            </a:endParaRPr>
+              <a:t>Automate releases &amp; experiments </a:t>
+            </a:r>
+            <a:r>
+              <a:rPr lang="en-US" sz="2000" dirty="0">
+                <a:solidFill>
+                  <a:schemeClr val="tx1"/>
+                </a:solidFill>
+              </a:rPr>
+              <a:t>for</a:t>
+            </a:r>
+            <a:r>
+              <a:rPr lang="en-US" sz="2000" b="1" dirty="0">
+                <a:solidFill>
+                  <a:srgbClr val="7A004A"/>
+                </a:solidFill>
+              </a:rPr>
+              <a:t> </a:t>
+            </a:r>
+          </a:p>
+          <a:p>
+            <a:pPr algn="ctr"/>
+            <a:r>
+              <a:rPr lang="en-US" sz="2000" dirty="0">
+                <a:solidFill>
+                  <a:schemeClr val="tx1"/>
+                </a:solidFill>
+              </a:rPr>
+              <a:t>Kubernetes</a:t>
+            </a:r>
+            <a:r>
+              <a:rPr lang="en-US" sz="2000" b="1" dirty="0">
+                <a:solidFill>
+                  <a:srgbClr val="7A004A"/>
+                </a:solidFill>
+              </a:rPr>
+              <a:t> </a:t>
+            </a:r>
+            <a:r>
+              <a:rPr lang="en-US" sz="2000" dirty="0">
+                <a:solidFill>
+                  <a:schemeClr val="tx1"/>
+                </a:solidFill>
+              </a:rPr>
+              <a:t>applications and ML models</a:t>
+            </a:r>
           </a:p>
         </p:txBody>
       </p:sp>
@@ -3938,8 +3919,8 @@
         </p:nvSpPr>
         <p:spPr>
           <a:xfrm>
-            <a:off x="3205655" y="2031427"/>
-            <a:ext cx="3585863" cy="1397573"/>
+            <a:off x="3341187" y="1600502"/>
+            <a:ext cx="3511558" cy="1397573"/>
           </a:xfrm>
           <a:prstGeom prst="roundRect">
             <a:avLst/>
@@ -3982,16 +3963,13 @@
                   <a:srgbClr val="7A004A"/>
                 </a:solidFill>
               </a:rPr>
-              <a:t>Find and promote winning version </a:t>
-            </a:r>
-            <a:r>
-              <a:rPr lang="en-US" sz="2000" dirty="0">
-                <a:solidFill>
-                  <a:schemeClr val="tx1"/>
-                </a:solidFill>
-              </a:rPr>
-              <a:t>of your app/ML model</a:t>
-            </a:r>
+              <a:t>Find and safely promote winning version</a:t>
+            </a:r>
+            <a:endParaRPr lang="en-US" sz="2000" dirty="0">
+              <a:solidFill>
+                <a:schemeClr val="tx1"/>
+              </a:solidFill>
+            </a:endParaRPr>
           </a:p>
         </p:txBody>
       </p:sp>
@@ -4023,7 +4001,7 @@
         </p:blipFill>
         <p:spPr>
           <a:xfrm flipH="1">
-            <a:off x="3987823" y="2106861"/>
+            <a:off x="4061398" y="1675936"/>
             <a:ext cx="623353" cy="623353"/>
           </a:xfrm>
           <a:prstGeom prst="rect">
@@ -4059,7 +4037,7 @@
         </p:blipFill>
         <p:spPr>
           <a:xfrm flipH="1">
-            <a:off x="4549766" y="2106861"/>
+            <a:off x="4623341" y="1675936"/>
             <a:ext cx="623353" cy="623353"/>
           </a:xfrm>
           <a:prstGeom prst="rect">
@@ -4095,7 +4073,7 @@
         </p:blipFill>
         <p:spPr>
           <a:xfrm flipH="1">
-            <a:off x="5101198" y="2106861"/>
+            <a:off x="5174773" y="1675936"/>
             <a:ext cx="623353" cy="623353"/>
           </a:xfrm>
           <a:prstGeom prst="rect">
@@ -4131,7 +4109,7 @@
         </p:blipFill>
         <p:spPr>
           <a:xfrm>
-            <a:off x="3195265" y="4074651"/>
+            <a:off x="3341187" y="3690599"/>
             <a:ext cx="837897" cy="837897"/>
           </a:xfrm>
           <a:prstGeom prst="rect">
@@ -4167,8 +4145,8 @@
         </p:nvCxnSpPr>
         <p:spPr>
           <a:xfrm>
-            <a:off x="4033162" y="4493600"/>
-            <a:ext cx="833128" cy="0"/>
+            <a:off x="4179084" y="4109548"/>
+            <a:ext cx="402213" cy="0"/>
           </a:xfrm>
           <a:prstGeom prst="straightConnector1">
             <a:avLst/>
@@ -4227,7 +4205,7 @@
         </p:blipFill>
         <p:spPr bwMode="auto">
           <a:xfrm flipH="1">
-            <a:off x="5099207" y="3905918"/>
+            <a:off x="5130738" y="3517033"/>
             <a:ext cx="505667" cy="498513"/>
           </a:xfrm>
           <a:prstGeom prst="rect">
@@ -4274,7 +4252,7 @@
         </p:blipFill>
         <p:spPr bwMode="auto">
           <a:xfrm>
-            <a:off x="6584339" y="3905631"/>
+            <a:off x="6615870" y="3516746"/>
             <a:ext cx="494256" cy="494256"/>
           </a:xfrm>
           <a:prstGeom prst="rect">
@@ -4321,7 +4299,7 @@
         </p:blipFill>
         <p:spPr bwMode="auto">
           <a:xfrm>
-            <a:off x="5778367" y="3905919"/>
+            <a:off x="5809898" y="3517034"/>
             <a:ext cx="611528" cy="494256"/>
           </a:xfrm>
           <a:prstGeom prst="rect">
@@ -4367,7 +4345,7 @@
         </p:blipFill>
         <p:spPr>
           <a:xfrm>
-            <a:off x="5698791" y="2133854"/>
+            <a:off x="5772366" y="1702929"/>
             <a:ext cx="506616" cy="506616"/>
           </a:xfrm>
           <a:prstGeom prst="rect">
@@ -4403,8 +4381,8 @@
         </p:blipFill>
         <p:spPr>
           <a:xfrm>
-            <a:off x="8460001" y="3944198"/>
-            <a:ext cx="546199" cy="546199"/>
+            <a:off x="9679340" y="3665630"/>
+            <a:ext cx="681704" cy="681704"/>
           </a:xfrm>
           <a:prstGeom prst="rect">
             <a:avLst/>
@@ -4432,8 +4410,8 @@
         </p:nvSpPr>
         <p:spPr>
           <a:xfrm>
-            <a:off x="7064615" y="2033013"/>
-            <a:ext cx="2178133" cy="1395986"/>
+            <a:off x="7414688" y="1602088"/>
+            <a:ext cx="3158719" cy="1395986"/>
           </a:xfrm>
           <a:prstGeom prst="roundRect">
             <a:avLst/>
@@ -4471,20 +4449,31 @@
           <a:p>
             <a:pPr algn="ctr"/>
             <a:r>
+              <a:rPr lang="en-US" sz="2000" dirty="0">
+                <a:solidFill>
+                  <a:schemeClr val="tx1"/>
+                </a:solidFill>
+              </a:rPr>
+              <a:t>Use</a:t>
+            </a:r>
+            <a:r>
               <a:rPr lang="en-US" sz="2000" b="1" dirty="0">
                 <a:solidFill>
                   <a:srgbClr val="7A004A"/>
                 </a:solidFill>
               </a:rPr>
-              <a:t>Use metrics</a:t>
-            </a:r>
+              <a:t> built-in metrics</a:t>
+            </a:r>
+          </a:p>
+          <a:p>
+            <a:pPr algn="ctr"/>
             <a:r>
               <a:rPr lang="en-US" sz="2000" dirty="0">
                 <a:solidFill>
                   <a:schemeClr val="tx1"/>
                 </a:solidFill>
               </a:rPr>
-              <a:t> from </a:t>
+              <a:t>or </a:t>
             </a:r>
             <a:r>
               <a:rPr lang="en-US" sz="2000" b="1" dirty="0">
@@ -4492,24 +4481,13 @@
                   <a:srgbClr val="7A004A"/>
                 </a:solidFill>
               </a:rPr>
-              <a:t>any</a:t>
-            </a:r>
-            <a:r>
-              <a:rPr lang="en-US" sz="2000" b="1" dirty="0">
-                <a:solidFill>
-                  <a:srgbClr val="C00000"/>
-                </a:solidFill>
-              </a:rPr>
-              <a:t> </a:t>
-            </a:r>
-            <a:r>
-              <a:rPr lang="en-US" sz="2000" dirty="0">
-                <a:solidFill>
-                  <a:schemeClr val="tx1"/>
-                </a:solidFill>
-              </a:rPr>
-              <a:t>provider</a:t>
-            </a:r>
+              <a:t>any metric database</a:t>
+            </a:r>
+            <a:endParaRPr lang="en-US" sz="2000" dirty="0">
+              <a:solidFill>
+                <a:schemeClr val="tx1"/>
+              </a:solidFill>
+            </a:endParaRPr>
           </a:p>
         </p:txBody>
       </p:sp>
@@ -4531,8 +4509,8 @@
         </p:nvCxnSpPr>
         <p:spPr>
           <a:xfrm>
-            <a:off x="6791518" y="2730214"/>
-            <a:ext cx="273097" cy="792"/>
+            <a:off x="6852745" y="2299289"/>
+            <a:ext cx="561943" cy="792"/>
           </a:xfrm>
           <a:prstGeom prst="straightConnector1">
             <a:avLst/>
@@ -4580,8 +4558,8 @@
         </p:nvCxnSpPr>
         <p:spPr>
           <a:xfrm rot="16200000" flipV="1">
-            <a:off x="5843250" y="2584338"/>
-            <a:ext cx="366607" cy="2055932"/>
+            <a:off x="6153856" y="1941186"/>
+            <a:ext cx="366607" cy="2480386"/>
           </a:xfrm>
           <a:prstGeom prst="bentConnector3">
             <a:avLst/>
@@ -4629,12 +4607,12 @@
         </p:nvCxnSpPr>
         <p:spPr>
           <a:xfrm rot="16200000" flipH="1">
-            <a:off x="8185792" y="3396888"/>
-            <a:ext cx="515199" cy="579419"/>
+            <a:off x="9173342" y="2818780"/>
+            <a:ext cx="667556" cy="1026144"/>
           </a:xfrm>
           <a:prstGeom prst="bentConnector3">
             <a:avLst>
-              <a:gd name="adj1" fmla="val 50000"/>
+              <a:gd name="adj1" fmla="val 31106"/>
             </a:avLst>
           </a:prstGeom>
           <a:ln w="25400">
@@ -4690,7 +4668,7 @@
         </p:blipFill>
         <p:spPr>
           <a:xfrm>
-            <a:off x="7110684" y="2115640"/>
+            <a:off x="8424475" y="1682265"/>
             <a:ext cx="469190" cy="485240"/>
           </a:xfrm>
           <a:prstGeom prst="rect">
@@ -4726,7 +4704,7 @@
         </p:blipFill>
         <p:spPr>
           <a:xfrm>
-            <a:off x="7617087" y="2115640"/>
+            <a:off x="8930878" y="1682265"/>
             <a:ext cx="576312" cy="485240"/>
           </a:xfrm>
           <a:prstGeom prst="rect">
@@ -4762,7 +4740,7 @@
         </p:blipFill>
         <p:spPr>
           <a:xfrm>
-            <a:off x="8241122" y="2115641"/>
+            <a:off x="9554913" y="1682266"/>
             <a:ext cx="465279" cy="485239"/>
           </a:xfrm>
           <a:prstGeom prst="rect">
@@ -4798,7 +4776,7 @@
         </p:blipFill>
         <p:spPr>
           <a:xfrm>
-            <a:off x="8733101" y="2115640"/>
+            <a:off x="10046892" y="1682265"/>
             <a:ext cx="467334" cy="485240"/>
           </a:xfrm>
           <a:prstGeom prst="rect">
@@ -4817,13 +4795,12 @@
           </p:cNvPr>
           <p:cNvCxnSpPr>
             <a:cxnSpLocks/>
-            <a:stCxn id="65" idx="1"/>
           </p:cNvCxnSpPr>
           <p:nvPr/>
         </p:nvCxnSpPr>
         <p:spPr>
           <a:xfrm flipH="1">
-            <a:off x="7143136" y="4217298"/>
+            <a:off x="7819763" y="3799340"/>
             <a:ext cx="1316865" cy="0"/>
           </a:xfrm>
           <a:prstGeom prst="straightConnector1">
@@ -4854,6 +4831,49 @@
           </a:fontRef>
         </p:style>
       </p:cxnSp>
+      <p:pic>
+        <p:nvPicPr>
+          <p:cNvPr id="27" name="Graphic 26">
+            <a:extLst>
+              <a:ext uri="{FF2B5EF4-FFF2-40B4-BE49-F238E27FC236}">
+                <a16:creationId xmlns:a16="http://schemas.microsoft.com/office/drawing/2014/main" id="{8E64CE0A-A303-B24D-84CD-764C68816431}"/>
+              </a:ext>
+            </a:extLst>
+          </p:cNvPr>
+          <p:cNvPicPr>
+            <a:picLocks noChangeAspect="1"/>
+          </p:cNvPicPr>
+          <p:nvPr/>
+        </p:nvPicPr>
+        <p:blipFill>
+          <a:blip r:embed="rId16">
+            <a:extLst>
+              <a:ext uri="{96DAC541-7B7A-43D3-8B79-37D633B846F1}">
+                <asvg:svgBlip xmlns:asvg="http://schemas.microsoft.com/office/drawing/2016/SVG/main" r:embed="rId17"/>
+              </a:ext>
+            </a:extLst>
+          </a:blip>
+          <a:stretch>
+            <a:fillRect/>
+          </a:stretch>
+        </p:blipFill>
+        <p:spPr>
+          <a:xfrm>
+            <a:off x="7521948" y="1675936"/>
+            <a:ext cx="485240" cy="485240"/>
+          </a:xfrm>
+          <a:prstGeom prst="rect">
+            <a:avLst/>
+          </a:prstGeom>
+          <a:effectLst>
+            <a:outerShdw blurRad="50800" dist="50800" dir="5400000" algn="ctr" rotWithShape="0">
+              <a:srgbClr val="000000">
+                <a:alpha val="93000"/>
+              </a:srgbClr>
+            </a:outerShdw>
+          </a:effectLst>
+        </p:spPr>
+      </p:pic>
     </p:spTree>
     <p:extLst>
       <p:ext uri="{BB962C8B-B14F-4D97-AF65-F5344CB8AC3E}">

</xml_diff>

<commit_message>
Improved landing page and slack unfurl (#699)
</commit_message>
<xml_diff>
--- a/mkdocs/docs/images/src/illustration.pptx
+++ b/mkdocs/docs/images/src/illustration.pptx
@@ -197,7 +197,7 @@
           <a:p>
             <a:fld id="{38B78CBE-37FA-D241-BB4C-CAC5D3B25F49}" type="datetimeFigureOut">
               <a:rPr lang="en-US" smtClean="0"/>
-              <a:t>5/2/21</a:t>
+              <a:t>5/27/21</a:t>
             </a:fld>
             <a:endParaRPr lang="en-US"/>
           </a:p>
@@ -695,7 +695,7 @@
           <a:p>
             <a:fld id="{708812C5-0212-FD42-A0D4-E2E8FF4E3AF5}" type="datetime1">
               <a:rPr lang="en-US" smtClean="0"/>
-              <a:t>5/2/21</a:t>
+              <a:t>5/27/21</a:t>
             </a:fld>
             <a:endParaRPr lang="en-US"/>
           </a:p>
@@ -896,7 +896,7 @@
           <a:p>
             <a:fld id="{D232AC6F-41C3-B34B-9BAA-03ED2F3BC0F6}" type="datetime1">
               <a:rPr lang="en-US" smtClean="0"/>
-              <a:t>5/2/21</a:t>
+              <a:t>5/27/21</a:t>
             </a:fld>
             <a:endParaRPr lang="en-US"/>
           </a:p>
@@ -1107,7 +1107,7 @@
           <a:p>
             <a:fld id="{BEE140C2-F440-9D49-95CB-5965D64CC4A2}" type="datetime1">
               <a:rPr lang="en-US" smtClean="0"/>
-              <a:t>5/2/21</a:t>
+              <a:t>5/27/21</a:t>
             </a:fld>
             <a:endParaRPr lang="en-US"/>
           </a:p>
@@ -1308,7 +1308,7 @@
           <a:p>
             <a:fld id="{CC99F980-FB29-FD47-8508-150F73F1E8B0}" type="datetime1">
               <a:rPr lang="en-US" smtClean="0"/>
-              <a:t>5/2/21</a:t>
+              <a:t>5/27/21</a:t>
             </a:fld>
             <a:endParaRPr lang="en-US"/>
           </a:p>
@@ -1586,7 +1586,7 @@
           <a:p>
             <a:fld id="{D4510983-EA22-9643-8AC0-B3C6499B643B}" type="datetime1">
               <a:rPr lang="en-US" smtClean="0"/>
-              <a:t>5/2/21</a:t>
+              <a:t>5/27/21</a:t>
             </a:fld>
             <a:endParaRPr lang="en-US"/>
           </a:p>
@@ -1854,7 +1854,7 @@
           <a:p>
             <a:fld id="{D5A39195-967D-5D4E-8C6A-C99866996458}" type="datetime1">
               <a:rPr lang="en-US" smtClean="0"/>
-              <a:t>5/2/21</a:t>
+              <a:t>5/27/21</a:t>
             </a:fld>
             <a:endParaRPr lang="en-US"/>
           </a:p>
@@ -2269,7 +2269,7 @@
           <a:p>
             <a:fld id="{5AD771E9-C79D-684D-A158-5EB6E92DE947}" type="datetime1">
               <a:rPr lang="en-US" smtClean="0"/>
-              <a:t>5/2/21</a:t>
+              <a:t>5/27/21</a:t>
             </a:fld>
             <a:endParaRPr lang="en-US"/>
           </a:p>
@@ -2413,7 +2413,7 @@
           <a:p>
             <a:fld id="{693CA161-7E4C-5C4B-B799-DB602A0B9806}" type="datetime1">
               <a:rPr lang="en-US" smtClean="0"/>
-              <a:t>5/2/21</a:t>
+              <a:t>5/27/21</a:t>
             </a:fld>
             <a:endParaRPr lang="en-US"/>
           </a:p>
@@ -2529,7 +2529,7 @@
           <a:p>
             <a:fld id="{6D55FDF3-8BB2-6349-A5FA-057F3D78953D}" type="datetime1">
               <a:rPr lang="en-US" smtClean="0"/>
-              <a:t>5/2/21</a:t>
+              <a:t>5/27/21</a:t>
             </a:fld>
             <a:endParaRPr lang="en-US"/>
           </a:p>
@@ -2843,7 +2843,7 @@
           <a:p>
             <a:fld id="{EEDFACC0-3228-BA4B-942E-CEF38B0101FD}" type="datetime1">
               <a:rPr lang="en-US" smtClean="0"/>
-              <a:t>5/2/21</a:t>
+              <a:t>5/27/21</a:t>
             </a:fld>
             <a:endParaRPr lang="en-US"/>
           </a:p>
@@ -3134,7 +3134,7 @@
           <a:p>
             <a:fld id="{07EEEDBE-E24C-D140-B419-6D8D592D0F1C}" type="datetime1">
               <a:rPr lang="en-US" smtClean="0"/>
-              <a:t>5/2/21</a:t>
+              <a:t>5/27/21</a:t>
             </a:fld>
             <a:endParaRPr lang="en-US"/>
           </a:p>
@@ -3378,7 +3378,7 @@
           <a:p>
             <a:fld id="{E05781A2-A5EF-C54C-A3EF-F62483D37EDC}" type="datetime1">
               <a:rPr lang="en-US" smtClean="0"/>
-              <a:t>5/2/21</a:t>
+              <a:t>5/27/21</a:t>
             </a:fld>
             <a:endParaRPr lang="en-US"/>
           </a:p>
@@ -3801,63 +3801,6 @@
       </p:grpSpPr>
       <p:sp>
         <p:nvSpPr>
-          <p:cNvPr id="2" name="Footer Placeholder 1">
-            <a:extLst>
-              <a:ext uri="{FF2B5EF4-FFF2-40B4-BE49-F238E27FC236}">
-                <a16:creationId xmlns:a16="http://schemas.microsoft.com/office/drawing/2014/main" id="{CAF876A6-21EF-6949-9DC3-C0A99675CD1E}"/>
-              </a:ext>
-            </a:extLst>
-          </p:cNvPr>
-          <p:cNvSpPr>
-            <a:spLocks noGrp="1"/>
-          </p:cNvSpPr>
-          <p:nvPr>
-            <p:ph type="ftr" sz="quarter" idx="11"/>
-          </p:nvPr>
-        </p:nvSpPr>
-        <p:spPr/>
-        <p:txBody>
-          <a:bodyPr/>
-          <a:lstStyle/>
-          <a:p>
-            <a:r>
-              <a:rPr lang="en-US" dirty="0"/>
-              <a:t>https://iter8.tools</a:t>
-            </a:r>
-          </a:p>
-        </p:txBody>
-      </p:sp>
-      <p:sp>
-        <p:nvSpPr>
-          <p:cNvPr id="3" name="Slide Number Placeholder 2">
-            <a:extLst>
-              <a:ext uri="{FF2B5EF4-FFF2-40B4-BE49-F238E27FC236}">
-                <a16:creationId xmlns:a16="http://schemas.microsoft.com/office/drawing/2014/main" id="{8986A4B5-D9A6-BA4A-AE84-82889CB87602}"/>
-              </a:ext>
-            </a:extLst>
-          </p:cNvPr>
-          <p:cNvSpPr>
-            <a:spLocks noGrp="1"/>
-          </p:cNvSpPr>
-          <p:nvPr>
-            <p:ph type="sldNum" sz="quarter" idx="12"/>
-          </p:nvPr>
-        </p:nvSpPr>
-        <p:spPr/>
-        <p:txBody>
-          <a:bodyPr/>
-          <a:lstStyle/>
-          <a:p>
-            <a:fld id="{B78E2DF1-CA0F-8745-8AE1-A3A61670CB1B}" type="slidenum">
-              <a:rPr lang="en-US" smtClean="0"/>
-              <a:t>1</a:t>
-            </a:fld>
-            <a:endParaRPr lang="en-US"/>
-          </a:p>
-        </p:txBody>
-      </p:sp>
-      <p:sp>
-        <p:nvSpPr>
           <p:cNvPr id="54" name="Rounded Rectangle 53">
             <a:extLst>
               <a:ext uri="{FF2B5EF4-FFF2-40B4-BE49-F238E27FC236}">
@@ -3870,8 +3813,8 @@
         </p:nvSpPr>
         <p:spPr>
           <a:xfrm>
-            <a:off x="4866290" y="3795607"/>
-            <a:ext cx="4376458" cy="1395986"/>
+            <a:off x="4581297" y="3364682"/>
+            <a:ext cx="5992110" cy="1489732"/>
           </a:xfrm>
           <a:prstGeom prst="roundRect">
             <a:avLst/>
@@ -3914,13 +3857,51 @@
                   <a:srgbClr val="7A004A"/>
                 </a:solidFill>
               </a:rPr>
-              <a:t>Automate A/B(/n), Canary, and Conformance experiments</a:t>
-            </a:r>
-            <a:endParaRPr lang="en-US" sz="2000" dirty="0">
-              <a:solidFill>
-                <a:schemeClr val="tx1"/>
-              </a:solidFill>
-            </a:endParaRPr>
+              <a:t>Automate releases &amp; experiments </a:t>
+            </a:r>
+            <a:r>
+              <a:rPr lang="en-US" sz="2000" dirty="0">
+                <a:solidFill>
+                  <a:schemeClr val="tx1"/>
+                </a:solidFill>
+              </a:rPr>
+              <a:t>for</a:t>
+            </a:r>
+            <a:r>
+              <a:rPr lang="en-US" sz="2000" b="1" dirty="0">
+                <a:solidFill>
+                  <a:srgbClr val="7A004A"/>
+                </a:solidFill>
+              </a:rPr>
+              <a:t> </a:t>
+            </a:r>
+          </a:p>
+          <a:p>
+            <a:pPr algn="ctr"/>
+            <a:r>
+              <a:rPr lang="en-US" sz="2000" dirty="0">
+                <a:solidFill>
+                  <a:schemeClr val="tx1"/>
+                </a:solidFill>
+              </a:rPr>
+              <a:t>Kubernetes</a:t>
+            </a:r>
+            <a:r>
+              <a:rPr lang="en-US" sz="2000" b="1" dirty="0">
+                <a:solidFill>
+                  <a:srgbClr val="7A004A"/>
+                </a:solidFill>
+              </a:rPr>
+              <a:t> </a:t>
+            </a:r>
+            <a:r>
+              <a:rPr lang="en-US" sz="2000" dirty="0">
+                <a:solidFill>
+                  <a:schemeClr val="tx1"/>
+                </a:solidFill>
+              </a:rPr>
+              <a:t>applications and ML models</a:t>
+            </a:r>
           </a:p>
         </p:txBody>
       </p:sp>
@@ -3938,8 +3919,8 @@
         </p:nvSpPr>
         <p:spPr>
           <a:xfrm>
-            <a:off x="3205655" y="2031427"/>
-            <a:ext cx="3585863" cy="1397573"/>
+            <a:off x="3341187" y="1600502"/>
+            <a:ext cx="3511558" cy="1397573"/>
           </a:xfrm>
           <a:prstGeom prst="roundRect">
             <a:avLst/>
@@ -3982,16 +3963,13 @@
                   <a:srgbClr val="7A004A"/>
                 </a:solidFill>
               </a:rPr>
-              <a:t>Find and promote winning version </a:t>
-            </a:r>
-            <a:r>
-              <a:rPr lang="en-US" sz="2000" dirty="0">
-                <a:solidFill>
-                  <a:schemeClr val="tx1"/>
-                </a:solidFill>
-              </a:rPr>
-              <a:t>of your app/ML model</a:t>
-            </a:r>
+              <a:t>Find and safely promote winning version</a:t>
+            </a:r>
+            <a:endParaRPr lang="en-US" sz="2000" dirty="0">
+              <a:solidFill>
+                <a:schemeClr val="tx1"/>
+              </a:solidFill>
+            </a:endParaRPr>
           </a:p>
         </p:txBody>
       </p:sp>
@@ -4023,7 +4001,7 @@
         </p:blipFill>
         <p:spPr>
           <a:xfrm flipH="1">
-            <a:off x="3987823" y="2106861"/>
+            <a:off x="4061398" y="1675936"/>
             <a:ext cx="623353" cy="623353"/>
           </a:xfrm>
           <a:prstGeom prst="rect">
@@ -4059,7 +4037,7 @@
         </p:blipFill>
         <p:spPr>
           <a:xfrm flipH="1">
-            <a:off x="4549766" y="2106861"/>
+            <a:off x="4623341" y="1675936"/>
             <a:ext cx="623353" cy="623353"/>
           </a:xfrm>
           <a:prstGeom prst="rect">
@@ -4095,7 +4073,7 @@
         </p:blipFill>
         <p:spPr>
           <a:xfrm flipH="1">
-            <a:off x="5101198" y="2106861"/>
+            <a:off x="5174773" y="1675936"/>
             <a:ext cx="623353" cy="623353"/>
           </a:xfrm>
           <a:prstGeom prst="rect">
@@ -4131,7 +4109,7 @@
         </p:blipFill>
         <p:spPr>
           <a:xfrm>
-            <a:off x="3195265" y="4074651"/>
+            <a:off x="3341187" y="3690599"/>
             <a:ext cx="837897" cy="837897"/>
           </a:xfrm>
           <a:prstGeom prst="rect">
@@ -4167,8 +4145,8 @@
         </p:nvCxnSpPr>
         <p:spPr>
           <a:xfrm>
-            <a:off x="4033162" y="4493600"/>
-            <a:ext cx="833128" cy="0"/>
+            <a:off x="4179084" y="4109548"/>
+            <a:ext cx="402213" cy="0"/>
           </a:xfrm>
           <a:prstGeom prst="straightConnector1">
             <a:avLst/>
@@ -4227,7 +4205,7 @@
         </p:blipFill>
         <p:spPr bwMode="auto">
           <a:xfrm flipH="1">
-            <a:off x="5099207" y="3905918"/>
+            <a:off x="5130738" y="3517033"/>
             <a:ext cx="505667" cy="498513"/>
           </a:xfrm>
           <a:prstGeom prst="rect">
@@ -4274,7 +4252,7 @@
         </p:blipFill>
         <p:spPr bwMode="auto">
           <a:xfrm>
-            <a:off x="6584339" y="3905631"/>
+            <a:off x="6615870" y="3516746"/>
             <a:ext cx="494256" cy="494256"/>
           </a:xfrm>
           <a:prstGeom prst="rect">
@@ -4321,7 +4299,7 @@
         </p:blipFill>
         <p:spPr bwMode="auto">
           <a:xfrm>
-            <a:off x="5778367" y="3905919"/>
+            <a:off x="5809898" y="3517034"/>
             <a:ext cx="611528" cy="494256"/>
           </a:xfrm>
           <a:prstGeom prst="rect">
@@ -4367,7 +4345,7 @@
         </p:blipFill>
         <p:spPr>
           <a:xfrm>
-            <a:off x="5698791" y="2133854"/>
+            <a:off x="5772366" y="1702929"/>
             <a:ext cx="506616" cy="506616"/>
           </a:xfrm>
           <a:prstGeom prst="rect">
@@ -4403,8 +4381,8 @@
         </p:blipFill>
         <p:spPr>
           <a:xfrm>
-            <a:off x="8460001" y="3944198"/>
-            <a:ext cx="546199" cy="546199"/>
+            <a:off x="9679340" y="3665630"/>
+            <a:ext cx="681704" cy="681704"/>
           </a:xfrm>
           <a:prstGeom prst="rect">
             <a:avLst/>
@@ -4432,8 +4410,8 @@
         </p:nvSpPr>
         <p:spPr>
           <a:xfrm>
-            <a:off x="7064615" y="2033013"/>
-            <a:ext cx="2178133" cy="1395986"/>
+            <a:off x="7414688" y="1602088"/>
+            <a:ext cx="3158719" cy="1395986"/>
           </a:xfrm>
           <a:prstGeom prst="roundRect">
             <a:avLst/>
@@ -4471,20 +4449,31 @@
           <a:p>
             <a:pPr algn="ctr"/>
             <a:r>
+              <a:rPr lang="en-US" sz="2000" dirty="0">
+                <a:solidFill>
+                  <a:schemeClr val="tx1"/>
+                </a:solidFill>
+              </a:rPr>
+              <a:t>Use</a:t>
+            </a:r>
+            <a:r>
               <a:rPr lang="en-US" sz="2000" b="1" dirty="0">
                 <a:solidFill>
                   <a:srgbClr val="7A004A"/>
                 </a:solidFill>
               </a:rPr>
-              <a:t>Use metrics</a:t>
-            </a:r>
+              <a:t> built-in metrics</a:t>
+            </a:r>
+          </a:p>
+          <a:p>
+            <a:pPr algn="ctr"/>
             <a:r>
               <a:rPr lang="en-US" sz="2000" dirty="0">
                 <a:solidFill>
                   <a:schemeClr val="tx1"/>
                 </a:solidFill>
               </a:rPr>
-              <a:t> from </a:t>
+              <a:t>or </a:t>
             </a:r>
             <a:r>
               <a:rPr lang="en-US" sz="2000" b="1" dirty="0">
@@ -4492,24 +4481,13 @@
                   <a:srgbClr val="7A004A"/>
                 </a:solidFill>
               </a:rPr>
-              <a:t>any</a:t>
-            </a:r>
-            <a:r>
-              <a:rPr lang="en-US" sz="2000" b="1" dirty="0">
-                <a:solidFill>
-                  <a:srgbClr val="C00000"/>
-                </a:solidFill>
-              </a:rPr>
-              <a:t> </a:t>
-            </a:r>
-            <a:r>
-              <a:rPr lang="en-US" sz="2000" dirty="0">
-                <a:solidFill>
-                  <a:schemeClr val="tx1"/>
-                </a:solidFill>
-              </a:rPr>
-              <a:t>provider</a:t>
-            </a:r>
+              <a:t>any metric database</a:t>
+            </a:r>
+            <a:endParaRPr lang="en-US" sz="2000" dirty="0">
+              <a:solidFill>
+                <a:schemeClr val="tx1"/>
+              </a:solidFill>
+            </a:endParaRPr>
           </a:p>
         </p:txBody>
       </p:sp>
@@ -4531,8 +4509,8 @@
         </p:nvCxnSpPr>
         <p:spPr>
           <a:xfrm>
-            <a:off x="6791518" y="2730214"/>
-            <a:ext cx="273097" cy="792"/>
+            <a:off x="6852745" y="2299289"/>
+            <a:ext cx="561943" cy="792"/>
           </a:xfrm>
           <a:prstGeom prst="straightConnector1">
             <a:avLst/>
@@ -4580,8 +4558,8 @@
         </p:nvCxnSpPr>
         <p:spPr>
           <a:xfrm rot="16200000" flipV="1">
-            <a:off x="5843250" y="2584338"/>
-            <a:ext cx="366607" cy="2055932"/>
+            <a:off x="6153856" y="1941186"/>
+            <a:ext cx="366607" cy="2480386"/>
           </a:xfrm>
           <a:prstGeom prst="bentConnector3">
             <a:avLst/>
@@ -4629,12 +4607,12 @@
         </p:nvCxnSpPr>
         <p:spPr>
           <a:xfrm rot="16200000" flipH="1">
-            <a:off x="8185792" y="3396888"/>
-            <a:ext cx="515199" cy="579419"/>
+            <a:off x="9173342" y="2818780"/>
+            <a:ext cx="667556" cy="1026144"/>
           </a:xfrm>
           <a:prstGeom prst="bentConnector3">
             <a:avLst>
-              <a:gd name="adj1" fmla="val 50000"/>
+              <a:gd name="adj1" fmla="val 31106"/>
             </a:avLst>
           </a:prstGeom>
           <a:ln w="25400">
@@ -4690,7 +4668,7 @@
         </p:blipFill>
         <p:spPr>
           <a:xfrm>
-            <a:off x="7110684" y="2115640"/>
+            <a:off x="8424475" y="1682265"/>
             <a:ext cx="469190" cy="485240"/>
           </a:xfrm>
           <a:prstGeom prst="rect">
@@ -4726,7 +4704,7 @@
         </p:blipFill>
         <p:spPr>
           <a:xfrm>
-            <a:off x="7617087" y="2115640"/>
+            <a:off x="8930878" y="1682265"/>
             <a:ext cx="576312" cy="485240"/>
           </a:xfrm>
           <a:prstGeom prst="rect">
@@ -4762,7 +4740,7 @@
         </p:blipFill>
         <p:spPr>
           <a:xfrm>
-            <a:off x="8241122" y="2115641"/>
+            <a:off x="9554913" y="1682266"/>
             <a:ext cx="465279" cy="485239"/>
           </a:xfrm>
           <a:prstGeom prst="rect">
@@ -4798,7 +4776,7 @@
         </p:blipFill>
         <p:spPr>
           <a:xfrm>
-            <a:off x="8733101" y="2115640"/>
+            <a:off x="10046892" y="1682265"/>
             <a:ext cx="467334" cy="485240"/>
           </a:xfrm>
           <a:prstGeom prst="rect">
@@ -4817,13 +4795,12 @@
           </p:cNvPr>
           <p:cNvCxnSpPr>
             <a:cxnSpLocks/>
-            <a:stCxn id="65" idx="1"/>
           </p:cNvCxnSpPr>
           <p:nvPr/>
         </p:nvCxnSpPr>
         <p:spPr>
           <a:xfrm flipH="1">
-            <a:off x="7143136" y="4217298"/>
+            <a:off x="7819763" y="3799340"/>
             <a:ext cx="1316865" cy="0"/>
           </a:xfrm>
           <a:prstGeom prst="straightConnector1">
@@ -4854,6 +4831,49 @@
           </a:fontRef>
         </p:style>
       </p:cxnSp>
+      <p:pic>
+        <p:nvPicPr>
+          <p:cNvPr id="27" name="Graphic 26">
+            <a:extLst>
+              <a:ext uri="{FF2B5EF4-FFF2-40B4-BE49-F238E27FC236}">
+                <a16:creationId xmlns:a16="http://schemas.microsoft.com/office/drawing/2014/main" id="{8E64CE0A-A303-B24D-84CD-764C68816431}"/>
+              </a:ext>
+            </a:extLst>
+          </p:cNvPr>
+          <p:cNvPicPr>
+            <a:picLocks noChangeAspect="1"/>
+          </p:cNvPicPr>
+          <p:nvPr/>
+        </p:nvPicPr>
+        <p:blipFill>
+          <a:blip r:embed="rId16">
+            <a:extLst>
+              <a:ext uri="{96DAC541-7B7A-43D3-8B79-37D633B846F1}">
+                <asvg:svgBlip xmlns:asvg="http://schemas.microsoft.com/office/drawing/2016/SVG/main" r:embed="rId17"/>
+              </a:ext>
+            </a:extLst>
+          </a:blip>
+          <a:stretch>
+            <a:fillRect/>
+          </a:stretch>
+        </p:blipFill>
+        <p:spPr>
+          <a:xfrm>
+            <a:off x="7521948" y="1675936"/>
+            <a:ext cx="485240" cy="485240"/>
+          </a:xfrm>
+          <a:prstGeom prst="rect">
+            <a:avLst/>
+          </a:prstGeom>
+          <a:effectLst>
+            <a:outerShdw blurRad="50800" dist="50800" dir="5400000" algn="ctr" rotWithShape="0">
+              <a:srgbClr val="000000">
+                <a:alpha val="93000"/>
+              </a:srgbClr>
+            </a:outerShdw>
+          </a:effectLst>
+        </p:spPr>
+      </p:pic>
     </p:spTree>
     <p:extLst>
       <p:ext uri="{BB962C8B-B14F-4D97-AF65-F5344CB8AC3E}">

</xml_diff>

<commit_message>
landing page style and content changes
Signed-off-by: Srinivasan Parthasarathy <spartha@us.ibm.com>
</commit_message>
<xml_diff>
--- a/mkdocs/docs/images/src/illustration.pptx
+++ b/mkdocs/docs/images/src/illustration.pptx
@@ -197,7 +197,7 @@
           <a:p>
             <a:fld id="{38B78CBE-37FA-D241-BB4C-CAC5D3B25F49}" type="datetimeFigureOut">
               <a:rPr lang="en-US" smtClean="0"/>
-              <a:t>5/27/21</a:t>
+              <a:t>6/7/21</a:t>
             </a:fld>
             <a:endParaRPr lang="en-US"/>
           </a:p>
@@ -695,7 +695,7 @@
           <a:p>
             <a:fld id="{708812C5-0212-FD42-A0D4-E2E8FF4E3AF5}" type="datetime1">
               <a:rPr lang="en-US" smtClean="0"/>
-              <a:t>5/27/21</a:t>
+              <a:t>6/7/21</a:t>
             </a:fld>
             <a:endParaRPr lang="en-US"/>
           </a:p>
@@ -896,7 +896,7 @@
           <a:p>
             <a:fld id="{D232AC6F-41C3-B34B-9BAA-03ED2F3BC0F6}" type="datetime1">
               <a:rPr lang="en-US" smtClean="0"/>
-              <a:t>5/27/21</a:t>
+              <a:t>6/7/21</a:t>
             </a:fld>
             <a:endParaRPr lang="en-US"/>
           </a:p>
@@ -1107,7 +1107,7 @@
           <a:p>
             <a:fld id="{BEE140C2-F440-9D49-95CB-5965D64CC4A2}" type="datetime1">
               <a:rPr lang="en-US" smtClean="0"/>
-              <a:t>5/27/21</a:t>
+              <a:t>6/7/21</a:t>
             </a:fld>
             <a:endParaRPr lang="en-US"/>
           </a:p>
@@ -1308,7 +1308,7 @@
           <a:p>
             <a:fld id="{CC99F980-FB29-FD47-8508-150F73F1E8B0}" type="datetime1">
               <a:rPr lang="en-US" smtClean="0"/>
-              <a:t>5/27/21</a:t>
+              <a:t>6/7/21</a:t>
             </a:fld>
             <a:endParaRPr lang="en-US"/>
           </a:p>
@@ -1586,7 +1586,7 @@
           <a:p>
             <a:fld id="{D4510983-EA22-9643-8AC0-B3C6499B643B}" type="datetime1">
               <a:rPr lang="en-US" smtClean="0"/>
-              <a:t>5/27/21</a:t>
+              <a:t>6/7/21</a:t>
             </a:fld>
             <a:endParaRPr lang="en-US"/>
           </a:p>
@@ -1854,7 +1854,7 @@
           <a:p>
             <a:fld id="{D5A39195-967D-5D4E-8C6A-C99866996458}" type="datetime1">
               <a:rPr lang="en-US" smtClean="0"/>
-              <a:t>5/27/21</a:t>
+              <a:t>6/7/21</a:t>
             </a:fld>
             <a:endParaRPr lang="en-US"/>
           </a:p>
@@ -2269,7 +2269,7 @@
           <a:p>
             <a:fld id="{5AD771E9-C79D-684D-A158-5EB6E92DE947}" type="datetime1">
               <a:rPr lang="en-US" smtClean="0"/>
-              <a:t>5/27/21</a:t>
+              <a:t>6/7/21</a:t>
             </a:fld>
             <a:endParaRPr lang="en-US"/>
           </a:p>
@@ -2413,7 +2413,7 @@
           <a:p>
             <a:fld id="{693CA161-7E4C-5C4B-B799-DB602A0B9806}" type="datetime1">
               <a:rPr lang="en-US" smtClean="0"/>
-              <a:t>5/27/21</a:t>
+              <a:t>6/7/21</a:t>
             </a:fld>
             <a:endParaRPr lang="en-US"/>
           </a:p>
@@ -2529,7 +2529,7 @@
           <a:p>
             <a:fld id="{6D55FDF3-8BB2-6349-A5FA-057F3D78953D}" type="datetime1">
               <a:rPr lang="en-US" smtClean="0"/>
-              <a:t>5/27/21</a:t>
+              <a:t>6/7/21</a:t>
             </a:fld>
             <a:endParaRPr lang="en-US"/>
           </a:p>
@@ -2843,7 +2843,7 @@
           <a:p>
             <a:fld id="{EEDFACC0-3228-BA4B-942E-CEF38B0101FD}" type="datetime1">
               <a:rPr lang="en-US" smtClean="0"/>
-              <a:t>5/27/21</a:t>
+              <a:t>6/7/21</a:t>
             </a:fld>
             <a:endParaRPr lang="en-US"/>
           </a:p>
@@ -3134,7 +3134,7 @@
           <a:p>
             <a:fld id="{07EEEDBE-E24C-D140-B419-6D8D592D0F1C}" type="datetime1">
               <a:rPr lang="en-US" smtClean="0"/>
-              <a:t>5/27/21</a:t>
+              <a:t>6/7/21</a:t>
             </a:fld>
             <a:endParaRPr lang="en-US"/>
           </a:p>
@@ -3378,7 +3378,7 @@
           <a:p>
             <a:fld id="{E05781A2-A5EF-C54C-A3EF-F62483D37EDC}" type="datetime1">
               <a:rPr lang="en-US" smtClean="0"/>
-              <a:t>5/27/21</a:t>
+              <a:t>6/7/21</a:t>
             </a:fld>
             <a:endParaRPr lang="en-US"/>
           </a:p>
@@ -3813,8 +3813,8 @@
         </p:nvSpPr>
         <p:spPr>
           <a:xfrm>
-            <a:off x="4581297" y="3364682"/>
-            <a:ext cx="5992110" cy="1489732"/>
+            <a:off x="4581297" y="3522338"/>
+            <a:ext cx="5992110" cy="1480830"/>
           </a:xfrm>
           <a:prstGeom prst="roundRect">
             <a:avLst/>
@@ -3857,51 +3857,24 @@
                   <a:srgbClr val="7A004A"/>
                 </a:solidFill>
               </a:rPr>
-              <a:t>Automate releases &amp; experiments </a:t>
-            </a:r>
-            <a:r>
-              <a:rPr lang="en-US" sz="2000" dirty="0">
-                <a:solidFill>
-                  <a:schemeClr val="tx1"/>
-                </a:solidFill>
-              </a:rPr>
-              <a:t>for</a:t>
-            </a:r>
+              <a:t>Automated SLO validation, A/B testing, </a:t>
+            </a:r>
+          </a:p>
+          <a:p>
+            <a:pPr algn="ctr"/>
             <a:r>
               <a:rPr lang="en-US" sz="2000" b="1" dirty="0">
                 <a:solidFill>
                   <a:srgbClr val="7A004A"/>
                 </a:solidFill>
               </a:rPr>
-              <a:t> </a:t>
-            </a:r>
-          </a:p>
-          <a:p>
-            <a:pPr algn="ctr"/>
-            <a:r>
-              <a:rPr lang="en-US" sz="2000" dirty="0">
-                <a:solidFill>
-                  <a:schemeClr val="tx1"/>
-                </a:solidFill>
-              </a:rPr>
-              <a:t>Kubernetes</a:t>
-            </a:r>
-            <a:r>
-              <a:rPr lang="en-US" sz="2000" b="1" dirty="0">
-                <a:solidFill>
-                  <a:srgbClr val="7A004A"/>
-                </a:solidFill>
-              </a:rPr>
-              <a:t> </a:t>
-            </a:r>
-            <a:r>
-              <a:rPr lang="en-US" sz="2000" dirty="0">
-                <a:solidFill>
-                  <a:schemeClr val="tx1"/>
-                </a:solidFill>
-              </a:rPr>
-              <a:t>applications and ML models</a:t>
-            </a:r>
+              <a:t>dark launch, blue green and canary deployments</a:t>
+            </a:r>
+            <a:endParaRPr lang="en-US" sz="2000" dirty="0">
+              <a:solidFill>
+                <a:schemeClr val="tx1"/>
+              </a:solidFill>
+            </a:endParaRPr>
           </a:p>
         </p:txBody>
       </p:sp>
@@ -3920,7 +3893,7 @@
         <p:spPr>
           <a:xfrm>
             <a:off x="3341187" y="1600502"/>
-            <a:ext cx="3511558" cy="1397573"/>
+            <a:ext cx="3080239" cy="1451386"/>
           </a:xfrm>
           <a:prstGeom prst="roundRect">
             <a:avLst/>
@@ -4001,7 +3974,7 @@
         </p:blipFill>
         <p:spPr>
           <a:xfrm flipH="1">
-            <a:off x="4061398" y="1675936"/>
+            <a:off x="3878416" y="1674667"/>
             <a:ext cx="623353" cy="623353"/>
           </a:xfrm>
           <a:prstGeom prst="rect">
@@ -4037,7 +4010,7 @@
         </p:blipFill>
         <p:spPr>
           <a:xfrm flipH="1">
-            <a:off x="4623341" y="1675936"/>
+            <a:off x="4440359" y="1674667"/>
             <a:ext cx="623353" cy="623353"/>
           </a:xfrm>
           <a:prstGeom prst="rect">
@@ -4073,7 +4046,7 @@
         </p:blipFill>
         <p:spPr>
           <a:xfrm flipH="1">
-            <a:off x="5174773" y="1675936"/>
+            <a:off x="4991791" y="1674667"/>
             <a:ext cx="623353" cy="623353"/>
           </a:xfrm>
           <a:prstGeom prst="rect">
@@ -4109,7 +4082,7 @@
         </p:blipFill>
         <p:spPr>
           <a:xfrm>
-            <a:off x="3341187" y="3690599"/>
+            <a:off x="3341187" y="3843804"/>
             <a:ext cx="837897" cy="837897"/>
           </a:xfrm>
           <a:prstGeom prst="rect">
@@ -4145,7 +4118,7 @@
         </p:nvCxnSpPr>
         <p:spPr>
           <a:xfrm>
-            <a:off x="4179084" y="4109548"/>
+            <a:off x="4179084" y="4262753"/>
             <a:ext cx="402213" cy="0"/>
           </a:xfrm>
           <a:prstGeom prst="straightConnector1">
@@ -4205,7 +4178,7 @@
         </p:blipFill>
         <p:spPr bwMode="auto">
           <a:xfrm flipH="1">
-            <a:off x="5130738" y="3517033"/>
+            <a:off x="5256861" y="3674689"/>
             <a:ext cx="505667" cy="498513"/>
           </a:xfrm>
           <a:prstGeom prst="rect">
@@ -4252,7 +4225,7 @@
         </p:blipFill>
         <p:spPr bwMode="auto">
           <a:xfrm>
-            <a:off x="6615870" y="3516746"/>
+            <a:off x="4663807" y="3674689"/>
             <a:ext cx="494256" cy="494256"/>
           </a:xfrm>
           <a:prstGeom prst="rect">
@@ -4299,7 +4272,7 @@
         </p:blipFill>
         <p:spPr bwMode="auto">
           <a:xfrm>
-            <a:off x="5809898" y="3517034"/>
+            <a:off x="5842559" y="3687208"/>
             <a:ext cx="611528" cy="494256"/>
           </a:xfrm>
           <a:prstGeom prst="rect">
@@ -4345,7 +4318,7 @@
         </p:blipFill>
         <p:spPr>
           <a:xfrm>
-            <a:off x="5772366" y="1702929"/>
+            <a:off x="5589384" y="1701660"/>
             <a:ext cx="506616" cy="506616"/>
           </a:xfrm>
           <a:prstGeom prst="rect">
@@ -4381,7 +4354,7 @@
         </p:blipFill>
         <p:spPr>
           <a:xfrm>
-            <a:off x="9679340" y="3665630"/>
+            <a:off x="9679340" y="3705462"/>
             <a:ext cx="681704" cy="681704"/>
           </a:xfrm>
           <a:prstGeom prst="rect">
@@ -4410,8 +4383,8 @@
         </p:nvSpPr>
         <p:spPr>
           <a:xfrm>
-            <a:off x="7414688" y="1602088"/>
-            <a:ext cx="3158719" cy="1395986"/>
+            <a:off x="6983370" y="1602088"/>
+            <a:ext cx="3590038" cy="1451388"/>
           </a:xfrm>
           <a:prstGeom prst="roundRect">
             <a:avLst/>
@@ -4449,24 +4422,13 @@
           <a:p>
             <a:pPr algn="ctr"/>
             <a:r>
-              <a:rPr lang="en-US" sz="2000" dirty="0">
-                <a:solidFill>
-                  <a:schemeClr val="tx1"/>
-                </a:solidFill>
-              </a:rPr>
-              <a:t>Use</a:t>
-            </a:r>
-            <a:r>
               <a:rPr lang="en-US" sz="2000" b="1" dirty="0">
                 <a:solidFill>
                   <a:srgbClr val="7A004A"/>
                 </a:solidFill>
               </a:rPr>
-              <a:t> built-in metrics</a:t>
-            </a:r>
-          </a:p>
-          <a:p>
-            <a:pPr algn="ctr"/>
+              <a:t>Built-in Iter8 metrics </a:t>
+            </a:r>
             <a:r>
               <a:rPr lang="en-US" sz="2000" dirty="0">
                 <a:solidFill>
@@ -4481,7 +4443,7 @@
                   <a:srgbClr val="7A004A"/>
                 </a:solidFill>
               </a:rPr>
-              <a:t>any metric database</a:t>
+              <a:t>custom metrics from any DB</a:t>
             </a:r>
             <a:endParaRPr lang="en-US" sz="2000" dirty="0">
               <a:solidFill>
@@ -4509,8 +4471,8 @@
         </p:nvCxnSpPr>
         <p:spPr>
           <a:xfrm>
-            <a:off x="6852745" y="2299289"/>
-            <a:ext cx="561943" cy="792"/>
+            <a:off x="6421426" y="2326195"/>
+            <a:ext cx="561944" cy="1587"/>
           </a:xfrm>
           <a:prstGeom prst="straightConnector1">
             <a:avLst/>
@@ -4558,8 +4520,8 @@
         </p:nvCxnSpPr>
         <p:spPr>
           <a:xfrm rot="16200000" flipV="1">
-            <a:off x="6153856" y="1941186"/>
-            <a:ext cx="366607" cy="2480386"/>
+            <a:off x="5994105" y="1939090"/>
+            <a:ext cx="470450" cy="2696045"/>
           </a:xfrm>
           <a:prstGeom prst="bentConnector3">
             <a:avLst/>
@@ -4607,12 +4569,12 @@
         </p:nvCxnSpPr>
         <p:spPr>
           <a:xfrm rot="16200000" flipH="1">
-            <a:off x="9173342" y="2818780"/>
-            <a:ext cx="667556" cy="1026144"/>
+            <a:off x="9073297" y="2758567"/>
+            <a:ext cx="651986" cy="1241803"/>
           </a:xfrm>
           <a:prstGeom prst="bentConnector3">
             <a:avLst>
-              <a:gd name="adj1" fmla="val 31106"/>
+              <a:gd name="adj1" fmla="val 50000"/>
             </a:avLst>
           </a:prstGeom>
           <a:ln w="25400">
@@ -4800,7 +4762,7 @@
         </p:nvCxnSpPr>
         <p:spPr>
           <a:xfrm flipH="1">
-            <a:off x="7819763" y="3799340"/>
+            <a:off x="7819763" y="3956996"/>
             <a:ext cx="1316865" cy="0"/>
           </a:xfrm>
           <a:prstGeom prst="straightConnector1">
@@ -4859,7 +4821,7 @@
         </p:blipFill>
         <p:spPr>
           <a:xfrm>
-            <a:off x="7521948" y="1675936"/>
+            <a:off x="7134220" y="1682265"/>
             <a:ext cx="485240" cy="485240"/>
           </a:xfrm>
           <a:prstGeom prst="rect">
@@ -4872,6 +4834,53 @@
               </a:srgbClr>
             </a:outerShdw>
           </a:effectLst>
+        </p:spPr>
+      </p:pic>
+      <p:pic>
+        <p:nvPicPr>
+          <p:cNvPr id="1026" name="Picture 2" descr="Seldon · GitHub">
+            <a:extLst>
+              <a:ext uri="{FF2B5EF4-FFF2-40B4-BE49-F238E27FC236}">
+                <a16:creationId xmlns:a16="http://schemas.microsoft.com/office/drawing/2014/main" id="{8B164542-4273-A246-B250-41186A1F5144}"/>
+              </a:ext>
+            </a:extLst>
+          </p:cNvPr>
+          <p:cNvPicPr>
+            <a:picLocks noChangeAspect="1" noChangeArrowheads="1"/>
+          </p:cNvPicPr>
+          <p:nvPr/>
+        </p:nvPicPr>
+        <p:blipFill>
+          <a:blip r:embed="rId26">
+            <a:extLst>
+              <a:ext uri="{28A0092B-C50C-407E-A947-70E740481C1C}">
+                <a14:useLocalDpi xmlns:a14="http://schemas.microsoft.com/office/drawing/2010/main" val="0"/>
+              </a:ext>
+            </a:extLst>
+          </a:blip>
+          <a:srcRect/>
+          <a:stretch>
+            <a:fillRect/>
+          </a:stretch>
+        </p:blipFill>
+        <p:spPr bwMode="auto">
+          <a:xfrm flipH="1">
+            <a:off x="6529075" y="3705462"/>
+            <a:ext cx="494255" cy="494255"/>
+          </a:xfrm>
+          <a:prstGeom prst="rect">
+            <a:avLst/>
+          </a:prstGeom>
+          <a:noFill/>
+          <a:extLst>
+            <a:ext uri="{909E8E84-426E-40DD-AFC4-6F175D3DCCD1}">
+              <a14:hiddenFill xmlns:a14="http://schemas.microsoft.com/office/drawing/2010/main">
+                <a:solidFill>
+                  <a:srgbClr val="FFFFFF"/>
+                </a:solidFill>
+              </a14:hiddenFill>
+            </a:ext>
+          </a:extLst>
         </p:spPr>
       </p:pic>
     </p:spTree>

</xml_diff>

<commit_message>
landing page style and content changes (#755)
Signed-off-by: Srinivasan Parthasarathy <spartha@us.ibm.com>
</commit_message>
<xml_diff>
--- a/mkdocs/docs/images/src/illustration.pptx
+++ b/mkdocs/docs/images/src/illustration.pptx
@@ -197,7 +197,7 @@
           <a:p>
             <a:fld id="{38B78CBE-37FA-D241-BB4C-CAC5D3B25F49}" type="datetimeFigureOut">
               <a:rPr lang="en-US" smtClean="0"/>
-              <a:t>5/27/21</a:t>
+              <a:t>6/7/21</a:t>
             </a:fld>
             <a:endParaRPr lang="en-US"/>
           </a:p>
@@ -695,7 +695,7 @@
           <a:p>
             <a:fld id="{708812C5-0212-FD42-A0D4-E2E8FF4E3AF5}" type="datetime1">
               <a:rPr lang="en-US" smtClean="0"/>
-              <a:t>5/27/21</a:t>
+              <a:t>6/7/21</a:t>
             </a:fld>
             <a:endParaRPr lang="en-US"/>
           </a:p>
@@ -896,7 +896,7 @@
           <a:p>
             <a:fld id="{D232AC6F-41C3-B34B-9BAA-03ED2F3BC0F6}" type="datetime1">
               <a:rPr lang="en-US" smtClean="0"/>
-              <a:t>5/27/21</a:t>
+              <a:t>6/7/21</a:t>
             </a:fld>
             <a:endParaRPr lang="en-US"/>
           </a:p>
@@ -1107,7 +1107,7 @@
           <a:p>
             <a:fld id="{BEE140C2-F440-9D49-95CB-5965D64CC4A2}" type="datetime1">
               <a:rPr lang="en-US" smtClean="0"/>
-              <a:t>5/27/21</a:t>
+              <a:t>6/7/21</a:t>
             </a:fld>
             <a:endParaRPr lang="en-US"/>
           </a:p>
@@ -1308,7 +1308,7 @@
           <a:p>
             <a:fld id="{CC99F980-FB29-FD47-8508-150F73F1E8B0}" type="datetime1">
               <a:rPr lang="en-US" smtClean="0"/>
-              <a:t>5/27/21</a:t>
+              <a:t>6/7/21</a:t>
             </a:fld>
             <a:endParaRPr lang="en-US"/>
           </a:p>
@@ -1586,7 +1586,7 @@
           <a:p>
             <a:fld id="{D4510983-EA22-9643-8AC0-B3C6499B643B}" type="datetime1">
               <a:rPr lang="en-US" smtClean="0"/>
-              <a:t>5/27/21</a:t>
+              <a:t>6/7/21</a:t>
             </a:fld>
             <a:endParaRPr lang="en-US"/>
           </a:p>
@@ -1854,7 +1854,7 @@
           <a:p>
             <a:fld id="{D5A39195-967D-5D4E-8C6A-C99866996458}" type="datetime1">
               <a:rPr lang="en-US" smtClean="0"/>
-              <a:t>5/27/21</a:t>
+              <a:t>6/7/21</a:t>
             </a:fld>
             <a:endParaRPr lang="en-US"/>
           </a:p>
@@ -2269,7 +2269,7 @@
           <a:p>
             <a:fld id="{5AD771E9-C79D-684D-A158-5EB6E92DE947}" type="datetime1">
               <a:rPr lang="en-US" smtClean="0"/>
-              <a:t>5/27/21</a:t>
+              <a:t>6/7/21</a:t>
             </a:fld>
             <a:endParaRPr lang="en-US"/>
           </a:p>
@@ -2413,7 +2413,7 @@
           <a:p>
             <a:fld id="{693CA161-7E4C-5C4B-B799-DB602A0B9806}" type="datetime1">
               <a:rPr lang="en-US" smtClean="0"/>
-              <a:t>5/27/21</a:t>
+              <a:t>6/7/21</a:t>
             </a:fld>
             <a:endParaRPr lang="en-US"/>
           </a:p>
@@ -2529,7 +2529,7 @@
           <a:p>
             <a:fld id="{6D55FDF3-8BB2-6349-A5FA-057F3D78953D}" type="datetime1">
               <a:rPr lang="en-US" smtClean="0"/>
-              <a:t>5/27/21</a:t>
+              <a:t>6/7/21</a:t>
             </a:fld>
             <a:endParaRPr lang="en-US"/>
           </a:p>
@@ -2843,7 +2843,7 @@
           <a:p>
             <a:fld id="{EEDFACC0-3228-BA4B-942E-CEF38B0101FD}" type="datetime1">
               <a:rPr lang="en-US" smtClean="0"/>
-              <a:t>5/27/21</a:t>
+              <a:t>6/7/21</a:t>
             </a:fld>
             <a:endParaRPr lang="en-US"/>
           </a:p>
@@ -3134,7 +3134,7 @@
           <a:p>
             <a:fld id="{07EEEDBE-E24C-D140-B419-6D8D592D0F1C}" type="datetime1">
               <a:rPr lang="en-US" smtClean="0"/>
-              <a:t>5/27/21</a:t>
+              <a:t>6/7/21</a:t>
             </a:fld>
             <a:endParaRPr lang="en-US"/>
           </a:p>
@@ -3378,7 +3378,7 @@
           <a:p>
             <a:fld id="{E05781A2-A5EF-C54C-A3EF-F62483D37EDC}" type="datetime1">
               <a:rPr lang="en-US" smtClean="0"/>
-              <a:t>5/27/21</a:t>
+              <a:t>6/7/21</a:t>
             </a:fld>
             <a:endParaRPr lang="en-US"/>
           </a:p>
@@ -3813,8 +3813,8 @@
         </p:nvSpPr>
         <p:spPr>
           <a:xfrm>
-            <a:off x="4581297" y="3364682"/>
-            <a:ext cx="5992110" cy="1489732"/>
+            <a:off x="4581297" y="3522338"/>
+            <a:ext cx="5992110" cy="1480830"/>
           </a:xfrm>
           <a:prstGeom prst="roundRect">
             <a:avLst/>
@@ -3857,51 +3857,24 @@
                   <a:srgbClr val="7A004A"/>
                 </a:solidFill>
               </a:rPr>
-              <a:t>Automate releases &amp; experiments </a:t>
-            </a:r>
-            <a:r>
-              <a:rPr lang="en-US" sz="2000" dirty="0">
-                <a:solidFill>
-                  <a:schemeClr val="tx1"/>
-                </a:solidFill>
-              </a:rPr>
-              <a:t>for</a:t>
-            </a:r>
+              <a:t>Automated SLO validation, A/B testing, </a:t>
+            </a:r>
+          </a:p>
+          <a:p>
+            <a:pPr algn="ctr"/>
             <a:r>
               <a:rPr lang="en-US" sz="2000" b="1" dirty="0">
                 <a:solidFill>
                   <a:srgbClr val="7A004A"/>
                 </a:solidFill>
               </a:rPr>
-              <a:t> </a:t>
-            </a:r>
-          </a:p>
-          <a:p>
-            <a:pPr algn="ctr"/>
-            <a:r>
-              <a:rPr lang="en-US" sz="2000" dirty="0">
-                <a:solidFill>
-                  <a:schemeClr val="tx1"/>
-                </a:solidFill>
-              </a:rPr>
-              <a:t>Kubernetes</a:t>
-            </a:r>
-            <a:r>
-              <a:rPr lang="en-US" sz="2000" b="1" dirty="0">
-                <a:solidFill>
-                  <a:srgbClr val="7A004A"/>
-                </a:solidFill>
-              </a:rPr>
-              <a:t> </a:t>
-            </a:r>
-            <a:r>
-              <a:rPr lang="en-US" sz="2000" dirty="0">
-                <a:solidFill>
-                  <a:schemeClr val="tx1"/>
-                </a:solidFill>
-              </a:rPr>
-              <a:t>applications and ML models</a:t>
-            </a:r>
+              <a:t>dark launch, blue green and canary deployments</a:t>
+            </a:r>
+            <a:endParaRPr lang="en-US" sz="2000" dirty="0">
+              <a:solidFill>
+                <a:schemeClr val="tx1"/>
+              </a:solidFill>
+            </a:endParaRPr>
           </a:p>
         </p:txBody>
       </p:sp>
@@ -3920,7 +3893,7 @@
         <p:spPr>
           <a:xfrm>
             <a:off x="3341187" y="1600502"/>
-            <a:ext cx="3511558" cy="1397573"/>
+            <a:ext cx="3080239" cy="1451386"/>
           </a:xfrm>
           <a:prstGeom prst="roundRect">
             <a:avLst/>
@@ -4001,7 +3974,7 @@
         </p:blipFill>
         <p:spPr>
           <a:xfrm flipH="1">
-            <a:off x="4061398" y="1675936"/>
+            <a:off x="3878416" y="1674667"/>
             <a:ext cx="623353" cy="623353"/>
           </a:xfrm>
           <a:prstGeom prst="rect">
@@ -4037,7 +4010,7 @@
         </p:blipFill>
         <p:spPr>
           <a:xfrm flipH="1">
-            <a:off x="4623341" y="1675936"/>
+            <a:off x="4440359" y="1674667"/>
             <a:ext cx="623353" cy="623353"/>
           </a:xfrm>
           <a:prstGeom prst="rect">
@@ -4073,7 +4046,7 @@
         </p:blipFill>
         <p:spPr>
           <a:xfrm flipH="1">
-            <a:off x="5174773" y="1675936"/>
+            <a:off x="4991791" y="1674667"/>
             <a:ext cx="623353" cy="623353"/>
           </a:xfrm>
           <a:prstGeom prst="rect">
@@ -4109,7 +4082,7 @@
         </p:blipFill>
         <p:spPr>
           <a:xfrm>
-            <a:off x="3341187" y="3690599"/>
+            <a:off x="3341187" y="3843804"/>
             <a:ext cx="837897" cy="837897"/>
           </a:xfrm>
           <a:prstGeom prst="rect">
@@ -4145,7 +4118,7 @@
         </p:nvCxnSpPr>
         <p:spPr>
           <a:xfrm>
-            <a:off x="4179084" y="4109548"/>
+            <a:off x="4179084" y="4262753"/>
             <a:ext cx="402213" cy="0"/>
           </a:xfrm>
           <a:prstGeom prst="straightConnector1">
@@ -4205,7 +4178,7 @@
         </p:blipFill>
         <p:spPr bwMode="auto">
           <a:xfrm flipH="1">
-            <a:off x="5130738" y="3517033"/>
+            <a:off x="5256861" y="3674689"/>
             <a:ext cx="505667" cy="498513"/>
           </a:xfrm>
           <a:prstGeom prst="rect">
@@ -4252,7 +4225,7 @@
         </p:blipFill>
         <p:spPr bwMode="auto">
           <a:xfrm>
-            <a:off x="6615870" y="3516746"/>
+            <a:off x="4663807" y="3674689"/>
             <a:ext cx="494256" cy="494256"/>
           </a:xfrm>
           <a:prstGeom prst="rect">
@@ -4299,7 +4272,7 @@
         </p:blipFill>
         <p:spPr bwMode="auto">
           <a:xfrm>
-            <a:off x="5809898" y="3517034"/>
+            <a:off x="5842559" y="3687208"/>
             <a:ext cx="611528" cy="494256"/>
           </a:xfrm>
           <a:prstGeom prst="rect">
@@ -4345,7 +4318,7 @@
         </p:blipFill>
         <p:spPr>
           <a:xfrm>
-            <a:off x="5772366" y="1702929"/>
+            <a:off x="5589384" y="1701660"/>
             <a:ext cx="506616" cy="506616"/>
           </a:xfrm>
           <a:prstGeom prst="rect">
@@ -4381,7 +4354,7 @@
         </p:blipFill>
         <p:spPr>
           <a:xfrm>
-            <a:off x="9679340" y="3665630"/>
+            <a:off x="9679340" y="3705462"/>
             <a:ext cx="681704" cy="681704"/>
           </a:xfrm>
           <a:prstGeom prst="rect">
@@ -4410,8 +4383,8 @@
         </p:nvSpPr>
         <p:spPr>
           <a:xfrm>
-            <a:off x="7414688" y="1602088"/>
-            <a:ext cx="3158719" cy="1395986"/>
+            <a:off x="6983370" y="1602088"/>
+            <a:ext cx="3590038" cy="1451388"/>
           </a:xfrm>
           <a:prstGeom prst="roundRect">
             <a:avLst/>
@@ -4449,24 +4422,13 @@
           <a:p>
             <a:pPr algn="ctr"/>
             <a:r>
-              <a:rPr lang="en-US" sz="2000" dirty="0">
-                <a:solidFill>
-                  <a:schemeClr val="tx1"/>
-                </a:solidFill>
-              </a:rPr>
-              <a:t>Use</a:t>
-            </a:r>
-            <a:r>
               <a:rPr lang="en-US" sz="2000" b="1" dirty="0">
                 <a:solidFill>
                   <a:srgbClr val="7A004A"/>
                 </a:solidFill>
               </a:rPr>
-              <a:t> built-in metrics</a:t>
-            </a:r>
-          </a:p>
-          <a:p>
-            <a:pPr algn="ctr"/>
+              <a:t>Built-in Iter8 metrics </a:t>
+            </a:r>
             <a:r>
               <a:rPr lang="en-US" sz="2000" dirty="0">
                 <a:solidFill>
@@ -4481,7 +4443,7 @@
                   <a:srgbClr val="7A004A"/>
                 </a:solidFill>
               </a:rPr>
-              <a:t>any metric database</a:t>
+              <a:t>custom metrics from any DB</a:t>
             </a:r>
             <a:endParaRPr lang="en-US" sz="2000" dirty="0">
               <a:solidFill>
@@ -4509,8 +4471,8 @@
         </p:nvCxnSpPr>
         <p:spPr>
           <a:xfrm>
-            <a:off x="6852745" y="2299289"/>
-            <a:ext cx="561943" cy="792"/>
+            <a:off x="6421426" y="2326195"/>
+            <a:ext cx="561944" cy="1587"/>
           </a:xfrm>
           <a:prstGeom prst="straightConnector1">
             <a:avLst/>
@@ -4558,8 +4520,8 @@
         </p:nvCxnSpPr>
         <p:spPr>
           <a:xfrm rot="16200000" flipV="1">
-            <a:off x="6153856" y="1941186"/>
-            <a:ext cx="366607" cy="2480386"/>
+            <a:off x="5994105" y="1939090"/>
+            <a:ext cx="470450" cy="2696045"/>
           </a:xfrm>
           <a:prstGeom prst="bentConnector3">
             <a:avLst/>
@@ -4607,12 +4569,12 @@
         </p:nvCxnSpPr>
         <p:spPr>
           <a:xfrm rot="16200000" flipH="1">
-            <a:off x="9173342" y="2818780"/>
-            <a:ext cx="667556" cy="1026144"/>
+            <a:off x="9073297" y="2758567"/>
+            <a:ext cx="651986" cy="1241803"/>
           </a:xfrm>
           <a:prstGeom prst="bentConnector3">
             <a:avLst>
-              <a:gd name="adj1" fmla="val 31106"/>
+              <a:gd name="adj1" fmla="val 50000"/>
             </a:avLst>
           </a:prstGeom>
           <a:ln w="25400">
@@ -4800,7 +4762,7 @@
         </p:nvCxnSpPr>
         <p:spPr>
           <a:xfrm flipH="1">
-            <a:off x="7819763" y="3799340"/>
+            <a:off x="7819763" y="3956996"/>
             <a:ext cx="1316865" cy="0"/>
           </a:xfrm>
           <a:prstGeom prst="straightConnector1">
@@ -4859,7 +4821,7 @@
         </p:blipFill>
         <p:spPr>
           <a:xfrm>
-            <a:off x="7521948" y="1675936"/>
+            <a:off x="7134220" y="1682265"/>
             <a:ext cx="485240" cy="485240"/>
           </a:xfrm>
           <a:prstGeom prst="rect">
@@ -4872,6 +4834,53 @@
               </a:srgbClr>
             </a:outerShdw>
           </a:effectLst>
+        </p:spPr>
+      </p:pic>
+      <p:pic>
+        <p:nvPicPr>
+          <p:cNvPr id="1026" name="Picture 2" descr="Seldon · GitHub">
+            <a:extLst>
+              <a:ext uri="{FF2B5EF4-FFF2-40B4-BE49-F238E27FC236}">
+                <a16:creationId xmlns:a16="http://schemas.microsoft.com/office/drawing/2014/main" id="{8B164542-4273-A246-B250-41186A1F5144}"/>
+              </a:ext>
+            </a:extLst>
+          </p:cNvPr>
+          <p:cNvPicPr>
+            <a:picLocks noChangeAspect="1" noChangeArrowheads="1"/>
+          </p:cNvPicPr>
+          <p:nvPr/>
+        </p:nvPicPr>
+        <p:blipFill>
+          <a:blip r:embed="rId26">
+            <a:extLst>
+              <a:ext uri="{28A0092B-C50C-407E-A947-70E740481C1C}">
+                <a14:useLocalDpi xmlns:a14="http://schemas.microsoft.com/office/drawing/2010/main" val="0"/>
+              </a:ext>
+            </a:extLst>
+          </a:blip>
+          <a:srcRect/>
+          <a:stretch>
+            <a:fillRect/>
+          </a:stretch>
+        </p:blipFill>
+        <p:spPr bwMode="auto">
+          <a:xfrm flipH="1">
+            <a:off x="6529075" y="3705462"/>
+            <a:ext cx="494255" cy="494255"/>
+          </a:xfrm>
+          <a:prstGeom prst="rect">
+            <a:avLst/>
+          </a:prstGeom>
+          <a:noFill/>
+          <a:extLst>
+            <a:ext uri="{909E8E84-426E-40DD-AFC4-6F175D3DCCD1}">
+              <a14:hiddenFill xmlns:a14="http://schemas.microsoft.com/office/drawing/2010/main">
+                <a:solidFill>
+                  <a:srgbClr val="FFFFFF"/>
+                </a:solidFill>
+              </a14:hiddenFill>
+            </a:ext>
+          </a:extLst>
         </p:spPr>
       </p:pic>
     </p:spTree>

</xml_diff>

<commit_message>
Align knative tutorials with the rest (#758)
* align knative tutorials with the rest

Signed-off-by: Srinivasan Parthasarathy <spartha@us.ibm.com>

* routing rule

Signed-off-by: Srinivasan Parthasarathy <spartha@us.ibm.com>

* improved illustrations

Signed-off-by: Srinivasan Parthasarathy <spartha@us.ibm.com>
</commit_message>
<xml_diff>
--- a/mkdocs/docs/images/src/illustration.pptx
+++ b/mkdocs/docs/images/src/illustration.pptx
@@ -197,7 +197,7 @@
           <a:p>
             <a:fld id="{38B78CBE-37FA-D241-BB4C-CAC5D3B25F49}" type="datetimeFigureOut">
               <a:rPr lang="en-US" smtClean="0"/>
-              <a:t>6/7/21</a:t>
+              <a:t>6/9/21</a:t>
             </a:fld>
             <a:endParaRPr lang="en-US"/>
           </a:p>
@@ -695,7 +695,7 @@
           <a:p>
             <a:fld id="{708812C5-0212-FD42-A0D4-E2E8FF4E3AF5}" type="datetime1">
               <a:rPr lang="en-US" smtClean="0"/>
-              <a:t>6/7/21</a:t>
+              <a:t>6/9/21</a:t>
             </a:fld>
             <a:endParaRPr lang="en-US"/>
           </a:p>
@@ -896,7 +896,7 @@
           <a:p>
             <a:fld id="{D232AC6F-41C3-B34B-9BAA-03ED2F3BC0F6}" type="datetime1">
               <a:rPr lang="en-US" smtClean="0"/>
-              <a:t>6/7/21</a:t>
+              <a:t>6/9/21</a:t>
             </a:fld>
             <a:endParaRPr lang="en-US"/>
           </a:p>
@@ -1107,7 +1107,7 @@
           <a:p>
             <a:fld id="{BEE140C2-F440-9D49-95CB-5965D64CC4A2}" type="datetime1">
               <a:rPr lang="en-US" smtClean="0"/>
-              <a:t>6/7/21</a:t>
+              <a:t>6/9/21</a:t>
             </a:fld>
             <a:endParaRPr lang="en-US"/>
           </a:p>
@@ -1308,7 +1308,7 @@
           <a:p>
             <a:fld id="{CC99F980-FB29-FD47-8508-150F73F1E8B0}" type="datetime1">
               <a:rPr lang="en-US" smtClean="0"/>
-              <a:t>6/7/21</a:t>
+              <a:t>6/9/21</a:t>
             </a:fld>
             <a:endParaRPr lang="en-US"/>
           </a:p>
@@ -1586,7 +1586,7 @@
           <a:p>
             <a:fld id="{D4510983-EA22-9643-8AC0-B3C6499B643B}" type="datetime1">
               <a:rPr lang="en-US" smtClean="0"/>
-              <a:t>6/7/21</a:t>
+              <a:t>6/9/21</a:t>
             </a:fld>
             <a:endParaRPr lang="en-US"/>
           </a:p>
@@ -1854,7 +1854,7 @@
           <a:p>
             <a:fld id="{D5A39195-967D-5D4E-8C6A-C99866996458}" type="datetime1">
               <a:rPr lang="en-US" smtClean="0"/>
-              <a:t>6/7/21</a:t>
+              <a:t>6/9/21</a:t>
             </a:fld>
             <a:endParaRPr lang="en-US"/>
           </a:p>
@@ -2269,7 +2269,7 @@
           <a:p>
             <a:fld id="{5AD771E9-C79D-684D-A158-5EB6E92DE947}" type="datetime1">
               <a:rPr lang="en-US" smtClean="0"/>
-              <a:t>6/7/21</a:t>
+              <a:t>6/9/21</a:t>
             </a:fld>
             <a:endParaRPr lang="en-US"/>
           </a:p>
@@ -2413,7 +2413,7 @@
           <a:p>
             <a:fld id="{693CA161-7E4C-5C4B-B799-DB602A0B9806}" type="datetime1">
               <a:rPr lang="en-US" smtClean="0"/>
-              <a:t>6/7/21</a:t>
+              <a:t>6/9/21</a:t>
             </a:fld>
             <a:endParaRPr lang="en-US"/>
           </a:p>
@@ -2529,7 +2529,7 @@
           <a:p>
             <a:fld id="{6D55FDF3-8BB2-6349-A5FA-057F3D78953D}" type="datetime1">
               <a:rPr lang="en-US" smtClean="0"/>
-              <a:t>6/7/21</a:t>
+              <a:t>6/9/21</a:t>
             </a:fld>
             <a:endParaRPr lang="en-US"/>
           </a:p>
@@ -2843,7 +2843,7 @@
           <a:p>
             <a:fld id="{EEDFACC0-3228-BA4B-942E-CEF38B0101FD}" type="datetime1">
               <a:rPr lang="en-US" smtClean="0"/>
-              <a:t>6/7/21</a:t>
+              <a:t>6/9/21</a:t>
             </a:fld>
             <a:endParaRPr lang="en-US"/>
           </a:p>
@@ -3134,7 +3134,7 @@
           <a:p>
             <a:fld id="{07EEEDBE-E24C-D140-B419-6D8D592D0F1C}" type="datetime1">
               <a:rPr lang="en-US" smtClean="0"/>
-              <a:t>6/7/21</a:t>
+              <a:t>6/9/21</a:t>
             </a:fld>
             <a:endParaRPr lang="en-US"/>
           </a:p>
@@ -3378,7 +3378,7 @@
           <a:p>
             <a:fld id="{E05781A2-A5EF-C54C-A3EF-F62483D37EDC}" type="datetime1">
               <a:rPr lang="en-US" smtClean="0"/>
-              <a:t>6/7/21</a:t>
+              <a:t>6/9/21</a:t>
             </a:fld>
             <a:endParaRPr lang="en-US"/>
           </a:p>
@@ -3814,7 +3814,7 @@
         <p:spPr>
           <a:xfrm>
             <a:off x="4581297" y="3522338"/>
-            <a:ext cx="5992110" cy="1480830"/>
+            <a:ext cx="5992110" cy="1063895"/>
           </a:xfrm>
           <a:prstGeom prst="roundRect">
             <a:avLst/>
@@ -3824,7 +3824,7 @@
               <a:lumMod val="95000"/>
             </a:schemeClr>
           </a:solidFill>
-          <a:ln>
+          <a:ln w="3175">
             <a:solidFill>
               <a:srgbClr val="002060"/>
             </a:solidFill>
@@ -3857,24 +3857,16 @@
                   <a:srgbClr val="7A004A"/>
                 </a:solidFill>
               </a:rPr>
-              <a:t>Automated SLO validation, A/B testing, </a:t>
-            </a:r>
-          </a:p>
-          <a:p>
-            <a:pPr algn="ctr"/>
-            <a:r>
-              <a:rPr lang="en-US" sz="2000" b="1" dirty="0">
+              <a:t>AI-driven </a:t>
+            </a:r>
+            <a:r>
+              <a:rPr lang="en-US" sz="2000" dirty="0">
                 <a:solidFill>
-                  <a:srgbClr val="7A004A"/>
+                  <a:schemeClr val="tx1"/>
                 </a:solidFill>
               </a:rPr>
-              <a:t>dark launch, blue green and canary deployments</a:t>
-            </a:r>
-            <a:endParaRPr lang="en-US" sz="2000" dirty="0">
-              <a:solidFill>
-                <a:schemeClr val="tx1"/>
-              </a:solidFill>
-            </a:endParaRPr>
+              <a:t>SLO validation &amp; A/B testing</a:t>
+            </a:r>
           </a:p>
         </p:txBody>
       </p:sp>
@@ -3892,8 +3884,8 @@
         </p:nvSpPr>
         <p:spPr>
           <a:xfrm>
-            <a:off x="3341187" y="1600502"/>
-            <a:ext cx="3080239" cy="1451386"/>
+            <a:off x="3351470" y="1482582"/>
+            <a:ext cx="3080239" cy="1578365"/>
           </a:xfrm>
           <a:prstGeom prst="roundRect">
             <a:avLst/>
@@ -3903,7 +3895,7 @@
               <a:lumMod val="95000"/>
             </a:schemeClr>
           </a:solidFill>
-          <a:ln>
+          <a:ln w="3175">
             <a:solidFill>
               <a:schemeClr val="tx2"/>
             </a:solidFill>
@@ -3931,12 +3923,20 @@
           <a:p>
             <a:pPr algn="ctr"/>
             <a:r>
+              <a:rPr lang="en-US" sz="2000" dirty="0">
+                <a:solidFill>
+                  <a:schemeClr val="tx1"/>
+                </a:solidFill>
+              </a:rPr>
+              <a:t>Find and safely promote</a:t>
+            </a:r>
+            <a:r>
               <a:rPr lang="en-US" sz="2000" b="1" dirty="0">
                 <a:solidFill>
                   <a:srgbClr val="7A004A"/>
                 </a:solidFill>
               </a:rPr>
-              <a:t>Find and safely promote winning version</a:t>
+              <a:t> winning version</a:t>
             </a:r>
             <a:endParaRPr lang="en-US" sz="2000" dirty="0">
               <a:solidFill>
@@ -4082,7 +4082,7 @@
         </p:blipFill>
         <p:spPr>
           <a:xfrm>
-            <a:off x="3341187" y="3843804"/>
+            <a:off x="3356695" y="3635337"/>
             <a:ext cx="837897" cy="837897"/>
           </a:xfrm>
           <a:prstGeom prst="rect">
@@ -4118,8 +4118,8 @@
         </p:nvCxnSpPr>
         <p:spPr>
           <a:xfrm>
-            <a:off x="4179084" y="4262753"/>
-            <a:ext cx="402213" cy="0"/>
+            <a:off x="4194592" y="4054286"/>
+            <a:ext cx="386705" cy="0"/>
           </a:xfrm>
           <a:prstGeom prst="straightConnector1">
             <a:avLst/>
@@ -4178,7 +4178,7 @@
         </p:blipFill>
         <p:spPr bwMode="auto">
           <a:xfrm flipH="1">
-            <a:off x="5256861" y="3674689"/>
+            <a:off x="5256861" y="3622139"/>
             <a:ext cx="505667" cy="498513"/>
           </a:xfrm>
           <a:prstGeom prst="rect">
@@ -4225,7 +4225,7 @@
         </p:blipFill>
         <p:spPr bwMode="auto">
           <a:xfrm>
-            <a:off x="4663807" y="3674689"/>
+            <a:off x="4663807" y="3622139"/>
             <a:ext cx="494256" cy="494256"/>
           </a:xfrm>
           <a:prstGeom prst="rect">
@@ -4272,7 +4272,7 @@
         </p:blipFill>
         <p:spPr bwMode="auto">
           <a:xfrm>
-            <a:off x="5842559" y="3687208"/>
+            <a:off x="5842559" y="3634658"/>
             <a:ext cx="611528" cy="494256"/>
           </a:xfrm>
           <a:prstGeom prst="rect">
@@ -4354,7 +4354,7 @@
         </p:blipFill>
         <p:spPr>
           <a:xfrm>
-            <a:off x="9679340" y="3705462"/>
+            <a:off x="9679340" y="3652912"/>
             <a:ext cx="681704" cy="681704"/>
           </a:xfrm>
           <a:prstGeom prst="rect">
@@ -4383,8 +4383,8 @@
         </p:nvSpPr>
         <p:spPr>
           <a:xfrm>
-            <a:off x="6983370" y="1602088"/>
-            <a:ext cx="3590038" cy="1451388"/>
+            <a:off x="6983370" y="1482581"/>
+            <a:ext cx="3590038" cy="1578369"/>
           </a:xfrm>
           <a:prstGeom prst="roundRect">
             <a:avLst/>
@@ -4394,7 +4394,7 @@
               <a:lumMod val="95000"/>
             </a:schemeClr>
           </a:solidFill>
-          <a:ln>
+          <a:ln w="3175">
             <a:solidFill>
               <a:schemeClr val="tx2"/>
             </a:solidFill>
@@ -4422,12 +4422,20 @@
           <a:p>
             <a:pPr algn="ctr"/>
             <a:r>
+              <a:rPr lang="en-US" sz="2000" b="1" dirty="0" err="1">
+                <a:solidFill>
+                  <a:srgbClr val="7A004A"/>
+                </a:solidFill>
+              </a:rPr>
+              <a:t>Builtin</a:t>
+            </a:r>
+            <a:r>
               <a:rPr lang="en-US" sz="2000" b="1" dirty="0">
                 <a:solidFill>
                   <a:srgbClr val="7A004A"/>
                 </a:solidFill>
               </a:rPr>
-              <a:t>Built-in Iter8 metrics </a:t>
+              <a:t> </a:t>
             </a:r>
             <a:r>
               <a:rPr lang="en-US" sz="2000" dirty="0">
@@ -4435,15 +4443,53 @@
                   <a:schemeClr val="tx1"/>
                 </a:solidFill>
               </a:rPr>
-              <a:t>or </a:t>
-            </a:r>
+              <a:t>metrics</a:t>
+            </a:r>
+          </a:p>
+          <a:p>
+            <a:pPr algn="ctr"/>
             <a:r>
               <a:rPr lang="en-US" sz="2000" b="1" dirty="0">
                 <a:solidFill>
                   <a:srgbClr val="7A004A"/>
                 </a:solidFill>
               </a:rPr>
-              <a:t>custom metrics from any DB</a:t>
+              <a:t>Custom </a:t>
+            </a:r>
+            <a:r>
+              <a:rPr lang="en-US" sz="2000" dirty="0">
+                <a:solidFill>
+                  <a:schemeClr val="tx1"/>
+                </a:solidFill>
+              </a:rPr>
+              <a:t>metrics from</a:t>
+            </a:r>
+            <a:r>
+              <a:rPr lang="en-US" sz="2000" b="1" dirty="0">
+                <a:solidFill>
+                  <a:srgbClr val="7A004A"/>
+                </a:solidFill>
+              </a:rPr>
+              <a:t> any DB</a:t>
+            </a:r>
+          </a:p>
+          <a:p>
+            <a:pPr algn="ctr"/>
+            <a:r>
+              <a:rPr lang="en-US" sz="2000" dirty="0">
+                <a:solidFill>
+                  <a:schemeClr val="tx1"/>
+                </a:solidFill>
+              </a:rPr>
+              <a:t>Metrics</a:t>
+            </a:r>
+            <a:r>
+              <a:rPr lang="en-US" sz="2000" b="1" dirty="0">
+                <a:solidFill>
+                  <a:srgbClr val="7A004A"/>
+                </a:solidFill>
+              </a:rPr>
+              <a:t> mock</a:t>
             </a:r>
             <a:endParaRPr lang="en-US" sz="2000" dirty="0">
               <a:solidFill>
@@ -4471,8 +4517,8 @@
         </p:nvCxnSpPr>
         <p:spPr>
           <a:xfrm>
-            <a:off x="6421426" y="2326195"/>
-            <a:ext cx="561944" cy="1587"/>
+            <a:off x="6431709" y="2271765"/>
+            <a:ext cx="551661" cy="1"/>
           </a:xfrm>
           <a:prstGeom prst="straightConnector1">
             <a:avLst/>
@@ -4520,8 +4566,8 @@
         </p:nvCxnSpPr>
         <p:spPr>
           <a:xfrm rot="16200000" flipV="1">
-            <a:off x="5994105" y="1939090"/>
-            <a:ext cx="470450" cy="2696045"/>
+            <a:off x="6003776" y="1948762"/>
+            <a:ext cx="461391" cy="2685762"/>
           </a:xfrm>
           <a:prstGeom prst="bentConnector3">
             <a:avLst/>
@@ -4569,8 +4615,8 @@
         </p:nvCxnSpPr>
         <p:spPr>
           <a:xfrm rot="16200000" flipH="1">
-            <a:off x="9073297" y="2758567"/>
-            <a:ext cx="651986" cy="1241803"/>
+            <a:off x="9103309" y="2736029"/>
+            <a:ext cx="591962" cy="1241803"/>
           </a:xfrm>
           <a:prstGeom prst="bentConnector3">
             <a:avLst>
@@ -4630,7 +4676,7 @@
         </p:blipFill>
         <p:spPr>
           <a:xfrm>
-            <a:off x="8424475" y="1682265"/>
+            <a:off x="8382435" y="1535121"/>
             <a:ext cx="469190" cy="485240"/>
           </a:xfrm>
           <a:prstGeom prst="rect">
@@ -4666,7 +4712,7 @@
         </p:blipFill>
         <p:spPr>
           <a:xfrm>
-            <a:off x="8930878" y="1682265"/>
+            <a:off x="8888838" y="1535121"/>
             <a:ext cx="576312" cy="485240"/>
           </a:xfrm>
           <a:prstGeom prst="rect">
@@ -4702,7 +4748,7 @@
         </p:blipFill>
         <p:spPr>
           <a:xfrm>
-            <a:off x="9554913" y="1682266"/>
+            <a:off x="9512873" y="1535122"/>
             <a:ext cx="465279" cy="485239"/>
           </a:xfrm>
           <a:prstGeom prst="rect">
@@ -4738,7 +4784,7 @@
         </p:blipFill>
         <p:spPr>
           <a:xfrm>
-            <a:off x="10046892" y="1682265"/>
+            <a:off x="10004852" y="1535121"/>
             <a:ext cx="467334" cy="485240"/>
           </a:xfrm>
           <a:prstGeom prst="rect">
@@ -4762,7 +4808,7 @@
         </p:nvCxnSpPr>
         <p:spPr>
           <a:xfrm flipH="1">
-            <a:off x="7819763" y="3956996"/>
+            <a:off x="7819763" y="3904446"/>
             <a:ext cx="1316865" cy="0"/>
           </a:xfrm>
           <a:prstGeom prst="straightConnector1">
@@ -4821,7 +4867,7 @@
         </p:blipFill>
         <p:spPr>
           <a:xfrm>
-            <a:off x="7134220" y="1682265"/>
+            <a:off x="7092180" y="1535121"/>
             <a:ext cx="485240" cy="485240"/>
           </a:xfrm>
           <a:prstGeom prst="rect">
@@ -4865,7 +4911,7 @@
         </p:blipFill>
         <p:spPr bwMode="auto">
           <a:xfrm flipH="1">
-            <a:off x="6529075" y="3705462"/>
+            <a:off x="6529075" y="3652912"/>
             <a:ext cx="494255" cy="494255"/>
           </a:xfrm>
           <a:prstGeom prst="rect">
@@ -4883,6 +4929,148 @@
           </a:extLst>
         </p:spPr>
       </p:pic>
+      <p:sp>
+        <p:nvSpPr>
+          <p:cNvPr id="30" name="Rounded Rectangle 29">
+            <a:extLst>
+              <a:ext uri="{FF2B5EF4-FFF2-40B4-BE49-F238E27FC236}">
+                <a16:creationId xmlns:a16="http://schemas.microsoft.com/office/drawing/2014/main" id="{C8D5905C-31B9-0F4D-9C80-768804812972}"/>
+              </a:ext>
+            </a:extLst>
+          </p:cNvPr>
+          <p:cNvSpPr/>
+          <p:nvPr/>
+        </p:nvSpPr>
+        <p:spPr>
+          <a:xfrm>
+            <a:off x="4581297" y="4598044"/>
+            <a:ext cx="5992110" cy="411345"/>
+          </a:xfrm>
+          <a:prstGeom prst="roundRect">
+            <a:avLst/>
+          </a:prstGeom>
+          <a:solidFill>
+            <a:schemeClr val="bg1">
+              <a:lumMod val="95000"/>
+            </a:schemeClr>
+          </a:solidFill>
+          <a:ln w="0">
+            <a:solidFill>
+              <a:srgbClr val="002060"/>
+            </a:solidFill>
+          </a:ln>
+        </p:spPr>
+        <p:style>
+          <a:lnRef idx="2">
+            <a:schemeClr val="accent1">
+              <a:shade val="50000"/>
+            </a:schemeClr>
+          </a:lnRef>
+          <a:fillRef idx="1">
+            <a:schemeClr val="accent1"/>
+          </a:fillRef>
+          <a:effectRef idx="0">
+            <a:schemeClr val="accent1"/>
+          </a:effectRef>
+          <a:fontRef idx="minor">
+            <a:schemeClr val="lt1"/>
+          </a:fontRef>
+        </p:style>
+        <p:txBody>
+          <a:bodyPr rtlCol="0" anchor="b"/>
+          <a:lstStyle/>
+          <a:p>
+            <a:pPr algn="ctr"/>
+            <a:r>
+              <a:rPr lang="en-US" sz="2000" dirty="0">
+                <a:solidFill>
+                  <a:schemeClr val="tx1"/>
+                </a:solidFill>
+              </a:rPr>
+              <a:t>Progressive delivery + traffic engineering</a:t>
+            </a:r>
+          </a:p>
+        </p:txBody>
+      </p:sp>
+      <p:sp>
+        <p:nvSpPr>
+          <p:cNvPr id="32" name="Rounded Rectangle 31">
+            <a:extLst>
+              <a:ext uri="{FF2B5EF4-FFF2-40B4-BE49-F238E27FC236}">
+                <a16:creationId xmlns:a16="http://schemas.microsoft.com/office/drawing/2014/main" id="{0771A79E-5A81-1240-95A0-ABFF155C3F52}"/>
+              </a:ext>
+            </a:extLst>
+          </p:cNvPr>
+          <p:cNvSpPr/>
+          <p:nvPr/>
+        </p:nvSpPr>
+        <p:spPr>
+          <a:xfrm>
+            <a:off x="4581297" y="5013053"/>
+            <a:ext cx="5992110" cy="411345"/>
+          </a:xfrm>
+          <a:prstGeom prst="roundRect">
+            <a:avLst/>
+          </a:prstGeom>
+          <a:solidFill>
+            <a:schemeClr val="bg1">
+              <a:lumMod val="95000"/>
+            </a:schemeClr>
+          </a:solidFill>
+          <a:ln w="3175">
+            <a:solidFill>
+              <a:srgbClr val="002060"/>
+            </a:solidFill>
+          </a:ln>
+        </p:spPr>
+        <p:style>
+          <a:lnRef idx="2">
+            <a:schemeClr val="accent1">
+              <a:shade val="50000"/>
+            </a:schemeClr>
+          </a:lnRef>
+          <a:fillRef idx="1">
+            <a:schemeClr val="accent1"/>
+          </a:fillRef>
+          <a:effectRef idx="0">
+            <a:schemeClr val="accent1"/>
+          </a:effectRef>
+          <a:fontRef idx="minor">
+            <a:schemeClr val="lt1"/>
+          </a:fontRef>
+        </p:style>
+        <p:txBody>
+          <a:bodyPr rtlCol="0" anchor="b"/>
+          <a:lstStyle/>
+          <a:p>
+            <a:pPr algn="ctr"/>
+            <a:r>
+              <a:rPr lang="en-US" sz="2000" dirty="0">
+                <a:solidFill>
+                  <a:schemeClr val="tx1"/>
+                </a:solidFill>
+              </a:rPr>
+              <a:t>Istio, </a:t>
+            </a:r>
+            <a:r>
+              <a:rPr lang="en-US" sz="2000" dirty="0" err="1">
+                <a:solidFill>
+                  <a:schemeClr val="tx1"/>
+                </a:solidFill>
+              </a:rPr>
+              <a:t>KFServing</a:t>
+            </a:r>
+            <a:r>
+              <a:rPr lang="en-US" sz="2000" dirty="0">
+                <a:solidFill>
+                  <a:schemeClr val="tx1"/>
+                </a:solidFill>
+              </a:rPr>
+              <a:t>, Knative, Seldon, …</a:t>
+            </a:r>
+          </a:p>
+        </p:txBody>
+      </p:sp>
     </p:spTree>
     <p:extLst>
       <p:ext uri="{BB962C8B-B14F-4D97-AF65-F5344CB8AC3E}">

</xml_diff>

<commit_message>
fixed split kfserving experiment
Signed-off-by: Srinivasan Parthasarathy <spartha@us.ibm.com>
</commit_message>
<xml_diff>
--- a/mkdocs/docs/images/src/illustration.pptx
+++ b/mkdocs/docs/images/src/illustration.pptx
@@ -197,7 +197,7 @@
           <a:p>
             <a:fld id="{38B78CBE-37FA-D241-BB4C-CAC5D3B25F49}" type="datetimeFigureOut">
               <a:rPr lang="en-US" smtClean="0"/>
-              <a:t>6/16/21</a:t>
+              <a:t>6/21/21</a:t>
             </a:fld>
             <a:endParaRPr lang="en-US"/>
           </a:p>
@@ -695,7 +695,7 @@
           <a:p>
             <a:fld id="{708812C5-0212-FD42-A0D4-E2E8FF4E3AF5}" type="datetime1">
               <a:rPr lang="en-US" smtClean="0"/>
-              <a:t>6/16/21</a:t>
+              <a:t>6/21/21</a:t>
             </a:fld>
             <a:endParaRPr lang="en-US"/>
           </a:p>
@@ -896,7 +896,7 @@
           <a:p>
             <a:fld id="{D232AC6F-41C3-B34B-9BAA-03ED2F3BC0F6}" type="datetime1">
               <a:rPr lang="en-US" smtClean="0"/>
-              <a:t>6/16/21</a:t>
+              <a:t>6/21/21</a:t>
             </a:fld>
             <a:endParaRPr lang="en-US"/>
           </a:p>
@@ -1107,7 +1107,7 @@
           <a:p>
             <a:fld id="{BEE140C2-F440-9D49-95CB-5965D64CC4A2}" type="datetime1">
               <a:rPr lang="en-US" smtClean="0"/>
-              <a:t>6/16/21</a:t>
+              <a:t>6/21/21</a:t>
             </a:fld>
             <a:endParaRPr lang="en-US"/>
           </a:p>
@@ -1308,7 +1308,7 @@
           <a:p>
             <a:fld id="{CC99F980-FB29-FD47-8508-150F73F1E8B0}" type="datetime1">
               <a:rPr lang="en-US" smtClean="0"/>
-              <a:t>6/16/21</a:t>
+              <a:t>6/21/21</a:t>
             </a:fld>
             <a:endParaRPr lang="en-US"/>
           </a:p>
@@ -1586,7 +1586,7 @@
           <a:p>
             <a:fld id="{D4510983-EA22-9643-8AC0-B3C6499B643B}" type="datetime1">
               <a:rPr lang="en-US" smtClean="0"/>
-              <a:t>6/16/21</a:t>
+              <a:t>6/21/21</a:t>
             </a:fld>
             <a:endParaRPr lang="en-US"/>
           </a:p>
@@ -1854,7 +1854,7 @@
           <a:p>
             <a:fld id="{D5A39195-967D-5D4E-8C6A-C99866996458}" type="datetime1">
               <a:rPr lang="en-US" smtClean="0"/>
-              <a:t>6/16/21</a:t>
+              <a:t>6/21/21</a:t>
             </a:fld>
             <a:endParaRPr lang="en-US"/>
           </a:p>
@@ -2269,7 +2269,7 @@
           <a:p>
             <a:fld id="{5AD771E9-C79D-684D-A158-5EB6E92DE947}" type="datetime1">
               <a:rPr lang="en-US" smtClean="0"/>
-              <a:t>6/16/21</a:t>
+              <a:t>6/21/21</a:t>
             </a:fld>
             <a:endParaRPr lang="en-US"/>
           </a:p>
@@ -2413,7 +2413,7 @@
           <a:p>
             <a:fld id="{693CA161-7E4C-5C4B-B799-DB602A0B9806}" type="datetime1">
               <a:rPr lang="en-US" smtClean="0"/>
-              <a:t>6/16/21</a:t>
+              <a:t>6/21/21</a:t>
             </a:fld>
             <a:endParaRPr lang="en-US"/>
           </a:p>
@@ -2529,7 +2529,7 @@
           <a:p>
             <a:fld id="{6D55FDF3-8BB2-6349-A5FA-057F3D78953D}" type="datetime1">
               <a:rPr lang="en-US" smtClean="0"/>
-              <a:t>6/16/21</a:t>
+              <a:t>6/21/21</a:t>
             </a:fld>
             <a:endParaRPr lang="en-US"/>
           </a:p>
@@ -2843,7 +2843,7 @@
           <a:p>
             <a:fld id="{EEDFACC0-3228-BA4B-942E-CEF38B0101FD}" type="datetime1">
               <a:rPr lang="en-US" smtClean="0"/>
-              <a:t>6/16/21</a:t>
+              <a:t>6/21/21</a:t>
             </a:fld>
             <a:endParaRPr lang="en-US"/>
           </a:p>
@@ -3134,7 +3134,7 @@
           <a:p>
             <a:fld id="{07EEEDBE-E24C-D140-B419-6D8D592D0F1C}" type="datetime1">
               <a:rPr lang="en-US" smtClean="0"/>
-              <a:t>6/16/21</a:t>
+              <a:t>6/21/21</a:t>
             </a:fld>
             <a:endParaRPr lang="en-US"/>
           </a:p>
@@ -3378,7 +3378,7 @@
           <a:p>
             <a:fld id="{E05781A2-A5EF-C54C-A3EF-F62483D37EDC}" type="datetime1">
               <a:rPr lang="en-US" smtClean="0"/>
-              <a:t>6/16/21</a:t>
+              <a:t>6/21/21</a:t>
             </a:fld>
             <a:endParaRPr lang="en-US"/>
           </a:p>
@@ -3857,12 +3857,20 @@
               </a:spcBef>
             </a:pPr>
             <a:r>
-              <a:rPr lang="en-US" sz="2000" dirty="0">
+              <a:rPr lang="en-US" sz="2000">
                 <a:solidFill>
                   <a:schemeClr val="tx1"/>
                 </a:solidFill>
               </a:rPr>
-              <a:t>Use Iter8 in </a:t>
+              <a:t>Use in </a:t>
+            </a:r>
+            <a:r>
+              <a:rPr lang="en-US" sz="2000" b="1">
+                <a:solidFill>
+                  <a:srgbClr val="7A004A"/>
+                </a:solidFill>
+              </a:rPr>
+              <a:t>any </a:t>
             </a:r>
             <a:r>
               <a:rPr lang="en-US" sz="2000" b="1" dirty="0">
@@ -3870,7 +3878,7 @@
                   <a:srgbClr val="7A004A"/>
                 </a:solidFill>
               </a:rPr>
-              <a:t>any K8s environment</a:t>
+              <a:t>K8s environment</a:t>
             </a:r>
             <a:endParaRPr lang="en-US" sz="2000" b="1" dirty="0">
               <a:solidFill>
@@ -3917,8 +3925,8 @@
         </p:nvSpPr>
         <p:spPr>
           <a:xfrm>
-            <a:off x="3351470" y="1187668"/>
-            <a:ext cx="3240666" cy="1873280"/>
+            <a:off x="3351470" y="1590876"/>
+            <a:ext cx="3240666" cy="1470072"/>
           </a:xfrm>
           <a:prstGeom prst="roundRect">
             <a:avLst/>
@@ -3966,7 +3974,7 @@
                   <a:schemeClr val="tx1"/>
                 </a:solidFill>
               </a:rPr>
-              <a:t>Find &amp; safely promote </a:t>
+              <a:t>Find &amp; safely rollout </a:t>
             </a:r>
             <a:r>
               <a:rPr lang="en-US" sz="2000" b="1" dirty="0">
@@ -3975,37 +3983,6 @@
                 </a:solidFill>
               </a:rPr>
               <a:t>winning version</a:t>
-            </a:r>
-          </a:p>
-          <a:p>
-            <a:pPr algn="ctr">
-              <a:spcBef>
-                <a:spcPts val="600"/>
-              </a:spcBef>
-            </a:pPr>
-            <a:r>
-              <a:rPr lang="en-US" sz="2000" dirty="0">
-                <a:solidFill>
-                  <a:schemeClr val="tx1"/>
-                </a:solidFill>
-              </a:rPr>
-              <a:t>Use </a:t>
-            </a:r>
-            <a:r>
-              <a:rPr lang="en-US" sz="2000" b="1" dirty="0">
-                <a:solidFill>
-                  <a:srgbClr val="7A004A"/>
-                </a:solidFill>
-              </a:rPr>
-              <a:t>any CI/CD/GitOps </a:t>
-            </a:r>
-            <a:r>
-              <a:rPr lang="en-US" sz="2000" dirty="0">
-                <a:solidFill>
-                  <a:schemeClr val="tx1"/>
-                </a:solidFill>
-              </a:rPr>
-              <a:t>tool</a:t>
             </a:r>
           </a:p>
         </p:txBody>
@@ -4038,7 +4015,7 @@
         </p:blipFill>
         <p:spPr>
           <a:xfrm flipH="1">
-            <a:off x="3878416" y="1233234"/>
+            <a:off x="3878416" y="1706187"/>
             <a:ext cx="623353" cy="623353"/>
           </a:xfrm>
           <a:prstGeom prst="rect">
@@ -4074,7 +4051,7 @@
         </p:blipFill>
         <p:spPr>
           <a:xfrm flipH="1">
-            <a:off x="4440359" y="1233234"/>
+            <a:off x="4440359" y="1706187"/>
             <a:ext cx="623353" cy="623353"/>
           </a:xfrm>
           <a:prstGeom prst="rect">
@@ -4110,7 +4087,7 @@
         </p:blipFill>
         <p:spPr>
           <a:xfrm flipH="1">
-            <a:off x="4991791" y="1233234"/>
+            <a:off x="4991791" y="1706187"/>
             <a:ext cx="623353" cy="623353"/>
           </a:xfrm>
           <a:prstGeom prst="rect">
@@ -4382,7 +4359,7 @@
         </p:blipFill>
         <p:spPr>
           <a:xfrm>
-            <a:off x="5589384" y="1260227"/>
+            <a:off x="5589384" y="1733180"/>
             <a:ext cx="506616" cy="506616"/>
           </a:xfrm>
           <a:prstGeom prst="rect">
@@ -4447,8 +4424,8 @@
         </p:nvSpPr>
         <p:spPr>
           <a:xfrm>
-            <a:off x="6983370" y="1187669"/>
-            <a:ext cx="3590038" cy="1873281"/>
+            <a:off x="6983370" y="1590877"/>
+            <a:ext cx="3590038" cy="1470073"/>
           </a:xfrm>
           <a:prstGeom prst="roundRect">
             <a:avLst/>
@@ -4491,12 +4468,12 @@
               </a:spcBef>
             </a:pPr>
             <a:r>
-              <a:rPr lang="en-US" sz="2000" b="1" dirty="0" err="1">
+              <a:rPr lang="en-US" sz="2000" dirty="0">
                 <a:solidFill>
-                  <a:srgbClr val="7A004A"/>
+                  <a:schemeClr val="tx1"/>
                 </a:solidFill>
               </a:rPr>
-              <a:t>Builtin</a:t>
+              <a:t>Use</a:t>
             </a:r>
             <a:r>
               <a:rPr lang="en-US" sz="2000" b="1" dirty="0">
@@ -4507,6 +4484,38 @@
               <a:t> </a:t>
             </a:r>
             <a:r>
+              <a:rPr lang="en-US" sz="2000" b="1" dirty="0" err="1">
+                <a:solidFill>
+                  <a:srgbClr val="7A004A"/>
+                </a:solidFill>
+              </a:rPr>
+              <a:t>builtin</a:t>
+            </a:r>
+            <a:r>
+              <a:rPr lang="en-US" sz="2000" b="1" dirty="0">
+                <a:solidFill>
+                  <a:srgbClr val="7A004A"/>
+                </a:solidFill>
+              </a:rPr>
+              <a:t> </a:t>
+            </a:r>
+            <a:r>
+              <a:rPr lang="en-US" sz="2000" dirty="0">
+                <a:solidFill>
+                  <a:schemeClr val="tx1"/>
+                </a:solidFill>
+              </a:rPr>
+              <a:t>metrics or </a:t>
+            </a:r>
+            <a:r>
+              <a:rPr lang="en-US" sz="2000" b="1" dirty="0">
+                <a:solidFill>
+                  <a:srgbClr val="7A004A"/>
+                </a:solidFill>
+              </a:rPr>
+              <a:t>custom </a:t>
+            </a:r>
+            <a:r>
               <a:rPr lang="en-US" sz="2000" dirty="0">
                 <a:solidFill>
                   <a:schemeClr val="tx1"/>
@@ -4514,20 +4523,13 @@
               </a:rPr>
               <a:t>metrics</a:t>
             </a:r>
-          </a:p>
-          <a:p>
-            <a:pPr algn="ctr">
-              <a:spcBef>
-                <a:spcPts val="600"/>
-              </a:spcBef>
-            </a:pPr>
             <a:r>
               <a:rPr lang="en-US" sz="2000" b="1" dirty="0">
                 <a:solidFill>
                   <a:srgbClr val="7A004A"/>
                 </a:solidFill>
               </a:rPr>
-              <a:t>Custom </a:t>
+              <a:t> </a:t>
             </a:r>
             <a:r>
               <a:rPr lang="en-US" sz="2000" dirty="0">
@@ -4535,7 +4537,7 @@
                   <a:schemeClr val="tx1"/>
                 </a:solidFill>
               </a:rPr>
-              <a:t>metrics from</a:t>
+              <a:t>from</a:t>
             </a:r>
             <a:r>
               <a:rPr lang="en-US" sz="2000" b="1" dirty="0">
@@ -4544,29 +4546,6 @@
                 </a:solidFill>
               </a:rPr>
               <a:t> any DB</a:t>
-            </a:r>
-          </a:p>
-          <a:p>
-            <a:pPr algn="ctr">
-              <a:spcBef>
-                <a:spcPts val="600"/>
-              </a:spcBef>
-            </a:pPr>
-            <a:r>
-              <a:rPr lang="en-US" sz="2000" dirty="0">
-                <a:solidFill>
-                  <a:schemeClr val="tx1"/>
-                </a:solidFill>
-              </a:rPr>
-              <a:t>Metrics</a:t>
-            </a:r>
-            <a:r>
-              <a:rPr lang="en-US" sz="2000" b="1" dirty="0">
-                <a:solidFill>
-                  <a:srgbClr val="7A004A"/>
-                </a:solidFill>
-              </a:rPr>
-              <a:t> mock</a:t>
             </a:r>
             <a:endParaRPr lang="en-US" sz="2000" dirty="0">
               <a:solidFill>
@@ -4594,7 +4573,7 @@
         </p:nvCxnSpPr>
         <p:spPr>
           <a:xfrm>
-            <a:off x="6592136" y="2124308"/>
+            <a:off x="6592136" y="2325912"/>
             <a:ext cx="391234" cy="2"/>
           </a:xfrm>
           <a:prstGeom prst="straightConnector1">
@@ -4756,7 +4735,7 @@
         </p:blipFill>
         <p:spPr>
           <a:xfrm>
-            <a:off x="8382435" y="1282875"/>
+            <a:off x="8382435" y="1755828"/>
             <a:ext cx="469190" cy="485240"/>
           </a:xfrm>
           <a:prstGeom prst="rect">
@@ -4792,7 +4771,7 @@
         </p:blipFill>
         <p:spPr>
           <a:xfrm>
-            <a:off x="8888838" y="1282875"/>
+            <a:off x="8888838" y="1755828"/>
             <a:ext cx="576312" cy="485240"/>
           </a:xfrm>
           <a:prstGeom prst="rect">
@@ -4828,7 +4807,7 @@
         </p:blipFill>
         <p:spPr>
           <a:xfrm>
-            <a:off x="9512873" y="1282876"/>
+            <a:off x="9512873" y="1755829"/>
             <a:ext cx="465279" cy="485239"/>
           </a:xfrm>
           <a:prstGeom prst="rect">
@@ -4864,7 +4843,7 @@
         </p:blipFill>
         <p:spPr>
           <a:xfrm>
-            <a:off x="10004852" y="1282875"/>
+            <a:off x="10004852" y="1755828"/>
             <a:ext cx="467334" cy="485240"/>
           </a:xfrm>
           <a:prstGeom prst="rect">
@@ -4948,7 +4927,7 @@
         </p:blipFill>
         <p:spPr>
           <a:xfrm>
-            <a:off x="7092180" y="1282875"/>
+            <a:off x="7092180" y="1671748"/>
             <a:ext cx="485240" cy="485240"/>
           </a:xfrm>
           <a:prstGeom prst="rect">
@@ -5010,150 +4989,6 @@
           </a:extLst>
         </p:spPr>
       </p:pic>
-      <p:cxnSp>
-        <p:nvCxnSpPr>
-          <p:cNvPr id="31" name="Straight Arrow Connector 30">
-            <a:extLst>
-              <a:ext uri="{FF2B5EF4-FFF2-40B4-BE49-F238E27FC236}">
-                <a16:creationId xmlns:a16="http://schemas.microsoft.com/office/drawing/2014/main" id="{6DFD61C5-FFAD-E64E-B85A-999A8AAC661D}"/>
-              </a:ext>
-            </a:extLst>
-          </p:cNvPr>
-          <p:cNvCxnSpPr>
-            <a:cxnSpLocks/>
-          </p:cNvCxnSpPr>
-          <p:nvPr/>
-        </p:nvCxnSpPr>
-        <p:spPr>
-          <a:xfrm flipH="1">
-            <a:off x="7281034" y="2207704"/>
-            <a:ext cx="2966552" cy="0"/>
-          </a:xfrm>
-          <a:prstGeom prst="straightConnector1">
-            <a:avLst/>
-          </a:prstGeom>
-          <a:ln w="25400">
-            <a:solidFill>
-              <a:schemeClr val="bg2">
-                <a:lumMod val="75000"/>
-              </a:schemeClr>
-            </a:solidFill>
-            <a:prstDash val="sysDot"/>
-            <a:tailEnd type="none" w="lg" len="lg"/>
-          </a:ln>
-          <a:effectLst/>
-        </p:spPr>
-        <p:style>
-          <a:lnRef idx="1">
-            <a:schemeClr val="accent1"/>
-          </a:lnRef>
-          <a:fillRef idx="0">
-            <a:schemeClr val="accent1"/>
-          </a:fillRef>
-          <a:effectRef idx="0">
-            <a:schemeClr val="accent1"/>
-          </a:effectRef>
-          <a:fontRef idx="minor">
-            <a:schemeClr val="tx1"/>
-          </a:fontRef>
-        </p:style>
-      </p:cxnSp>
-      <p:cxnSp>
-        <p:nvCxnSpPr>
-          <p:cNvPr id="33" name="Straight Arrow Connector 32">
-            <a:extLst>
-              <a:ext uri="{FF2B5EF4-FFF2-40B4-BE49-F238E27FC236}">
-                <a16:creationId xmlns:a16="http://schemas.microsoft.com/office/drawing/2014/main" id="{F258C48F-0BB4-B54E-A661-F02809584330}"/>
-              </a:ext>
-            </a:extLst>
-          </p:cNvPr>
-          <p:cNvCxnSpPr>
-            <a:cxnSpLocks/>
-          </p:cNvCxnSpPr>
-          <p:nvPr/>
-        </p:nvCxnSpPr>
-        <p:spPr>
-          <a:xfrm flipH="1">
-            <a:off x="8019394" y="2601842"/>
-            <a:ext cx="1493479" cy="0"/>
-          </a:xfrm>
-          <a:prstGeom prst="straightConnector1">
-            <a:avLst/>
-          </a:prstGeom>
-          <a:ln w="25400">
-            <a:solidFill>
-              <a:schemeClr val="bg2">
-                <a:lumMod val="75000"/>
-              </a:schemeClr>
-            </a:solidFill>
-            <a:prstDash val="sysDot"/>
-            <a:tailEnd type="none" w="lg" len="lg"/>
-          </a:ln>
-          <a:effectLst/>
-        </p:spPr>
-        <p:style>
-          <a:lnRef idx="1">
-            <a:schemeClr val="accent1"/>
-          </a:lnRef>
-          <a:fillRef idx="0">
-            <a:schemeClr val="accent1"/>
-          </a:fillRef>
-          <a:effectRef idx="0">
-            <a:schemeClr val="accent1"/>
-          </a:effectRef>
-          <a:fontRef idx="minor">
-            <a:schemeClr val="tx1"/>
-          </a:fontRef>
-        </p:style>
-      </p:cxnSp>
-      <p:cxnSp>
-        <p:nvCxnSpPr>
-          <p:cNvPr id="29" name="Straight Arrow Connector 28">
-            <a:extLst>
-              <a:ext uri="{FF2B5EF4-FFF2-40B4-BE49-F238E27FC236}">
-                <a16:creationId xmlns:a16="http://schemas.microsoft.com/office/drawing/2014/main" id="{24063261-3EE5-CE42-A48E-1638492BEBA4}"/>
-              </a:ext>
-            </a:extLst>
-          </p:cNvPr>
-          <p:cNvCxnSpPr>
-            <a:cxnSpLocks/>
-          </p:cNvCxnSpPr>
-          <p:nvPr/>
-        </p:nvCxnSpPr>
-        <p:spPr>
-          <a:xfrm flipH="1">
-            <a:off x="3625584" y="2570308"/>
-            <a:ext cx="2712154" cy="0"/>
-          </a:xfrm>
-          <a:prstGeom prst="straightConnector1">
-            <a:avLst/>
-          </a:prstGeom>
-          <a:ln w="25400">
-            <a:solidFill>
-              <a:schemeClr val="bg2">
-                <a:lumMod val="75000"/>
-              </a:schemeClr>
-            </a:solidFill>
-            <a:prstDash val="sysDot"/>
-            <a:tailEnd type="none" w="lg" len="lg"/>
-          </a:ln>
-          <a:effectLst/>
-        </p:spPr>
-        <p:style>
-          <a:lnRef idx="1">
-            <a:schemeClr val="accent1"/>
-          </a:lnRef>
-          <a:fillRef idx="0">
-            <a:schemeClr val="accent1"/>
-          </a:fillRef>
-          <a:effectRef idx="0">
-            <a:schemeClr val="accent1"/>
-          </a:effectRef>
-          <a:fontRef idx="minor">
-            <a:schemeClr val="tx1"/>
-          </a:fontRef>
-        </p:style>
-      </p:cxnSp>
       <p:cxnSp>
         <p:nvCxnSpPr>
           <p:cNvPr id="32" name="Straight Arrow Connector 31">

</xml_diff>

<commit_message>
landing page and concepts upgrade
Signed-off-by: Srinivasan Parthasarathy <spartha@us.ibm.com>
</commit_message>
<xml_diff>
--- a/mkdocs/docs/images/src/illustration.pptx
+++ b/mkdocs/docs/images/src/illustration.pptx
@@ -5,11 +5,14 @@
     <p:sldMasterId id="2147483648" r:id="rId1"/>
   </p:sldMasterIdLst>
   <p:notesMasterIdLst>
-    <p:notesMasterId r:id="rId4"/>
+    <p:notesMasterId r:id="rId7"/>
   </p:notesMasterIdLst>
   <p:sldIdLst>
     <p:sldId id="374" r:id="rId2"/>
     <p:sldId id="375" r:id="rId3"/>
+    <p:sldId id="376" r:id="rId4"/>
+    <p:sldId id="378" r:id="rId5"/>
+    <p:sldId id="379" r:id="rId6"/>
   </p:sldIdLst>
   <p:sldSz cx="12192000" cy="6858000"/>
   <p:notesSz cx="6858000" cy="9144000"/>
@@ -198,7 +201,7 @@
           <a:p>
             <a:fld id="{38B78CBE-37FA-D241-BB4C-CAC5D3B25F49}" type="datetimeFigureOut">
               <a:rPr lang="en-US" smtClean="0"/>
-              <a:t>9/26/21</a:t>
+              <a:t>10/14/21</a:t>
             </a:fld>
             <a:endParaRPr lang="en-US"/>
           </a:p>
@@ -633,6 +636,258 @@
 </p:notes>
 </file>
 
+<file path=ppt/notesSlides/notesSlide3.xml><?xml version="1.0" encoding="utf-8"?>
+<p:notes xmlns:a="http://schemas.openxmlformats.org/drawingml/2006/main" xmlns:r="http://schemas.openxmlformats.org/officeDocument/2006/relationships" xmlns:p="http://schemas.openxmlformats.org/presentationml/2006/main">
+  <p:cSld>
+    <p:spTree>
+      <p:nvGrpSpPr>
+        <p:cNvPr id="1" name=""/>
+        <p:cNvGrpSpPr/>
+        <p:nvPr/>
+      </p:nvGrpSpPr>
+      <p:grpSpPr>
+        <a:xfrm>
+          <a:off x="0" y="0"/>
+          <a:ext cx="0" cy="0"/>
+          <a:chOff x="0" y="0"/>
+          <a:chExt cx="0" cy="0"/>
+        </a:xfrm>
+      </p:grpSpPr>
+      <p:sp>
+        <p:nvSpPr>
+          <p:cNvPr id="2" name="Slide Image Placeholder 1"/>
+          <p:cNvSpPr>
+            <a:spLocks noGrp="1" noRot="1" noChangeAspect="1"/>
+          </p:cNvSpPr>
+          <p:nvPr>
+            <p:ph type="sldImg"/>
+          </p:nvPr>
+        </p:nvSpPr>
+        <p:spPr/>
+      </p:sp>
+      <p:sp>
+        <p:nvSpPr>
+          <p:cNvPr id="3" name="Notes Placeholder 2"/>
+          <p:cNvSpPr>
+            <a:spLocks noGrp="1"/>
+          </p:cNvSpPr>
+          <p:nvPr>
+            <p:ph type="body" idx="1"/>
+          </p:nvPr>
+        </p:nvSpPr>
+        <p:spPr/>
+        <p:txBody>
+          <a:bodyPr/>
+          <a:lstStyle/>
+          <a:p>
+            <a:endParaRPr lang="en-US" dirty="0"/>
+          </a:p>
+        </p:txBody>
+      </p:sp>
+      <p:sp>
+        <p:nvSpPr>
+          <p:cNvPr id="4" name="Slide Number Placeholder 3"/>
+          <p:cNvSpPr>
+            <a:spLocks noGrp="1"/>
+          </p:cNvSpPr>
+          <p:nvPr>
+            <p:ph type="sldNum" sz="quarter" idx="5"/>
+          </p:nvPr>
+        </p:nvSpPr>
+        <p:spPr/>
+        <p:txBody>
+          <a:bodyPr/>
+          <a:lstStyle/>
+          <a:p>
+            <a:fld id="{38344E6D-279C-6147-976F-4BE3F315D9D6}" type="slidenum">
+              <a:rPr lang="en-US" smtClean="0"/>
+              <a:t>3</a:t>
+            </a:fld>
+            <a:endParaRPr lang="en-US"/>
+          </a:p>
+        </p:txBody>
+      </p:sp>
+    </p:spTree>
+    <p:extLst>
+      <p:ext uri="{BB962C8B-B14F-4D97-AF65-F5344CB8AC3E}">
+        <p14:creationId xmlns:p14="http://schemas.microsoft.com/office/powerpoint/2010/main" val="1920320764"/>
+      </p:ext>
+    </p:extLst>
+  </p:cSld>
+  <p:clrMapOvr>
+    <a:masterClrMapping/>
+  </p:clrMapOvr>
+</p:notes>
+</file>
+
+<file path=ppt/notesSlides/notesSlide4.xml><?xml version="1.0" encoding="utf-8"?>
+<p:notes xmlns:a="http://schemas.openxmlformats.org/drawingml/2006/main" xmlns:r="http://schemas.openxmlformats.org/officeDocument/2006/relationships" xmlns:p="http://schemas.openxmlformats.org/presentationml/2006/main">
+  <p:cSld>
+    <p:spTree>
+      <p:nvGrpSpPr>
+        <p:cNvPr id="1" name=""/>
+        <p:cNvGrpSpPr/>
+        <p:nvPr/>
+      </p:nvGrpSpPr>
+      <p:grpSpPr>
+        <a:xfrm>
+          <a:off x="0" y="0"/>
+          <a:ext cx="0" cy="0"/>
+          <a:chOff x="0" y="0"/>
+          <a:chExt cx="0" cy="0"/>
+        </a:xfrm>
+      </p:grpSpPr>
+      <p:sp>
+        <p:nvSpPr>
+          <p:cNvPr id="2" name="Slide Image Placeholder 1"/>
+          <p:cNvSpPr>
+            <a:spLocks noGrp="1" noRot="1" noChangeAspect="1"/>
+          </p:cNvSpPr>
+          <p:nvPr>
+            <p:ph type="sldImg"/>
+          </p:nvPr>
+        </p:nvSpPr>
+        <p:spPr/>
+      </p:sp>
+      <p:sp>
+        <p:nvSpPr>
+          <p:cNvPr id="3" name="Notes Placeholder 2"/>
+          <p:cNvSpPr>
+            <a:spLocks noGrp="1"/>
+          </p:cNvSpPr>
+          <p:nvPr>
+            <p:ph type="body" idx="1"/>
+          </p:nvPr>
+        </p:nvSpPr>
+        <p:spPr/>
+        <p:txBody>
+          <a:bodyPr/>
+          <a:lstStyle/>
+          <a:p>
+            <a:endParaRPr lang="en-US" dirty="0"/>
+          </a:p>
+        </p:txBody>
+      </p:sp>
+      <p:sp>
+        <p:nvSpPr>
+          <p:cNvPr id="4" name="Slide Number Placeholder 3"/>
+          <p:cNvSpPr>
+            <a:spLocks noGrp="1"/>
+          </p:cNvSpPr>
+          <p:nvPr>
+            <p:ph type="sldNum" sz="quarter" idx="5"/>
+          </p:nvPr>
+        </p:nvSpPr>
+        <p:spPr/>
+        <p:txBody>
+          <a:bodyPr/>
+          <a:lstStyle/>
+          <a:p>
+            <a:fld id="{38344E6D-279C-6147-976F-4BE3F315D9D6}" type="slidenum">
+              <a:rPr lang="en-US" smtClean="0"/>
+              <a:t>4</a:t>
+            </a:fld>
+            <a:endParaRPr lang="en-US"/>
+          </a:p>
+        </p:txBody>
+      </p:sp>
+    </p:spTree>
+    <p:extLst>
+      <p:ext uri="{BB962C8B-B14F-4D97-AF65-F5344CB8AC3E}">
+        <p14:creationId xmlns:p14="http://schemas.microsoft.com/office/powerpoint/2010/main" val="1237927400"/>
+      </p:ext>
+    </p:extLst>
+  </p:cSld>
+  <p:clrMapOvr>
+    <a:masterClrMapping/>
+  </p:clrMapOvr>
+</p:notes>
+</file>
+
+<file path=ppt/notesSlides/notesSlide5.xml><?xml version="1.0" encoding="utf-8"?>
+<p:notes xmlns:a="http://schemas.openxmlformats.org/drawingml/2006/main" xmlns:r="http://schemas.openxmlformats.org/officeDocument/2006/relationships" xmlns:p="http://schemas.openxmlformats.org/presentationml/2006/main">
+  <p:cSld>
+    <p:spTree>
+      <p:nvGrpSpPr>
+        <p:cNvPr id="1" name=""/>
+        <p:cNvGrpSpPr/>
+        <p:nvPr/>
+      </p:nvGrpSpPr>
+      <p:grpSpPr>
+        <a:xfrm>
+          <a:off x="0" y="0"/>
+          <a:ext cx="0" cy="0"/>
+          <a:chOff x="0" y="0"/>
+          <a:chExt cx="0" cy="0"/>
+        </a:xfrm>
+      </p:grpSpPr>
+      <p:sp>
+        <p:nvSpPr>
+          <p:cNvPr id="2" name="Slide Image Placeholder 1"/>
+          <p:cNvSpPr>
+            <a:spLocks noGrp="1" noRot="1" noChangeAspect="1"/>
+          </p:cNvSpPr>
+          <p:nvPr>
+            <p:ph type="sldImg"/>
+          </p:nvPr>
+        </p:nvSpPr>
+        <p:spPr/>
+      </p:sp>
+      <p:sp>
+        <p:nvSpPr>
+          <p:cNvPr id="3" name="Notes Placeholder 2"/>
+          <p:cNvSpPr>
+            <a:spLocks noGrp="1"/>
+          </p:cNvSpPr>
+          <p:nvPr>
+            <p:ph type="body" idx="1"/>
+          </p:nvPr>
+        </p:nvSpPr>
+        <p:spPr/>
+        <p:txBody>
+          <a:bodyPr/>
+          <a:lstStyle/>
+          <a:p>
+            <a:endParaRPr lang="en-US" dirty="0"/>
+          </a:p>
+        </p:txBody>
+      </p:sp>
+      <p:sp>
+        <p:nvSpPr>
+          <p:cNvPr id="4" name="Slide Number Placeholder 3"/>
+          <p:cNvSpPr>
+            <a:spLocks noGrp="1"/>
+          </p:cNvSpPr>
+          <p:nvPr>
+            <p:ph type="sldNum" sz="quarter" idx="5"/>
+          </p:nvPr>
+        </p:nvSpPr>
+        <p:spPr/>
+        <p:txBody>
+          <a:bodyPr/>
+          <a:lstStyle/>
+          <a:p>
+            <a:fld id="{38344E6D-279C-6147-976F-4BE3F315D9D6}" type="slidenum">
+              <a:rPr lang="en-US" smtClean="0"/>
+              <a:t>5</a:t>
+            </a:fld>
+            <a:endParaRPr lang="en-US"/>
+          </a:p>
+        </p:txBody>
+      </p:sp>
+    </p:spTree>
+    <p:extLst>
+      <p:ext uri="{BB962C8B-B14F-4D97-AF65-F5344CB8AC3E}">
+        <p14:creationId xmlns:p14="http://schemas.microsoft.com/office/powerpoint/2010/main" val="2111761150"/>
+      </p:ext>
+    </p:extLst>
+  </p:cSld>
+  <p:clrMapOvr>
+    <a:masterClrMapping/>
+  </p:clrMapOvr>
+</p:notes>
+</file>
+
 <file path=ppt/slideLayouts/slideLayout1.xml><?xml version="1.0" encoding="utf-8"?>
 <p:sldLayout xmlns:a="http://schemas.openxmlformats.org/drawingml/2006/main" xmlns:r="http://schemas.openxmlformats.org/officeDocument/2006/relationships" xmlns:p="http://schemas.openxmlformats.org/presentationml/2006/main" type="title" preserve="1">
   <p:cSld name="Title Slide">
@@ -780,7 +1035,7 @@
           <a:p>
             <a:fld id="{708812C5-0212-FD42-A0D4-E2E8FF4E3AF5}" type="datetime1">
               <a:rPr lang="en-US" smtClean="0"/>
-              <a:t>9/26/21</a:t>
+              <a:t>10/14/21</a:t>
             </a:fld>
             <a:endParaRPr lang="en-US"/>
           </a:p>
@@ -981,7 +1236,7 @@
           <a:p>
             <a:fld id="{D232AC6F-41C3-B34B-9BAA-03ED2F3BC0F6}" type="datetime1">
               <a:rPr lang="en-US" smtClean="0"/>
-              <a:t>9/26/21</a:t>
+              <a:t>10/14/21</a:t>
             </a:fld>
             <a:endParaRPr lang="en-US"/>
           </a:p>
@@ -1192,7 +1447,7 @@
           <a:p>
             <a:fld id="{BEE140C2-F440-9D49-95CB-5965D64CC4A2}" type="datetime1">
               <a:rPr lang="en-US" smtClean="0"/>
-              <a:t>9/26/21</a:t>
+              <a:t>10/14/21</a:t>
             </a:fld>
             <a:endParaRPr lang="en-US"/>
           </a:p>
@@ -1393,7 +1648,7 @@
           <a:p>
             <a:fld id="{CC99F980-FB29-FD47-8508-150F73F1E8B0}" type="datetime1">
               <a:rPr lang="en-US" smtClean="0"/>
-              <a:t>9/26/21</a:t>
+              <a:t>10/14/21</a:t>
             </a:fld>
             <a:endParaRPr lang="en-US"/>
           </a:p>
@@ -1671,7 +1926,7 @@
           <a:p>
             <a:fld id="{D4510983-EA22-9643-8AC0-B3C6499B643B}" type="datetime1">
               <a:rPr lang="en-US" smtClean="0"/>
-              <a:t>9/26/21</a:t>
+              <a:t>10/14/21</a:t>
             </a:fld>
             <a:endParaRPr lang="en-US"/>
           </a:p>
@@ -1939,7 +2194,7 @@
           <a:p>
             <a:fld id="{D5A39195-967D-5D4E-8C6A-C99866996458}" type="datetime1">
               <a:rPr lang="en-US" smtClean="0"/>
-              <a:t>9/26/21</a:t>
+              <a:t>10/14/21</a:t>
             </a:fld>
             <a:endParaRPr lang="en-US"/>
           </a:p>
@@ -2354,7 +2609,7 @@
           <a:p>
             <a:fld id="{5AD771E9-C79D-684D-A158-5EB6E92DE947}" type="datetime1">
               <a:rPr lang="en-US" smtClean="0"/>
-              <a:t>9/26/21</a:t>
+              <a:t>10/14/21</a:t>
             </a:fld>
             <a:endParaRPr lang="en-US"/>
           </a:p>
@@ -2498,7 +2753,7 @@
           <a:p>
             <a:fld id="{693CA161-7E4C-5C4B-B799-DB602A0B9806}" type="datetime1">
               <a:rPr lang="en-US" smtClean="0"/>
-              <a:t>9/26/21</a:t>
+              <a:t>10/14/21</a:t>
             </a:fld>
             <a:endParaRPr lang="en-US"/>
           </a:p>
@@ -2614,7 +2869,7 @@
           <a:p>
             <a:fld id="{6D55FDF3-8BB2-6349-A5FA-057F3D78953D}" type="datetime1">
               <a:rPr lang="en-US" smtClean="0"/>
-              <a:t>9/26/21</a:t>
+              <a:t>10/14/21</a:t>
             </a:fld>
             <a:endParaRPr lang="en-US"/>
           </a:p>
@@ -2928,7 +3183,7 @@
           <a:p>
             <a:fld id="{EEDFACC0-3228-BA4B-942E-CEF38B0101FD}" type="datetime1">
               <a:rPr lang="en-US" smtClean="0"/>
-              <a:t>9/26/21</a:t>
+              <a:t>10/14/21</a:t>
             </a:fld>
             <a:endParaRPr lang="en-US"/>
           </a:p>
@@ -3219,7 +3474,7 @@
           <a:p>
             <a:fld id="{07EEEDBE-E24C-D140-B419-6D8D592D0F1C}" type="datetime1">
               <a:rPr lang="en-US" smtClean="0"/>
-              <a:t>9/26/21</a:t>
+              <a:t>10/14/21</a:t>
             </a:fld>
             <a:endParaRPr lang="en-US"/>
           </a:p>
@@ -3463,7 +3718,7 @@
           <a:p>
             <a:fld id="{E05781A2-A5EF-C54C-A3EF-F62483D37EDC}" type="datetime1">
               <a:rPr lang="en-US" smtClean="0"/>
-              <a:t>9/26/21</a:t>
+              <a:t>10/14/21</a:t>
             </a:fld>
             <a:endParaRPr lang="en-US"/>
           </a:p>
@@ -5617,6 +5872,2969 @@
     <p:extLst>
       <p:ext uri="{BB962C8B-B14F-4D97-AF65-F5344CB8AC3E}">
         <p14:creationId xmlns:p14="http://schemas.microsoft.com/office/powerpoint/2010/main" val="2174649656"/>
+      </p:ext>
+    </p:extLst>
+  </p:cSld>
+  <p:clrMapOvr>
+    <a:masterClrMapping/>
+  </p:clrMapOvr>
+</p:sld>
+</file>
+
+<file path=ppt/slides/slide3.xml><?xml version="1.0" encoding="utf-8"?>
+<p:sld xmlns:a="http://schemas.openxmlformats.org/drawingml/2006/main" xmlns:r="http://schemas.openxmlformats.org/officeDocument/2006/relationships" xmlns:p="http://schemas.openxmlformats.org/presentationml/2006/main">
+  <p:cSld>
+    <p:spTree>
+      <p:nvGrpSpPr>
+        <p:cNvPr id="1" name=""/>
+        <p:cNvGrpSpPr/>
+        <p:nvPr/>
+      </p:nvGrpSpPr>
+      <p:grpSpPr>
+        <a:xfrm>
+          <a:off x="0" y="0"/>
+          <a:ext cx="0" cy="0"/>
+          <a:chOff x="0" y="0"/>
+          <a:chExt cx="0" cy="0"/>
+        </a:xfrm>
+      </p:grpSpPr>
+      <p:sp>
+        <p:nvSpPr>
+          <p:cNvPr id="9" name="Rounded Rectangle 8">
+            <a:extLst>
+              <a:ext uri="{FF2B5EF4-FFF2-40B4-BE49-F238E27FC236}">
+                <a16:creationId xmlns:a16="http://schemas.microsoft.com/office/drawing/2014/main" id="{319D71A4-FD5D-BD48-844B-435B16760232}"/>
+              </a:ext>
+            </a:extLst>
+          </p:cNvPr>
+          <p:cNvSpPr/>
+          <p:nvPr/>
+        </p:nvSpPr>
+        <p:spPr>
+          <a:xfrm>
+            <a:off x="2438397" y="1933404"/>
+            <a:ext cx="7315200" cy="2690649"/>
+          </a:xfrm>
+          <a:prstGeom prst="roundRect">
+            <a:avLst/>
+          </a:prstGeom>
+          <a:gradFill>
+            <a:gsLst>
+              <a:gs pos="0">
+                <a:srgbClr val="C00000"/>
+              </a:gs>
+              <a:gs pos="100000">
+                <a:schemeClr val="accent1">
+                  <a:lumMod val="45000"/>
+                  <a:lumOff val="55000"/>
+                </a:schemeClr>
+              </a:gs>
+              <a:gs pos="100000">
+                <a:schemeClr val="accent1">
+                  <a:lumMod val="45000"/>
+                  <a:lumOff val="55000"/>
+                </a:schemeClr>
+              </a:gs>
+              <a:gs pos="100000">
+                <a:schemeClr val="tx2"/>
+              </a:gs>
+            </a:gsLst>
+            <a:lin ang="5400000" scaled="1"/>
+          </a:gradFill>
+        </p:spPr>
+        <p:style>
+          <a:lnRef idx="2">
+            <a:schemeClr val="accent1">
+              <a:shade val="50000"/>
+            </a:schemeClr>
+          </a:lnRef>
+          <a:fillRef idx="1">
+            <a:schemeClr val="accent1"/>
+          </a:fillRef>
+          <a:effectRef idx="0">
+            <a:schemeClr val="accent1"/>
+          </a:effectRef>
+          <a:fontRef idx="minor">
+            <a:schemeClr val="lt1"/>
+          </a:fontRef>
+        </p:style>
+        <p:txBody>
+          <a:bodyPr rtlCol="0" anchor="ctr"/>
+          <a:lstStyle/>
+          <a:p>
+            <a:pPr algn="ctr"/>
+            <a:endParaRPr lang="en-US"/>
+          </a:p>
+        </p:txBody>
+      </p:sp>
+      <p:sp>
+        <p:nvSpPr>
+          <p:cNvPr id="45" name="Oval 44">
+            <a:extLst>
+              <a:ext uri="{FF2B5EF4-FFF2-40B4-BE49-F238E27FC236}">
+                <a16:creationId xmlns:a16="http://schemas.microsoft.com/office/drawing/2014/main" id="{7EA7BD02-DB63-9548-B6A6-786AF358FC92}"/>
+              </a:ext>
+            </a:extLst>
+          </p:cNvPr>
+          <p:cNvSpPr>
+            <a:spLocks noChangeAspect="1"/>
+          </p:cNvSpPr>
+          <p:nvPr/>
+        </p:nvSpPr>
+        <p:spPr>
+          <a:xfrm>
+            <a:off x="5528064" y="2719254"/>
+            <a:ext cx="1115568" cy="1118950"/>
+          </a:xfrm>
+          <a:prstGeom prst="ellipse">
+            <a:avLst/>
+          </a:prstGeom>
+          <a:solidFill>
+            <a:schemeClr val="bg1"/>
+          </a:solidFill>
+          <a:ln>
+            <a:solidFill>
+              <a:srgbClr val="C00000"/>
+            </a:solidFill>
+          </a:ln>
+          <a:effectLst>
+            <a:outerShdw blurRad="50800" dist="38100" dir="2700000" algn="tl" rotWithShape="0">
+              <a:prstClr val="black">
+                <a:alpha val="40000"/>
+              </a:prstClr>
+            </a:outerShdw>
+          </a:effectLst>
+        </p:spPr>
+        <p:style>
+          <a:lnRef idx="2">
+            <a:schemeClr val="accent1">
+              <a:shade val="50000"/>
+            </a:schemeClr>
+          </a:lnRef>
+          <a:fillRef idx="1">
+            <a:schemeClr val="accent1"/>
+          </a:fillRef>
+          <a:effectRef idx="0">
+            <a:schemeClr val="accent1"/>
+          </a:effectRef>
+          <a:fontRef idx="minor">
+            <a:schemeClr val="lt1"/>
+          </a:fontRef>
+        </p:style>
+        <p:txBody>
+          <a:bodyPr rtlCol="0" anchor="ctr"/>
+          <a:lstStyle/>
+          <a:p>
+            <a:pPr algn="ctr"/>
+            <a:endParaRPr lang="en-US" dirty="0"/>
+          </a:p>
+        </p:txBody>
+      </p:sp>
+      <p:pic>
+        <p:nvPicPr>
+          <p:cNvPr id="46" name="Graphic 45">
+            <a:extLst>
+              <a:ext uri="{FF2B5EF4-FFF2-40B4-BE49-F238E27FC236}">
+                <a16:creationId xmlns:a16="http://schemas.microsoft.com/office/drawing/2014/main" id="{DB0AF4BA-07A2-6344-A68F-2AF45ACD2045}"/>
+              </a:ext>
+            </a:extLst>
+          </p:cNvPr>
+          <p:cNvPicPr>
+            <a:picLocks noChangeAspect="1"/>
+          </p:cNvPicPr>
+          <p:nvPr/>
+        </p:nvPicPr>
+        <p:blipFill>
+          <a:blip r:embed="rId3">
+            <a:extLst>
+              <a:ext uri="{96DAC541-7B7A-43D3-8B79-37D633B846F1}">
+                <asvg:svgBlip xmlns:asvg="http://schemas.microsoft.com/office/drawing/2016/SVG/main" r:embed="rId4"/>
+              </a:ext>
+            </a:extLst>
+          </a:blip>
+          <a:stretch>
+            <a:fillRect/>
+          </a:stretch>
+        </p:blipFill>
+        <p:spPr>
+          <a:xfrm>
+            <a:off x="5711261" y="2892139"/>
+            <a:ext cx="746070" cy="746070"/>
+          </a:xfrm>
+          <a:prstGeom prst="rect">
+            <a:avLst/>
+          </a:prstGeom>
+          <a:effectLst>
+            <a:outerShdw blurRad="50800" dist="50800" dir="5400000" algn="ctr" rotWithShape="0">
+              <a:srgbClr val="000000">
+                <a:alpha val="93000"/>
+              </a:srgbClr>
+            </a:outerShdw>
+          </a:effectLst>
+        </p:spPr>
+      </p:pic>
+      <p:cxnSp>
+        <p:nvCxnSpPr>
+          <p:cNvPr id="78" name="Straight Arrow Connector 77">
+            <a:extLst>
+              <a:ext uri="{FF2B5EF4-FFF2-40B4-BE49-F238E27FC236}">
+                <a16:creationId xmlns:a16="http://schemas.microsoft.com/office/drawing/2014/main" id="{0442ED27-3243-AE4E-ADAC-0122C7D2199B}"/>
+              </a:ext>
+            </a:extLst>
+          </p:cNvPr>
+          <p:cNvCxnSpPr>
+            <a:cxnSpLocks/>
+            <a:stCxn id="45" idx="1"/>
+          </p:cNvCxnSpPr>
+          <p:nvPr/>
+        </p:nvCxnSpPr>
+        <p:spPr>
+          <a:xfrm flipH="1">
+            <a:off x="2975388" y="2883120"/>
+            <a:ext cx="2716047" cy="0"/>
+          </a:xfrm>
+          <a:prstGeom prst="straightConnector1">
+            <a:avLst/>
+          </a:prstGeom>
+          <a:ln w="31750">
+            <a:gradFill>
+              <a:gsLst>
+                <a:gs pos="0">
+                  <a:schemeClr val="bg1"/>
+                </a:gs>
+                <a:gs pos="100000">
+                  <a:srgbClr val="B70703"/>
+                </a:gs>
+              </a:gsLst>
+              <a:lin ang="0" scaled="0"/>
+            </a:gradFill>
+            <a:tailEnd type="none"/>
+          </a:ln>
+        </p:spPr>
+        <p:style>
+          <a:lnRef idx="1">
+            <a:schemeClr val="accent1"/>
+          </a:lnRef>
+          <a:fillRef idx="0">
+            <a:schemeClr val="accent1"/>
+          </a:fillRef>
+          <a:effectRef idx="0">
+            <a:schemeClr val="accent1"/>
+          </a:effectRef>
+          <a:fontRef idx="minor">
+            <a:schemeClr val="tx1"/>
+          </a:fontRef>
+        </p:style>
+      </p:cxnSp>
+      <p:sp>
+        <p:nvSpPr>
+          <p:cNvPr id="26" name="TextBox 25">
+            <a:extLst>
+              <a:ext uri="{FF2B5EF4-FFF2-40B4-BE49-F238E27FC236}">
+                <a16:creationId xmlns:a16="http://schemas.microsoft.com/office/drawing/2014/main" id="{00B0B6B7-226E-954C-98D8-33134757394E}"/>
+              </a:ext>
+            </a:extLst>
+          </p:cNvPr>
+          <p:cNvSpPr txBox="1"/>
+          <p:nvPr/>
+        </p:nvSpPr>
+        <p:spPr>
+          <a:xfrm>
+            <a:off x="5085881" y="2083323"/>
+            <a:ext cx="2020233" cy="369332"/>
+          </a:xfrm>
+          <a:prstGeom prst="rect">
+            <a:avLst/>
+          </a:prstGeom>
+          <a:noFill/>
+          <a:effectLst>
+            <a:outerShdw blurRad="50800" dist="38100" dir="2700000" algn="tl" rotWithShape="0">
+              <a:prstClr val="black">
+                <a:alpha val="40000"/>
+              </a:prstClr>
+            </a:outerShdw>
+          </a:effectLst>
+        </p:spPr>
+        <p:txBody>
+          <a:bodyPr wrap="none" rtlCol="0">
+            <a:spAutoFit/>
+          </a:bodyPr>
+          <a:lstStyle/>
+          <a:p>
+            <a:r>
+              <a:rPr lang="en-US" dirty="0">
+                <a:gradFill>
+                  <a:gsLst>
+                    <a:gs pos="0">
+                      <a:schemeClr val="accent4">
+                        <a:lumMod val="20000"/>
+                        <a:lumOff val="80000"/>
+                      </a:schemeClr>
+                    </a:gs>
+                    <a:gs pos="99000">
+                      <a:schemeClr val="bg1"/>
+                    </a:gs>
+                  </a:gsLst>
+                  <a:lin ang="0" scaled="0"/>
+                </a:gradFill>
+                <a:effectLst>
+                  <a:outerShdw blurRad="50800" dist="38100" dir="2700000" algn="tl" rotWithShape="0">
+                    <a:schemeClr val="accent4">
+                      <a:lumMod val="75000"/>
+                      <a:alpha val="40000"/>
+                    </a:schemeClr>
+                  </a:outerShdw>
+                </a:effectLst>
+              </a:rPr>
+              <a:t>Progressive rollouts</a:t>
+            </a:r>
+          </a:p>
+        </p:txBody>
+      </p:sp>
+      <p:sp>
+        <p:nvSpPr>
+          <p:cNvPr id="84" name="TextBox 83">
+            <a:extLst>
+              <a:ext uri="{FF2B5EF4-FFF2-40B4-BE49-F238E27FC236}">
+                <a16:creationId xmlns:a16="http://schemas.microsoft.com/office/drawing/2014/main" id="{4F6B134A-27C2-A744-BDF7-EB488EF3E173}"/>
+              </a:ext>
+            </a:extLst>
+          </p:cNvPr>
+          <p:cNvSpPr txBox="1"/>
+          <p:nvPr/>
+        </p:nvSpPr>
+        <p:spPr>
+          <a:xfrm>
+            <a:off x="2975388" y="3300409"/>
+            <a:ext cx="1442767" cy="369332"/>
+          </a:xfrm>
+          <a:prstGeom prst="rect">
+            <a:avLst/>
+          </a:prstGeom>
+          <a:noFill/>
+          <a:effectLst>
+            <a:outerShdw blurRad="50800" dist="38100" dir="2700000" algn="tl" rotWithShape="0">
+              <a:prstClr val="black">
+                <a:alpha val="40000"/>
+              </a:prstClr>
+            </a:outerShdw>
+          </a:effectLst>
+        </p:spPr>
+        <p:txBody>
+          <a:bodyPr wrap="none" rtlCol="0">
+            <a:spAutoFit/>
+          </a:bodyPr>
+          <a:lstStyle/>
+          <a:p>
+            <a:r>
+              <a:rPr lang="en-US" dirty="0">
+                <a:gradFill>
+                  <a:gsLst>
+                    <a:gs pos="0">
+                      <a:schemeClr val="accent4">
+                        <a:lumMod val="40000"/>
+                        <a:lumOff val="60000"/>
+                      </a:schemeClr>
+                    </a:gs>
+                    <a:gs pos="99000">
+                      <a:schemeClr val="bg1"/>
+                    </a:gs>
+                  </a:gsLst>
+                  <a:lin ang="0" scaled="0"/>
+                </a:gradFill>
+                <a:effectLst>
+                  <a:outerShdw blurRad="50800" dist="38100" dir="2700000" algn="tl" rotWithShape="0">
+                    <a:schemeClr val="accent4">
+                      <a:lumMod val="75000"/>
+                      <a:alpha val="40000"/>
+                    </a:schemeClr>
+                  </a:outerShdw>
+                </a:effectLst>
+              </a:rPr>
+              <a:t>Chaos testing</a:t>
+            </a:r>
+          </a:p>
+        </p:txBody>
+      </p:sp>
+      <p:sp>
+        <p:nvSpPr>
+          <p:cNvPr id="86" name="TextBox 85">
+            <a:extLst>
+              <a:ext uri="{FF2B5EF4-FFF2-40B4-BE49-F238E27FC236}">
+                <a16:creationId xmlns:a16="http://schemas.microsoft.com/office/drawing/2014/main" id="{3AF42E4E-4F2B-3444-9D30-D6A138BC1321}"/>
+              </a:ext>
+            </a:extLst>
+          </p:cNvPr>
+          <p:cNvSpPr txBox="1"/>
+          <p:nvPr/>
+        </p:nvSpPr>
+        <p:spPr>
+          <a:xfrm>
+            <a:off x="4180023" y="4141054"/>
+            <a:ext cx="3808543" cy="369332"/>
+          </a:xfrm>
+          <a:prstGeom prst="rect">
+            <a:avLst/>
+          </a:prstGeom>
+          <a:noFill/>
+          <a:effectLst>
+            <a:outerShdw blurRad="50800" dist="38100" dir="2700000" algn="tl" rotWithShape="0">
+              <a:prstClr val="black">
+                <a:alpha val="40000"/>
+              </a:prstClr>
+            </a:outerShdw>
+          </a:effectLst>
+        </p:spPr>
+        <p:txBody>
+          <a:bodyPr wrap="none" rtlCol="0">
+            <a:spAutoFit/>
+          </a:bodyPr>
+          <a:lstStyle/>
+          <a:p>
+            <a:r>
+              <a:rPr lang="en-US" dirty="0">
+                <a:gradFill>
+                  <a:gsLst>
+                    <a:gs pos="0">
+                      <a:schemeClr val="bg1"/>
+                    </a:gs>
+                    <a:gs pos="98000">
+                      <a:schemeClr val="accent4">
+                        <a:lumMod val="40000"/>
+                        <a:lumOff val="60000"/>
+                      </a:schemeClr>
+                    </a:gs>
+                  </a:gsLst>
+                  <a:lin ang="0" scaled="0"/>
+                </a:gradFill>
+                <a:effectLst>
+                  <a:outerShdw blurRad="50800" dist="38100" dir="2700000" algn="tl" rotWithShape="0">
+                    <a:schemeClr val="accent4">
+                      <a:lumMod val="75000"/>
+                      <a:alpha val="40000"/>
+                    </a:schemeClr>
+                  </a:outerShdw>
+                </a:effectLst>
+              </a:rPr>
+              <a:t>State-of-the-art AI &amp; statistical analysis</a:t>
+            </a:r>
+          </a:p>
+        </p:txBody>
+      </p:sp>
+      <p:sp>
+        <p:nvSpPr>
+          <p:cNvPr id="87" name="TextBox 86">
+            <a:extLst>
+              <a:ext uri="{FF2B5EF4-FFF2-40B4-BE49-F238E27FC236}">
+                <a16:creationId xmlns:a16="http://schemas.microsoft.com/office/drawing/2014/main" id="{A14FFCA2-5CA7-AC47-8DEE-26F0528D2DA1}"/>
+              </a:ext>
+            </a:extLst>
+          </p:cNvPr>
+          <p:cNvSpPr txBox="1"/>
+          <p:nvPr/>
+        </p:nvSpPr>
+        <p:spPr>
+          <a:xfrm>
+            <a:off x="3545503" y="2480564"/>
+            <a:ext cx="1575816" cy="369332"/>
+          </a:xfrm>
+          <a:prstGeom prst="rect">
+            <a:avLst/>
+          </a:prstGeom>
+          <a:noFill/>
+          <a:effectLst>
+            <a:outerShdw blurRad="50800" dist="38100" dir="2700000" algn="tl" rotWithShape="0">
+              <a:prstClr val="black">
+                <a:alpha val="40000"/>
+              </a:prstClr>
+            </a:outerShdw>
+          </a:effectLst>
+        </p:spPr>
+        <p:txBody>
+          <a:bodyPr wrap="none" rtlCol="0">
+            <a:spAutoFit/>
+          </a:bodyPr>
+          <a:lstStyle/>
+          <a:p>
+            <a:r>
+              <a:rPr lang="en-US" dirty="0">
+                <a:gradFill>
+                  <a:gsLst>
+                    <a:gs pos="0">
+                      <a:schemeClr val="accent4">
+                        <a:lumMod val="20000"/>
+                        <a:lumOff val="80000"/>
+                      </a:schemeClr>
+                    </a:gs>
+                    <a:gs pos="99000">
+                      <a:schemeClr val="bg1"/>
+                    </a:gs>
+                  </a:gsLst>
+                  <a:lin ang="0" scaled="0"/>
+                </a:gradFill>
+                <a:effectLst>
+                  <a:outerShdw blurRad="50800" dist="38100" dir="2700000" algn="tl" rotWithShape="0">
+                    <a:schemeClr val="accent4">
+                      <a:lumMod val="75000"/>
+                      <a:alpha val="40000"/>
+                    </a:schemeClr>
+                  </a:outerShdw>
+                </a:effectLst>
+              </a:rPr>
+              <a:t>A/B(/n) testing</a:t>
+            </a:r>
+          </a:p>
+        </p:txBody>
+      </p:sp>
+      <p:cxnSp>
+        <p:nvCxnSpPr>
+          <p:cNvPr id="24" name="Straight Arrow Connector 23">
+            <a:extLst>
+              <a:ext uri="{FF2B5EF4-FFF2-40B4-BE49-F238E27FC236}">
+                <a16:creationId xmlns:a16="http://schemas.microsoft.com/office/drawing/2014/main" id="{B9D26F47-5E45-C548-8703-049CCF161E69}"/>
+              </a:ext>
+            </a:extLst>
+          </p:cNvPr>
+          <p:cNvCxnSpPr>
+            <a:cxnSpLocks/>
+            <a:stCxn id="45" idx="3"/>
+          </p:cNvCxnSpPr>
+          <p:nvPr/>
+        </p:nvCxnSpPr>
+        <p:spPr>
+          <a:xfrm flipH="1">
+            <a:off x="2975388" y="3674338"/>
+            <a:ext cx="2716047" cy="0"/>
+          </a:xfrm>
+          <a:prstGeom prst="straightConnector1">
+            <a:avLst/>
+          </a:prstGeom>
+          <a:ln w="31750">
+            <a:gradFill>
+              <a:gsLst>
+                <a:gs pos="0">
+                  <a:schemeClr val="bg1"/>
+                </a:gs>
+                <a:gs pos="100000">
+                  <a:srgbClr val="B70703"/>
+                </a:gs>
+              </a:gsLst>
+              <a:lin ang="0" scaled="0"/>
+            </a:gradFill>
+            <a:tailEnd type="none"/>
+          </a:ln>
+        </p:spPr>
+        <p:style>
+          <a:lnRef idx="1">
+            <a:schemeClr val="accent1"/>
+          </a:lnRef>
+          <a:fillRef idx="0">
+            <a:schemeClr val="accent1"/>
+          </a:fillRef>
+          <a:effectRef idx="0">
+            <a:schemeClr val="accent1"/>
+          </a:effectRef>
+          <a:fontRef idx="minor">
+            <a:schemeClr val="tx1"/>
+          </a:fontRef>
+        </p:style>
+      </p:cxnSp>
+      <p:cxnSp>
+        <p:nvCxnSpPr>
+          <p:cNvPr id="27" name="Straight Arrow Connector 26">
+            <a:extLst>
+              <a:ext uri="{FF2B5EF4-FFF2-40B4-BE49-F238E27FC236}">
+                <a16:creationId xmlns:a16="http://schemas.microsoft.com/office/drawing/2014/main" id="{5330E225-5DC0-6D4C-83F4-B6F53FA58B81}"/>
+              </a:ext>
+            </a:extLst>
+          </p:cNvPr>
+          <p:cNvCxnSpPr>
+            <a:cxnSpLocks/>
+            <a:stCxn id="45" idx="4"/>
+          </p:cNvCxnSpPr>
+          <p:nvPr/>
+        </p:nvCxnSpPr>
+        <p:spPr>
+          <a:xfrm flipH="1">
+            <a:off x="6084296" y="3838204"/>
+            <a:ext cx="1552" cy="258910"/>
+          </a:xfrm>
+          <a:prstGeom prst="straightConnector1">
+            <a:avLst/>
+          </a:prstGeom>
+          <a:ln w="31750">
+            <a:solidFill>
+              <a:schemeClr val="lt1">
+                <a:hueOff val="0"/>
+                <a:satOff val="0"/>
+                <a:lumOff val="0"/>
+              </a:schemeClr>
+            </a:solidFill>
+            <a:tailEnd type="none"/>
+          </a:ln>
+        </p:spPr>
+        <p:style>
+          <a:lnRef idx="1">
+            <a:schemeClr val="accent1"/>
+          </a:lnRef>
+          <a:fillRef idx="0">
+            <a:schemeClr val="accent1"/>
+          </a:fillRef>
+          <a:effectRef idx="0">
+            <a:schemeClr val="accent1"/>
+          </a:effectRef>
+          <a:fontRef idx="minor">
+            <a:schemeClr val="tx1"/>
+          </a:fontRef>
+        </p:style>
+      </p:cxnSp>
+      <p:cxnSp>
+        <p:nvCxnSpPr>
+          <p:cNvPr id="30" name="Straight Arrow Connector 29">
+            <a:extLst>
+              <a:ext uri="{FF2B5EF4-FFF2-40B4-BE49-F238E27FC236}">
+                <a16:creationId xmlns:a16="http://schemas.microsoft.com/office/drawing/2014/main" id="{7046775E-C39B-3444-98D7-1861DFAD2629}"/>
+              </a:ext>
+            </a:extLst>
+          </p:cNvPr>
+          <p:cNvCxnSpPr>
+            <a:cxnSpLocks/>
+          </p:cNvCxnSpPr>
+          <p:nvPr/>
+        </p:nvCxnSpPr>
+        <p:spPr>
+          <a:xfrm flipH="1">
+            <a:off x="6095999" y="2469809"/>
+            <a:ext cx="1552" cy="258910"/>
+          </a:xfrm>
+          <a:prstGeom prst="straightConnector1">
+            <a:avLst/>
+          </a:prstGeom>
+          <a:ln w="31750">
+            <a:solidFill>
+              <a:schemeClr val="lt1">
+                <a:hueOff val="0"/>
+                <a:satOff val="0"/>
+                <a:lumOff val="0"/>
+              </a:schemeClr>
+            </a:solidFill>
+            <a:tailEnd type="none"/>
+          </a:ln>
+        </p:spPr>
+        <p:style>
+          <a:lnRef idx="1">
+            <a:schemeClr val="accent1"/>
+          </a:lnRef>
+          <a:fillRef idx="0">
+            <a:schemeClr val="accent1"/>
+          </a:fillRef>
+          <a:effectRef idx="0">
+            <a:schemeClr val="accent1"/>
+          </a:effectRef>
+          <a:fontRef idx="minor">
+            <a:schemeClr val="tx1"/>
+          </a:fontRef>
+        </p:style>
+      </p:cxnSp>
+      <p:cxnSp>
+        <p:nvCxnSpPr>
+          <p:cNvPr id="31" name="Straight Arrow Connector 30">
+            <a:extLst>
+              <a:ext uri="{FF2B5EF4-FFF2-40B4-BE49-F238E27FC236}">
+                <a16:creationId xmlns:a16="http://schemas.microsoft.com/office/drawing/2014/main" id="{6F6EB244-A7B0-B645-B012-C7F92E43D308}"/>
+              </a:ext>
+            </a:extLst>
+          </p:cNvPr>
+          <p:cNvCxnSpPr>
+            <a:cxnSpLocks/>
+          </p:cNvCxnSpPr>
+          <p:nvPr/>
+        </p:nvCxnSpPr>
+        <p:spPr>
+          <a:xfrm flipH="1">
+            <a:off x="4737975" y="2446217"/>
+            <a:ext cx="2716047" cy="0"/>
+          </a:xfrm>
+          <a:prstGeom prst="straightConnector1">
+            <a:avLst/>
+          </a:prstGeom>
+          <a:ln w="31750">
+            <a:gradFill>
+              <a:gsLst>
+                <a:gs pos="49000">
+                  <a:schemeClr val="bg1"/>
+                </a:gs>
+                <a:gs pos="0">
+                  <a:srgbClr val="B70703"/>
+                </a:gs>
+                <a:gs pos="100000">
+                  <a:srgbClr val="B70703"/>
+                </a:gs>
+              </a:gsLst>
+              <a:lin ang="0" scaled="0"/>
+            </a:gradFill>
+            <a:tailEnd type="none"/>
+          </a:ln>
+        </p:spPr>
+        <p:style>
+          <a:lnRef idx="1">
+            <a:schemeClr val="accent1"/>
+          </a:lnRef>
+          <a:fillRef idx="0">
+            <a:schemeClr val="accent1"/>
+          </a:fillRef>
+          <a:effectRef idx="0">
+            <a:schemeClr val="accent1"/>
+          </a:effectRef>
+          <a:fontRef idx="minor">
+            <a:schemeClr val="tx1"/>
+          </a:fontRef>
+        </p:style>
+      </p:cxnSp>
+      <p:cxnSp>
+        <p:nvCxnSpPr>
+          <p:cNvPr id="32" name="Straight Arrow Connector 31">
+            <a:extLst>
+              <a:ext uri="{FF2B5EF4-FFF2-40B4-BE49-F238E27FC236}">
+                <a16:creationId xmlns:a16="http://schemas.microsoft.com/office/drawing/2014/main" id="{60FAE7CA-C26E-1C43-BACB-203469C347F9}"/>
+              </a:ext>
+            </a:extLst>
+          </p:cNvPr>
+          <p:cNvCxnSpPr>
+            <a:cxnSpLocks/>
+          </p:cNvCxnSpPr>
+          <p:nvPr/>
+        </p:nvCxnSpPr>
+        <p:spPr>
+          <a:xfrm flipH="1">
+            <a:off x="4726272" y="4110186"/>
+            <a:ext cx="2716047" cy="0"/>
+          </a:xfrm>
+          <a:prstGeom prst="straightConnector1">
+            <a:avLst/>
+          </a:prstGeom>
+          <a:ln w="31750">
+            <a:gradFill>
+              <a:gsLst>
+                <a:gs pos="49000">
+                  <a:schemeClr val="bg1"/>
+                </a:gs>
+                <a:gs pos="0">
+                  <a:srgbClr val="B70703"/>
+                </a:gs>
+                <a:gs pos="100000">
+                  <a:srgbClr val="B70703"/>
+                </a:gs>
+              </a:gsLst>
+              <a:lin ang="0" scaled="0"/>
+            </a:gradFill>
+            <a:tailEnd type="none"/>
+          </a:ln>
+        </p:spPr>
+        <p:style>
+          <a:lnRef idx="1">
+            <a:schemeClr val="accent1"/>
+          </a:lnRef>
+          <a:fillRef idx="0">
+            <a:schemeClr val="accent1"/>
+          </a:fillRef>
+          <a:effectRef idx="0">
+            <a:schemeClr val="accent1"/>
+          </a:effectRef>
+          <a:fontRef idx="minor">
+            <a:schemeClr val="tx1"/>
+          </a:fontRef>
+        </p:style>
+      </p:cxnSp>
+      <p:cxnSp>
+        <p:nvCxnSpPr>
+          <p:cNvPr id="33" name="Straight Arrow Connector 32">
+            <a:extLst>
+              <a:ext uri="{FF2B5EF4-FFF2-40B4-BE49-F238E27FC236}">
+                <a16:creationId xmlns:a16="http://schemas.microsoft.com/office/drawing/2014/main" id="{FD43408C-8FD1-2A45-BAFA-7C30E55C1B43}"/>
+              </a:ext>
+            </a:extLst>
+          </p:cNvPr>
+          <p:cNvCxnSpPr>
+            <a:cxnSpLocks/>
+            <a:stCxn id="45" idx="7"/>
+          </p:cNvCxnSpPr>
+          <p:nvPr/>
+        </p:nvCxnSpPr>
+        <p:spPr>
+          <a:xfrm flipV="1">
+            <a:off x="6480260" y="2876683"/>
+            <a:ext cx="2715768" cy="6437"/>
+          </a:xfrm>
+          <a:prstGeom prst="straightConnector1">
+            <a:avLst/>
+          </a:prstGeom>
+          <a:ln w="31750">
+            <a:gradFill>
+              <a:gsLst>
+                <a:gs pos="0">
+                  <a:schemeClr val="bg1"/>
+                </a:gs>
+                <a:gs pos="100000">
+                  <a:srgbClr val="B70703"/>
+                </a:gs>
+              </a:gsLst>
+              <a:lin ang="0" scaled="0"/>
+            </a:gradFill>
+            <a:tailEnd type="none"/>
+          </a:ln>
+        </p:spPr>
+        <p:style>
+          <a:lnRef idx="1">
+            <a:schemeClr val="accent1"/>
+          </a:lnRef>
+          <a:fillRef idx="0">
+            <a:schemeClr val="accent1"/>
+          </a:fillRef>
+          <a:effectRef idx="0">
+            <a:schemeClr val="accent1"/>
+          </a:effectRef>
+          <a:fontRef idx="minor">
+            <a:schemeClr val="tx1"/>
+          </a:fontRef>
+        </p:style>
+      </p:cxnSp>
+      <p:cxnSp>
+        <p:nvCxnSpPr>
+          <p:cNvPr id="36" name="Straight Arrow Connector 35">
+            <a:extLst>
+              <a:ext uri="{FF2B5EF4-FFF2-40B4-BE49-F238E27FC236}">
+                <a16:creationId xmlns:a16="http://schemas.microsoft.com/office/drawing/2014/main" id="{ED3C73B4-F988-764F-8F41-1E2C8D45CA10}"/>
+              </a:ext>
+            </a:extLst>
+          </p:cNvPr>
+          <p:cNvCxnSpPr>
+            <a:cxnSpLocks/>
+            <a:stCxn id="45" idx="5"/>
+          </p:cNvCxnSpPr>
+          <p:nvPr/>
+        </p:nvCxnSpPr>
+        <p:spPr>
+          <a:xfrm flipV="1">
+            <a:off x="6480260" y="3673284"/>
+            <a:ext cx="2715768" cy="1054"/>
+          </a:xfrm>
+          <a:prstGeom prst="straightConnector1">
+            <a:avLst/>
+          </a:prstGeom>
+          <a:ln w="31750">
+            <a:gradFill>
+              <a:gsLst>
+                <a:gs pos="0">
+                  <a:schemeClr val="bg1"/>
+                </a:gs>
+                <a:gs pos="100000">
+                  <a:srgbClr val="B70703"/>
+                </a:gs>
+              </a:gsLst>
+              <a:lin ang="0" scaled="0"/>
+            </a:gradFill>
+            <a:tailEnd type="none"/>
+          </a:ln>
+        </p:spPr>
+        <p:style>
+          <a:lnRef idx="1">
+            <a:schemeClr val="accent1"/>
+          </a:lnRef>
+          <a:fillRef idx="0">
+            <a:schemeClr val="accent1"/>
+          </a:fillRef>
+          <a:effectRef idx="0">
+            <a:schemeClr val="accent1"/>
+          </a:effectRef>
+          <a:fontRef idx="minor">
+            <a:schemeClr val="tx1"/>
+          </a:fontRef>
+        </p:style>
+      </p:cxnSp>
+      <p:sp>
+        <p:nvSpPr>
+          <p:cNvPr id="39" name="TextBox 38">
+            <a:extLst>
+              <a:ext uri="{FF2B5EF4-FFF2-40B4-BE49-F238E27FC236}">
+                <a16:creationId xmlns:a16="http://schemas.microsoft.com/office/drawing/2014/main" id="{2DE3CC12-59D6-9D49-9D9F-4D03B8689AA5}"/>
+              </a:ext>
+            </a:extLst>
+          </p:cNvPr>
+          <p:cNvSpPr txBox="1"/>
+          <p:nvPr/>
+        </p:nvSpPr>
+        <p:spPr>
+          <a:xfrm>
+            <a:off x="7083450" y="2507474"/>
+            <a:ext cx="1509388" cy="369332"/>
+          </a:xfrm>
+          <a:prstGeom prst="rect">
+            <a:avLst/>
+          </a:prstGeom>
+          <a:noFill/>
+          <a:effectLst>
+            <a:outerShdw blurRad="50800" dist="38100" dir="2700000" algn="tl" rotWithShape="0">
+              <a:prstClr val="black">
+                <a:alpha val="40000"/>
+              </a:prstClr>
+            </a:outerShdw>
+          </a:effectLst>
+        </p:spPr>
+        <p:txBody>
+          <a:bodyPr wrap="none" rtlCol="0">
+            <a:spAutoFit/>
+          </a:bodyPr>
+          <a:lstStyle/>
+          <a:p>
+            <a:r>
+              <a:rPr lang="en-US" dirty="0">
+                <a:gradFill>
+                  <a:gsLst>
+                    <a:gs pos="0">
+                      <a:schemeClr val="accent4">
+                        <a:lumMod val="20000"/>
+                        <a:lumOff val="80000"/>
+                      </a:schemeClr>
+                    </a:gs>
+                    <a:gs pos="99000">
+                      <a:schemeClr val="bg1"/>
+                    </a:gs>
+                  </a:gsLst>
+                  <a:lin ang="0" scaled="0"/>
+                </a:gradFill>
+                <a:effectLst>
+                  <a:outerShdw blurRad="50800" dist="38100" dir="2700000" algn="tl" rotWithShape="0">
+                    <a:schemeClr val="accent4">
+                      <a:lumMod val="75000"/>
+                      <a:alpha val="40000"/>
+                    </a:schemeClr>
+                  </a:outerShdw>
+                </a:effectLst>
+              </a:rPr>
+              <a:t>SLO validation</a:t>
+            </a:r>
+          </a:p>
+        </p:txBody>
+      </p:sp>
+      <p:sp>
+        <p:nvSpPr>
+          <p:cNvPr id="40" name="TextBox 39">
+            <a:extLst>
+              <a:ext uri="{FF2B5EF4-FFF2-40B4-BE49-F238E27FC236}">
+                <a16:creationId xmlns:a16="http://schemas.microsoft.com/office/drawing/2014/main" id="{242E5DE1-1E49-F44F-B81D-96319EC276E1}"/>
+              </a:ext>
+            </a:extLst>
+          </p:cNvPr>
+          <p:cNvSpPr txBox="1"/>
+          <p:nvPr/>
+        </p:nvSpPr>
+        <p:spPr>
+          <a:xfrm>
+            <a:off x="7868677" y="3278728"/>
+            <a:ext cx="1327351" cy="369332"/>
+          </a:xfrm>
+          <a:prstGeom prst="rect">
+            <a:avLst/>
+          </a:prstGeom>
+          <a:noFill/>
+          <a:effectLst>
+            <a:outerShdw blurRad="50800" dist="38100" dir="2700000" algn="tl" rotWithShape="0">
+              <a:prstClr val="black">
+                <a:alpha val="40000"/>
+              </a:prstClr>
+            </a:outerShdw>
+          </a:effectLst>
+        </p:spPr>
+        <p:txBody>
+          <a:bodyPr wrap="none" rtlCol="0">
+            <a:spAutoFit/>
+          </a:bodyPr>
+          <a:lstStyle/>
+          <a:p>
+            <a:r>
+              <a:rPr lang="en-US" dirty="0">
+                <a:gradFill>
+                  <a:gsLst>
+                    <a:gs pos="0">
+                      <a:schemeClr val="accent4">
+                        <a:lumMod val="40000"/>
+                        <a:lumOff val="60000"/>
+                      </a:schemeClr>
+                    </a:gs>
+                    <a:gs pos="99000">
+                      <a:schemeClr val="bg1"/>
+                    </a:gs>
+                  </a:gsLst>
+                  <a:lin ang="0" scaled="0"/>
+                </a:gradFill>
+                <a:effectLst>
+                  <a:outerShdw blurRad="50800" dist="38100" dir="2700000" algn="tl" rotWithShape="0">
+                    <a:schemeClr val="accent4">
+                      <a:lumMod val="75000"/>
+                      <a:alpha val="40000"/>
+                    </a:schemeClr>
+                  </a:outerShdw>
+                </a:effectLst>
+              </a:rPr>
+              <a:t>Load testing</a:t>
+            </a:r>
+          </a:p>
+        </p:txBody>
+      </p:sp>
+    </p:spTree>
+    <p:extLst>
+      <p:ext uri="{BB962C8B-B14F-4D97-AF65-F5344CB8AC3E}">
+        <p14:creationId xmlns:p14="http://schemas.microsoft.com/office/powerpoint/2010/main" val="1153916681"/>
+      </p:ext>
+    </p:extLst>
+  </p:cSld>
+  <p:clrMapOvr>
+    <a:masterClrMapping/>
+  </p:clrMapOvr>
+</p:sld>
+</file>
+
+<file path=ppt/slides/slide4.xml><?xml version="1.0" encoding="utf-8"?>
+<p:sld xmlns:a="http://schemas.openxmlformats.org/drawingml/2006/main" xmlns:r="http://schemas.openxmlformats.org/officeDocument/2006/relationships" xmlns:p="http://schemas.openxmlformats.org/presentationml/2006/main">
+  <p:cSld>
+    <p:spTree>
+      <p:nvGrpSpPr>
+        <p:cNvPr id="1" name=""/>
+        <p:cNvGrpSpPr/>
+        <p:nvPr/>
+      </p:nvGrpSpPr>
+      <p:grpSpPr>
+        <a:xfrm>
+          <a:off x="0" y="0"/>
+          <a:ext cx="0" cy="0"/>
+          <a:chOff x="0" y="0"/>
+          <a:chExt cx="0" cy="0"/>
+        </a:xfrm>
+      </p:grpSpPr>
+      <p:sp>
+        <p:nvSpPr>
+          <p:cNvPr id="45" name="Oval 44">
+            <a:extLst>
+              <a:ext uri="{FF2B5EF4-FFF2-40B4-BE49-F238E27FC236}">
+                <a16:creationId xmlns:a16="http://schemas.microsoft.com/office/drawing/2014/main" id="{7EA7BD02-DB63-9548-B6A6-786AF358FC92}"/>
+              </a:ext>
+            </a:extLst>
+          </p:cNvPr>
+          <p:cNvSpPr>
+            <a:spLocks noChangeAspect="1"/>
+          </p:cNvSpPr>
+          <p:nvPr/>
+        </p:nvSpPr>
+        <p:spPr>
+          <a:xfrm>
+            <a:off x="5528064" y="2719254"/>
+            <a:ext cx="1115568" cy="1118950"/>
+          </a:xfrm>
+          <a:prstGeom prst="ellipse">
+            <a:avLst/>
+          </a:prstGeom>
+          <a:solidFill>
+            <a:schemeClr val="bg1"/>
+          </a:solidFill>
+          <a:ln>
+            <a:solidFill>
+              <a:srgbClr val="C00000"/>
+            </a:solidFill>
+          </a:ln>
+          <a:effectLst>
+            <a:outerShdw blurRad="50800" dist="38100" dir="2700000" algn="tl" rotWithShape="0">
+              <a:prstClr val="black">
+                <a:alpha val="40000"/>
+              </a:prstClr>
+            </a:outerShdw>
+          </a:effectLst>
+        </p:spPr>
+        <p:style>
+          <a:lnRef idx="2">
+            <a:schemeClr val="accent1">
+              <a:shade val="50000"/>
+            </a:schemeClr>
+          </a:lnRef>
+          <a:fillRef idx="1">
+            <a:schemeClr val="accent1"/>
+          </a:fillRef>
+          <a:effectRef idx="0">
+            <a:schemeClr val="accent1"/>
+          </a:effectRef>
+          <a:fontRef idx="minor">
+            <a:schemeClr val="lt1"/>
+          </a:fontRef>
+        </p:style>
+        <p:txBody>
+          <a:bodyPr rtlCol="0" anchor="ctr"/>
+          <a:lstStyle/>
+          <a:p>
+            <a:pPr algn="ctr"/>
+            <a:endParaRPr lang="en-US" dirty="0"/>
+          </a:p>
+        </p:txBody>
+      </p:sp>
+      <p:pic>
+        <p:nvPicPr>
+          <p:cNvPr id="46" name="Graphic 45">
+            <a:extLst>
+              <a:ext uri="{FF2B5EF4-FFF2-40B4-BE49-F238E27FC236}">
+                <a16:creationId xmlns:a16="http://schemas.microsoft.com/office/drawing/2014/main" id="{DB0AF4BA-07A2-6344-A68F-2AF45ACD2045}"/>
+              </a:ext>
+            </a:extLst>
+          </p:cNvPr>
+          <p:cNvPicPr>
+            <a:picLocks noChangeAspect="1"/>
+          </p:cNvPicPr>
+          <p:nvPr/>
+        </p:nvPicPr>
+        <p:blipFill>
+          <a:blip r:embed="rId3">
+            <a:extLst>
+              <a:ext uri="{96DAC541-7B7A-43D3-8B79-37D633B846F1}">
+                <asvg:svgBlip xmlns:asvg="http://schemas.microsoft.com/office/drawing/2016/SVG/main" r:embed="rId4"/>
+              </a:ext>
+            </a:extLst>
+          </a:blip>
+          <a:stretch>
+            <a:fillRect/>
+          </a:stretch>
+        </p:blipFill>
+        <p:spPr>
+          <a:xfrm>
+            <a:off x="5711261" y="2892139"/>
+            <a:ext cx="746070" cy="746070"/>
+          </a:xfrm>
+          <a:prstGeom prst="rect">
+            <a:avLst/>
+          </a:prstGeom>
+          <a:effectLst>
+            <a:outerShdw blurRad="50800" dist="50800" dir="5400000" algn="ctr" rotWithShape="0">
+              <a:srgbClr val="000000">
+                <a:alpha val="93000"/>
+              </a:srgbClr>
+            </a:outerShdw>
+          </a:effectLst>
+        </p:spPr>
+      </p:pic>
+      <p:cxnSp>
+        <p:nvCxnSpPr>
+          <p:cNvPr id="78" name="Straight Arrow Connector 77">
+            <a:extLst>
+              <a:ext uri="{FF2B5EF4-FFF2-40B4-BE49-F238E27FC236}">
+                <a16:creationId xmlns:a16="http://schemas.microsoft.com/office/drawing/2014/main" id="{0442ED27-3243-AE4E-ADAC-0122C7D2199B}"/>
+              </a:ext>
+            </a:extLst>
+          </p:cNvPr>
+          <p:cNvCxnSpPr>
+            <a:cxnSpLocks/>
+            <a:stCxn id="45" idx="1"/>
+          </p:cNvCxnSpPr>
+          <p:nvPr/>
+        </p:nvCxnSpPr>
+        <p:spPr>
+          <a:xfrm flipH="1">
+            <a:off x="2975388" y="2883120"/>
+            <a:ext cx="2716047" cy="0"/>
+          </a:xfrm>
+          <a:prstGeom prst="straightConnector1">
+            <a:avLst/>
+          </a:prstGeom>
+          <a:ln w="31750">
+            <a:gradFill>
+              <a:gsLst>
+                <a:gs pos="0">
+                  <a:schemeClr val="bg1"/>
+                </a:gs>
+                <a:gs pos="100000">
+                  <a:srgbClr val="B70703"/>
+                </a:gs>
+              </a:gsLst>
+              <a:lin ang="0" scaled="0"/>
+            </a:gradFill>
+            <a:tailEnd type="none"/>
+          </a:ln>
+        </p:spPr>
+        <p:style>
+          <a:lnRef idx="1">
+            <a:schemeClr val="accent1"/>
+          </a:lnRef>
+          <a:fillRef idx="0">
+            <a:schemeClr val="accent1"/>
+          </a:fillRef>
+          <a:effectRef idx="0">
+            <a:schemeClr val="accent1"/>
+          </a:effectRef>
+          <a:fontRef idx="minor">
+            <a:schemeClr val="tx1"/>
+          </a:fontRef>
+        </p:style>
+      </p:cxnSp>
+      <p:sp>
+        <p:nvSpPr>
+          <p:cNvPr id="26" name="TextBox 25">
+            <a:extLst>
+              <a:ext uri="{FF2B5EF4-FFF2-40B4-BE49-F238E27FC236}">
+                <a16:creationId xmlns:a16="http://schemas.microsoft.com/office/drawing/2014/main" id="{00B0B6B7-226E-954C-98D8-33134757394E}"/>
+              </a:ext>
+            </a:extLst>
+          </p:cNvPr>
+          <p:cNvSpPr txBox="1"/>
+          <p:nvPr/>
+        </p:nvSpPr>
+        <p:spPr>
+          <a:xfrm>
+            <a:off x="5085881" y="2083323"/>
+            <a:ext cx="2020233" cy="369332"/>
+          </a:xfrm>
+          <a:prstGeom prst="rect">
+            <a:avLst/>
+          </a:prstGeom>
+          <a:noFill/>
+          <a:effectLst>
+            <a:outerShdw blurRad="50800" dist="38100" dir="2700000" algn="tl" rotWithShape="0">
+              <a:prstClr val="black">
+                <a:alpha val="40000"/>
+              </a:prstClr>
+            </a:outerShdw>
+          </a:effectLst>
+        </p:spPr>
+        <p:txBody>
+          <a:bodyPr wrap="none" rtlCol="0">
+            <a:spAutoFit/>
+          </a:bodyPr>
+          <a:lstStyle/>
+          <a:p>
+            <a:r>
+              <a:rPr lang="en-US" dirty="0">
+                <a:gradFill>
+                  <a:gsLst>
+                    <a:gs pos="0">
+                      <a:schemeClr val="accent4">
+                        <a:lumMod val="20000"/>
+                        <a:lumOff val="80000"/>
+                      </a:schemeClr>
+                    </a:gs>
+                    <a:gs pos="99000">
+                      <a:schemeClr val="bg1"/>
+                    </a:gs>
+                  </a:gsLst>
+                  <a:lin ang="0" scaled="0"/>
+                </a:gradFill>
+                <a:effectLst>
+                  <a:outerShdw blurRad="50800" dist="38100" dir="2700000" algn="tl" rotWithShape="0">
+                    <a:schemeClr val="accent4">
+                      <a:lumMod val="75000"/>
+                      <a:alpha val="40000"/>
+                    </a:schemeClr>
+                  </a:outerShdw>
+                </a:effectLst>
+              </a:rPr>
+              <a:t>Progressive rollouts</a:t>
+            </a:r>
+          </a:p>
+        </p:txBody>
+      </p:sp>
+      <p:sp>
+        <p:nvSpPr>
+          <p:cNvPr id="84" name="TextBox 83">
+            <a:extLst>
+              <a:ext uri="{FF2B5EF4-FFF2-40B4-BE49-F238E27FC236}">
+                <a16:creationId xmlns:a16="http://schemas.microsoft.com/office/drawing/2014/main" id="{4F6B134A-27C2-A744-BDF7-EB488EF3E173}"/>
+              </a:ext>
+            </a:extLst>
+          </p:cNvPr>
+          <p:cNvSpPr txBox="1"/>
+          <p:nvPr/>
+        </p:nvSpPr>
+        <p:spPr>
+          <a:xfrm>
+            <a:off x="2975388" y="3300409"/>
+            <a:ext cx="1442767" cy="369332"/>
+          </a:xfrm>
+          <a:prstGeom prst="rect">
+            <a:avLst/>
+          </a:prstGeom>
+          <a:noFill/>
+          <a:effectLst>
+            <a:outerShdw blurRad="50800" dist="38100" dir="2700000" algn="tl" rotWithShape="0">
+              <a:prstClr val="black">
+                <a:alpha val="40000"/>
+              </a:prstClr>
+            </a:outerShdw>
+          </a:effectLst>
+        </p:spPr>
+        <p:txBody>
+          <a:bodyPr wrap="none" rtlCol="0">
+            <a:spAutoFit/>
+          </a:bodyPr>
+          <a:lstStyle/>
+          <a:p>
+            <a:r>
+              <a:rPr lang="en-US" dirty="0">
+                <a:gradFill>
+                  <a:gsLst>
+                    <a:gs pos="0">
+                      <a:schemeClr val="accent4">
+                        <a:lumMod val="40000"/>
+                        <a:lumOff val="60000"/>
+                      </a:schemeClr>
+                    </a:gs>
+                    <a:gs pos="99000">
+                      <a:schemeClr val="bg1"/>
+                    </a:gs>
+                  </a:gsLst>
+                  <a:lin ang="0" scaled="0"/>
+                </a:gradFill>
+                <a:effectLst>
+                  <a:outerShdw blurRad="50800" dist="38100" dir="2700000" algn="tl" rotWithShape="0">
+                    <a:schemeClr val="accent4">
+                      <a:lumMod val="75000"/>
+                      <a:alpha val="40000"/>
+                    </a:schemeClr>
+                  </a:outerShdw>
+                </a:effectLst>
+              </a:rPr>
+              <a:t>Chaos testing</a:t>
+            </a:r>
+          </a:p>
+        </p:txBody>
+      </p:sp>
+      <p:sp>
+        <p:nvSpPr>
+          <p:cNvPr id="86" name="TextBox 85">
+            <a:extLst>
+              <a:ext uri="{FF2B5EF4-FFF2-40B4-BE49-F238E27FC236}">
+                <a16:creationId xmlns:a16="http://schemas.microsoft.com/office/drawing/2014/main" id="{3AF42E4E-4F2B-3444-9D30-D6A138BC1321}"/>
+              </a:ext>
+            </a:extLst>
+          </p:cNvPr>
+          <p:cNvSpPr txBox="1"/>
+          <p:nvPr/>
+        </p:nvSpPr>
+        <p:spPr>
+          <a:xfrm>
+            <a:off x="4180023" y="4141054"/>
+            <a:ext cx="3808543" cy="369332"/>
+          </a:xfrm>
+          <a:prstGeom prst="rect">
+            <a:avLst/>
+          </a:prstGeom>
+          <a:noFill/>
+          <a:effectLst>
+            <a:outerShdw blurRad="50800" dist="38100" dir="2700000" algn="tl" rotWithShape="0">
+              <a:prstClr val="black">
+                <a:alpha val="40000"/>
+              </a:prstClr>
+            </a:outerShdw>
+          </a:effectLst>
+        </p:spPr>
+        <p:txBody>
+          <a:bodyPr wrap="none" rtlCol="0">
+            <a:spAutoFit/>
+          </a:bodyPr>
+          <a:lstStyle/>
+          <a:p>
+            <a:r>
+              <a:rPr lang="en-US" dirty="0">
+                <a:gradFill>
+                  <a:gsLst>
+                    <a:gs pos="0">
+                      <a:schemeClr val="bg1"/>
+                    </a:gs>
+                    <a:gs pos="98000">
+                      <a:schemeClr val="accent4">
+                        <a:lumMod val="40000"/>
+                        <a:lumOff val="60000"/>
+                      </a:schemeClr>
+                    </a:gs>
+                  </a:gsLst>
+                  <a:lin ang="0" scaled="0"/>
+                </a:gradFill>
+                <a:effectLst>
+                  <a:outerShdw blurRad="50800" dist="38100" dir="2700000" algn="tl" rotWithShape="0">
+                    <a:schemeClr val="accent4">
+                      <a:lumMod val="75000"/>
+                      <a:alpha val="40000"/>
+                    </a:schemeClr>
+                  </a:outerShdw>
+                </a:effectLst>
+              </a:rPr>
+              <a:t>State-of-the-art AI &amp; statistical analysis</a:t>
+            </a:r>
+          </a:p>
+        </p:txBody>
+      </p:sp>
+      <p:sp>
+        <p:nvSpPr>
+          <p:cNvPr id="87" name="TextBox 86">
+            <a:extLst>
+              <a:ext uri="{FF2B5EF4-FFF2-40B4-BE49-F238E27FC236}">
+                <a16:creationId xmlns:a16="http://schemas.microsoft.com/office/drawing/2014/main" id="{A14FFCA2-5CA7-AC47-8DEE-26F0528D2DA1}"/>
+              </a:ext>
+            </a:extLst>
+          </p:cNvPr>
+          <p:cNvSpPr txBox="1"/>
+          <p:nvPr/>
+        </p:nvSpPr>
+        <p:spPr>
+          <a:xfrm>
+            <a:off x="3545503" y="2480564"/>
+            <a:ext cx="1575816" cy="369332"/>
+          </a:xfrm>
+          <a:prstGeom prst="rect">
+            <a:avLst/>
+          </a:prstGeom>
+          <a:noFill/>
+          <a:effectLst>
+            <a:outerShdw blurRad="50800" dist="38100" dir="2700000" algn="tl" rotWithShape="0">
+              <a:prstClr val="black">
+                <a:alpha val="40000"/>
+              </a:prstClr>
+            </a:outerShdw>
+          </a:effectLst>
+        </p:spPr>
+        <p:txBody>
+          <a:bodyPr wrap="none" rtlCol="0">
+            <a:spAutoFit/>
+          </a:bodyPr>
+          <a:lstStyle/>
+          <a:p>
+            <a:r>
+              <a:rPr lang="en-US" dirty="0">
+                <a:gradFill>
+                  <a:gsLst>
+                    <a:gs pos="0">
+                      <a:schemeClr val="accent4">
+                        <a:lumMod val="20000"/>
+                        <a:lumOff val="80000"/>
+                      </a:schemeClr>
+                    </a:gs>
+                    <a:gs pos="99000">
+                      <a:schemeClr val="bg1"/>
+                    </a:gs>
+                  </a:gsLst>
+                  <a:lin ang="0" scaled="0"/>
+                </a:gradFill>
+                <a:effectLst>
+                  <a:outerShdw blurRad="50800" dist="38100" dir="2700000" algn="tl" rotWithShape="0">
+                    <a:schemeClr val="accent4">
+                      <a:lumMod val="75000"/>
+                      <a:alpha val="40000"/>
+                    </a:schemeClr>
+                  </a:outerShdw>
+                </a:effectLst>
+              </a:rPr>
+              <a:t>A/B(/n) testing</a:t>
+            </a:r>
+          </a:p>
+        </p:txBody>
+      </p:sp>
+      <p:cxnSp>
+        <p:nvCxnSpPr>
+          <p:cNvPr id="24" name="Straight Arrow Connector 23">
+            <a:extLst>
+              <a:ext uri="{FF2B5EF4-FFF2-40B4-BE49-F238E27FC236}">
+                <a16:creationId xmlns:a16="http://schemas.microsoft.com/office/drawing/2014/main" id="{B9D26F47-5E45-C548-8703-049CCF161E69}"/>
+              </a:ext>
+            </a:extLst>
+          </p:cNvPr>
+          <p:cNvCxnSpPr>
+            <a:cxnSpLocks/>
+            <a:stCxn id="45" idx="3"/>
+          </p:cNvCxnSpPr>
+          <p:nvPr/>
+        </p:nvCxnSpPr>
+        <p:spPr>
+          <a:xfrm flipH="1">
+            <a:off x="2975388" y="3674338"/>
+            <a:ext cx="2716047" cy="0"/>
+          </a:xfrm>
+          <a:prstGeom prst="straightConnector1">
+            <a:avLst/>
+          </a:prstGeom>
+          <a:ln w="31750">
+            <a:gradFill>
+              <a:gsLst>
+                <a:gs pos="0">
+                  <a:schemeClr val="bg1"/>
+                </a:gs>
+                <a:gs pos="100000">
+                  <a:srgbClr val="B70703"/>
+                </a:gs>
+              </a:gsLst>
+              <a:lin ang="0" scaled="0"/>
+            </a:gradFill>
+            <a:tailEnd type="none"/>
+          </a:ln>
+        </p:spPr>
+        <p:style>
+          <a:lnRef idx="1">
+            <a:schemeClr val="accent1"/>
+          </a:lnRef>
+          <a:fillRef idx="0">
+            <a:schemeClr val="accent1"/>
+          </a:fillRef>
+          <a:effectRef idx="0">
+            <a:schemeClr val="accent1"/>
+          </a:effectRef>
+          <a:fontRef idx="minor">
+            <a:schemeClr val="tx1"/>
+          </a:fontRef>
+        </p:style>
+      </p:cxnSp>
+      <p:cxnSp>
+        <p:nvCxnSpPr>
+          <p:cNvPr id="27" name="Straight Arrow Connector 26">
+            <a:extLst>
+              <a:ext uri="{FF2B5EF4-FFF2-40B4-BE49-F238E27FC236}">
+                <a16:creationId xmlns:a16="http://schemas.microsoft.com/office/drawing/2014/main" id="{5330E225-5DC0-6D4C-83F4-B6F53FA58B81}"/>
+              </a:ext>
+            </a:extLst>
+          </p:cNvPr>
+          <p:cNvCxnSpPr>
+            <a:cxnSpLocks/>
+            <a:stCxn id="45" idx="4"/>
+          </p:cNvCxnSpPr>
+          <p:nvPr/>
+        </p:nvCxnSpPr>
+        <p:spPr>
+          <a:xfrm flipH="1">
+            <a:off x="6084296" y="3838204"/>
+            <a:ext cx="1552" cy="258910"/>
+          </a:xfrm>
+          <a:prstGeom prst="straightConnector1">
+            <a:avLst/>
+          </a:prstGeom>
+          <a:ln w="31750">
+            <a:solidFill>
+              <a:schemeClr val="lt1">
+                <a:hueOff val="0"/>
+                <a:satOff val="0"/>
+                <a:lumOff val="0"/>
+              </a:schemeClr>
+            </a:solidFill>
+            <a:tailEnd type="none"/>
+          </a:ln>
+        </p:spPr>
+        <p:style>
+          <a:lnRef idx="1">
+            <a:schemeClr val="accent1"/>
+          </a:lnRef>
+          <a:fillRef idx="0">
+            <a:schemeClr val="accent1"/>
+          </a:fillRef>
+          <a:effectRef idx="0">
+            <a:schemeClr val="accent1"/>
+          </a:effectRef>
+          <a:fontRef idx="minor">
+            <a:schemeClr val="tx1"/>
+          </a:fontRef>
+        </p:style>
+      </p:cxnSp>
+      <p:cxnSp>
+        <p:nvCxnSpPr>
+          <p:cNvPr id="30" name="Straight Arrow Connector 29">
+            <a:extLst>
+              <a:ext uri="{FF2B5EF4-FFF2-40B4-BE49-F238E27FC236}">
+                <a16:creationId xmlns:a16="http://schemas.microsoft.com/office/drawing/2014/main" id="{7046775E-C39B-3444-98D7-1861DFAD2629}"/>
+              </a:ext>
+            </a:extLst>
+          </p:cNvPr>
+          <p:cNvCxnSpPr>
+            <a:cxnSpLocks/>
+          </p:cNvCxnSpPr>
+          <p:nvPr/>
+        </p:nvCxnSpPr>
+        <p:spPr>
+          <a:xfrm flipH="1">
+            <a:off x="6095999" y="2469809"/>
+            <a:ext cx="1552" cy="258910"/>
+          </a:xfrm>
+          <a:prstGeom prst="straightConnector1">
+            <a:avLst/>
+          </a:prstGeom>
+          <a:ln w="31750">
+            <a:solidFill>
+              <a:schemeClr val="lt1">
+                <a:hueOff val="0"/>
+                <a:satOff val="0"/>
+                <a:lumOff val="0"/>
+              </a:schemeClr>
+            </a:solidFill>
+            <a:tailEnd type="none"/>
+          </a:ln>
+        </p:spPr>
+        <p:style>
+          <a:lnRef idx="1">
+            <a:schemeClr val="accent1"/>
+          </a:lnRef>
+          <a:fillRef idx="0">
+            <a:schemeClr val="accent1"/>
+          </a:fillRef>
+          <a:effectRef idx="0">
+            <a:schemeClr val="accent1"/>
+          </a:effectRef>
+          <a:fontRef idx="minor">
+            <a:schemeClr val="tx1"/>
+          </a:fontRef>
+        </p:style>
+      </p:cxnSp>
+      <p:cxnSp>
+        <p:nvCxnSpPr>
+          <p:cNvPr id="31" name="Straight Arrow Connector 30">
+            <a:extLst>
+              <a:ext uri="{FF2B5EF4-FFF2-40B4-BE49-F238E27FC236}">
+                <a16:creationId xmlns:a16="http://schemas.microsoft.com/office/drawing/2014/main" id="{6F6EB244-A7B0-B645-B012-C7F92E43D308}"/>
+              </a:ext>
+            </a:extLst>
+          </p:cNvPr>
+          <p:cNvCxnSpPr>
+            <a:cxnSpLocks/>
+          </p:cNvCxnSpPr>
+          <p:nvPr/>
+        </p:nvCxnSpPr>
+        <p:spPr>
+          <a:xfrm flipH="1">
+            <a:off x="4737975" y="2446217"/>
+            <a:ext cx="2716047" cy="0"/>
+          </a:xfrm>
+          <a:prstGeom prst="straightConnector1">
+            <a:avLst/>
+          </a:prstGeom>
+          <a:ln w="31750">
+            <a:gradFill>
+              <a:gsLst>
+                <a:gs pos="49000">
+                  <a:schemeClr val="bg1"/>
+                </a:gs>
+                <a:gs pos="0">
+                  <a:srgbClr val="B70703"/>
+                </a:gs>
+                <a:gs pos="100000">
+                  <a:srgbClr val="B70703"/>
+                </a:gs>
+              </a:gsLst>
+              <a:lin ang="0" scaled="0"/>
+            </a:gradFill>
+            <a:tailEnd type="none"/>
+          </a:ln>
+        </p:spPr>
+        <p:style>
+          <a:lnRef idx="1">
+            <a:schemeClr val="accent1"/>
+          </a:lnRef>
+          <a:fillRef idx="0">
+            <a:schemeClr val="accent1"/>
+          </a:fillRef>
+          <a:effectRef idx="0">
+            <a:schemeClr val="accent1"/>
+          </a:effectRef>
+          <a:fontRef idx="minor">
+            <a:schemeClr val="tx1"/>
+          </a:fontRef>
+        </p:style>
+      </p:cxnSp>
+      <p:cxnSp>
+        <p:nvCxnSpPr>
+          <p:cNvPr id="32" name="Straight Arrow Connector 31">
+            <a:extLst>
+              <a:ext uri="{FF2B5EF4-FFF2-40B4-BE49-F238E27FC236}">
+                <a16:creationId xmlns:a16="http://schemas.microsoft.com/office/drawing/2014/main" id="{60FAE7CA-C26E-1C43-BACB-203469C347F9}"/>
+              </a:ext>
+            </a:extLst>
+          </p:cNvPr>
+          <p:cNvCxnSpPr>
+            <a:cxnSpLocks/>
+          </p:cNvCxnSpPr>
+          <p:nvPr/>
+        </p:nvCxnSpPr>
+        <p:spPr>
+          <a:xfrm flipH="1">
+            <a:off x="4726272" y="4110186"/>
+            <a:ext cx="2716047" cy="0"/>
+          </a:xfrm>
+          <a:prstGeom prst="straightConnector1">
+            <a:avLst/>
+          </a:prstGeom>
+          <a:ln w="31750">
+            <a:gradFill>
+              <a:gsLst>
+                <a:gs pos="49000">
+                  <a:schemeClr val="bg1"/>
+                </a:gs>
+                <a:gs pos="0">
+                  <a:srgbClr val="B70703"/>
+                </a:gs>
+                <a:gs pos="100000">
+                  <a:srgbClr val="B70703"/>
+                </a:gs>
+              </a:gsLst>
+              <a:lin ang="0" scaled="0"/>
+            </a:gradFill>
+            <a:tailEnd type="none"/>
+          </a:ln>
+        </p:spPr>
+        <p:style>
+          <a:lnRef idx="1">
+            <a:schemeClr val="accent1"/>
+          </a:lnRef>
+          <a:fillRef idx="0">
+            <a:schemeClr val="accent1"/>
+          </a:fillRef>
+          <a:effectRef idx="0">
+            <a:schemeClr val="accent1"/>
+          </a:effectRef>
+          <a:fontRef idx="minor">
+            <a:schemeClr val="tx1"/>
+          </a:fontRef>
+        </p:style>
+      </p:cxnSp>
+      <p:cxnSp>
+        <p:nvCxnSpPr>
+          <p:cNvPr id="33" name="Straight Arrow Connector 32">
+            <a:extLst>
+              <a:ext uri="{FF2B5EF4-FFF2-40B4-BE49-F238E27FC236}">
+                <a16:creationId xmlns:a16="http://schemas.microsoft.com/office/drawing/2014/main" id="{FD43408C-8FD1-2A45-BAFA-7C30E55C1B43}"/>
+              </a:ext>
+            </a:extLst>
+          </p:cNvPr>
+          <p:cNvCxnSpPr>
+            <a:cxnSpLocks/>
+            <a:stCxn id="45" idx="7"/>
+          </p:cNvCxnSpPr>
+          <p:nvPr/>
+        </p:nvCxnSpPr>
+        <p:spPr>
+          <a:xfrm flipV="1">
+            <a:off x="6480260" y="2876683"/>
+            <a:ext cx="2715768" cy="6437"/>
+          </a:xfrm>
+          <a:prstGeom prst="straightConnector1">
+            <a:avLst/>
+          </a:prstGeom>
+          <a:ln w="31750">
+            <a:gradFill>
+              <a:gsLst>
+                <a:gs pos="0">
+                  <a:schemeClr val="bg1"/>
+                </a:gs>
+                <a:gs pos="100000">
+                  <a:srgbClr val="B70703"/>
+                </a:gs>
+              </a:gsLst>
+              <a:lin ang="0" scaled="0"/>
+            </a:gradFill>
+            <a:tailEnd type="none"/>
+          </a:ln>
+        </p:spPr>
+        <p:style>
+          <a:lnRef idx="1">
+            <a:schemeClr val="accent1"/>
+          </a:lnRef>
+          <a:fillRef idx="0">
+            <a:schemeClr val="accent1"/>
+          </a:fillRef>
+          <a:effectRef idx="0">
+            <a:schemeClr val="accent1"/>
+          </a:effectRef>
+          <a:fontRef idx="minor">
+            <a:schemeClr val="tx1"/>
+          </a:fontRef>
+        </p:style>
+      </p:cxnSp>
+      <p:cxnSp>
+        <p:nvCxnSpPr>
+          <p:cNvPr id="36" name="Straight Arrow Connector 35">
+            <a:extLst>
+              <a:ext uri="{FF2B5EF4-FFF2-40B4-BE49-F238E27FC236}">
+                <a16:creationId xmlns:a16="http://schemas.microsoft.com/office/drawing/2014/main" id="{ED3C73B4-F988-764F-8F41-1E2C8D45CA10}"/>
+              </a:ext>
+            </a:extLst>
+          </p:cNvPr>
+          <p:cNvCxnSpPr>
+            <a:cxnSpLocks/>
+            <a:stCxn id="45" idx="5"/>
+          </p:cNvCxnSpPr>
+          <p:nvPr/>
+        </p:nvCxnSpPr>
+        <p:spPr>
+          <a:xfrm flipV="1">
+            <a:off x="6480260" y="3673284"/>
+            <a:ext cx="2715768" cy="1054"/>
+          </a:xfrm>
+          <a:prstGeom prst="straightConnector1">
+            <a:avLst/>
+          </a:prstGeom>
+          <a:ln w="31750">
+            <a:gradFill>
+              <a:gsLst>
+                <a:gs pos="0">
+                  <a:schemeClr val="bg1"/>
+                </a:gs>
+                <a:gs pos="100000">
+                  <a:srgbClr val="B70703"/>
+                </a:gs>
+              </a:gsLst>
+              <a:lin ang="0" scaled="0"/>
+            </a:gradFill>
+            <a:tailEnd type="none"/>
+          </a:ln>
+        </p:spPr>
+        <p:style>
+          <a:lnRef idx="1">
+            <a:schemeClr val="accent1"/>
+          </a:lnRef>
+          <a:fillRef idx="0">
+            <a:schemeClr val="accent1"/>
+          </a:fillRef>
+          <a:effectRef idx="0">
+            <a:schemeClr val="accent1"/>
+          </a:effectRef>
+          <a:fontRef idx="minor">
+            <a:schemeClr val="tx1"/>
+          </a:fontRef>
+        </p:style>
+      </p:cxnSp>
+      <p:sp>
+        <p:nvSpPr>
+          <p:cNvPr id="39" name="TextBox 38">
+            <a:extLst>
+              <a:ext uri="{FF2B5EF4-FFF2-40B4-BE49-F238E27FC236}">
+                <a16:creationId xmlns:a16="http://schemas.microsoft.com/office/drawing/2014/main" id="{2DE3CC12-59D6-9D49-9D9F-4D03B8689AA5}"/>
+              </a:ext>
+            </a:extLst>
+          </p:cNvPr>
+          <p:cNvSpPr txBox="1"/>
+          <p:nvPr/>
+        </p:nvSpPr>
+        <p:spPr>
+          <a:xfrm>
+            <a:off x="7083450" y="2507474"/>
+            <a:ext cx="1509388" cy="369332"/>
+          </a:xfrm>
+          <a:prstGeom prst="rect">
+            <a:avLst/>
+          </a:prstGeom>
+          <a:noFill/>
+          <a:effectLst>
+            <a:outerShdw blurRad="50800" dist="38100" dir="2700000" algn="tl" rotWithShape="0">
+              <a:prstClr val="black">
+                <a:alpha val="40000"/>
+              </a:prstClr>
+            </a:outerShdw>
+          </a:effectLst>
+        </p:spPr>
+        <p:txBody>
+          <a:bodyPr wrap="none" rtlCol="0">
+            <a:spAutoFit/>
+          </a:bodyPr>
+          <a:lstStyle/>
+          <a:p>
+            <a:r>
+              <a:rPr lang="en-US" dirty="0">
+                <a:gradFill>
+                  <a:gsLst>
+                    <a:gs pos="0">
+                      <a:schemeClr val="accent4">
+                        <a:lumMod val="20000"/>
+                        <a:lumOff val="80000"/>
+                      </a:schemeClr>
+                    </a:gs>
+                    <a:gs pos="99000">
+                      <a:schemeClr val="bg1"/>
+                    </a:gs>
+                  </a:gsLst>
+                  <a:lin ang="0" scaled="0"/>
+                </a:gradFill>
+                <a:effectLst>
+                  <a:outerShdw blurRad="50800" dist="38100" dir="2700000" algn="tl" rotWithShape="0">
+                    <a:schemeClr val="accent4">
+                      <a:lumMod val="75000"/>
+                      <a:alpha val="40000"/>
+                    </a:schemeClr>
+                  </a:outerShdw>
+                </a:effectLst>
+              </a:rPr>
+              <a:t>SLO validation</a:t>
+            </a:r>
+          </a:p>
+        </p:txBody>
+      </p:sp>
+      <p:sp>
+        <p:nvSpPr>
+          <p:cNvPr id="40" name="TextBox 39">
+            <a:extLst>
+              <a:ext uri="{FF2B5EF4-FFF2-40B4-BE49-F238E27FC236}">
+                <a16:creationId xmlns:a16="http://schemas.microsoft.com/office/drawing/2014/main" id="{242E5DE1-1E49-F44F-B81D-96319EC276E1}"/>
+              </a:ext>
+            </a:extLst>
+          </p:cNvPr>
+          <p:cNvSpPr txBox="1"/>
+          <p:nvPr/>
+        </p:nvSpPr>
+        <p:spPr>
+          <a:xfrm>
+            <a:off x="7868677" y="3278728"/>
+            <a:ext cx="1327351" cy="369332"/>
+          </a:xfrm>
+          <a:prstGeom prst="rect">
+            <a:avLst/>
+          </a:prstGeom>
+          <a:noFill/>
+          <a:effectLst>
+            <a:outerShdw blurRad="50800" dist="38100" dir="2700000" algn="tl" rotWithShape="0">
+              <a:prstClr val="black">
+                <a:alpha val="40000"/>
+              </a:prstClr>
+            </a:outerShdw>
+          </a:effectLst>
+        </p:spPr>
+        <p:txBody>
+          <a:bodyPr wrap="none" rtlCol="0">
+            <a:spAutoFit/>
+          </a:bodyPr>
+          <a:lstStyle/>
+          <a:p>
+            <a:r>
+              <a:rPr lang="en-US" dirty="0">
+                <a:gradFill>
+                  <a:gsLst>
+                    <a:gs pos="0">
+                      <a:schemeClr val="accent4">
+                        <a:lumMod val="40000"/>
+                        <a:lumOff val="60000"/>
+                      </a:schemeClr>
+                    </a:gs>
+                    <a:gs pos="99000">
+                      <a:schemeClr val="bg1"/>
+                    </a:gs>
+                  </a:gsLst>
+                  <a:lin ang="0" scaled="0"/>
+                </a:gradFill>
+                <a:effectLst>
+                  <a:outerShdw blurRad="50800" dist="38100" dir="2700000" algn="tl" rotWithShape="0">
+                    <a:schemeClr val="accent4">
+                      <a:lumMod val="75000"/>
+                      <a:alpha val="40000"/>
+                    </a:schemeClr>
+                  </a:outerShdw>
+                </a:effectLst>
+              </a:rPr>
+              <a:t>Load testing</a:t>
+            </a:r>
+          </a:p>
+        </p:txBody>
+      </p:sp>
+    </p:spTree>
+    <p:extLst>
+      <p:ext uri="{BB962C8B-B14F-4D97-AF65-F5344CB8AC3E}">
+        <p14:creationId xmlns:p14="http://schemas.microsoft.com/office/powerpoint/2010/main" val="1325324565"/>
+      </p:ext>
+    </p:extLst>
+  </p:cSld>
+  <p:clrMapOvr>
+    <a:masterClrMapping/>
+  </p:clrMapOvr>
+</p:sld>
+</file>
+
+<file path=ppt/slides/slide5.xml><?xml version="1.0" encoding="utf-8"?>
+<p:sld xmlns:a="http://schemas.openxmlformats.org/drawingml/2006/main" xmlns:r="http://schemas.openxmlformats.org/officeDocument/2006/relationships" xmlns:p="http://schemas.openxmlformats.org/presentationml/2006/main">
+  <p:cSld>
+    <p:spTree>
+      <p:nvGrpSpPr>
+        <p:cNvPr id="1" name=""/>
+        <p:cNvGrpSpPr/>
+        <p:nvPr/>
+      </p:nvGrpSpPr>
+      <p:grpSpPr>
+        <a:xfrm>
+          <a:off x="0" y="0"/>
+          <a:ext cx="0" cy="0"/>
+          <a:chOff x="0" y="0"/>
+          <a:chExt cx="0" cy="0"/>
+        </a:xfrm>
+      </p:grpSpPr>
+      <p:sp>
+        <p:nvSpPr>
+          <p:cNvPr id="9" name="Rounded Rectangle 8">
+            <a:extLst>
+              <a:ext uri="{FF2B5EF4-FFF2-40B4-BE49-F238E27FC236}">
+                <a16:creationId xmlns:a16="http://schemas.microsoft.com/office/drawing/2014/main" id="{319D71A4-FD5D-BD48-844B-435B16760232}"/>
+              </a:ext>
+            </a:extLst>
+          </p:cNvPr>
+          <p:cNvSpPr/>
+          <p:nvPr/>
+        </p:nvSpPr>
+        <p:spPr>
+          <a:xfrm>
+            <a:off x="2438397" y="1933404"/>
+            <a:ext cx="7315200" cy="2690649"/>
+          </a:xfrm>
+          <a:prstGeom prst="roundRect">
+            <a:avLst/>
+          </a:prstGeom>
+          <a:gradFill>
+            <a:gsLst>
+              <a:gs pos="0">
+                <a:srgbClr val="C00000"/>
+              </a:gs>
+              <a:gs pos="100000">
+                <a:schemeClr val="tx2">
+                  <a:lumMod val="75000"/>
+                </a:schemeClr>
+              </a:gs>
+            </a:gsLst>
+            <a:lin ang="5400000" scaled="1"/>
+          </a:gradFill>
+        </p:spPr>
+        <p:style>
+          <a:lnRef idx="2">
+            <a:schemeClr val="accent1">
+              <a:shade val="50000"/>
+            </a:schemeClr>
+          </a:lnRef>
+          <a:fillRef idx="1">
+            <a:schemeClr val="accent1"/>
+          </a:fillRef>
+          <a:effectRef idx="0">
+            <a:schemeClr val="accent1"/>
+          </a:effectRef>
+          <a:fontRef idx="minor">
+            <a:schemeClr val="lt1"/>
+          </a:fontRef>
+        </p:style>
+        <p:txBody>
+          <a:bodyPr rtlCol="0" anchor="ctr"/>
+          <a:lstStyle/>
+          <a:p>
+            <a:pPr algn="ctr"/>
+            <a:endParaRPr lang="en-US" dirty="0"/>
+          </a:p>
+        </p:txBody>
+      </p:sp>
+      <p:sp>
+        <p:nvSpPr>
+          <p:cNvPr id="45" name="Oval 44">
+            <a:extLst>
+              <a:ext uri="{FF2B5EF4-FFF2-40B4-BE49-F238E27FC236}">
+                <a16:creationId xmlns:a16="http://schemas.microsoft.com/office/drawing/2014/main" id="{7EA7BD02-DB63-9548-B6A6-786AF358FC92}"/>
+              </a:ext>
+            </a:extLst>
+          </p:cNvPr>
+          <p:cNvSpPr>
+            <a:spLocks noChangeAspect="1"/>
+          </p:cNvSpPr>
+          <p:nvPr/>
+        </p:nvSpPr>
+        <p:spPr>
+          <a:xfrm>
+            <a:off x="5528064" y="2719254"/>
+            <a:ext cx="1115568" cy="1118950"/>
+          </a:xfrm>
+          <a:prstGeom prst="ellipse">
+            <a:avLst/>
+          </a:prstGeom>
+          <a:solidFill>
+            <a:schemeClr val="bg1"/>
+          </a:solidFill>
+          <a:ln>
+            <a:solidFill>
+              <a:srgbClr val="C00000"/>
+            </a:solidFill>
+          </a:ln>
+          <a:effectLst>
+            <a:outerShdw blurRad="50800" dist="38100" dir="2700000" algn="tl" rotWithShape="0">
+              <a:prstClr val="black">
+                <a:alpha val="40000"/>
+              </a:prstClr>
+            </a:outerShdw>
+          </a:effectLst>
+        </p:spPr>
+        <p:style>
+          <a:lnRef idx="2">
+            <a:schemeClr val="accent1">
+              <a:shade val="50000"/>
+            </a:schemeClr>
+          </a:lnRef>
+          <a:fillRef idx="1">
+            <a:schemeClr val="accent1"/>
+          </a:fillRef>
+          <a:effectRef idx="0">
+            <a:schemeClr val="accent1"/>
+          </a:effectRef>
+          <a:fontRef idx="minor">
+            <a:schemeClr val="lt1"/>
+          </a:fontRef>
+        </p:style>
+        <p:txBody>
+          <a:bodyPr rtlCol="0" anchor="ctr"/>
+          <a:lstStyle/>
+          <a:p>
+            <a:pPr algn="ctr"/>
+            <a:endParaRPr lang="en-US" dirty="0"/>
+          </a:p>
+        </p:txBody>
+      </p:sp>
+      <p:pic>
+        <p:nvPicPr>
+          <p:cNvPr id="46" name="Graphic 45">
+            <a:extLst>
+              <a:ext uri="{FF2B5EF4-FFF2-40B4-BE49-F238E27FC236}">
+                <a16:creationId xmlns:a16="http://schemas.microsoft.com/office/drawing/2014/main" id="{DB0AF4BA-07A2-6344-A68F-2AF45ACD2045}"/>
+              </a:ext>
+            </a:extLst>
+          </p:cNvPr>
+          <p:cNvPicPr>
+            <a:picLocks noChangeAspect="1"/>
+          </p:cNvPicPr>
+          <p:nvPr/>
+        </p:nvPicPr>
+        <p:blipFill>
+          <a:blip r:embed="rId3">
+            <a:extLst>
+              <a:ext uri="{96DAC541-7B7A-43D3-8B79-37D633B846F1}">
+                <asvg:svgBlip xmlns:asvg="http://schemas.microsoft.com/office/drawing/2016/SVG/main" r:embed="rId4"/>
+              </a:ext>
+            </a:extLst>
+          </a:blip>
+          <a:stretch>
+            <a:fillRect/>
+          </a:stretch>
+        </p:blipFill>
+        <p:spPr>
+          <a:xfrm>
+            <a:off x="5711261" y="2892139"/>
+            <a:ext cx="746070" cy="746070"/>
+          </a:xfrm>
+          <a:prstGeom prst="rect">
+            <a:avLst/>
+          </a:prstGeom>
+          <a:effectLst>
+            <a:outerShdw blurRad="50800" dist="50800" dir="5400000" algn="ctr" rotWithShape="0">
+              <a:srgbClr val="000000">
+                <a:alpha val="93000"/>
+              </a:srgbClr>
+            </a:outerShdw>
+          </a:effectLst>
+        </p:spPr>
+      </p:pic>
+      <p:cxnSp>
+        <p:nvCxnSpPr>
+          <p:cNvPr id="78" name="Straight Arrow Connector 77">
+            <a:extLst>
+              <a:ext uri="{FF2B5EF4-FFF2-40B4-BE49-F238E27FC236}">
+                <a16:creationId xmlns:a16="http://schemas.microsoft.com/office/drawing/2014/main" id="{0442ED27-3243-AE4E-ADAC-0122C7D2199B}"/>
+              </a:ext>
+            </a:extLst>
+          </p:cNvPr>
+          <p:cNvCxnSpPr>
+            <a:cxnSpLocks/>
+            <a:stCxn id="45" idx="1"/>
+          </p:cNvCxnSpPr>
+          <p:nvPr/>
+        </p:nvCxnSpPr>
+        <p:spPr>
+          <a:xfrm flipH="1">
+            <a:off x="2975388" y="2883120"/>
+            <a:ext cx="2716047" cy="0"/>
+          </a:xfrm>
+          <a:prstGeom prst="straightConnector1">
+            <a:avLst/>
+          </a:prstGeom>
+          <a:ln w="31750">
+            <a:gradFill>
+              <a:gsLst>
+                <a:gs pos="0">
+                  <a:schemeClr val="bg1"/>
+                </a:gs>
+                <a:gs pos="100000">
+                  <a:srgbClr val="B70703"/>
+                </a:gs>
+              </a:gsLst>
+              <a:lin ang="0" scaled="0"/>
+            </a:gradFill>
+            <a:tailEnd type="none"/>
+          </a:ln>
+        </p:spPr>
+        <p:style>
+          <a:lnRef idx="1">
+            <a:schemeClr val="accent1"/>
+          </a:lnRef>
+          <a:fillRef idx="0">
+            <a:schemeClr val="accent1"/>
+          </a:fillRef>
+          <a:effectRef idx="0">
+            <a:schemeClr val="accent1"/>
+          </a:effectRef>
+          <a:fontRef idx="minor">
+            <a:schemeClr val="tx1"/>
+          </a:fontRef>
+        </p:style>
+      </p:cxnSp>
+      <p:sp>
+        <p:nvSpPr>
+          <p:cNvPr id="26" name="TextBox 25">
+            <a:extLst>
+              <a:ext uri="{FF2B5EF4-FFF2-40B4-BE49-F238E27FC236}">
+                <a16:creationId xmlns:a16="http://schemas.microsoft.com/office/drawing/2014/main" id="{00B0B6B7-226E-954C-98D8-33134757394E}"/>
+              </a:ext>
+            </a:extLst>
+          </p:cNvPr>
+          <p:cNvSpPr txBox="1"/>
+          <p:nvPr/>
+        </p:nvSpPr>
+        <p:spPr>
+          <a:xfrm>
+            <a:off x="4791598" y="1978223"/>
+            <a:ext cx="2631554" cy="461665"/>
+          </a:xfrm>
+          <a:prstGeom prst="rect">
+            <a:avLst/>
+          </a:prstGeom>
+          <a:noFill/>
+          <a:effectLst>
+            <a:outerShdw blurRad="50800" dist="38100" dir="2700000" algn="tl" rotWithShape="0">
+              <a:prstClr val="black">
+                <a:alpha val="40000"/>
+              </a:prstClr>
+            </a:outerShdw>
+          </a:effectLst>
+        </p:spPr>
+        <p:txBody>
+          <a:bodyPr wrap="none" rtlCol="0">
+            <a:spAutoFit/>
+          </a:bodyPr>
+          <a:lstStyle/>
+          <a:p>
+            <a:r>
+              <a:rPr lang="en-US" sz="2400" dirty="0">
+                <a:gradFill>
+                  <a:gsLst>
+                    <a:gs pos="0">
+                      <a:schemeClr val="accent4">
+                        <a:lumMod val="20000"/>
+                        <a:lumOff val="80000"/>
+                      </a:schemeClr>
+                    </a:gs>
+                    <a:gs pos="99000">
+                      <a:schemeClr val="bg1"/>
+                    </a:gs>
+                  </a:gsLst>
+                  <a:lin ang="0" scaled="0"/>
+                </a:gradFill>
+                <a:effectLst>
+                  <a:outerShdw blurRad="50800" dist="38100" dir="2700000" algn="tl" rotWithShape="0">
+                    <a:schemeClr val="accent4">
+                      <a:lumMod val="75000"/>
+                      <a:alpha val="40000"/>
+                    </a:schemeClr>
+                  </a:outerShdw>
+                </a:effectLst>
+              </a:rPr>
+              <a:t>Progressive rollouts</a:t>
+            </a:r>
+          </a:p>
+        </p:txBody>
+      </p:sp>
+      <p:sp>
+        <p:nvSpPr>
+          <p:cNvPr id="84" name="TextBox 83">
+            <a:extLst>
+              <a:ext uri="{FF2B5EF4-FFF2-40B4-BE49-F238E27FC236}">
+                <a16:creationId xmlns:a16="http://schemas.microsoft.com/office/drawing/2014/main" id="{4F6B134A-27C2-A744-BDF7-EB488EF3E173}"/>
+              </a:ext>
+            </a:extLst>
+          </p:cNvPr>
+          <p:cNvSpPr txBox="1"/>
+          <p:nvPr/>
+        </p:nvSpPr>
+        <p:spPr>
+          <a:xfrm>
+            <a:off x="2975388" y="3217546"/>
+            <a:ext cx="1857816" cy="461665"/>
+          </a:xfrm>
+          <a:prstGeom prst="rect">
+            <a:avLst/>
+          </a:prstGeom>
+          <a:noFill/>
+          <a:effectLst>
+            <a:outerShdw blurRad="50800" dist="38100" dir="2700000" algn="tl" rotWithShape="0">
+              <a:prstClr val="black">
+                <a:alpha val="40000"/>
+              </a:prstClr>
+            </a:outerShdw>
+          </a:effectLst>
+        </p:spPr>
+        <p:txBody>
+          <a:bodyPr wrap="none" rtlCol="0">
+            <a:spAutoFit/>
+          </a:bodyPr>
+          <a:lstStyle/>
+          <a:p>
+            <a:r>
+              <a:rPr lang="en-US" sz="2400" dirty="0">
+                <a:gradFill>
+                  <a:gsLst>
+                    <a:gs pos="0">
+                      <a:schemeClr val="accent4">
+                        <a:lumMod val="40000"/>
+                        <a:lumOff val="60000"/>
+                      </a:schemeClr>
+                    </a:gs>
+                    <a:gs pos="99000">
+                      <a:schemeClr val="bg1"/>
+                    </a:gs>
+                  </a:gsLst>
+                  <a:lin ang="0" scaled="0"/>
+                </a:gradFill>
+                <a:effectLst>
+                  <a:outerShdw blurRad="50800" dist="38100" dir="2700000" algn="tl" rotWithShape="0">
+                    <a:schemeClr val="accent4">
+                      <a:lumMod val="75000"/>
+                      <a:alpha val="40000"/>
+                    </a:schemeClr>
+                  </a:outerShdw>
+                </a:effectLst>
+              </a:rPr>
+              <a:t>Chaos testing</a:t>
+            </a:r>
+          </a:p>
+        </p:txBody>
+      </p:sp>
+      <p:sp>
+        <p:nvSpPr>
+          <p:cNvPr id="86" name="TextBox 85">
+            <a:extLst>
+              <a:ext uri="{FF2B5EF4-FFF2-40B4-BE49-F238E27FC236}">
+                <a16:creationId xmlns:a16="http://schemas.microsoft.com/office/drawing/2014/main" id="{3AF42E4E-4F2B-3444-9D30-D6A138BC1321}"/>
+              </a:ext>
+            </a:extLst>
+          </p:cNvPr>
+          <p:cNvSpPr txBox="1"/>
+          <p:nvPr/>
+        </p:nvSpPr>
+        <p:spPr>
+          <a:xfrm>
+            <a:off x="3570429" y="4120034"/>
+            <a:ext cx="5014065" cy="461665"/>
+          </a:xfrm>
+          <a:prstGeom prst="rect">
+            <a:avLst/>
+          </a:prstGeom>
+          <a:noFill/>
+          <a:effectLst>
+            <a:outerShdw blurRad="50800" dist="38100" dir="2700000" algn="tl" rotWithShape="0">
+              <a:prstClr val="black">
+                <a:alpha val="40000"/>
+              </a:prstClr>
+            </a:outerShdw>
+          </a:effectLst>
+        </p:spPr>
+        <p:txBody>
+          <a:bodyPr wrap="none" rtlCol="0">
+            <a:spAutoFit/>
+          </a:bodyPr>
+          <a:lstStyle/>
+          <a:p>
+            <a:r>
+              <a:rPr lang="en-US" sz="2400" dirty="0">
+                <a:gradFill>
+                  <a:gsLst>
+                    <a:gs pos="0">
+                      <a:schemeClr val="bg1"/>
+                    </a:gs>
+                    <a:gs pos="98000">
+                      <a:schemeClr val="accent4">
+                        <a:lumMod val="40000"/>
+                        <a:lumOff val="60000"/>
+                      </a:schemeClr>
+                    </a:gs>
+                  </a:gsLst>
+                  <a:lin ang="0" scaled="0"/>
+                </a:gradFill>
+                <a:effectLst>
+                  <a:outerShdw blurRad="50800" dist="38100" dir="2700000" algn="tl" rotWithShape="0">
+                    <a:schemeClr val="accent4">
+                      <a:lumMod val="75000"/>
+                      <a:alpha val="40000"/>
+                    </a:schemeClr>
+                  </a:outerShdw>
+                </a:effectLst>
+              </a:rPr>
+              <a:t>State-of-the-art AI &amp; statistical analysis</a:t>
+            </a:r>
+          </a:p>
+        </p:txBody>
+      </p:sp>
+      <p:sp>
+        <p:nvSpPr>
+          <p:cNvPr id="87" name="TextBox 86">
+            <a:extLst>
+              <a:ext uri="{FF2B5EF4-FFF2-40B4-BE49-F238E27FC236}">
+                <a16:creationId xmlns:a16="http://schemas.microsoft.com/office/drawing/2014/main" id="{A14FFCA2-5CA7-AC47-8DEE-26F0528D2DA1}"/>
+              </a:ext>
+            </a:extLst>
+          </p:cNvPr>
+          <p:cNvSpPr txBox="1"/>
+          <p:nvPr/>
+        </p:nvSpPr>
+        <p:spPr>
+          <a:xfrm>
+            <a:off x="2956498" y="2427301"/>
+            <a:ext cx="2032544" cy="461665"/>
+          </a:xfrm>
+          <a:prstGeom prst="rect">
+            <a:avLst/>
+          </a:prstGeom>
+          <a:noFill/>
+          <a:effectLst>
+            <a:outerShdw blurRad="50800" dist="38100" dir="2700000" algn="tl" rotWithShape="0">
+              <a:prstClr val="black">
+                <a:alpha val="40000"/>
+              </a:prstClr>
+            </a:outerShdw>
+          </a:effectLst>
+        </p:spPr>
+        <p:txBody>
+          <a:bodyPr wrap="none" rtlCol="0">
+            <a:spAutoFit/>
+          </a:bodyPr>
+          <a:lstStyle/>
+          <a:p>
+            <a:r>
+              <a:rPr lang="en-US" sz="2400" dirty="0">
+                <a:gradFill>
+                  <a:gsLst>
+                    <a:gs pos="0">
+                      <a:schemeClr val="accent4">
+                        <a:lumMod val="20000"/>
+                        <a:lumOff val="80000"/>
+                      </a:schemeClr>
+                    </a:gs>
+                    <a:gs pos="99000">
+                      <a:schemeClr val="bg1"/>
+                    </a:gs>
+                  </a:gsLst>
+                  <a:lin ang="0" scaled="0"/>
+                </a:gradFill>
+                <a:effectLst>
+                  <a:outerShdw blurRad="50800" dist="38100" dir="2700000" algn="tl" rotWithShape="0">
+                    <a:schemeClr val="accent4">
+                      <a:lumMod val="75000"/>
+                      <a:alpha val="40000"/>
+                    </a:schemeClr>
+                  </a:outerShdw>
+                </a:effectLst>
+              </a:rPr>
+              <a:t>A/B(/n) testing</a:t>
+            </a:r>
+          </a:p>
+        </p:txBody>
+      </p:sp>
+      <p:cxnSp>
+        <p:nvCxnSpPr>
+          <p:cNvPr id="24" name="Straight Arrow Connector 23">
+            <a:extLst>
+              <a:ext uri="{FF2B5EF4-FFF2-40B4-BE49-F238E27FC236}">
+                <a16:creationId xmlns:a16="http://schemas.microsoft.com/office/drawing/2014/main" id="{B9D26F47-5E45-C548-8703-049CCF161E69}"/>
+              </a:ext>
+            </a:extLst>
+          </p:cNvPr>
+          <p:cNvCxnSpPr>
+            <a:cxnSpLocks/>
+            <a:stCxn id="45" idx="3"/>
+          </p:cNvCxnSpPr>
+          <p:nvPr/>
+        </p:nvCxnSpPr>
+        <p:spPr>
+          <a:xfrm flipH="1">
+            <a:off x="2975388" y="3674338"/>
+            <a:ext cx="2716047" cy="0"/>
+          </a:xfrm>
+          <a:prstGeom prst="straightConnector1">
+            <a:avLst/>
+          </a:prstGeom>
+          <a:ln w="31750">
+            <a:gradFill>
+              <a:gsLst>
+                <a:gs pos="0">
+                  <a:schemeClr val="bg1"/>
+                </a:gs>
+                <a:gs pos="100000">
+                  <a:srgbClr val="B70703"/>
+                </a:gs>
+              </a:gsLst>
+              <a:lin ang="0" scaled="0"/>
+            </a:gradFill>
+            <a:tailEnd type="none"/>
+          </a:ln>
+        </p:spPr>
+        <p:style>
+          <a:lnRef idx="1">
+            <a:schemeClr val="accent1"/>
+          </a:lnRef>
+          <a:fillRef idx="0">
+            <a:schemeClr val="accent1"/>
+          </a:fillRef>
+          <a:effectRef idx="0">
+            <a:schemeClr val="accent1"/>
+          </a:effectRef>
+          <a:fontRef idx="minor">
+            <a:schemeClr val="tx1"/>
+          </a:fontRef>
+        </p:style>
+      </p:cxnSp>
+      <p:cxnSp>
+        <p:nvCxnSpPr>
+          <p:cNvPr id="27" name="Straight Arrow Connector 26">
+            <a:extLst>
+              <a:ext uri="{FF2B5EF4-FFF2-40B4-BE49-F238E27FC236}">
+                <a16:creationId xmlns:a16="http://schemas.microsoft.com/office/drawing/2014/main" id="{5330E225-5DC0-6D4C-83F4-B6F53FA58B81}"/>
+              </a:ext>
+            </a:extLst>
+          </p:cNvPr>
+          <p:cNvCxnSpPr>
+            <a:cxnSpLocks/>
+            <a:stCxn id="45" idx="4"/>
+          </p:cNvCxnSpPr>
+          <p:nvPr/>
+        </p:nvCxnSpPr>
+        <p:spPr>
+          <a:xfrm flipH="1">
+            <a:off x="6084296" y="3838204"/>
+            <a:ext cx="1552" cy="258910"/>
+          </a:xfrm>
+          <a:prstGeom prst="straightConnector1">
+            <a:avLst/>
+          </a:prstGeom>
+          <a:ln w="31750">
+            <a:solidFill>
+              <a:schemeClr val="lt1">
+                <a:hueOff val="0"/>
+                <a:satOff val="0"/>
+                <a:lumOff val="0"/>
+              </a:schemeClr>
+            </a:solidFill>
+            <a:tailEnd type="none"/>
+          </a:ln>
+        </p:spPr>
+        <p:style>
+          <a:lnRef idx="1">
+            <a:schemeClr val="accent1"/>
+          </a:lnRef>
+          <a:fillRef idx="0">
+            <a:schemeClr val="accent1"/>
+          </a:fillRef>
+          <a:effectRef idx="0">
+            <a:schemeClr val="accent1"/>
+          </a:effectRef>
+          <a:fontRef idx="minor">
+            <a:schemeClr val="tx1"/>
+          </a:fontRef>
+        </p:style>
+      </p:cxnSp>
+      <p:cxnSp>
+        <p:nvCxnSpPr>
+          <p:cNvPr id="30" name="Straight Arrow Connector 29">
+            <a:extLst>
+              <a:ext uri="{FF2B5EF4-FFF2-40B4-BE49-F238E27FC236}">
+                <a16:creationId xmlns:a16="http://schemas.microsoft.com/office/drawing/2014/main" id="{7046775E-C39B-3444-98D7-1861DFAD2629}"/>
+              </a:ext>
+            </a:extLst>
+          </p:cNvPr>
+          <p:cNvCxnSpPr>
+            <a:cxnSpLocks/>
+          </p:cNvCxnSpPr>
+          <p:nvPr/>
+        </p:nvCxnSpPr>
+        <p:spPr>
+          <a:xfrm flipH="1">
+            <a:off x="6095999" y="2469809"/>
+            <a:ext cx="1552" cy="258910"/>
+          </a:xfrm>
+          <a:prstGeom prst="straightConnector1">
+            <a:avLst/>
+          </a:prstGeom>
+          <a:ln w="31750">
+            <a:solidFill>
+              <a:schemeClr val="lt1">
+                <a:hueOff val="0"/>
+                <a:satOff val="0"/>
+                <a:lumOff val="0"/>
+              </a:schemeClr>
+            </a:solidFill>
+            <a:tailEnd type="none"/>
+          </a:ln>
+        </p:spPr>
+        <p:style>
+          <a:lnRef idx="1">
+            <a:schemeClr val="accent1"/>
+          </a:lnRef>
+          <a:fillRef idx="0">
+            <a:schemeClr val="accent1"/>
+          </a:fillRef>
+          <a:effectRef idx="0">
+            <a:schemeClr val="accent1"/>
+          </a:effectRef>
+          <a:fontRef idx="minor">
+            <a:schemeClr val="tx1"/>
+          </a:fontRef>
+        </p:style>
+      </p:cxnSp>
+      <p:cxnSp>
+        <p:nvCxnSpPr>
+          <p:cNvPr id="31" name="Straight Arrow Connector 30">
+            <a:extLst>
+              <a:ext uri="{FF2B5EF4-FFF2-40B4-BE49-F238E27FC236}">
+                <a16:creationId xmlns:a16="http://schemas.microsoft.com/office/drawing/2014/main" id="{6F6EB244-A7B0-B645-B012-C7F92E43D308}"/>
+              </a:ext>
+            </a:extLst>
+          </p:cNvPr>
+          <p:cNvCxnSpPr>
+            <a:cxnSpLocks/>
+          </p:cNvCxnSpPr>
+          <p:nvPr/>
+        </p:nvCxnSpPr>
+        <p:spPr>
+          <a:xfrm flipH="1">
+            <a:off x="4737975" y="2446217"/>
+            <a:ext cx="2716047" cy="0"/>
+          </a:xfrm>
+          <a:prstGeom prst="straightConnector1">
+            <a:avLst/>
+          </a:prstGeom>
+          <a:ln w="31750">
+            <a:gradFill>
+              <a:gsLst>
+                <a:gs pos="49000">
+                  <a:schemeClr val="bg1"/>
+                </a:gs>
+                <a:gs pos="0">
+                  <a:srgbClr val="B70703"/>
+                </a:gs>
+                <a:gs pos="100000">
+                  <a:srgbClr val="B70703"/>
+                </a:gs>
+              </a:gsLst>
+              <a:lin ang="0" scaled="0"/>
+            </a:gradFill>
+            <a:tailEnd type="none"/>
+          </a:ln>
+        </p:spPr>
+        <p:style>
+          <a:lnRef idx="1">
+            <a:schemeClr val="accent1"/>
+          </a:lnRef>
+          <a:fillRef idx="0">
+            <a:schemeClr val="accent1"/>
+          </a:fillRef>
+          <a:effectRef idx="0">
+            <a:schemeClr val="accent1"/>
+          </a:effectRef>
+          <a:fontRef idx="minor">
+            <a:schemeClr val="tx1"/>
+          </a:fontRef>
+        </p:style>
+      </p:cxnSp>
+      <p:cxnSp>
+        <p:nvCxnSpPr>
+          <p:cNvPr id="32" name="Straight Arrow Connector 31">
+            <a:extLst>
+              <a:ext uri="{FF2B5EF4-FFF2-40B4-BE49-F238E27FC236}">
+                <a16:creationId xmlns:a16="http://schemas.microsoft.com/office/drawing/2014/main" id="{60FAE7CA-C26E-1C43-BACB-203469C347F9}"/>
+              </a:ext>
+            </a:extLst>
+          </p:cNvPr>
+          <p:cNvCxnSpPr>
+            <a:cxnSpLocks/>
+          </p:cNvCxnSpPr>
+          <p:nvPr/>
+        </p:nvCxnSpPr>
+        <p:spPr>
+          <a:xfrm flipH="1">
+            <a:off x="4726272" y="4110186"/>
+            <a:ext cx="2716047" cy="0"/>
+          </a:xfrm>
+          <a:prstGeom prst="straightConnector1">
+            <a:avLst/>
+          </a:prstGeom>
+          <a:ln w="31750">
+            <a:gradFill>
+              <a:gsLst>
+                <a:gs pos="49000">
+                  <a:schemeClr val="bg1"/>
+                </a:gs>
+                <a:gs pos="0">
+                  <a:srgbClr val="B70703"/>
+                </a:gs>
+                <a:gs pos="100000">
+                  <a:srgbClr val="B70703"/>
+                </a:gs>
+              </a:gsLst>
+              <a:lin ang="0" scaled="0"/>
+            </a:gradFill>
+            <a:tailEnd type="none"/>
+          </a:ln>
+        </p:spPr>
+        <p:style>
+          <a:lnRef idx="1">
+            <a:schemeClr val="accent1"/>
+          </a:lnRef>
+          <a:fillRef idx="0">
+            <a:schemeClr val="accent1"/>
+          </a:fillRef>
+          <a:effectRef idx="0">
+            <a:schemeClr val="accent1"/>
+          </a:effectRef>
+          <a:fontRef idx="minor">
+            <a:schemeClr val="tx1"/>
+          </a:fontRef>
+        </p:style>
+      </p:cxnSp>
+      <p:cxnSp>
+        <p:nvCxnSpPr>
+          <p:cNvPr id="33" name="Straight Arrow Connector 32">
+            <a:extLst>
+              <a:ext uri="{FF2B5EF4-FFF2-40B4-BE49-F238E27FC236}">
+                <a16:creationId xmlns:a16="http://schemas.microsoft.com/office/drawing/2014/main" id="{FD43408C-8FD1-2A45-BAFA-7C30E55C1B43}"/>
+              </a:ext>
+            </a:extLst>
+          </p:cNvPr>
+          <p:cNvCxnSpPr>
+            <a:cxnSpLocks/>
+            <a:stCxn id="45" idx="7"/>
+          </p:cNvCxnSpPr>
+          <p:nvPr/>
+        </p:nvCxnSpPr>
+        <p:spPr>
+          <a:xfrm flipV="1">
+            <a:off x="6480260" y="2876683"/>
+            <a:ext cx="2715768" cy="6437"/>
+          </a:xfrm>
+          <a:prstGeom prst="straightConnector1">
+            <a:avLst/>
+          </a:prstGeom>
+          <a:ln w="31750">
+            <a:gradFill>
+              <a:gsLst>
+                <a:gs pos="0">
+                  <a:schemeClr val="bg1"/>
+                </a:gs>
+                <a:gs pos="100000">
+                  <a:srgbClr val="B70703"/>
+                </a:gs>
+              </a:gsLst>
+              <a:lin ang="0" scaled="0"/>
+            </a:gradFill>
+            <a:tailEnd type="none"/>
+          </a:ln>
+        </p:spPr>
+        <p:style>
+          <a:lnRef idx="1">
+            <a:schemeClr val="accent1"/>
+          </a:lnRef>
+          <a:fillRef idx="0">
+            <a:schemeClr val="accent1"/>
+          </a:fillRef>
+          <a:effectRef idx="0">
+            <a:schemeClr val="accent1"/>
+          </a:effectRef>
+          <a:fontRef idx="minor">
+            <a:schemeClr val="tx1"/>
+          </a:fontRef>
+        </p:style>
+      </p:cxnSp>
+      <p:cxnSp>
+        <p:nvCxnSpPr>
+          <p:cNvPr id="36" name="Straight Arrow Connector 35">
+            <a:extLst>
+              <a:ext uri="{FF2B5EF4-FFF2-40B4-BE49-F238E27FC236}">
+                <a16:creationId xmlns:a16="http://schemas.microsoft.com/office/drawing/2014/main" id="{ED3C73B4-F988-764F-8F41-1E2C8D45CA10}"/>
+              </a:ext>
+            </a:extLst>
+          </p:cNvPr>
+          <p:cNvCxnSpPr>
+            <a:cxnSpLocks/>
+            <a:stCxn id="45" idx="5"/>
+          </p:cNvCxnSpPr>
+          <p:nvPr/>
+        </p:nvCxnSpPr>
+        <p:spPr>
+          <a:xfrm flipV="1">
+            <a:off x="6480260" y="3673284"/>
+            <a:ext cx="2715768" cy="1054"/>
+          </a:xfrm>
+          <a:prstGeom prst="straightConnector1">
+            <a:avLst/>
+          </a:prstGeom>
+          <a:ln w="31750">
+            <a:gradFill>
+              <a:gsLst>
+                <a:gs pos="0">
+                  <a:schemeClr val="bg1"/>
+                </a:gs>
+                <a:gs pos="100000">
+                  <a:srgbClr val="B70703"/>
+                </a:gs>
+              </a:gsLst>
+              <a:lin ang="0" scaled="0"/>
+            </a:gradFill>
+            <a:tailEnd type="none"/>
+          </a:ln>
+        </p:spPr>
+        <p:style>
+          <a:lnRef idx="1">
+            <a:schemeClr val="accent1"/>
+          </a:lnRef>
+          <a:fillRef idx="0">
+            <a:schemeClr val="accent1"/>
+          </a:fillRef>
+          <a:effectRef idx="0">
+            <a:schemeClr val="accent1"/>
+          </a:effectRef>
+          <a:fontRef idx="minor">
+            <a:schemeClr val="tx1"/>
+          </a:fontRef>
+        </p:style>
+      </p:cxnSp>
+      <p:sp>
+        <p:nvSpPr>
+          <p:cNvPr id="39" name="TextBox 38">
+            <a:extLst>
+              <a:ext uri="{FF2B5EF4-FFF2-40B4-BE49-F238E27FC236}">
+                <a16:creationId xmlns:a16="http://schemas.microsoft.com/office/drawing/2014/main" id="{2DE3CC12-59D6-9D49-9D9F-4D03B8689AA5}"/>
+              </a:ext>
+            </a:extLst>
+          </p:cNvPr>
+          <p:cNvSpPr txBox="1"/>
+          <p:nvPr/>
+        </p:nvSpPr>
+        <p:spPr>
+          <a:xfrm>
+            <a:off x="7272652" y="2409454"/>
+            <a:ext cx="1948290" cy="461665"/>
+          </a:xfrm>
+          <a:prstGeom prst="rect">
+            <a:avLst/>
+          </a:prstGeom>
+          <a:noFill/>
+          <a:effectLst>
+            <a:outerShdw blurRad="50800" dist="38100" dir="2700000" algn="tl" rotWithShape="0">
+              <a:prstClr val="black">
+                <a:alpha val="40000"/>
+              </a:prstClr>
+            </a:outerShdw>
+          </a:effectLst>
+        </p:spPr>
+        <p:txBody>
+          <a:bodyPr wrap="none" rtlCol="0">
+            <a:spAutoFit/>
+          </a:bodyPr>
+          <a:lstStyle/>
+          <a:p>
+            <a:r>
+              <a:rPr lang="en-US" sz="2400" dirty="0">
+                <a:gradFill>
+                  <a:gsLst>
+                    <a:gs pos="0">
+                      <a:schemeClr val="accent4">
+                        <a:lumMod val="20000"/>
+                        <a:lumOff val="80000"/>
+                      </a:schemeClr>
+                    </a:gs>
+                    <a:gs pos="99000">
+                      <a:schemeClr val="bg1"/>
+                    </a:gs>
+                  </a:gsLst>
+                  <a:lin ang="0" scaled="0"/>
+                </a:gradFill>
+                <a:effectLst>
+                  <a:outerShdw blurRad="50800" dist="38100" dir="2700000" algn="tl" rotWithShape="0">
+                    <a:schemeClr val="accent4">
+                      <a:lumMod val="75000"/>
+                      <a:alpha val="40000"/>
+                    </a:schemeClr>
+                  </a:outerShdw>
+                </a:effectLst>
+              </a:rPr>
+              <a:t>SLO validation</a:t>
+            </a:r>
+          </a:p>
+        </p:txBody>
+      </p:sp>
+      <p:sp>
+        <p:nvSpPr>
+          <p:cNvPr id="40" name="TextBox 39">
+            <a:extLst>
+              <a:ext uri="{FF2B5EF4-FFF2-40B4-BE49-F238E27FC236}">
+                <a16:creationId xmlns:a16="http://schemas.microsoft.com/office/drawing/2014/main" id="{242E5DE1-1E49-F44F-B81D-96319EC276E1}"/>
+              </a:ext>
+            </a:extLst>
+          </p:cNvPr>
+          <p:cNvSpPr txBox="1"/>
+          <p:nvPr/>
+        </p:nvSpPr>
+        <p:spPr>
+          <a:xfrm>
+            <a:off x="7437477" y="3204689"/>
+            <a:ext cx="1703928" cy="461665"/>
+          </a:xfrm>
+          <a:prstGeom prst="rect">
+            <a:avLst/>
+          </a:prstGeom>
+          <a:noFill/>
+          <a:effectLst>
+            <a:outerShdw blurRad="50800" dist="38100" dir="2700000" algn="tl" rotWithShape="0">
+              <a:prstClr val="black">
+                <a:alpha val="40000"/>
+              </a:prstClr>
+            </a:outerShdw>
+          </a:effectLst>
+        </p:spPr>
+        <p:txBody>
+          <a:bodyPr wrap="none" rtlCol="0">
+            <a:spAutoFit/>
+          </a:bodyPr>
+          <a:lstStyle/>
+          <a:p>
+            <a:r>
+              <a:rPr lang="en-US" sz="2400" dirty="0">
+                <a:gradFill>
+                  <a:gsLst>
+                    <a:gs pos="0">
+                      <a:schemeClr val="accent4">
+                        <a:lumMod val="40000"/>
+                        <a:lumOff val="60000"/>
+                      </a:schemeClr>
+                    </a:gs>
+                    <a:gs pos="99000">
+                      <a:schemeClr val="bg1"/>
+                    </a:gs>
+                  </a:gsLst>
+                  <a:lin ang="0" scaled="0"/>
+                </a:gradFill>
+                <a:effectLst>
+                  <a:outerShdw blurRad="50800" dist="38100" dir="2700000" algn="tl" rotWithShape="0">
+                    <a:schemeClr val="accent4">
+                      <a:lumMod val="75000"/>
+                      <a:alpha val="40000"/>
+                    </a:schemeClr>
+                  </a:outerShdw>
+                </a:effectLst>
+              </a:rPr>
+              <a:t>Load testing</a:t>
+            </a:r>
+          </a:p>
+        </p:txBody>
+      </p:sp>
+    </p:spTree>
+    <p:extLst>
+      <p:ext uri="{BB962C8B-B14F-4D97-AF65-F5344CB8AC3E}">
+        <p14:creationId xmlns:p14="http://schemas.microsoft.com/office/powerpoint/2010/main" val="3212434172"/>
       </p:ext>
     </p:extLst>
   </p:cSld>

</xml_diff>

<commit_message>
improved landing page and concepts
Signed-off-by: Srinivasan Parthasarathy <spartha@us.ibm.com>
</commit_message>
<xml_diff>
--- a/mkdocs/docs/images/src/illustration.pptx
+++ b/mkdocs/docs/images/src/illustration.pptx
@@ -13,8 +13,8 @@
     <p:sldId id="376" r:id="rId4"/>
     <p:sldId id="378" r:id="rId5"/>
     <p:sldId id="379" r:id="rId6"/>
-    <p:sldId id="381" r:id="rId7"/>
-    <p:sldId id="382" r:id="rId8"/>
+    <p:sldId id="383" r:id="rId7"/>
+    <p:sldId id="384" r:id="rId8"/>
   </p:sldIdLst>
   <p:sldSz cx="12192000" cy="6858000"/>
   <p:notesSz cx="6858000" cy="9144000"/>
@@ -964,7 +964,7 @@
     </p:spTree>
     <p:extLst>
       <p:ext uri="{BB962C8B-B14F-4D97-AF65-F5344CB8AC3E}">
-        <p14:creationId xmlns:p14="http://schemas.microsoft.com/office/powerpoint/2010/main" val="3808219815"/>
+        <p14:creationId xmlns:p14="http://schemas.microsoft.com/office/powerpoint/2010/main" val="1622399603"/>
       </p:ext>
     </p:extLst>
   </p:cSld>
@@ -1048,7 +1048,7 @@
     </p:spTree>
     <p:extLst>
       <p:ext uri="{BB962C8B-B14F-4D97-AF65-F5344CB8AC3E}">
-        <p14:creationId xmlns:p14="http://schemas.microsoft.com/office/powerpoint/2010/main" val="691872956"/>
+        <p14:creationId xmlns:p14="http://schemas.microsoft.com/office/powerpoint/2010/main" val="111072290"/>
       </p:ext>
     </p:extLst>
   </p:cSld>
@@ -9045,8 +9045,8 @@
         </p:nvSpPr>
         <p:spPr>
           <a:xfrm>
-            <a:off x="2438397" y="1933404"/>
-            <a:ext cx="7315200" cy="2690649"/>
+            <a:off x="2438397" y="1755228"/>
+            <a:ext cx="7315200" cy="3331779"/>
           </a:xfrm>
           <a:prstGeom prst="roundRect">
             <a:avLst/>
@@ -9217,13 +9217,14 @@
           </p:cNvPr>
           <p:cNvCxnSpPr>
             <a:cxnSpLocks/>
+            <a:stCxn id="45" idx="1"/>
           </p:cNvCxnSpPr>
           <p:nvPr/>
         </p:nvCxnSpPr>
         <p:spPr>
           <a:xfrm flipH="1" flipV="1">
-            <a:off x="2743200" y="3300409"/>
-            <a:ext cx="2784865" cy="1"/>
+            <a:off x="2816772" y="2876683"/>
+            <a:ext cx="2874663" cy="6437"/>
           </a:xfrm>
           <a:prstGeom prst="straightConnector1">
             <a:avLst/>
@@ -9260,10 +9261,10 @@
       </p:cxnSp>
       <p:sp>
         <p:nvSpPr>
-          <p:cNvPr id="26" name="TextBox 25">
-            <a:extLst>
-              <a:ext uri="{FF2B5EF4-FFF2-40B4-BE49-F238E27FC236}">
-                <a16:creationId xmlns:a16="http://schemas.microsoft.com/office/drawing/2014/main" id="{00B0B6B7-226E-954C-98D8-33134757394E}"/>
+          <p:cNvPr id="86" name="TextBox 85">
+            <a:extLst>
+              <a:ext uri="{FF2B5EF4-FFF2-40B4-BE49-F238E27FC236}">
+                <a16:creationId xmlns:a16="http://schemas.microsoft.com/office/drawing/2014/main" id="{3AF42E4E-4F2B-3444-9D30-D6A138BC1321}"/>
               </a:ext>
             </a:extLst>
           </p:cNvPr>
@@ -9272,8 +9273,8 @@
         </p:nvSpPr>
         <p:spPr>
           <a:xfrm>
-            <a:off x="3689568" y="2041329"/>
-            <a:ext cx="4789453" cy="369332"/>
+            <a:off x="4309241" y="4281099"/>
+            <a:ext cx="3563008" cy="584775"/>
           </a:xfrm>
           <a:prstGeom prst="rect">
             <a:avLst/>
@@ -9288,13 +9289,14 @@
           </a:effectLst>
         </p:spPr>
         <p:txBody>
-          <a:bodyPr wrap="none" rtlCol="0">
+          <a:bodyPr wrap="square" rtlCol="0">
             <a:spAutoFit/>
           </a:bodyPr>
           <a:lstStyle/>
           <a:p>
-            <a:r>
-              <a:rPr lang="en-US" dirty="0">
+            <a:pPr algn="ctr"/>
+            <a:r>
+              <a:rPr lang="en-US" sz="1600" dirty="0">
                 <a:gradFill>
                   <a:gsLst>
                     <a:gs pos="0">
@@ -9318,17 +9320,17 @@
                   </a:outerShdw>
                 </a:effectLst>
               </a:rPr>
-              <a:t>Use with any CI/CD/GitOps &amp; app/ML framework</a:t>
-            </a:r>
-          </a:p>
-        </p:txBody>
-      </p:sp>
-      <p:sp>
-        <p:nvSpPr>
-          <p:cNvPr id="86" name="TextBox 85">
-            <a:extLst>
-              <a:ext uri="{FF2B5EF4-FFF2-40B4-BE49-F238E27FC236}">
-                <a16:creationId xmlns:a16="http://schemas.microsoft.com/office/drawing/2014/main" id="{3AF42E4E-4F2B-3444-9D30-D6A138BC1321}"/>
+              <a:t>Experiment locally, using K8s jobs, or within CI/CD/GitOps pipelines</a:t>
+            </a:r>
+          </a:p>
+        </p:txBody>
+      </p:sp>
+      <p:sp>
+        <p:nvSpPr>
+          <p:cNvPr id="87" name="TextBox 86">
+            <a:extLst>
+              <a:ext uri="{FF2B5EF4-FFF2-40B4-BE49-F238E27FC236}">
+                <a16:creationId xmlns:a16="http://schemas.microsoft.com/office/drawing/2014/main" id="{A14FFCA2-5CA7-AC47-8DEE-26F0528D2DA1}"/>
               </a:ext>
             </a:extLst>
           </p:cNvPr>
@@ -9337,8 +9339,8 @@
         </p:nvSpPr>
         <p:spPr>
           <a:xfrm>
-            <a:off x="4541853" y="4135418"/>
-            <a:ext cx="3108287" cy="369332"/>
+            <a:off x="2712577" y="2403003"/>
+            <a:ext cx="1057918" cy="461665"/>
           </a:xfrm>
           <a:prstGeom prst="rect">
             <a:avLst/>
@@ -9359,72 +9361,7 @@
           <a:lstStyle/>
           <a:p>
             <a:r>
-              <a:rPr lang="en-US" dirty="0">
-                <a:gradFill>
-                  <a:gsLst>
-                    <a:gs pos="0">
-                      <a:schemeClr val="bg1"/>
-                    </a:gs>
-                    <a:gs pos="98000">
-                      <a:schemeClr val="accent4">
-                        <a:lumMod val="40000"/>
-                        <a:lumOff val="60000"/>
-                      </a:schemeClr>
-                    </a:gs>
-                  </a:gsLst>
-                  <a:lin ang="0" scaled="0"/>
-                </a:gradFill>
-                <a:effectLst>
-                  <a:outerShdw blurRad="50800" dist="38100" dir="2700000" algn="tl" rotWithShape="0">
-                    <a:schemeClr val="accent4">
-                      <a:lumMod val="75000"/>
-                      <a:alpha val="40000"/>
-                    </a:schemeClr>
-                  </a:outerShdw>
-                </a:effectLst>
-              </a:rPr>
-              <a:t>Rigorous statistical foundations</a:t>
-            </a:r>
-          </a:p>
-        </p:txBody>
-      </p:sp>
-      <p:sp>
-        <p:nvSpPr>
-          <p:cNvPr id="87" name="TextBox 86">
-            <a:extLst>
-              <a:ext uri="{FF2B5EF4-FFF2-40B4-BE49-F238E27FC236}">
-                <a16:creationId xmlns:a16="http://schemas.microsoft.com/office/drawing/2014/main" id="{A14FFCA2-5CA7-AC47-8DEE-26F0528D2DA1}"/>
-              </a:ext>
-            </a:extLst>
-          </p:cNvPr>
-          <p:cNvSpPr txBox="1"/>
-          <p:nvPr/>
-        </p:nvSpPr>
-        <p:spPr>
-          <a:xfrm>
-            <a:off x="2671557" y="2898764"/>
-            <a:ext cx="1678152" cy="369332"/>
-          </a:xfrm>
-          <a:prstGeom prst="rect">
-            <a:avLst/>
-          </a:prstGeom>
-          <a:noFill/>
-          <a:effectLst>
-            <a:outerShdw blurRad="50800" dist="38100" dir="2700000" algn="tl" rotWithShape="0">
-              <a:prstClr val="black">
-                <a:alpha val="40000"/>
-              </a:prstClr>
-            </a:outerShdw>
-          </a:effectLst>
-        </p:spPr>
-        <p:txBody>
-          <a:bodyPr wrap="none" rtlCol="0">
-            <a:spAutoFit/>
-          </a:bodyPr>
-          <a:lstStyle/>
-          <a:p>
-            <a:r>
-              <a:rPr lang="en-US" dirty="0">
+              <a:rPr lang="en-US" sz="2400" dirty="0">
                 <a:gradFill>
                   <a:gsLst>
                     <a:gs pos="0">
@@ -9448,7 +9385,7 @@
                   </a:outerShdw>
                 </a:effectLst>
               </a:rPr>
-              <a:t>Testing patterns</a:t>
+              <a:t>Testing</a:t>
             </a:r>
           </a:p>
         </p:txBody>
@@ -9465,13 +9402,14 @@
           <p:cNvCxnSpPr>
             <a:cxnSpLocks/>
             <a:stCxn id="45" idx="4"/>
+            <a:endCxn id="86" idx="0"/>
           </p:cNvCxnSpPr>
           <p:nvPr/>
         </p:nvCxnSpPr>
         <p:spPr>
-          <a:xfrm flipH="1">
-            <a:off x="6084296" y="3838204"/>
-            <a:ext cx="1552" cy="258910"/>
+          <a:xfrm>
+            <a:off x="6085848" y="3838204"/>
+            <a:ext cx="4897" cy="442895"/>
           </a:xfrm>
           <a:prstGeom prst="straightConnector1">
             <a:avLst/>
@@ -9504,10 +9442,10 @@
       </p:cxnSp>
       <p:cxnSp>
         <p:nvCxnSpPr>
-          <p:cNvPr id="30" name="Straight Arrow Connector 29">
-            <a:extLst>
-              <a:ext uri="{FF2B5EF4-FFF2-40B4-BE49-F238E27FC236}">
-                <a16:creationId xmlns:a16="http://schemas.microsoft.com/office/drawing/2014/main" id="{7046775E-C39B-3444-98D7-1861DFAD2629}"/>
+          <p:cNvPr id="32" name="Straight Arrow Connector 31">
+            <a:extLst>
+              <a:ext uri="{FF2B5EF4-FFF2-40B4-BE49-F238E27FC236}">
+                <a16:creationId xmlns:a16="http://schemas.microsoft.com/office/drawing/2014/main" id="{60FAE7CA-C26E-1C43-BACB-203469C347F9}"/>
               </a:ext>
             </a:extLst>
           </p:cNvPr>
@@ -9518,55 +9456,7 @@
         </p:nvCxnSpPr>
         <p:spPr>
           <a:xfrm flipH="1">
-            <a:off x="6095999" y="2469809"/>
-            <a:ext cx="1552" cy="258910"/>
-          </a:xfrm>
-          <a:prstGeom prst="straightConnector1">
-            <a:avLst/>
-          </a:prstGeom>
-          <a:ln w="31750">
-            <a:solidFill>
-              <a:schemeClr val="lt1">
-                <a:hueOff val="0"/>
-                <a:satOff val="0"/>
-                <a:lumOff val="0"/>
-              </a:schemeClr>
-            </a:solidFill>
-            <a:tailEnd type="none"/>
-          </a:ln>
-        </p:spPr>
-        <p:style>
-          <a:lnRef idx="1">
-            <a:schemeClr val="accent1"/>
-          </a:lnRef>
-          <a:fillRef idx="0">
-            <a:schemeClr val="accent1"/>
-          </a:fillRef>
-          <a:effectRef idx="0">
-            <a:schemeClr val="accent1"/>
-          </a:effectRef>
-          <a:fontRef idx="minor">
-            <a:schemeClr val="tx1"/>
-          </a:fontRef>
-        </p:style>
-      </p:cxnSp>
-      <p:cxnSp>
-        <p:nvCxnSpPr>
-          <p:cNvPr id="31" name="Straight Arrow Connector 30">
-            <a:extLst>
-              <a:ext uri="{FF2B5EF4-FFF2-40B4-BE49-F238E27FC236}">
-                <a16:creationId xmlns:a16="http://schemas.microsoft.com/office/drawing/2014/main" id="{6F6EB244-A7B0-B645-B012-C7F92E43D308}"/>
-              </a:ext>
-            </a:extLst>
-          </p:cNvPr>
-          <p:cNvCxnSpPr>
-            <a:cxnSpLocks/>
-          </p:cNvCxnSpPr>
-          <p:nvPr/>
-        </p:nvCxnSpPr>
-        <p:spPr>
-          <a:xfrm flipH="1">
-            <a:off x="4737975" y="2446217"/>
+            <a:off x="4726272" y="4278346"/>
             <a:ext cx="2716047" cy="0"/>
           </a:xfrm>
           <a:prstGeom prst="straightConnector1">
@@ -9607,78 +9497,23 @@
       </p:cxnSp>
       <p:cxnSp>
         <p:nvCxnSpPr>
-          <p:cNvPr id="32" name="Straight Arrow Connector 31">
-            <a:extLst>
-              <a:ext uri="{FF2B5EF4-FFF2-40B4-BE49-F238E27FC236}">
-                <a16:creationId xmlns:a16="http://schemas.microsoft.com/office/drawing/2014/main" id="{60FAE7CA-C26E-1C43-BACB-203469C347F9}"/>
+          <p:cNvPr id="33" name="Straight Arrow Connector 32">
+            <a:extLst>
+              <a:ext uri="{FF2B5EF4-FFF2-40B4-BE49-F238E27FC236}">
+                <a16:creationId xmlns:a16="http://schemas.microsoft.com/office/drawing/2014/main" id="{FD43408C-8FD1-2A45-BAFA-7C30E55C1B43}"/>
               </a:ext>
             </a:extLst>
           </p:cNvPr>
           <p:cNvCxnSpPr>
             <a:cxnSpLocks/>
+            <a:stCxn id="45" idx="5"/>
           </p:cNvCxnSpPr>
           <p:nvPr/>
         </p:nvCxnSpPr>
         <p:spPr>
-          <a:xfrm flipH="1">
-            <a:off x="4726272" y="4110186"/>
-            <a:ext cx="2716047" cy="0"/>
-          </a:xfrm>
-          <a:prstGeom prst="straightConnector1">
-            <a:avLst/>
-          </a:prstGeom>
-          <a:ln w="31750">
-            <a:gradFill>
-              <a:gsLst>
-                <a:gs pos="49000">
-                  <a:schemeClr val="bg1"/>
-                </a:gs>
-                <a:gs pos="0">
-                  <a:srgbClr val="B70703"/>
-                </a:gs>
-                <a:gs pos="100000">
-                  <a:srgbClr val="B70703"/>
-                </a:gs>
-              </a:gsLst>
-              <a:lin ang="0" scaled="0"/>
-            </a:gradFill>
-            <a:tailEnd type="none"/>
-          </a:ln>
-        </p:spPr>
-        <p:style>
-          <a:lnRef idx="1">
-            <a:schemeClr val="accent1"/>
-          </a:lnRef>
-          <a:fillRef idx="0">
-            <a:schemeClr val="accent1"/>
-          </a:fillRef>
-          <a:effectRef idx="0">
-            <a:schemeClr val="accent1"/>
-          </a:effectRef>
-          <a:fontRef idx="minor">
-            <a:schemeClr val="tx1"/>
-          </a:fontRef>
-        </p:style>
-      </p:cxnSp>
-      <p:cxnSp>
-        <p:nvCxnSpPr>
-          <p:cNvPr id="33" name="Straight Arrow Connector 32">
-            <a:extLst>
-              <a:ext uri="{FF2B5EF4-FFF2-40B4-BE49-F238E27FC236}">
-                <a16:creationId xmlns:a16="http://schemas.microsoft.com/office/drawing/2014/main" id="{FD43408C-8FD1-2A45-BAFA-7C30E55C1B43}"/>
-              </a:ext>
-            </a:extLst>
-          </p:cNvPr>
-          <p:cNvCxnSpPr>
-            <a:cxnSpLocks/>
-            <a:stCxn id="45" idx="7"/>
-          </p:cNvCxnSpPr>
-          <p:nvPr/>
-        </p:nvCxnSpPr>
-        <p:spPr>
-          <a:xfrm flipV="1">
-            <a:off x="6480260" y="2876683"/>
-            <a:ext cx="2715768" cy="6437"/>
+          <a:xfrm>
+            <a:off x="6480261" y="3674338"/>
+            <a:ext cx="2793477" cy="0"/>
           </a:xfrm>
           <a:prstGeom prst="straightConnector1">
             <a:avLst/>
@@ -9727,8 +9562,8 @@
         </p:nvSpPr>
         <p:spPr>
           <a:xfrm>
-            <a:off x="6397942" y="2507351"/>
-            <a:ext cx="2763834" cy="369332"/>
+            <a:off x="6770872" y="3691210"/>
+            <a:ext cx="2502866" cy="461665"/>
           </a:xfrm>
           <a:prstGeom prst="rect">
             <a:avLst/>
@@ -9748,8 +9583,9 @@
           </a:bodyPr>
           <a:lstStyle/>
           <a:p>
-            <a:r>
-              <a:rPr lang="en-US" dirty="0">
+            <a:pPr algn="r"/>
+            <a:r>
+              <a:rPr lang="en-US" sz="2400" dirty="0">
                 <a:gradFill>
                   <a:gsLst>
                     <a:gs pos="0">
@@ -9773,7 +9609,7 @@
                   </a:outerShdw>
                 </a:effectLst>
               </a:rPr>
-              <a:t>Traffic engineering patterns</a:t>
+              <a:t>Traffic engineering</a:t>
             </a:r>
           </a:p>
         </p:txBody>
@@ -9792,8 +9628,8 @@
         </p:nvSpPr>
         <p:spPr>
           <a:xfrm>
-            <a:off x="2671557" y="3335966"/>
-            <a:ext cx="2690993" cy="307777"/>
+            <a:off x="2712577" y="2878976"/>
+            <a:ext cx="2750855" cy="830997"/>
           </a:xfrm>
           <a:prstGeom prst="rect">
             <a:avLst/>
@@ -9808,13 +9644,13 @@
           </a:effectLst>
         </p:spPr>
         <p:txBody>
-          <a:bodyPr wrap="none" rtlCol="0">
+          <a:bodyPr wrap="square" rtlCol="0">
             <a:spAutoFit/>
           </a:bodyPr>
           <a:lstStyle/>
           <a:p>
             <a:r>
-              <a:rPr lang="en-US" sz="1400" dirty="0">
+              <a:rPr lang="en-US" sz="1600" dirty="0">
                 <a:gradFill>
                   <a:gsLst>
                     <a:gs pos="0">
@@ -9838,7 +9674,7 @@
                   </a:outerShdw>
                 </a:effectLst>
               </a:rPr>
-              <a:t>Load, SLOs, A/B(/n), Chaos, Hybrid</a:t>
+              <a:t>Load, SLO validation, A/B(/n) with business rewards, Chaos, Hybrid</a:t>
             </a:r>
           </a:p>
         </p:txBody>
@@ -9857,8 +9693,8 @@
         </p:nvSpPr>
         <p:spPr>
           <a:xfrm>
-            <a:off x="7439376" y="2900001"/>
-            <a:ext cx="1756652" cy="1169551"/>
+            <a:off x="6873498" y="2584688"/>
+            <a:ext cx="2400240" cy="1077218"/>
           </a:xfrm>
           <a:prstGeom prst="rect">
             <a:avLst/>
@@ -9880,7 +9716,7 @@
           <a:p>
             <a:pPr algn="r"/>
             <a:r>
-              <a:rPr lang="en-US" sz="1400" dirty="0">
+              <a:rPr lang="en-US" sz="1600" dirty="0">
                 <a:gradFill>
                   <a:gsLst>
                     <a:gs pos="0">
@@ -9904,67 +9740,7 @@
                   </a:outerShdw>
                 </a:effectLst>
               </a:rPr>
-              <a:t>Mirroring</a:t>
-            </a:r>
-          </a:p>
-          <a:p>
-            <a:pPr algn="r"/>
-            <a:r>
-              <a:rPr lang="en-US" sz="1400" dirty="0">
-                <a:gradFill>
-                  <a:gsLst>
-                    <a:gs pos="0">
-                      <a:schemeClr val="accent4">
-                        <a:lumMod val="20000"/>
-                        <a:lumOff val="80000"/>
-                      </a:schemeClr>
-                    </a:gs>
-                    <a:gs pos="99000">
-                      <a:schemeClr val="bg1"/>
-                    </a:gs>
-                  </a:gsLst>
-                  <a:lin ang="0" scaled="0"/>
-                </a:gradFill>
-                <a:effectLst>
-                  <a:outerShdw blurRad="50800" dist="38100" dir="2700000" algn="tl" rotWithShape="0">
-                    <a:schemeClr val="accent4">
-                      <a:lumMod val="75000"/>
-                      <a:alpha val="40000"/>
-                    </a:schemeClr>
-                  </a:outerShdw>
-                </a:effectLst>
-              </a:rPr>
-              <a:t>%-traffic split</a:t>
-            </a:r>
-          </a:p>
-          <a:p>
-            <a:pPr algn="r"/>
-            <a:r>
-              <a:rPr lang="en-US" sz="1400" dirty="0">
-                <a:gradFill>
-                  <a:gsLst>
-                    <a:gs pos="0">
-                      <a:schemeClr val="accent4">
-                        <a:lumMod val="20000"/>
-                        <a:lumOff val="80000"/>
-                      </a:schemeClr>
-                    </a:gs>
-                    <a:gs pos="99000">
-                      <a:schemeClr val="bg1"/>
-                    </a:gs>
-                  </a:gsLst>
-                  <a:lin ang="0" scaled="0"/>
-                </a:gradFill>
-                <a:effectLst>
-                  <a:outerShdw blurRad="50800" dist="38100" dir="2700000" algn="tl" rotWithShape="0">
-                    <a:schemeClr val="accent4">
-                      <a:lumMod val="75000"/>
-                      <a:alpha val="40000"/>
-                    </a:schemeClr>
-                  </a:outerShdw>
-                </a:effectLst>
-              </a:rPr>
-              <a:t>User segmentation Session affinity Progressive rollout</a:t>
+              <a:t>Mirroring, %-traffic split, User segmentation, Session affinity, Progressive traffic shifting</a:t>
             </a:r>
           </a:p>
         </p:txBody>
@@ -9972,7 +9748,7 @@
     </p:spTree>
     <p:extLst>
       <p:ext uri="{BB962C8B-B14F-4D97-AF65-F5344CB8AC3E}">
-        <p14:creationId xmlns:p14="http://schemas.microsoft.com/office/powerpoint/2010/main" val="389890464"/>
+        <p14:creationId xmlns:p14="http://schemas.microsoft.com/office/powerpoint/2010/main" val="1325385497"/>
       </p:ext>
     </p:extLst>
   </p:cSld>
@@ -10116,13 +9892,14 @@
           </p:cNvPr>
           <p:cNvCxnSpPr>
             <a:cxnSpLocks/>
+            <a:stCxn id="45" idx="1"/>
           </p:cNvCxnSpPr>
           <p:nvPr/>
         </p:nvCxnSpPr>
         <p:spPr>
           <a:xfrm flipH="1" flipV="1">
-            <a:off x="2743200" y="3300409"/>
-            <a:ext cx="2784865" cy="1"/>
+            <a:off x="2816772" y="2876683"/>
+            <a:ext cx="2874663" cy="6437"/>
           </a:xfrm>
           <a:prstGeom prst="straightConnector1">
             <a:avLst/>
@@ -10159,10 +9936,10 @@
       </p:cxnSp>
       <p:sp>
         <p:nvSpPr>
-          <p:cNvPr id="26" name="TextBox 25">
-            <a:extLst>
-              <a:ext uri="{FF2B5EF4-FFF2-40B4-BE49-F238E27FC236}">
-                <a16:creationId xmlns:a16="http://schemas.microsoft.com/office/drawing/2014/main" id="{00B0B6B7-226E-954C-98D8-33134757394E}"/>
+          <p:cNvPr id="86" name="TextBox 85">
+            <a:extLst>
+              <a:ext uri="{FF2B5EF4-FFF2-40B4-BE49-F238E27FC236}">
+                <a16:creationId xmlns:a16="http://schemas.microsoft.com/office/drawing/2014/main" id="{3AF42E4E-4F2B-3444-9D30-D6A138BC1321}"/>
               </a:ext>
             </a:extLst>
           </p:cNvPr>
@@ -10171,8 +9948,8 @@
         </p:nvSpPr>
         <p:spPr>
           <a:xfrm>
-            <a:off x="3689568" y="2041329"/>
-            <a:ext cx="4789453" cy="369332"/>
+            <a:off x="4309241" y="4281099"/>
+            <a:ext cx="3563008" cy="584775"/>
           </a:xfrm>
           <a:prstGeom prst="rect">
             <a:avLst/>
@@ -10187,13 +9964,14 @@
           </a:effectLst>
         </p:spPr>
         <p:txBody>
-          <a:bodyPr wrap="none" rtlCol="0">
+          <a:bodyPr wrap="square" rtlCol="0">
             <a:spAutoFit/>
           </a:bodyPr>
           <a:lstStyle/>
           <a:p>
-            <a:r>
-              <a:rPr lang="en-US" dirty="0">
+            <a:pPr algn="ctr"/>
+            <a:r>
+              <a:rPr lang="en-US" sz="1600" dirty="0">
                 <a:gradFill>
                   <a:gsLst>
                     <a:gs pos="0">
@@ -10217,17 +9995,17 @@
                   </a:outerShdw>
                 </a:effectLst>
               </a:rPr>
-              <a:t>Use with any CI/CD/GitOps &amp; app/ML framework</a:t>
-            </a:r>
-          </a:p>
-        </p:txBody>
-      </p:sp>
-      <p:sp>
-        <p:nvSpPr>
-          <p:cNvPr id="86" name="TextBox 85">
-            <a:extLst>
-              <a:ext uri="{FF2B5EF4-FFF2-40B4-BE49-F238E27FC236}">
-                <a16:creationId xmlns:a16="http://schemas.microsoft.com/office/drawing/2014/main" id="{3AF42E4E-4F2B-3444-9D30-D6A138BC1321}"/>
+              <a:t>Experiment locally, using K8s jobs, or within CI/CD/GitOps pipelines</a:t>
+            </a:r>
+          </a:p>
+        </p:txBody>
+      </p:sp>
+      <p:sp>
+        <p:nvSpPr>
+          <p:cNvPr id="87" name="TextBox 86">
+            <a:extLst>
+              <a:ext uri="{FF2B5EF4-FFF2-40B4-BE49-F238E27FC236}">
+                <a16:creationId xmlns:a16="http://schemas.microsoft.com/office/drawing/2014/main" id="{A14FFCA2-5CA7-AC47-8DEE-26F0528D2DA1}"/>
               </a:ext>
             </a:extLst>
           </p:cNvPr>
@@ -10236,8 +10014,8 @@
         </p:nvSpPr>
         <p:spPr>
           <a:xfrm>
-            <a:off x="4541853" y="4135418"/>
-            <a:ext cx="3108287" cy="369332"/>
+            <a:off x="2712577" y="2403003"/>
+            <a:ext cx="1057918" cy="461665"/>
           </a:xfrm>
           <a:prstGeom prst="rect">
             <a:avLst/>
@@ -10258,72 +10036,7 @@
           <a:lstStyle/>
           <a:p>
             <a:r>
-              <a:rPr lang="en-US" dirty="0">
-                <a:gradFill>
-                  <a:gsLst>
-                    <a:gs pos="0">
-                      <a:schemeClr val="bg1"/>
-                    </a:gs>
-                    <a:gs pos="98000">
-                      <a:schemeClr val="accent4">
-                        <a:lumMod val="40000"/>
-                        <a:lumOff val="60000"/>
-                      </a:schemeClr>
-                    </a:gs>
-                  </a:gsLst>
-                  <a:lin ang="0" scaled="0"/>
-                </a:gradFill>
-                <a:effectLst>
-                  <a:outerShdw blurRad="50800" dist="38100" dir="2700000" algn="tl" rotWithShape="0">
-                    <a:schemeClr val="accent4">
-                      <a:lumMod val="75000"/>
-                      <a:alpha val="40000"/>
-                    </a:schemeClr>
-                  </a:outerShdw>
-                </a:effectLst>
-              </a:rPr>
-              <a:t>Rigorous statistical foundations</a:t>
-            </a:r>
-          </a:p>
-        </p:txBody>
-      </p:sp>
-      <p:sp>
-        <p:nvSpPr>
-          <p:cNvPr id="87" name="TextBox 86">
-            <a:extLst>
-              <a:ext uri="{FF2B5EF4-FFF2-40B4-BE49-F238E27FC236}">
-                <a16:creationId xmlns:a16="http://schemas.microsoft.com/office/drawing/2014/main" id="{A14FFCA2-5CA7-AC47-8DEE-26F0528D2DA1}"/>
-              </a:ext>
-            </a:extLst>
-          </p:cNvPr>
-          <p:cNvSpPr txBox="1"/>
-          <p:nvPr/>
-        </p:nvSpPr>
-        <p:spPr>
-          <a:xfrm>
-            <a:off x="2671557" y="2898764"/>
-            <a:ext cx="1678152" cy="369332"/>
-          </a:xfrm>
-          <a:prstGeom prst="rect">
-            <a:avLst/>
-          </a:prstGeom>
-          <a:noFill/>
-          <a:effectLst>
-            <a:outerShdw blurRad="50800" dist="38100" dir="2700000" algn="tl" rotWithShape="0">
-              <a:prstClr val="black">
-                <a:alpha val="40000"/>
-              </a:prstClr>
-            </a:outerShdw>
-          </a:effectLst>
-        </p:spPr>
-        <p:txBody>
-          <a:bodyPr wrap="none" rtlCol="0">
-            <a:spAutoFit/>
-          </a:bodyPr>
-          <a:lstStyle/>
-          <a:p>
-            <a:r>
-              <a:rPr lang="en-US" dirty="0">
+              <a:rPr lang="en-US" sz="2400" dirty="0">
                 <a:gradFill>
                   <a:gsLst>
                     <a:gs pos="0">
@@ -10347,7 +10060,7 @@
                   </a:outerShdw>
                 </a:effectLst>
               </a:rPr>
-              <a:t>Testing patterns</a:t>
+              <a:t>Testing</a:t>
             </a:r>
           </a:p>
         </p:txBody>
@@ -10364,13 +10077,14 @@
           <p:cNvCxnSpPr>
             <a:cxnSpLocks/>
             <a:stCxn id="45" idx="4"/>
+            <a:endCxn id="86" idx="0"/>
           </p:cNvCxnSpPr>
           <p:nvPr/>
         </p:nvCxnSpPr>
         <p:spPr>
-          <a:xfrm flipH="1">
-            <a:off x="6084296" y="3838204"/>
-            <a:ext cx="1552" cy="258910"/>
+          <a:xfrm>
+            <a:off x="6085848" y="3838204"/>
+            <a:ext cx="4897" cy="442895"/>
           </a:xfrm>
           <a:prstGeom prst="straightConnector1">
             <a:avLst/>
@@ -10403,10 +10117,10 @@
       </p:cxnSp>
       <p:cxnSp>
         <p:nvCxnSpPr>
-          <p:cNvPr id="30" name="Straight Arrow Connector 29">
-            <a:extLst>
-              <a:ext uri="{FF2B5EF4-FFF2-40B4-BE49-F238E27FC236}">
-                <a16:creationId xmlns:a16="http://schemas.microsoft.com/office/drawing/2014/main" id="{7046775E-C39B-3444-98D7-1861DFAD2629}"/>
+          <p:cNvPr id="32" name="Straight Arrow Connector 31">
+            <a:extLst>
+              <a:ext uri="{FF2B5EF4-FFF2-40B4-BE49-F238E27FC236}">
+                <a16:creationId xmlns:a16="http://schemas.microsoft.com/office/drawing/2014/main" id="{60FAE7CA-C26E-1C43-BACB-203469C347F9}"/>
               </a:ext>
             </a:extLst>
           </p:cNvPr>
@@ -10417,55 +10131,7 @@
         </p:nvCxnSpPr>
         <p:spPr>
           <a:xfrm flipH="1">
-            <a:off x="6095999" y="2469809"/>
-            <a:ext cx="1552" cy="258910"/>
-          </a:xfrm>
-          <a:prstGeom prst="straightConnector1">
-            <a:avLst/>
-          </a:prstGeom>
-          <a:ln w="31750">
-            <a:solidFill>
-              <a:schemeClr val="lt1">
-                <a:hueOff val="0"/>
-                <a:satOff val="0"/>
-                <a:lumOff val="0"/>
-              </a:schemeClr>
-            </a:solidFill>
-            <a:tailEnd type="none"/>
-          </a:ln>
-        </p:spPr>
-        <p:style>
-          <a:lnRef idx="1">
-            <a:schemeClr val="accent1"/>
-          </a:lnRef>
-          <a:fillRef idx="0">
-            <a:schemeClr val="accent1"/>
-          </a:fillRef>
-          <a:effectRef idx="0">
-            <a:schemeClr val="accent1"/>
-          </a:effectRef>
-          <a:fontRef idx="minor">
-            <a:schemeClr val="tx1"/>
-          </a:fontRef>
-        </p:style>
-      </p:cxnSp>
-      <p:cxnSp>
-        <p:nvCxnSpPr>
-          <p:cNvPr id="31" name="Straight Arrow Connector 30">
-            <a:extLst>
-              <a:ext uri="{FF2B5EF4-FFF2-40B4-BE49-F238E27FC236}">
-                <a16:creationId xmlns:a16="http://schemas.microsoft.com/office/drawing/2014/main" id="{6F6EB244-A7B0-B645-B012-C7F92E43D308}"/>
-              </a:ext>
-            </a:extLst>
-          </p:cNvPr>
-          <p:cNvCxnSpPr>
-            <a:cxnSpLocks/>
-          </p:cNvCxnSpPr>
-          <p:nvPr/>
-        </p:nvCxnSpPr>
-        <p:spPr>
-          <a:xfrm flipH="1">
-            <a:off x="4737975" y="2446217"/>
+            <a:off x="4726272" y="4278346"/>
             <a:ext cx="2716047" cy="0"/>
           </a:xfrm>
           <a:prstGeom prst="straightConnector1">
@@ -10506,78 +10172,23 @@
       </p:cxnSp>
       <p:cxnSp>
         <p:nvCxnSpPr>
-          <p:cNvPr id="32" name="Straight Arrow Connector 31">
-            <a:extLst>
-              <a:ext uri="{FF2B5EF4-FFF2-40B4-BE49-F238E27FC236}">
-                <a16:creationId xmlns:a16="http://schemas.microsoft.com/office/drawing/2014/main" id="{60FAE7CA-C26E-1C43-BACB-203469C347F9}"/>
+          <p:cNvPr id="33" name="Straight Arrow Connector 32">
+            <a:extLst>
+              <a:ext uri="{FF2B5EF4-FFF2-40B4-BE49-F238E27FC236}">
+                <a16:creationId xmlns:a16="http://schemas.microsoft.com/office/drawing/2014/main" id="{FD43408C-8FD1-2A45-BAFA-7C30E55C1B43}"/>
               </a:ext>
             </a:extLst>
           </p:cNvPr>
           <p:cNvCxnSpPr>
             <a:cxnSpLocks/>
+            <a:stCxn id="45" idx="5"/>
           </p:cNvCxnSpPr>
           <p:nvPr/>
         </p:nvCxnSpPr>
         <p:spPr>
-          <a:xfrm flipH="1">
-            <a:off x="4726272" y="4110186"/>
-            <a:ext cx="2716047" cy="0"/>
-          </a:xfrm>
-          <a:prstGeom prst="straightConnector1">
-            <a:avLst/>
-          </a:prstGeom>
-          <a:ln w="31750">
-            <a:gradFill>
-              <a:gsLst>
-                <a:gs pos="49000">
-                  <a:schemeClr val="bg1"/>
-                </a:gs>
-                <a:gs pos="0">
-                  <a:srgbClr val="B70703"/>
-                </a:gs>
-                <a:gs pos="100000">
-                  <a:srgbClr val="B70703"/>
-                </a:gs>
-              </a:gsLst>
-              <a:lin ang="0" scaled="0"/>
-            </a:gradFill>
-            <a:tailEnd type="none"/>
-          </a:ln>
-        </p:spPr>
-        <p:style>
-          <a:lnRef idx="1">
-            <a:schemeClr val="accent1"/>
-          </a:lnRef>
-          <a:fillRef idx="0">
-            <a:schemeClr val="accent1"/>
-          </a:fillRef>
-          <a:effectRef idx="0">
-            <a:schemeClr val="accent1"/>
-          </a:effectRef>
-          <a:fontRef idx="minor">
-            <a:schemeClr val="tx1"/>
-          </a:fontRef>
-        </p:style>
-      </p:cxnSp>
-      <p:cxnSp>
-        <p:nvCxnSpPr>
-          <p:cNvPr id="33" name="Straight Arrow Connector 32">
-            <a:extLst>
-              <a:ext uri="{FF2B5EF4-FFF2-40B4-BE49-F238E27FC236}">
-                <a16:creationId xmlns:a16="http://schemas.microsoft.com/office/drawing/2014/main" id="{FD43408C-8FD1-2A45-BAFA-7C30E55C1B43}"/>
-              </a:ext>
-            </a:extLst>
-          </p:cNvPr>
-          <p:cNvCxnSpPr>
-            <a:cxnSpLocks/>
-            <a:stCxn id="45" idx="7"/>
-          </p:cNvCxnSpPr>
-          <p:nvPr/>
-        </p:nvCxnSpPr>
-        <p:spPr>
-          <a:xfrm flipV="1">
-            <a:off x="6480260" y="2876683"/>
-            <a:ext cx="2715768" cy="6437"/>
+          <a:xfrm>
+            <a:off x="6480261" y="3674338"/>
+            <a:ext cx="2793477" cy="0"/>
           </a:xfrm>
           <a:prstGeom prst="straightConnector1">
             <a:avLst/>
@@ -10626,8 +10237,8 @@
         </p:nvSpPr>
         <p:spPr>
           <a:xfrm>
-            <a:off x="6397942" y="2507351"/>
-            <a:ext cx="2763834" cy="369332"/>
+            <a:off x="6770872" y="3691210"/>
+            <a:ext cx="2502866" cy="461665"/>
           </a:xfrm>
           <a:prstGeom prst="rect">
             <a:avLst/>
@@ -10647,8 +10258,9 @@
           </a:bodyPr>
           <a:lstStyle/>
           <a:p>
-            <a:r>
-              <a:rPr lang="en-US" dirty="0">
+            <a:pPr algn="r"/>
+            <a:r>
+              <a:rPr lang="en-US" sz="2400" dirty="0">
                 <a:gradFill>
                   <a:gsLst>
                     <a:gs pos="0">
@@ -10672,7 +10284,7 @@
                   </a:outerShdw>
                 </a:effectLst>
               </a:rPr>
-              <a:t>Traffic engineering patterns</a:t>
+              <a:t>Traffic engineering</a:t>
             </a:r>
           </a:p>
         </p:txBody>
@@ -10691,8 +10303,8 @@
         </p:nvSpPr>
         <p:spPr>
           <a:xfrm>
-            <a:off x="2671557" y="3335966"/>
-            <a:ext cx="2690993" cy="307777"/>
+            <a:off x="2712577" y="2878976"/>
+            <a:ext cx="2750855" cy="830997"/>
           </a:xfrm>
           <a:prstGeom prst="rect">
             <a:avLst/>
@@ -10707,13 +10319,13 @@
           </a:effectLst>
         </p:spPr>
         <p:txBody>
-          <a:bodyPr wrap="none" rtlCol="0">
+          <a:bodyPr wrap="square" rtlCol="0">
             <a:spAutoFit/>
           </a:bodyPr>
           <a:lstStyle/>
           <a:p>
             <a:r>
-              <a:rPr lang="en-US" sz="1400" dirty="0">
+              <a:rPr lang="en-US" sz="1600" dirty="0">
                 <a:gradFill>
                   <a:gsLst>
                     <a:gs pos="0">
@@ -10737,7 +10349,7 @@
                   </a:outerShdw>
                 </a:effectLst>
               </a:rPr>
-              <a:t>Load, SLOs, A/B(/n), Chaos, Hybrid</a:t>
+              <a:t>Load, SLO validation, A/B(/n) with business rewards, Chaos, Hybrid</a:t>
             </a:r>
           </a:p>
         </p:txBody>
@@ -10756,8 +10368,8 @@
         </p:nvSpPr>
         <p:spPr>
           <a:xfrm>
-            <a:off x="7439376" y="2900001"/>
-            <a:ext cx="1756652" cy="1169551"/>
+            <a:off x="6826829" y="2584688"/>
+            <a:ext cx="2446909" cy="1077218"/>
           </a:xfrm>
           <a:prstGeom prst="rect">
             <a:avLst/>
@@ -10779,7 +10391,7 @@
           <a:p>
             <a:pPr algn="r"/>
             <a:r>
-              <a:rPr lang="en-US" sz="1400" dirty="0">
+              <a:rPr lang="en-US" sz="1600" dirty="0">
                 <a:gradFill>
                   <a:gsLst>
                     <a:gs pos="0">
@@ -10803,67 +10415,7 @@
                   </a:outerShdw>
                 </a:effectLst>
               </a:rPr>
-              <a:t>Mirroring</a:t>
-            </a:r>
-          </a:p>
-          <a:p>
-            <a:pPr algn="r"/>
-            <a:r>
-              <a:rPr lang="en-US" sz="1400" dirty="0">
-                <a:gradFill>
-                  <a:gsLst>
-                    <a:gs pos="0">
-                      <a:schemeClr val="accent4">
-                        <a:lumMod val="20000"/>
-                        <a:lumOff val="80000"/>
-                      </a:schemeClr>
-                    </a:gs>
-                    <a:gs pos="99000">
-                      <a:schemeClr val="bg1"/>
-                    </a:gs>
-                  </a:gsLst>
-                  <a:lin ang="0" scaled="0"/>
-                </a:gradFill>
-                <a:effectLst>
-                  <a:outerShdw blurRad="50800" dist="38100" dir="2700000" algn="tl" rotWithShape="0">
-                    <a:schemeClr val="accent4">
-                      <a:lumMod val="75000"/>
-                      <a:alpha val="40000"/>
-                    </a:schemeClr>
-                  </a:outerShdw>
-                </a:effectLst>
-              </a:rPr>
-              <a:t>%-traffic split</a:t>
-            </a:r>
-          </a:p>
-          <a:p>
-            <a:pPr algn="r"/>
-            <a:r>
-              <a:rPr lang="en-US" sz="1400" dirty="0">
-                <a:gradFill>
-                  <a:gsLst>
-                    <a:gs pos="0">
-                      <a:schemeClr val="accent4">
-                        <a:lumMod val="20000"/>
-                        <a:lumOff val="80000"/>
-                      </a:schemeClr>
-                    </a:gs>
-                    <a:gs pos="99000">
-                      <a:schemeClr val="bg1"/>
-                    </a:gs>
-                  </a:gsLst>
-                  <a:lin ang="0" scaled="0"/>
-                </a:gradFill>
-                <a:effectLst>
-                  <a:outerShdw blurRad="50800" dist="38100" dir="2700000" algn="tl" rotWithShape="0">
-                    <a:schemeClr val="accent4">
-                      <a:lumMod val="75000"/>
-                      <a:alpha val="40000"/>
-                    </a:schemeClr>
-                  </a:outerShdw>
-                </a:effectLst>
-              </a:rPr>
-              <a:t>User segmentation Session affinity Progressive rollout</a:t>
+              <a:t>Mirroring, %-traffic split, User segmentation, Session affinity, Progressive traffic shifting</a:t>
             </a:r>
           </a:p>
         </p:txBody>
@@ -10871,7 +10423,7 @@
     </p:spTree>
     <p:extLst>
       <p:ext uri="{BB962C8B-B14F-4D97-AF65-F5344CB8AC3E}">
-        <p14:creationId xmlns:p14="http://schemas.microsoft.com/office/powerpoint/2010/main" val="2460292311"/>
+        <p14:creationId xmlns:p14="http://schemas.microsoft.com/office/powerpoint/2010/main" val="1425287963"/>
       </p:ext>
     </p:extLst>
   </p:cSld>

</xml_diff>

<commit_message>
Small changes to landing page (#1085)
* illustration

Signed-off-by: Srinivasan Parthasarathy <spartha@us.ibm.com>

* small changes to landing page

Signed-off-by: Srinivasan Parthasarathy <spartha@us.ibm.com>

* retracting whole bunch of iter8 versions

Signed-off-by: Srinivasan Parthasarathy <spartha@us.ibm.com>
</commit_message>
<xml_diff>
--- a/mkdocs/docs/images/src/illustration.pptx
+++ b/mkdocs/docs/images/src/illustration.pptx
@@ -14,7 +14,7 @@
     <p:sldId id="378" r:id="rId5"/>
     <p:sldId id="379" r:id="rId6"/>
     <p:sldId id="385" r:id="rId7"/>
-    <p:sldId id="387" r:id="rId8"/>
+    <p:sldId id="386" r:id="rId8"/>
   </p:sldIdLst>
   <p:sldSz cx="12192000" cy="6858000"/>
   <p:notesSz cx="6858000" cy="9144000"/>
@@ -1048,7 +1048,7 @@
     </p:spTree>
     <p:extLst>
       <p:ext uri="{BB962C8B-B14F-4D97-AF65-F5344CB8AC3E}">
-        <p14:creationId xmlns:p14="http://schemas.microsoft.com/office/powerpoint/2010/main" val="4184170233"/>
+        <p14:creationId xmlns:p14="http://schemas.microsoft.com/office/powerpoint/2010/main" val="4259050774"/>
       </p:ext>
     </p:extLst>
   </p:cSld>
@@ -9552,7 +9552,7 @@
         <p:spPr>
           <a:xfrm>
             <a:off x="2712578" y="2889486"/>
-            <a:ext cx="2143201" cy="338554"/>
+            <a:ext cx="1838401" cy="584775"/>
           </a:xfrm>
           <a:prstGeom prst="rect">
             <a:avLst/>
@@ -9597,8 +9597,10 @@
                   </a:outerShdw>
                 </a:effectLst>
               </a:rPr>
-              <a:t>Load testing</a:t>
-            </a:r>
+              <a:t>Load testing/SLOs</a:t>
+            </a:r>
+          </a:p>
+          <a:p>
             <a:r>
               <a:rPr lang="en-US" sz="1600" dirty="0">
                 <a:gradFill>
@@ -9624,34 +9626,7 @@
                   </a:outerShdw>
                 </a:effectLst>
               </a:rPr>
-              <a:t> with </a:t>
-            </a:r>
-            <a:r>
-              <a:rPr lang="en-US" sz="1600" b="1" dirty="0">
-                <a:gradFill>
-                  <a:gsLst>
-                    <a:gs pos="0">
-                      <a:schemeClr val="accent4">
-                        <a:lumMod val="20000"/>
-                        <a:lumOff val="80000"/>
-                      </a:schemeClr>
-                    </a:gs>
-                    <a:gs pos="99000">
-                      <a:schemeClr val="bg1"/>
-                    </a:gs>
-                  </a:gsLst>
-                  <a:lin ang="0" scaled="0"/>
-                </a:gradFill>
-                <a:effectLst>
-                  <a:outerShdw blurRad="50800" dist="38100" dir="2700000" algn="tl" rotWithShape="0">
-                    <a:schemeClr val="accent4">
-                      <a:lumMod val="75000"/>
-                      <a:alpha val="40000"/>
-                    </a:schemeClr>
-                  </a:outerShdw>
-                </a:effectLst>
-              </a:rPr>
-              <a:t>SLOs</a:t>
+              <a:t>with built-in metrics</a:t>
             </a:r>
           </a:p>
         </p:txBody>
@@ -9670,8 +9645,8 @@
         </p:nvSpPr>
         <p:spPr>
           <a:xfrm>
-            <a:off x="6785918" y="3068282"/>
-            <a:ext cx="2487820" cy="584775"/>
+            <a:off x="7262272" y="3068282"/>
+            <a:ext cx="2011466" cy="584775"/>
           </a:xfrm>
           <a:prstGeom prst="rect">
             <a:avLst/>
@@ -9719,6 +9694,9 @@
               </a:rPr>
               <a:t>A/B(/n) testing</a:t>
             </a:r>
+          </a:p>
+          <a:p>
+            <a:pPr algn="r"/>
             <a:r>
               <a:rPr lang="en-US" sz="1600" dirty="0">
                 <a:gradFill>
@@ -9744,7 +9722,7 @@
                   </a:outerShdw>
                 </a:effectLst>
               </a:rPr>
-              <a:t> with business metrics</a:t>
+              <a:t>with business metrics</a:t>
             </a:r>
           </a:p>
         </p:txBody>
@@ -10454,7 +10432,7 @@
         <p:spPr>
           <a:xfrm>
             <a:off x="2712578" y="2889486"/>
-            <a:ext cx="2143201" cy="338554"/>
+            <a:ext cx="1838401" cy="584775"/>
           </a:xfrm>
           <a:prstGeom prst="rect">
             <a:avLst/>
@@ -10499,8 +10477,10 @@
                   </a:outerShdw>
                 </a:effectLst>
               </a:rPr>
-              <a:t>Load testing</a:t>
-            </a:r>
+              <a:t>Load testing/SLOs</a:t>
+            </a:r>
+          </a:p>
+          <a:p>
             <a:r>
               <a:rPr lang="en-US" sz="1600" dirty="0">
                 <a:gradFill>
@@ -10526,34 +10506,7 @@
                   </a:outerShdw>
                 </a:effectLst>
               </a:rPr>
-              <a:t> with </a:t>
-            </a:r>
-            <a:r>
-              <a:rPr lang="en-US" sz="1600" b="1" dirty="0">
-                <a:gradFill>
-                  <a:gsLst>
-                    <a:gs pos="0">
-                      <a:schemeClr val="accent4">
-                        <a:lumMod val="20000"/>
-                        <a:lumOff val="80000"/>
-                      </a:schemeClr>
-                    </a:gs>
-                    <a:gs pos="99000">
-                      <a:schemeClr val="bg1"/>
-                    </a:gs>
-                  </a:gsLst>
-                  <a:lin ang="0" scaled="0"/>
-                </a:gradFill>
-                <a:effectLst>
-                  <a:outerShdw blurRad="50800" dist="38100" dir="2700000" algn="tl" rotWithShape="0">
-                    <a:schemeClr val="accent4">
-                      <a:lumMod val="75000"/>
-                      <a:alpha val="40000"/>
-                    </a:schemeClr>
-                  </a:outerShdw>
-                </a:effectLst>
-              </a:rPr>
-              <a:t>SLOs</a:t>
+              <a:t>with built-in metrics</a:t>
             </a:r>
           </a:p>
         </p:txBody>
@@ -10572,8 +10525,8 @@
         </p:nvSpPr>
         <p:spPr>
           <a:xfrm>
-            <a:off x="6785918" y="3068282"/>
-            <a:ext cx="2487820" cy="584775"/>
+            <a:off x="7262272" y="3068282"/>
+            <a:ext cx="2011466" cy="584775"/>
           </a:xfrm>
           <a:prstGeom prst="rect">
             <a:avLst/>
@@ -10621,6 +10574,9 @@
               </a:rPr>
               <a:t>A/B(/n) testing</a:t>
             </a:r>
+          </a:p>
+          <a:p>
+            <a:pPr algn="r"/>
             <a:r>
               <a:rPr lang="en-US" sz="1600" dirty="0">
                 <a:gradFill>
@@ -10646,7 +10602,7 @@
                   </a:outerShdw>
                 </a:effectLst>
               </a:rPr>
-              <a:t> with business metrics</a:t>
+              <a:t>with business metrics</a:t>
             </a:r>
           </a:p>
         </p:txBody>
@@ -10877,7 +10833,7 @@
     </p:spTree>
     <p:extLst>
       <p:ext uri="{BB962C8B-B14F-4D97-AF65-F5344CB8AC3E}">
-        <p14:creationId xmlns:p14="http://schemas.microsoft.com/office/powerpoint/2010/main" val="4292317971"/>
+        <p14:creationId xmlns:p14="http://schemas.microsoft.com/office/powerpoint/2010/main" val="2058438647"/>
       </p:ext>
     </p:extLst>
   </p:cSld>

</xml_diff>

<commit_message>
cleaned up landing page
Signed-off-by: Srinivasan Parthasarathy <spartha@us.ibm.com>
</commit_message>
<xml_diff>
--- a/mkdocs/docs/images/src/illustration.pptx
+++ b/mkdocs/docs/images/src/illustration.pptx
@@ -13,8 +13,8 @@
     <p:sldId id="376" r:id="rId4"/>
     <p:sldId id="378" r:id="rId5"/>
     <p:sldId id="379" r:id="rId6"/>
-    <p:sldId id="385" r:id="rId7"/>
-    <p:sldId id="386" r:id="rId8"/>
+    <p:sldId id="386" r:id="rId7"/>
+    <p:sldId id="387" r:id="rId8"/>
   </p:sldIdLst>
   <p:sldSz cx="12192000" cy="6858000"/>
   <p:notesSz cx="6858000" cy="9144000"/>
@@ -203,7 +203,7 @@
           <a:p>
             <a:fld id="{38B78CBE-37FA-D241-BB4C-CAC5D3B25F49}" type="datetimeFigureOut">
               <a:rPr lang="en-US" smtClean="0"/>
-              <a:t>12/15/21</a:t>
+              <a:t>12/17/21</a:t>
             </a:fld>
             <a:endParaRPr lang="en-US"/>
           </a:p>
@@ -964,7 +964,7 @@
     </p:spTree>
     <p:extLst>
       <p:ext uri="{BB962C8B-B14F-4D97-AF65-F5344CB8AC3E}">
-        <p14:creationId xmlns:p14="http://schemas.microsoft.com/office/powerpoint/2010/main" val="3283311487"/>
+        <p14:creationId xmlns:p14="http://schemas.microsoft.com/office/powerpoint/2010/main" val="1572782677"/>
       </p:ext>
     </p:extLst>
   </p:cSld>
@@ -1048,7 +1048,7 @@
     </p:spTree>
     <p:extLst>
       <p:ext uri="{BB962C8B-B14F-4D97-AF65-F5344CB8AC3E}">
-        <p14:creationId xmlns:p14="http://schemas.microsoft.com/office/powerpoint/2010/main" val="4259050774"/>
+        <p14:creationId xmlns:p14="http://schemas.microsoft.com/office/powerpoint/2010/main" val="178661305"/>
       </p:ext>
     </p:extLst>
   </p:cSld>
@@ -1205,7 +1205,7 @@
           <a:p>
             <a:fld id="{708812C5-0212-FD42-A0D4-E2E8FF4E3AF5}" type="datetime1">
               <a:rPr lang="en-US" smtClean="0"/>
-              <a:t>12/15/21</a:t>
+              <a:t>12/17/21</a:t>
             </a:fld>
             <a:endParaRPr lang="en-US"/>
           </a:p>
@@ -1406,7 +1406,7 @@
           <a:p>
             <a:fld id="{D232AC6F-41C3-B34B-9BAA-03ED2F3BC0F6}" type="datetime1">
               <a:rPr lang="en-US" smtClean="0"/>
-              <a:t>12/15/21</a:t>
+              <a:t>12/17/21</a:t>
             </a:fld>
             <a:endParaRPr lang="en-US"/>
           </a:p>
@@ -1617,7 +1617,7 @@
           <a:p>
             <a:fld id="{BEE140C2-F440-9D49-95CB-5965D64CC4A2}" type="datetime1">
               <a:rPr lang="en-US" smtClean="0"/>
-              <a:t>12/15/21</a:t>
+              <a:t>12/17/21</a:t>
             </a:fld>
             <a:endParaRPr lang="en-US"/>
           </a:p>
@@ -1818,7 +1818,7 @@
           <a:p>
             <a:fld id="{CC99F980-FB29-FD47-8508-150F73F1E8B0}" type="datetime1">
               <a:rPr lang="en-US" smtClean="0"/>
-              <a:t>12/15/21</a:t>
+              <a:t>12/17/21</a:t>
             </a:fld>
             <a:endParaRPr lang="en-US"/>
           </a:p>
@@ -2096,7 +2096,7 @@
           <a:p>
             <a:fld id="{D4510983-EA22-9643-8AC0-B3C6499B643B}" type="datetime1">
               <a:rPr lang="en-US" smtClean="0"/>
-              <a:t>12/15/21</a:t>
+              <a:t>12/17/21</a:t>
             </a:fld>
             <a:endParaRPr lang="en-US"/>
           </a:p>
@@ -2364,7 +2364,7 @@
           <a:p>
             <a:fld id="{D5A39195-967D-5D4E-8C6A-C99866996458}" type="datetime1">
               <a:rPr lang="en-US" smtClean="0"/>
-              <a:t>12/15/21</a:t>
+              <a:t>12/17/21</a:t>
             </a:fld>
             <a:endParaRPr lang="en-US"/>
           </a:p>
@@ -2779,7 +2779,7 @@
           <a:p>
             <a:fld id="{5AD771E9-C79D-684D-A158-5EB6E92DE947}" type="datetime1">
               <a:rPr lang="en-US" smtClean="0"/>
-              <a:t>12/15/21</a:t>
+              <a:t>12/17/21</a:t>
             </a:fld>
             <a:endParaRPr lang="en-US"/>
           </a:p>
@@ -2923,7 +2923,7 @@
           <a:p>
             <a:fld id="{693CA161-7E4C-5C4B-B799-DB602A0B9806}" type="datetime1">
               <a:rPr lang="en-US" smtClean="0"/>
-              <a:t>12/15/21</a:t>
+              <a:t>12/17/21</a:t>
             </a:fld>
             <a:endParaRPr lang="en-US"/>
           </a:p>
@@ -3039,7 +3039,7 @@
           <a:p>
             <a:fld id="{6D55FDF3-8BB2-6349-A5FA-057F3D78953D}" type="datetime1">
               <a:rPr lang="en-US" smtClean="0"/>
-              <a:t>12/15/21</a:t>
+              <a:t>12/17/21</a:t>
             </a:fld>
             <a:endParaRPr lang="en-US"/>
           </a:p>
@@ -3353,7 +3353,7 @@
           <a:p>
             <a:fld id="{EEDFACC0-3228-BA4B-942E-CEF38B0101FD}" type="datetime1">
               <a:rPr lang="en-US" smtClean="0"/>
-              <a:t>12/15/21</a:t>
+              <a:t>12/17/21</a:t>
             </a:fld>
             <a:endParaRPr lang="en-US"/>
           </a:p>
@@ -3644,7 +3644,7 @@
           <a:p>
             <a:fld id="{07EEEDBE-E24C-D140-B419-6D8D592D0F1C}" type="datetime1">
               <a:rPr lang="en-US" smtClean="0"/>
-              <a:t>12/15/21</a:t>
+              <a:t>12/17/21</a:t>
             </a:fld>
             <a:endParaRPr lang="en-US"/>
           </a:p>
@@ -3888,7 +3888,7 @@
           <a:p>
             <a:fld id="{E05781A2-A5EF-C54C-A3EF-F62483D37EDC}" type="datetime1">
               <a:rPr lang="en-US" smtClean="0"/>
-              <a:t>12/15/21</a:t>
+              <a:t>12/17/21</a:t>
             </a:fld>
             <a:endParaRPr lang="en-US"/>
           </a:p>
@@ -9045,8 +9045,8 @@
         </p:nvSpPr>
         <p:spPr>
           <a:xfrm>
-            <a:off x="2438397" y="1639614"/>
-            <a:ext cx="7315200" cy="3447393"/>
+            <a:off x="2438397" y="1639613"/>
+            <a:ext cx="7315204" cy="3321269"/>
           </a:xfrm>
           <a:prstGeom prst="roundRect">
             <a:avLst/>
@@ -9116,7 +9116,7 @@
         </p:nvSpPr>
         <p:spPr>
           <a:xfrm>
-            <a:off x="5528064" y="2719254"/>
+            <a:off x="5528064" y="2551089"/>
             <a:ext cx="1115568" cy="1118950"/>
           </a:xfrm>
           <a:prstGeom prst="ellipse">
@@ -9191,7 +9191,7 @@
         </p:blipFill>
         <p:spPr>
           <a:xfrm>
-            <a:off x="5711261" y="2892139"/>
+            <a:off x="5711261" y="2723974"/>
             <a:ext cx="746070" cy="746070"/>
           </a:xfrm>
           <a:prstGeom prst="rect">
@@ -9223,8 +9223,8 @@
         </p:nvCxnSpPr>
         <p:spPr>
           <a:xfrm flipH="1" flipV="1">
-            <a:off x="2816772" y="2876683"/>
-            <a:ext cx="2874663" cy="6437"/>
+            <a:off x="2743200" y="2712820"/>
+            <a:ext cx="2948235" cy="2135"/>
           </a:xfrm>
           <a:prstGeom prst="straightConnector1">
             <a:avLst/>
@@ -9273,8 +9273,8 @@
         </p:nvSpPr>
         <p:spPr>
           <a:xfrm>
-            <a:off x="4130562" y="4300629"/>
-            <a:ext cx="3930870" cy="584775"/>
+            <a:off x="4456388" y="4165260"/>
+            <a:ext cx="3273336" cy="707886"/>
           </a:xfrm>
           <a:prstGeom prst="rect">
             <a:avLst/>
@@ -9296,7 +9296,7 @@
           <a:p>
             <a:pPr algn="ctr"/>
             <a:r>
-              <a:rPr lang="en-US" sz="1600" dirty="0">
+              <a:rPr lang="en-US" sz="2000" dirty="0">
                 <a:gradFill>
                   <a:gsLst>
                     <a:gs pos="0">
@@ -9323,7 +9323,7 @@
               <a:t>Run </a:t>
             </a:r>
             <a:r>
-              <a:rPr lang="en-US" sz="1600" b="1" dirty="0">
+              <a:rPr lang="en-US" sz="2000" b="1" dirty="0">
                 <a:gradFill>
                   <a:gsLst>
                     <a:gs pos="0">
@@ -9347,10 +9347,10 @@
                   </a:outerShdw>
                 </a:effectLst>
               </a:rPr>
-              <a:t>anywhere</a:t>
-            </a:r>
-            <a:r>
-              <a:rPr lang="en-US" sz="1600" dirty="0">
+              <a:t>locally</a:t>
+            </a:r>
+            <a:r>
+              <a:rPr lang="en-US" sz="2000" dirty="0">
                 <a:gradFill>
                   <a:gsLst>
                     <a:gs pos="0">
@@ -9374,7 +9374,145 @@
                   </a:outerShdw>
                 </a:effectLst>
               </a:rPr>
-              <a:t>. Local. Container. Kubernetes. CI/CD/GitOps pipeline.</a:t>
+              <a:t> or in </a:t>
+            </a:r>
+            <a:r>
+              <a:rPr lang="en-US" sz="2000" b="1" dirty="0">
+                <a:gradFill>
+                  <a:gsLst>
+                    <a:gs pos="0">
+                      <a:schemeClr val="accent4">
+                        <a:lumMod val="20000"/>
+                        <a:lumOff val="80000"/>
+                      </a:schemeClr>
+                    </a:gs>
+                    <a:gs pos="99000">
+                      <a:schemeClr val="bg1"/>
+                    </a:gs>
+                  </a:gsLst>
+                  <a:lin ang="0" scaled="0"/>
+                </a:gradFill>
+                <a:effectLst>
+                  <a:outerShdw blurRad="50800" dist="38100" dir="2700000" algn="tl" rotWithShape="0">
+                    <a:schemeClr val="accent4">
+                      <a:lumMod val="75000"/>
+                      <a:alpha val="40000"/>
+                    </a:schemeClr>
+                  </a:outerShdw>
+                </a:effectLst>
+              </a:rPr>
+              <a:t>Kubernetes</a:t>
+            </a:r>
+            <a:r>
+              <a:rPr lang="en-US" sz="2000" dirty="0">
+                <a:gradFill>
+                  <a:gsLst>
+                    <a:gs pos="0">
+                      <a:schemeClr val="accent4">
+                        <a:lumMod val="20000"/>
+                        <a:lumOff val="80000"/>
+                      </a:schemeClr>
+                    </a:gs>
+                    <a:gs pos="99000">
+                      <a:schemeClr val="bg1"/>
+                    </a:gs>
+                  </a:gsLst>
+                  <a:lin ang="0" scaled="0"/>
+                </a:gradFill>
+                <a:effectLst>
+                  <a:outerShdw blurRad="50800" dist="38100" dir="2700000" algn="tl" rotWithShape="0">
+                    <a:schemeClr val="accent4">
+                      <a:lumMod val="75000"/>
+                      <a:alpha val="40000"/>
+                    </a:schemeClr>
+                  </a:outerShdw>
+                </a:effectLst>
+              </a:rPr>
+              <a:t> </a:t>
+            </a:r>
+          </a:p>
+          <a:p>
+            <a:pPr algn="ctr"/>
+            <a:r>
+              <a:rPr lang="en-US" sz="2000" b="1" dirty="0">
+                <a:gradFill>
+                  <a:gsLst>
+                    <a:gs pos="0">
+                      <a:schemeClr val="accent4">
+                        <a:lumMod val="20000"/>
+                        <a:lumOff val="80000"/>
+                      </a:schemeClr>
+                    </a:gs>
+                    <a:gs pos="99000">
+                      <a:schemeClr val="bg1"/>
+                    </a:gs>
+                  </a:gsLst>
+                  <a:lin ang="0" scaled="0"/>
+                </a:gradFill>
+                <a:effectLst>
+                  <a:outerShdw blurRad="50800" dist="38100" dir="2700000" algn="tl" rotWithShape="0">
+                    <a:schemeClr val="accent4">
+                      <a:lumMod val="75000"/>
+                      <a:alpha val="40000"/>
+                    </a:schemeClr>
+                  </a:outerShdw>
+                </a:effectLst>
+              </a:rPr>
+              <a:t>Notifications </a:t>
+            </a:r>
+            <a:r>
+              <a:rPr lang="en-US" sz="2000" dirty="0">
+                <a:gradFill>
+                  <a:gsLst>
+                    <a:gs pos="0">
+                      <a:schemeClr val="accent4">
+                        <a:lumMod val="20000"/>
+                        <a:lumOff val="80000"/>
+                      </a:schemeClr>
+                    </a:gs>
+                    <a:gs pos="99000">
+                      <a:schemeClr val="bg1"/>
+                    </a:gs>
+                  </a:gsLst>
+                  <a:lin ang="0" scaled="0"/>
+                </a:gradFill>
+                <a:effectLst>
+                  <a:outerShdw blurRad="50800" dist="38100" dir="2700000" algn="tl" rotWithShape="0">
+                    <a:schemeClr val="accent4">
+                      <a:lumMod val="75000"/>
+                      <a:alpha val="40000"/>
+                    </a:schemeClr>
+                  </a:outerShdw>
+                </a:effectLst>
+              </a:rPr>
+              <a:t>&amp;</a:t>
+            </a:r>
+            <a:r>
+              <a:rPr lang="en-US" sz="2000" b="1" dirty="0">
+                <a:gradFill>
+                  <a:gsLst>
+                    <a:gs pos="0">
+                      <a:schemeClr val="accent4">
+                        <a:lumMod val="20000"/>
+                        <a:lumOff val="80000"/>
+                      </a:schemeClr>
+                    </a:gs>
+                    <a:gs pos="99000">
+                      <a:schemeClr val="bg1"/>
+                    </a:gs>
+                  </a:gsLst>
+                  <a:lin ang="0" scaled="0"/>
+                </a:gradFill>
+                <a:effectLst>
+                  <a:outerShdw blurRad="50800" dist="38100" dir="2700000" algn="tl" rotWithShape="0">
+                    <a:schemeClr val="accent4">
+                      <a:lumMod val="75000"/>
+                      <a:alpha val="40000"/>
+                    </a:schemeClr>
+                  </a:outerShdw>
+                </a:effectLst>
+              </a:rPr>
+              <a:t> Reporting</a:t>
             </a:r>
           </a:p>
         </p:txBody>
@@ -9391,14 +9529,13 @@
           <p:cNvCxnSpPr>
             <a:cxnSpLocks/>
             <a:stCxn id="45" idx="4"/>
-            <a:endCxn id="86" idx="0"/>
           </p:cNvCxnSpPr>
           <p:nvPr/>
         </p:nvCxnSpPr>
         <p:spPr>
           <a:xfrm>
-            <a:off x="6085848" y="3838204"/>
-            <a:ext cx="10149" cy="462425"/>
+            <a:off x="6085848" y="3670039"/>
+            <a:ext cx="0" cy="475141"/>
           </a:xfrm>
           <a:prstGeom prst="straightConnector1">
             <a:avLst/>
@@ -9445,7 +9582,7 @@
         </p:nvCxnSpPr>
         <p:spPr>
           <a:xfrm flipH="1">
-            <a:off x="4726272" y="4278346"/>
+            <a:off x="4737976" y="4145180"/>
             <a:ext cx="2716047" cy="0"/>
           </a:xfrm>
           <a:prstGeom prst="straightConnector1">
@@ -9484,59 +9621,6 @@
           </a:fontRef>
         </p:style>
       </p:cxnSp>
-      <p:cxnSp>
-        <p:nvCxnSpPr>
-          <p:cNvPr id="33" name="Straight Arrow Connector 32">
-            <a:extLst>
-              <a:ext uri="{FF2B5EF4-FFF2-40B4-BE49-F238E27FC236}">
-                <a16:creationId xmlns:a16="http://schemas.microsoft.com/office/drawing/2014/main" id="{FD43408C-8FD1-2A45-BAFA-7C30E55C1B43}"/>
-              </a:ext>
-            </a:extLst>
-          </p:cNvPr>
-          <p:cNvCxnSpPr>
-            <a:cxnSpLocks/>
-            <a:stCxn id="45" idx="5"/>
-          </p:cNvCxnSpPr>
-          <p:nvPr/>
-        </p:nvCxnSpPr>
-        <p:spPr>
-          <a:xfrm>
-            <a:off x="6480261" y="3674338"/>
-            <a:ext cx="2793477" cy="0"/>
-          </a:xfrm>
-          <a:prstGeom prst="straightConnector1">
-            <a:avLst/>
-          </a:prstGeom>
-          <a:ln w="31750">
-            <a:gradFill>
-              <a:gsLst>
-                <a:gs pos="0">
-                  <a:schemeClr val="bg1"/>
-                </a:gs>
-                <a:gs pos="100000">
-                  <a:srgbClr val="B70703"/>
-                </a:gs>
-              </a:gsLst>
-              <a:lin ang="0" scaled="0"/>
-            </a:gradFill>
-            <a:tailEnd type="none"/>
-          </a:ln>
-        </p:spPr>
-        <p:style>
-          <a:lnRef idx="1">
-            <a:schemeClr val="accent1"/>
-          </a:lnRef>
-          <a:fillRef idx="0">
-            <a:schemeClr val="accent1"/>
-          </a:fillRef>
-          <a:effectRef idx="0">
-            <a:schemeClr val="accent1"/>
-          </a:effectRef>
-          <a:fontRef idx="minor">
-            <a:schemeClr val="tx1"/>
-          </a:fontRef>
-        </p:style>
-      </p:cxnSp>
       <p:sp>
         <p:nvSpPr>
           <p:cNvPr id="21" name="TextBox 20">
@@ -9551,8 +9635,8 @@
         </p:nvSpPr>
         <p:spPr>
           <a:xfrm>
-            <a:off x="2712578" y="2889486"/>
-            <a:ext cx="1838401" cy="584775"/>
+            <a:off x="2650292" y="2725465"/>
+            <a:ext cx="2436343" cy="707886"/>
           </a:xfrm>
           <a:prstGeom prst="rect">
             <a:avLst/>
@@ -9573,7 +9657,7 @@
           <a:lstStyle/>
           <a:p>
             <a:r>
-              <a:rPr lang="en-US" sz="1600" b="1" dirty="0">
+              <a:rPr lang="en-US" sz="2000" b="1" dirty="0">
                 <a:gradFill>
                   <a:gsLst>
                     <a:gs pos="0">
@@ -9597,12 +9681,12 @@
                   </a:outerShdw>
                 </a:effectLst>
               </a:rPr>
-              <a:t>Load testing/SLOs</a:t>
-            </a:r>
-          </a:p>
-          <a:p>
-            <a:r>
-              <a:rPr lang="en-US" sz="1600" dirty="0">
+              <a:t>Load testing</a:t>
+            </a:r>
+          </a:p>
+          <a:p>
+            <a:r>
+              <a:rPr lang="en-US" sz="2000" dirty="0">
                 <a:gradFill>
                   <a:gsLst>
                     <a:gs pos="0">
@@ -9626,7 +9710,7 @@
                   </a:outerShdw>
                 </a:effectLst>
               </a:rPr>
-              <a:t>with built-in metrics</a:t>
+              <a:t>with SLO validation</a:t>
             </a:r>
           </a:p>
         </p:txBody>
@@ -9645,8 +9729,8 @@
         </p:nvSpPr>
         <p:spPr>
           <a:xfrm>
-            <a:off x="7262272" y="3068282"/>
-            <a:ext cx="2011466" cy="584775"/>
+            <a:off x="6826829" y="2777831"/>
+            <a:ext cx="2596059" cy="707886"/>
           </a:xfrm>
           <a:prstGeom prst="rect">
             <a:avLst/>
@@ -9668,7 +9752,7 @@
           <a:p>
             <a:pPr algn="r"/>
             <a:r>
-              <a:rPr lang="en-US" sz="1600" b="1" dirty="0">
+              <a:rPr lang="en-US" sz="2000" b="1" dirty="0">
                 <a:gradFill>
                   <a:gsLst>
                     <a:gs pos="0">
@@ -9698,7 +9782,7 @@
           <a:p>
             <a:pPr algn="r"/>
             <a:r>
-              <a:rPr lang="en-US" sz="1600" dirty="0">
+              <a:rPr lang="en-US" sz="2000" dirty="0">
                 <a:gradFill>
                   <a:gsLst>
                     <a:gs pos="0">
@@ -9722,7 +9806,7 @@
                   </a:outerShdw>
                 </a:effectLst>
               </a:rPr>
-              <a:t>with business metrics</a:t>
+              <a:t>for business growth</a:t>
             </a:r>
           </a:p>
         </p:txBody>
@@ -9743,8 +9827,8 @@
         </p:nvCxnSpPr>
         <p:spPr>
           <a:xfrm>
-            <a:off x="6079398" y="2273607"/>
-            <a:ext cx="4897" cy="442895"/>
+            <a:off x="6079398" y="2105442"/>
+            <a:ext cx="0" cy="442895"/>
           </a:xfrm>
           <a:prstGeom prst="straightConnector1">
             <a:avLst/>
@@ -9791,7 +9875,7 @@
         </p:nvCxnSpPr>
         <p:spPr>
           <a:xfrm flipH="1">
-            <a:off x="4721374" y="2273607"/>
+            <a:off x="4721374" y="2105442"/>
             <a:ext cx="2716047" cy="0"/>
           </a:xfrm>
           <a:prstGeom prst="straightConnector1">
@@ -9844,8 +9928,8 @@
         </p:nvSpPr>
         <p:spPr>
           <a:xfrm>
-            <a:off x="4046484" y="1899037"/>
-            <a:ext cx="4078014" cy="338554"/>
+            <a:off x="3677551" y="1696796"/>
+            <a:ext cx="4795573" cy="400110"/>
           </a:xfrm>
           <a:prstGeom prst="rect">
             <a:avLst/>
@@ -9867,7 +9951,7 @@
           <a:p>
             <a:pPr algn="ctr"/>
             <a:r>
-              <a:rPr lang="en-US" sz="1600" dirty="0">
+              <a:rPr lang="en-US" sz="2000" dirty="0">
                 <a:gradFill>
                   <a:gsLst>
                     <a:gs pos="0">
@@ -9894,7 +9978,7 @@
               <a:t>Use with </a:t>
             </a:r>
             <a:r>
-              <a:rPr lang="en-US" sz="1600" b="1" dirty="0">
+              <a:rPr lang="en-US" sz="2000" b="1" dirty="0">
                 <a:gradFill>
                   <a:gsLst>
                     <a:gs pos="0">
@@ -9921,7 +10005,7 @@
               <a:t>any </a:t>
             </a:r>
             <a:r>
-              <a:rPr lang="en-US" sz="1600" dirty="0">
+              <a:rPr lang="en-US" sz="2000" dirty="0">
                 <a:gradFill>
                   <a:gsLst>
                     <a:gs pos="0">
@@ -9945,15 +10029,68 @@
                   </a:outerShdw>
                 </a:effectLst>
               </a:rPr>
-              <a:t>app/serverless/ML framework. </a:t>
-            </a:r>
-          </a:p>
-        </p:txBody>
-      </p:sp>
+              <a:t>app/serverless/ML framework</a:t>
+            </a:r>
+          </a:p>
+        </p:txBody>
+      </p:sp>
+      <p:cxnSp>
+        <p:nvCxnSpPr>
+          <p:cNvPr id="17" name="Straight Arrow Connector 16">
+            <a:extLst>
+              <a:ext uri="{FF2B5EF4-FFF2-40B4-BE49-F238E27FC236}">
+                <a16:creationId xmlns:a16="http://schemas.microsoft.com/office/drawing/2014/main" id="{1F33487F-230E-394B-AC71-9D6DE82963E9}"/>
+              </a:ext>
+            </a:extLst>
+          </p:cNvPr>
+          <p:cNvCxnSpPr>
+            <a:cxnSpLocks/>
+            <a:endCxn id="45" idx="5"/>
+          </p:cNvCxnSpPr>
+          <p:nvPr/>
+        </p:nvCxnSpPr>
+        <p:spPr>
+          <a:xfrm flipH="1" flipV="1">
+            <a:off x="6480261" y="3506173"/>
+            <a:ext cx="2944368" cy="0"/>
+          </a:xfrm>
+          <a:prstGeom prst="straightConnector1">
+            <a:avLst/>
+          </a:prstGeom>
+          <a:ln w="31750">
+            <a:gradFill>
+              <a:gsLst>
+                <a:gs pos="0">
+                  <a:schemeClr val="bg1"/>
+                </a:gs>
+                <a:gs pos="100000">
+                  <a:srgbClr val="B70703"/>
+                </a:gs>
+              </a:gsLst>
+              <a:lin ang="0" scaled="0"/>
+            </a:gradFill>
+            <a:tailEnd type="none"/>
+          </a:ln>
+        </p:spPr>
+        <p:style>
+          <a:lnRef idx="1">
+            <a:schemeClr val="accent1"/>
+          </a:lnRef>
+          <a:fillRef idx="0">
+            <a:schemeClr val="accent1"/>
+          </a:fillRef>
+          <a:effectRef idx="0">
+            <a:schemeClr val="accent1"/>
+          </a:effectRef>
+          <a:fontRef idx="minor">
+            <a:schemeClr val="tx1"/>
+          </a:fontRef>
+        </p:style>
+      </p:cxnSp>
     </p:spTree>
     <p:extLst>
       <p:ext uri="{BB962C8B-B14F-4D97-AF65-F5344CB8AC3E}">
-        <p14:creationId xmlns:p14="http://schemas.microsoft.com/office/powerpoint/2010/main" val="3546969742"/>
+        <p14:creationId xmlns:p14="http://schemas.microsoft.com/office/powerpoint/2010/main" val="3682862473"/>
       </p:ext>
     </p:extLst>
   </p:cSld>
@@ -9996,7 +10133,7 @@
         </p:nvSpPr>
         <p:spPr>
           <a:xfrm>
-            <a:off x="5528064" y="2719254"/>
+            <a:off x="5528064" y="2551089"/>
             <a:ext cx="1115568" cy="1118950"/>
           </a:xfrm>
           <a:prstGeom prst="ellipse">
@@ -10071,7 +10208,7 @@
         </p:blipFill>
         <p:spPr>
           <a:xfrm>
-            <a:off x="5711261" y="2892139"/>
+            <a:off x="5711261" y="2723974"/>
             <a:ext cx="746070" cy="746070"/>
           </a:xfrm>
           <a:prstGeom prst="rect">
@@ -10103,8 +10240,8 @@
         </p:nvCxnSpPr>
         <p:spPr>
           <a:xfrm flipH="1" flipV="1">
-            <a:off x="2816772" y="2876683"/>
-            <a:ext cx="2874663" cy="6437"/>
+            <a:off x="2743200" y="2712820"/>
+            <a:ext cx="2948235" cy="2135"/>
           </a:xfrm>
           <a:prstGeom prst="straightConnector1">
             <a:avLst/>
@@ -10153,8 +10290,8 @@
         </p:nvSpPr>
         <p:spPr>
           <a:xfrm>
-            <a:off x="4130562" y="4300629"/>
-            <a:ext cx="3930870" cy="584775"/>
+            <a:off x="4456388" y="4165260"/>
+            <a:ext cx="3273336" cy="707886"/>
           </a:xfrm>
           <a:prstGeom prst="rect">
             <a:avLst/>
@@ -10176,7 +10313,7 @@
           <a:p>
             <a:pPr algn="ctr"/>
             <a:r>
-              <a:rPr lang="en-US" sz="1600" dirty="0">
+              <a:rPr lang="en-US" sz="2000" dirty="0">
                 <a:gradFill>
                   <a:gsLst>
                     <a:gs pos="0">
@@ -10203,7 +10340,7 @@
               <a:t>Run </a:t>
             </a:r>
             <a:r>
-              <a:rPr lang="en-US" sz="1600" b="1" dirty="0">
+              <a:rPr lang="en-US" sz="2000" b="1" dirty="0">
                 <a:gradFill>
                   <a:gsLst>
                     <a:gs pos="0">
@@ -10227,10 +10364,10 @@
                   </a:outerShdw>
                 </a:effectLst>
               </a:rPr>
-              <a:t>anywhere</a:t>
-            </a:r>
-            <a:r>
-              <a:rPr lang="en-US" sz="1600" dirty="0">
+              <a:t>locally</a:t>
+            </a:r>
+            <a:r>
+              <a:rPr lang="en-US" sz="2000" dirty="0">
                 <a:gradFill>
                   <a:gsLst>
                     <a:gs pos="0">
@@ -10254,7 +10391,145 @@
                   </a:outerShdw>
                 </a:effectLst>
               </a:rPr>
-              <a:t>. Local. Container. Kubernetes. CI/CD/GitOps pipeline.</a:t>
+              <a:t> or in </a:t>
+            </a:r>
+            <a:r>
+              <a:rPr lang="en-US" sz="2000" b="1" dirty="0">
+                <a:gradFill>
+                  <a:gsLst>
+                    <a:gs pos="0">
+                      <a:schemeClr val="accent4">
+                        <a:lumMod val="20000"/>
+                        <a:lumOff val="80000"/>
+                      </a:schemeClr>
+                    </a:gs>
+                    <a:gs pos="99000">
+                      <a:schemeClr val="bg1"/>
+                    </a:gs>
+                  </a:gsLst>
+                  <a:lin ang="0" scaled="0"/>
+                </a:gradFill>
+                <a:effectLst>
+                  <a:outerShdw blurRad="50800" dist="38100" dir="2700000" algn="tl" rotWithShape="0">
+                    <a:schemeClr val="accent4">
+                      <a:lumMod val="75000"/>
+                      <a:alpha val="40000"/>
+                    </a:schemeClr>
+                  </a:outerShdw>
+                </a:effectLst>
+              </a:rPr>
+              <a:t>Kubernetes</a:t>
+            </a:r>
+            <a:r>
+              <a:rPr lang="en-US" sz="2000" dirty="0">
+                <a:gradFill>
+                  <a:gsLst>
+                    <a:gs pos="0">
+                      <a:schemeClr val="accent4">
+                        <a:lumMod val="20000"/>
+                        <a:lumOff val="80000"/>
+                      </a:schemeClr>
+                    </a:gs>
+                    <a:gs pos="99000">
+                      <a:schemeClr val="bg1"/>
+                    </a:gs>
+                  </a:gsLst>
+                  <a:lin ang="0" scaled="0"/>
+                </a:gradFill>
+                <a:effectLst>
+                  <a:outerShdw blurRad="50800" dist="38100" dir="2700000" algn="tl" rotWithShape="0">
+                    <a:schemeClr val="accent4">
+                      <a:lumMod val="75000"/>
+                      <a:alpha val="40000"/>
+                    </a:schemeClr>
+                  </a:outerShdw>
+                </a:effectLst>
+              </a:rPr>
+              <a:t> </a:t>
+            </a:r>
+          </a:p>
+          <a:p>
+            <a:pPr algn="ctr"/>
+            <a:r>
+              <a:rPr lang="en-US" sz="2000" b="1" dirty="0">
+                <a:gradFill>
+                  <a:gsLst>
+                    <a:gs pos="0">
+                      <a:schemeClr val="accent4">
+                        <a:lumMod val="20000"/>
+                        <a:lumOff val="80000"/>
+                      </a:schemeClr>
+                    </a:gs>
+                    <a:gs pos="99000">
+                      <a:schemeClr val="bg1"/>
+                    </a:gs>
+                  </a:gsLst>
+                  <a:lin ang="0" scaled="0"/>
+                </a:gradFill>
+                <a:effectLst>
+                  <a:outerShdw blurRad="50800" dist="38100" dir="2700000" algn="tl" rotWithShape="0">
+                    <a:schemeClr val="accent4">
+                      <a:lumMod val="75000"/>
+                      <a:alpha val="40000"/>
+                    </a:schemeClr>
+                  </a:outerShdw>
+                </a:effectLst>
+              </a:rPr>
+              <a:t>Notifications </a:t>
+            </a:r>
+            <a:r>
+              <a:rPr lang="en-US" sz="2000" dirty="0">
+                <a:gradFill>
+                  <a:gsLst>
+                    <a:gs pos="0">
+                      <a:schemeClr val="accent4">
+                        <a:lumMod val="20000"/>
+                        <a:lumOff val="80000"/>
+                      </a:schemeClr>
+                    </a:gs>
+                    <a:gs pos="99000">
+                      <a:schemeClr val="bg1"/>
+                    </a:gs>
+                  </a:gsLst>
+                  <a:lin ang="0" scaled="0"/>
+                </a:gradFill>
+                <a:effectLst>
+                  <a:outerShdw blurRad="50800" dist="38100" dir="2700000" algn="tl" rotWithShape="0">
+                    <a:schemeClr val="accent4">
+                      <a:lumMod val="75000"/>
+                      <a:alpha val="40000"/>
+                    </a:schemeClr>
+                  </a:outerShdw>
+                </a:effectLst>
+              </a:rPr>
+              <a:t>&amp;</a:t>
+            </a:r>
+            <a:r>
+              <a:rPr lang="en-US" sz="2000" b="1" dirty="0">
+                <a:gradFill>
+                  <a:gsLst>
+                    <a:gs pos="0">
+                      <a:schemeClr val="accent4">
+                        <a:lumMod val="20000"/>
+                        <a:lumOff val="80000"/>
+                      </a:schemeClr>
+                    </a:gs>
+                    <a:gs pos="99000">
+                      <a:schemeClr val="bg1"/>
+                    </a:gs>
+                  </a:gsLst>
+                  <a:lin ang="0" scaled="0"/>
+                </a:gradFill>
+                <a:effectLst>
+                  <a:outerShdw blurRad="50800" dist="38100" dir="2700000" algn="tl" rotWithShape="0">
+                    <a:schemeClr val="accent4">
+                      <a:lumMod val="75000"/>
+                      <a:alpha val="40000"/>
+                    </a:schemeClr>
+                  </a:outerShdw>
+                </a:effectLst>
+              </a:rPr>
+              <a:t> Reporting</a:t>
             </a:r>
           </a:p>
         </p:txBody>
@@ -10271,14 +10546,13 @@
           <p:cNvCxnSpPr>
             <a:cxnSpLocks/>
             <a:stCxn id="45" idx="4"/>
-            <a:endCxn id="86" idx="0"/>
           </p:cNvCxnSpPr>
           <p:nvPr/>
         </p:nvCxnSpPr>
         <p:spPr>
           <a:xfrm>
-            <a:off x="6085848" y="3838204"/>
-            <a:ext cx="10149" cy="462425"/>
+            <a:off x="6085848" y="3670039"/>
+            <a:ext cx="0" cy="475141"/>
           </a:xfrm>
           <a:prstGeom prst="straightConnector1">
             <a:avLst/>
@@ -10325,7 +10599,7 @@
         </p:nvCxnSpPr>
         <p:spPr>
           <a:xfrm flipH="1">
-            <a:off x="4726272" y="4278346"/>
+            <a:off x="4737976" y="4145180"/>
             <a:ext cx="2716047" cy="0"/>
           </a:xfrm>
           <a:prstGeom prst="straightConnector1">
@@ -10364,59 +10638,6 @@
           </a:fontRef>
         </p:style>
       </p:cxnSp>
-      <p:cxnSp>
-        <p:nvCxnSpPr>
-          <p:cNvPr id="33" name="Straight Arrow Connector 32">
-            <a:extLst>
-              <a:ext uri="{FF2B5EF4-FFF2-40B4-BE49-F238E27FC236}">
-                <a16:creationId xmlns:a16="http://schemas.microsoft.com/office/drawing/2014/main" id="{FD43408C-8FD1-2A45-BAFA-7C30E55C1B43}"/>
-              </a:ext>
-            </a:extLst>
-          </p:cNvPr>
-          <p:cNvCxnSpPr>
-            <a:cxnSpLocks/>
-            <a:stCxn id="45" idx="5"/>
-          </p:cNvCxnSpPr>
-          <p:nvPr/>
-        </p:nvCxnSpPr>
-        <p:spPr>
-          <a:xfrm>
-            <a:off x="6480261" y="3674338"/>
-            <a:ext cx="2793477" cy="0"/>
-          </a:xfrm>
-          <a:prstGeom prst="straightConnector1">
-            <a:avLst/>
-          </a:prstGeom>
-          <a:ln w="31750">
-            <a:gradFill>
-              <a:gsLst>
-                <a:gs pos="0">
-                  <a:schemeClr val="bg1"/>
-                </a:gs>
-                <a:gs pos="100000">
-                  <a:srgbClr val="B70703"/>
-                </a:gs>
-              </a:gsLst>
-              <a:lin ang="0" scaled="0"/>
-            </a:gradFill>
-            <a:tailEnd type="none"/>
-          </a:ln>
-        </p:spPr>
-        <p:style>
-          <a:lnRef idx="1">
-            <a:schemeClr val="accent1"/>
-          </a:lnRef>
-          <a:fillRef idx="0">
-            <a:schemeClr val="accent1"/>
-          </a:fillRef>
-          <a:effectRef idx="0">
-            <a:schemeClr val="accent1"/>
-          </a:effectRef>
-          <a:fontRef idx="minor">
-            <a:schemeClr val="tx1"/>
-          </a:fontRef>
-        </p:style>
-      </p:cxnSp>
       <p:sp>
         <p:nvSpPr>
           <p:cNvPr id="21" name="TextBox 20">
@@ -10431,8 +10652,8 @@
         </p:nvSpPr>
         <p:spPr>
           <a:xfrm>
-            <a:off x="2712578" y="2889486"/>
-            <a:ext cx="1838401" cy="584775"/>
+            <a:off x="2650292" y="2725465"/>
+            <a:ext cx="2436343" cy="707886"/>
           </a:xfrm>
           <a:prstGeom prst="rect">
             <a:avLst/>
@@ -10453,7 +10674,7 @@
           <a:lstStyle/>
           <a:p>
             <a:r>
-              <a:rPr lang="en-US" sz="1600" b="1" dirty="0">
+              <a:rPr lang="en-US" sz="2000" b="1" dirty="0">
                 <a:gradFill>
                   <a:gsLst>
                     <a:gs pos="0">
@@ -10477,12 +10698,12 @@
                   </a:outerShdw>
                 </a:effectLst>
               </a:rPr>
-              <a:t>Load testing/SLOs</a:t>
-            </a:r>
-          </a:p>
-          <a:p>
-            <a:r>
-              <a:rPr lang="en-US" sz="1600" dirty="0">
+              <a:t>Load testing</a:t>
+            </a:r>
+          </a:p>
+          <a:p>
+            <a:r>
+              <a:rPr lang="en-US" sz="2000" dirty="0">
                 <a:gradFill>
                   <a:gsLst>
                     <a:gs pos="0">
@@ -10506,7 +10727,7 @@
                   </a:outerShdw>
                 </a:effectLst>
               </a:rPr>
-              <a:t>with built-in metrics</a:t>
+              <a:t>with SLO validation</a:t>
             </a:r>
           </a:p>
         </p:txBody>
@@ -10525,8 +10746,8 @@
         </p:nvSpPr>
         <p:spPr>
           <a:xfrm>
-            <a:off x="7262272" y="3068282"/>
-            <a:ext cx="2011466" cy="584775"/>
+            <a:off x="6826829" y="2777831"/>
+            <a:ext cx="2596059" cy="707886"/>
           </a:xfrm>
           <a:prstGeom prst="rect">
             <a:avLst/>
@@ -10548,7 +10769,7 @@
           <a:p>
             <a:pPr algn="r"/>
             <a:r>
-              <a:rPr lang="en-US" sz="1600" b="1" dirty="0">
+              <a:rPr lang="en-US" sz="2000" b="1" dirty="0">
                 <a:gradFill>
                   <a:gsLst>
                     <a:gs pos="0">
@@ -10578,7 +10799,7 @@
           <a:p>
             <a:pPr algn="r"/>
             <a:r>
-              <a:rPr lang="en-US" sz="1600" dirty="0">
+              <a:rPr lang="en-US" sz="2000" dirty="0">
                 <a:gradFill>
                   <a:gsLst>
                     <a:gs pos="0">
@@ -10602,7 +10823,7 @@
                   </a:outerShdw>
                 </a:effectLst>
               </a:rPr>
-              <a:t>with business metrics</a:t>
+              <a:t>for business growth</a:t>
             </a:r>
           </a:p>
         </p:txBody>
@@ -10623,8 +10844,8 @@
         </p:nvCxnSpPr>
         <p:spPr>
           <a:xfrm>
-            <a:off x="6079398" y="2273607"/>
-            <a:ext cx="4897" cy="442895"/>
+            <a:off x="6079398" y="2105442"/>
+            <a:ext cx="0" cy="442895"/>
           </a:xfrm>
           <a:prstGeom prst="straightConnector1">
             <a:avLst/>
@@ -10671,7 +10892,7 @@
         </p:nvCxnSpPr>
         <p:spPr>
           <a:xfrm flipH="1">
-            <a:off x="4721374" y="2273607"/>
+            <a:off x="4721374" y="2105442"/>
             <a:ext cx="2716047" cy="0"/>
           </a:xfrm>
           <a:prstGeom prst="straightConnector1">
@@ -10724,8 +10945,8 @@
         </p:nvSpPr>
         <p:spPr>
           <a:xfrm>
-            <a:off x="4046484" y="1899037"/>
-            <a:ext cx="4078014" cy="338554"/>
+            <a:off x="3677551" y="1696796"/>
+            <a:ext cx="4795573" cy="400110"/>
           </a:xfrm>
           <a:prstGeom prst="rect">
             <a:avLst/>
@@ -10747,7 +10968,7 @@
           <a:p>
             <a:pPr algn="ctr"/>
             <a:r>
-              <a:rPr lang="en-US" sz="1600" dirty="0">
+              <a:rPr lang="en-US" sz="2000" dirty="0">
                 <a:gradFill>
                   <a:gsLst>
                     <a:gs pos="0">
@@ -10774,7 +10995,7 @@
               <a:t>Use with </a:t>
             </a:r>
             <a:r>
-              <a:rPr lang="en-US" sz="1600" b="1" dirty="0">
+              <a:rPr lang="en-US" sz="2000" b="1" dirty="0">
                 <a:gradFill>
                   <a:gsLst>
                     <a:gs pos="0">
@@ -10801,7 +11022,7 @@
               <a:t>any </a:t>
             </a:r>
             <a:r>
-              <a:rPr lang="en-US" sz="1600" dirty="0">
+              <a:rPr lang="en-US" sz="2000" dirty="0">
                 <a:gradFill>
                   <a:gsLst>
                     <a:gs pos="0">
@@ -10825,15 +11046,68 @@
                   </a:outerShdw>
                 </a:effectLst>
               </a:rPr>
-              <a:t>app/serverless/ML framework. </a:t>
-            </a:r>
-          </a:p>
-        </p:txBody>
-      </p:sp>
+              <a:t>app/serverless/ML framework</a:t>
+            </a:r>
+          </a:p>
+        </p:txBody>
+      </p:sp>
+      <p:cxnSp>
+        <p:nvCxnSpPr>
+          <p:cNvPr id="17" name="Straight Arrow Connector 16">
+            <a:extLst>
+              <a:ext uri="{FF2B5EF4-FFF2-40B4-BE49-F238E27FC236}">
+                <a16:creationId xmlns:a16="http://schemas.microsoft.com/office/drawing/2014/main" id="{1F33487F-230E-394B-AC71-9D6DE82963E9}"/>
+              </a:ext>
+            </a:extLst>
+          </p:cNvPr>
+          <p:cNvCxnSpPr>
+            <a:cxnSpLocks/>
+            <a:endCxn id="45" idx="5"/>
+          </p:cNvCxnSpPr>
+          <p:nvPr/>
+        </p:nvCxnSpPr>
+        <p:spPr>
+          <a:xfrm flipH="1" flipV="1">
+            <a:off x="6480261" y="3506173"/>
+            <a:ext cx="2944368" cy="0"/>
+          </a:xfrm>
+          <a:prstGeom prst="straightConnector1">
+            <a:avLst/>
+          </a:prstGeom>
+          <a:ln w="31750">
+            <a:gradFill>
+              <a:gsLst>
+                <a:gs pos="0">
+                  <a:schemeClr val="bg1"/>
+                </a:gs>
+                <a:gs pos="100000">
+                  <a:srgbClr val="B70703"/>
+                </a:gs>
+              </a:gsLst>
+              <a:lin ang="0" scaled="0"/>
+            </a:gradFill>
+            <a:tailEnd type="none"/>
+          </a:ln>
+        </p:spPr>
+        <p:style>
+          <a:lnRef idx="1">
+            <a:schemeClr val="accent1"/>
+          </a:lnRef>
+          <a:fillRef idx="0">
+            <a:schemeClr val="accent1"/>
+          </a:fillRef>
+          <a:effectRef idx="0">
+            <a:schemeClr val="accent1"/>
+          </a:effectRef>
+          <a:fontRef idx="minor">
+            <a:schemeClr val="tx1"/>
+          </a:fontRef>
+        </p:style>
+      </p:cxnSp>
     </p:spTree>
     <p:extLst>
       <p:ext uri="{BB962C8B-B14F-4D97-AF65-F5344CB8AC3E}">
-        <p14:creationId xmlns:p14="http://schemas.microsoft.com/office/powerpoint/2010/main" val="2058438647"/>
+        <p14:creationId xmlns:p14="http://schemas.microsoft.com/office/powerpoint/2010/main" val="3248554908"/>
       </p:ext>
     </p:extLst>
   </p:cSld>

</xml_diff>

<commit_message>
Landing page improvements (#1099)
* cleaned up landing page

Signed-off-by: Srinivasan Parthasarathy <spartha@us.ibm.com>

* fixed cmddocs

Signed-off-by: Srinivasan Parthasarathy <spartha@us.ibm.com>
</commit_message>
<xml_diff>
--- a/mkdocs/docs/images/src/illustration.pptx
+++ b/mkdocs/docs/images/src/illustration.pptx
@@ -13,8 +13,8 @@
     <p:sldId id="376" r:id="rId4"/>
     <p:sldId id="378" r:id="rId5"/>
     <p:sldId id="379" r:id="rId6"/>
-    <p:sldId id="385" r:id="rId7"/>
-    <p:sldId id="386" r:id="rId8"/>
+    <p:sldId id="386" r:id="rId7"/>
+    <p:sldId id="387" r:id="rId8"/>
   </p:sldIdLst>
   <p:sldSz cx="12192000" cy="6858000"/>
   <p:notesSz cx="6858000" cy="9144000"/>
@@ -203,7 +203,7 @@
           <a:p>
             <a:fld id="{38B78CBE-37FA-D241-BB4C-CAC5D3B25F49}" type="datetimeFigureOut">
               <a:rPr lang="en-US" smtClean="0"/>
-              <a:t>12/15/21</a:t>
+              <a:t>12/17/21</a:t>
             </a:fld>
             <a:endParaRPr lang="en-US"/>
           </a:p>
@@ -964,7 +964,7 @@
     </p:spTree>
     <p:extLst>
       <p:ext uri="{BB962C8B-B14F-4D97-AF65-F5344CB8AC3E}">
-        <p14:creationId xmlns:p14="http://schemas.microsoft.com/office/powerpoint/2010/main" val="3283311487"/>
+        <p14:creationId xmlns:p14="http://schemas.microsoft.com/office/powerpoint/2010/main" val="1572782677"/>
       </p:ext>
     </p:extLst>
   </p:cSld>
@@ -1048,7 +1048,7 @@
     </p:spTree>
     <p:extLst>
       <p:ext uri="{BB962C8B-B14F-4D97-AF65-F5344CB8AC3E}">
-        <p14:creationId xmlns:p14="http://schemas.microsoft.com/office/powerpoint/2010/main" val="4259050774"/>
+        <p14:creationId xmlns:p14="http://schemas.microsoft.com/office/powerpoint/2010/main" val="178661305"/>
       </p:ext>
     </p:extLst>
   </p:cSld>
@@ -1205,7 +1205,7 @@
           <a:p>
             <a:fld id="{708812C5-0212-FD42-A0D4-E2E8FF4E3AF5}" type="datetime1">
               <a:rPr lang="en-US" smtClean="0"/>
-              <a:t>12/15/21</a:t>
+              <a:t>12/17/21</a:t>
             </a:fld>
             <a:endParaRPr lang="en-US"/>
           </a:p>
@@ -1406,7 +1406,7 @@
           <a:p>
             <a:fld id="{D232AC6F-41C3-B34B-9BAA-03ED2F3BC0F6}" type="datetime1">
               <a:rPr lang="en-US" smtClean="0"/>
-              <a:t>12/15/21</a:t>
+              <a:t>12/17/21</a:t>
             </a:fld>
             <a:endParaRPr lang="en-US"/>
           </a:p>
@@ -1617,7 +1617,7 @@
           <a:p>
             <a:fld id="{BEE140C2-F440-9D49-95CB-5965D64CC4A2}" type="datetime1">
               <a:rPr lang="en-US" smtClean="0"/>
-              <a:t>12/15/21</a:t>
+              <a:t>12/17/21</a:t>
             </a:fld>
             <a:endParaRPr lang="en-US"/>
           </a:p>
@@ -1818,7 +1818,7 @@
           <a:p>
             <a:fld id="{CC99F980-FB29-FD47-8508-150F73F1E8B0}" type="datetime1">
               <a:rPr lang="en-US" smtClean="0"/>
-              <a:t>12/15/21</a:t>
+              <a:t>12/17/21</a:t>
             </a:fld>
             <a:endParaRPr lang="en-US"/>
           </a:p>
@@ -2096,7 +2096,7 @@
           <a:p>
             <a:fld id="{D4510983-EA22-9643-8AC0-B3C6499B643B}" type="datetime1">
               <a:rPr lang="en-US" smtClean="0"/>
-              <a:t>12/15/21</a:t>
+              <a:t>12/17/21</a:t>
             </a:fld>
             <a:endParaRPr lang="en-US"/>
           </a:p>
@@ -2364,7 +2364,7 @@
           <a:p>
             <a:fld id="{D5A39195-967D-5D4E-8C6A-C99866996458}" type="datetime1">
               <a:rPr lang="en-US" smtClean="0"/>
-              <a:t>12/15/21</a:t>
+              <a:t>12/17/21</a:t>
             </a:fld>
             <a:endParaRPr lang="en-US"/>
           </a:p>
@@ -2779,7 +2779,7 @@
           <a:p>
             <a:fld id="{5AD771E9-C79D-684D-A158-5EB6E92DE947}" type="datetime1">
               <a:rPr lang="en-US" smtClean="0"/>
-              <a:t>12/15/21</a:t>
+              <a:t>12/17/21</a:t>
             </a:fld>
             <a:endParaRPr lang="en-US"/>
           </a:p>
@@ -2923,7 +2923,7 @@
           <a:p>
             <a:fld id="{693CA161-7E4C-5C4B-B799-DB602A0B9806}" type="datetime1">
               <a:rPr lang="en-US" smtClean="0"/>
-              <a:t>12/15/21</a:t>
+              <a:t>12/17/21</a:t>
             </a:fld>
             <a:endParaRPr lang="en-US"/>
           </a:p>
@@ -3039,7 +3039,7 @@
           <a:p>
             <a:fld id="{6D55FDF3-8BB2-6349-A5FA-057F3D78953D}" type="datetime1">
               <a:rPr lang="en-US" smtClean="0"/>
-              <a:t>12/15/21</a:t>
+              <a:t>12/17/21</a:t>
             </a:fld>
             <a:endParaRPr lang="en-US"/>
           </a:p>
@@ -3353,7 +3353,7 @@
           <a:p>
             <a:fld id="{EEDFACC0-3228-BA4B-942E-CEF38B0101FD}" type="datetime1">
               <a:rPr lang="en-US" smtClean="0"/>
-              <a:t>12/15/21</a:t>
+              <a:t>12/17/21</a:t>
             </a:fld>
             <a:endParaRPr lang="en-US"/>
           </a:p>
@@ -3644,7 +3644,7 @@
           <a:p>
             <a:fld id="{07EEEDBE-E24C-D140-B419-6D8D592D0F1C}" type="datetime1">
               <a:rPr lang="en-US" smtClean="0"/>
-              <a:t>12/15/21</a:t>
+              <a:t>12/17/21</a:t>
             </a:fld>
             <a:endParaRPr lang="en-US"/>
           </a:p>
@@ -3888,7 +3888,7 @@
           <a:p>
             <a:fld id="{E05781A2-A5EF-C54C-A3EF-F62483D37EDC}" type="datetime1">
               <a:rPr lang="en-US" smtClean="0"/>
-              <a:t>12/15/21</a:t>
+              <a:t>12/17/21</a:t>
             </a:fld>
             <a:endParaRPr lang="en-US"/>
           </a:p>
@@ -9045,8 +9045,8 @@
         </p:nvSpPr>
         <p:spPr>
           <a:xfrm>
-            <a:off x="2438397" y="1639614"/>
-            <a:ext cx="7315200" cy="3447393"/>
+            <a:off x="2438397" y="1639613"/>
+            <a:ext cx="7315204" cy="3321269"/>
           </a:xfrm>
           <a:prstGeom prst="roundRect">
             <a:avLst/>
@@ -9116,7 +9116,7 @@
         </p:nvSpPr>
         <p:spPr>
           <a:xfrm>
-            <a:off x="5528064" y="2719254"/>
+            <a:off x="5528064" y="2551089"/>
             <a:ext cx="1115568" cy="1118950"/>
           </a:xfrm>
           <a:prstGeom prst="ellipse">
@@ -9191,7 +9191,7 @@
         </p:blipFill>
         <p:spPr>
           <a:xfrm>
-            <a:off x="5711261" y="2892139"/>
+            <a:off x="5711261" y="2723974"/>
             <a:ext cx="746070" cy="746070"/>
           </a:xfrm>
           <a:prstGeom prst="rect">
@@ -9223,8 +9223,8 @@
         </p:nvCxnSpPr>
         <p:spPr>
           <a:xfrm flipH="1" flipV="1">
-            <a:off x="2816772" y="2876683"/>
-            <a:ext cx="2874663" cy="6437"/>
+            <a:off x="2743200" y="2712820"/>
+            <a:ext cx="2948235" cy="2135"/>
           </a:xfrm>
           <a:prstGeom prst="straightConnector1">
             <a:avLst/>
@@ -9273,8 +9273,8 @@
         </p:nvSpPr>
         <p:spPr>
           <a:xfrm>
-            <a:off x="4130562" y="4300629"/>
-            <a:ext cx="3930870" cy="584775"/>
+            <a:off x="4456388" y="4165260"/>
+            <a:ext cx="3273336" cy="707886"/>
           </a:xfrm>
           <a:prstGeom prst="rect">
             <a:avLst/>
@@ -9296,7 +9296,7 @@
           <a:p>
             <a:pPr algn="ctr"/>
             <a:r>
-              <a:rPr lang="en-US" sz="1600" dirty="0">
+              <a:rPr lang="en-US" sz="2000" dirty="0">
                 <a:gradFill>
                   <a:gsLst>
                     <a:gs pos="0">
@@ -9323,7 +9323,7 @@
               <a:t>Run </a:t>
             </a:r>
             <a:r>
-              <a:rPr lang="en-US" sz="1600" b="1" dirty="0">
+              <a:rPr lang="en-US" sz="2000" b="1" dirty="0">
                 <a:gradFill>
                   <a:gsLst>
                     <a:gs pos="0">
@@ -9347,10 +9347,10 @@
                   </a:outerShdw>
                 </a:effectLst>
               </a:rPr>
-              <a:t>anywhere</a:t>
-            </a:r>
-            <a:r>
-              <a:rPr lang="en-US" sz="1600" dirty="0">
+              <a:t>locally</a:t>
+            </a:r>
+            <a:r>
+              <a:rPr lang="en-US" sz="2000" dirty="0">
                 <a:gradFill>
                   <a:gsLst>
                     <a:gs pos="0">
@@ -9374,7 +9374,145 @@
                   </a:outerShdw>
                 </a:effectLst>
               </a:rPr>
-              <a:t>. Local. Container. Kubernetes. CI/CD/GitOps pipeline.</a:t>
+              <a:t> or in </a:t>
+            </a:r>
+            <a:r>
+              <a:rPr lang="en-US" sz="2000" b="1" dirty="0">
+                <a:gradFill>
+                  <a:gsLst>
+                    <a:gs pos="0">
+                      <a:schemeClr val="accent4">
+                        <a:lumMod val="20000"/>
+                        <a:lumOff val="80000"/>
+                      </a:schemeClr>
+                    </a:gs>
+                    <a:gs pos="99000">
+                      <a:schemeClr val="bg1"/>
+                    </a:gs>
+                  </a:gsLst>
+                  <a:lin ang="0" scaled="0"/>
+                </a:gradFill>
+                <a:effectLst>
+                  <a:outerShdw blurRad="50800" dist="38100" dir="2700000" algn="tl" rotWithShape="0">
+                    <a:schemeClr val="accent4">
+                      <a:lumMod val="75000"/>
+                      <a:alpha val="40000"/>
+                    </a:schemeClr>
+                  </a:outerShdw>
+                </a:effectLst>
+              </a:rPr>
+              <a:t>Kubernetes</a:t>
+            </a:r>
+            <a:r>
+              <a:rPr lang="en-US" sz="2000" dirty="0">
+                <a:gradFill>
+                  <a:gsLst>
+                    <a:gs pos="0">
+                      <a:schemeClr val="accent4">
+                        <a:lumMod val="20000"/>
+                        <a:lumOff val="80000"/>
+                      </a:schemeClr>
+                    </a:gs>
+                    <a:gs pos="99000">
+                      <a:schemeClr val="bg1"/>
+                    </a:gs>
+                  </a:gsLst>
+                  <a:lin ang="0" scaled="0"/>
+                </a:gradFill>
+                <a:effectLst>
+                  <a:outerShdw blurRad="50800" dist="38100" dir="2700000" algn="tl" rotWithShape="0">
+                    <a:schemeClr val="accent4">
+                      <a:lumMod val="75000"/>
+                      <a:alpha val="40000"/>
+                    </a:schemeClr>
+                  </a:outerShdw>
+                </a:effectLst>
+              </a:rPr>
+              <a:t> </a:t>
+            </a:r>
+          </a:p>
+          <a:p>
+            <a:pPr algn="ctr"/>
+            <a:r>
+              <a:rPr lang="en-US" sz="2000" b="1" dirty="0">
+                <a:gradFill>
+                  <a:gsLst>
+                    <a:gs pos="0">
+                      <a:schemeClr val="accent4">
+                        <a:lumMod val="20000"/>
+                        <a:lumOff val="80000"/>
+                      </a:schemeClr>
+                    </a:gs>
+                    <a:gs pos="99000">
+                      <a:schemeClr val="bg1"/>
+                    </a:gs>
+                  </a:gsLst>
+                  <a:lin ang="0" scaled="0"/>
+                </a:gradFill>
+                <a:effectLst>
+                  <a:outerShdw blurRad="50800" dist="38100" dir="2700000" algn="tl" rotWithShape="0">
+                    <a:schemeClr val="accent4">
+                      <a:lumMod val="75000"/>
+                      <a:alpha val="40000"/>
+                    </a:schemeClr>
+                  </a:outerShdw>
+                </a:effectLst>
+              </a:rPr>
+              <a:t>Notifications </a:t>
+            </a:r>
+            <a:r>
+              <a:rPr lang="en-US" sz="2000" dirty="0">
+                <a:gradFill>
+                  <a:gsLst>
+                    <a:gs pos="0">
+                      <a:schemeClr val="accent4">
+                        <a:lumMod val="20000"/>
+                        <a:lumOff val="80000"/>
+                      </a:schemeClr>
+                    </a:gs>
+                    <a:gs pos="99000">
+                      <a:schemeClr val="bg1"/>
+                    </a:gs>
+                  </a:gsLst>
+                  <a:lin ang="0" scaled="0"/>
+                </a:gradFill>
+                <a:effectLst>
+                  <a:outerShdw blurRad="50800" dist="38100" dir="2700000" algn="tl" rotWithShape="0">
+                    <a:schemeClr val="accent4">
+                      <a:lumMod val="75000"/>
+                      <a:alpha val="40000"/>
+                    </a:schemeClr>
+                  </a:outerShdw>
+                </a:effectLst>
+              </a:rPr>
+              <a:t>&amp;</a:t>
+            </a:r>
+            <a:r>
+              <a:rPr lang="en-US" sz="2000" b="1" dirty="0">
+                <a:gradFill>
+                  <a:gsLst>
+                    <a:gs pos="0">
+                      <a:schemeClr val="accent4">
+                        <a:lumMod val="20000"/>
+                        <a:lumOff val="80000"/>
+                      </a:schemeClr>
+                    </a:gs>
+                    <a:gs pos="99000">
+                      <a:schemeClr val="bg1"/>
+                    </a:gs>
+                  </a:gsLst>
+                  <a:lin ang="0" scaled="0"/>
+                </a:gradFill>
+                <a:effectLst>
+                  <a:outerShdw blurRad="50800" dist="38100" dir="2700000" algn="tl" rotWithShape="0">
+                    <a:schemeClr val="accent4">
+                      <a:lumMod val="75000"/>
+                      <a:alpha val="40000"/>
+                    </a:schemeClr>
+                  </a:outerShdw>
+                </a:effectLst>
+              </a:rPr>
+              <a:t> Reporting</a:t>
             </a:r>
           </a:p>
         </p:txBody>
@@ -9391,14 +9529,13 @@
           <p:cNvCxnSpPr>
             <a:cxnSpLocks/>
             <a:stCxn id="45" idx="4"/>
-            <a:endCxn id="86" idx="0"/>
           </p:cNvCxnSpPr>
           <p:nvPr/>
         </p:nvCxnSpPr>
         <p:spPr>
           <a:xfrm>
-            <a:off x="6085848" y="3838204"/>
-            <a:ext cx="10149" cy="462425"/>
+            <a:off x="6085848" y="3670039"/>
+            <a:ext cx="0" cy="475141"/>
           </a:xfrm>
           <a:prstGeom prst="straightConnector1">
             <a:avLst/>
@@ -9445,7 +9582,7 @@
         </p:nvCxnSpPr>
         <p:spPr>
           <a:xfrm flipH="1">
-            <a:off x="4726272" y="4278346"/>
+            <a:off x="4737976" y="4145180"/>
             <a:ext cx="2716047" cy="0"/>
           </a:xfrm>
           <a:prstGeom prst="straightConnector1">
@@ -9484,59 +9621,6 @@
           </a:fontRef>
         </p:style>
       </p:cxnSp>
-      <p:cxnSp>
-        <p:nvCxnSpPr>
-          <p:cNvPr id="33" name="Straight Arrow Connector 32">
-            <a:extLst>
-              <a:ext uri="{FF2B5EF4-FFF2-40B4-BE49-F238E27FC236}">
-                <a16:creationId xmlns:a16="http://schemas.microsoft.com/office/drawing/2014/main" id="{FD43408C-8FD1-2A45-BAFA-7C30E55C1B43}"/>
-              </a:ext>
-            </a:extLst>
-          </p:cNvPr>
-          <p:cNvCxnSpPr>
-            <a:cxnSpLocks/>
-            <a:stCxn id="45" idx="5"/>
-          </p:cNvCxnSpPr>
-          <p:nvPr/>
-        </p:nvCxnSpPr>
-        <p:spPr>
-          <a:xfrm>
-            <a:off x="6480261" y="3674338"/>
-            <a:ext cx="2793477" cy="0"/>
-          </a:xfrm>
-          <a:prstGeom prst="straightConnector1">
-            <a:avLst/>
-          </a:prstGeom>
-          <a:ln w="31750">
-            <a:gradFill>
-              <a:gsLst>
-                <a:gs pos="0">
-                  <a:schemeClr val="bg1"/>
-                </a:gs>
-                <a:gs pos="100000">
-                  <a:srgbClr val="B70703"/>
-                </a:gs>
-              </a:gsLst>
-              <a:lin ang="0" scaled="0"/>
-            </a:gradFill>
-            <a:tailEnd type="none"/>
-          </a:ln>
-        </p:spPr>
-        <p:style>
-          <a:lnRef idx="1">
-            <a:schemeClr val="accent1"/>
-          </a:lnRef>
-          <a:fillRef idx="0">
-            <a:schemeClr val="accent1"/>
-          </a:fillRef>
-          <a:effectRef idx="0">
-            <a:schemeClr val="accent1"/>
-          </a:effectRef>
-          <a:fontRef idx="minor">
-            <a:schemeClr val="tx1"/>
-          </a:fontRef>
-        </p:style>
-      </p:cxnSp>
       <p:sp>
         <p:nvSpPr>
           <p:cNvPr id="21" name="TextBox 20">
@@ -9551,8 +9635,8 @@
         </p:nvSpPr>
         <p:spPr>
           <a:xfrm>
-            <a:off x="2712578" y="2889486"/>
-            <a:ext cx="1838401" cy="584775"/>
+            <a:off x="2650292" y="2725465"/>
+            <a:ext cx="2436343" cy="707886"/>
           </a:xfrm>
           <a:prstGeom prst="rect">
             <a:avLst/>
@@ -9573,7 +9657,7 @@
           <a:lstStyle/>
           <a:p>
             <a:r>
-              <a:rPr lang="en-US" sz="1600" b="1" dirty="0">
+              <a:rPr lang="en-US" sz="2000" b="1" dirty="0">
                 <a:gradFill>
                   <a:gsLst>
                     <a:gs pos="0">
@@ -9597,12 +9681,12 @@
                   </a:outerShdw>
                 </a:effectLst>
               </a:rPr>
-              <a:t>Load testing/SLOs</a:t>
-            </a:r>
-          </a:p>
-          <a:p>
-            <a:r>
-              <a:rPr lang="en-US" sz="1600" dirty="0">
+              <a:t>Load testing</a:t>
+            </a:r>
+          </a:p>
+          <a:p>
+            <a:r>
+              <a:rPr lang="en-US" sz="2000" dirty="0">
                 <a:gradFill>
                   <a:gsLst>
                     <a:gs pos="0">
@@ -9626,7 +9710,7 @@
                   </a:outerShdw>
                 </a:effectLst>
               </a:rPr>
-              <a:t>with built-in metrics</a:t>
+              <a:t>with SLO validation</a:t>
             </a:r>
           </a:p>
         </p:txBody>
@@ -9645,8 +9729,8 @@
         </p:nvSpPr>
         <p:spPr>
           <a:xfrm>
-            <a:off x="7262272" y="3068282"/>
-            <a:ext cx="2011466" cy="584775"/>
+            <a:off x="6826829" y="2777831"/>
+            <a:ext cx="2596059" cy="707886"/>
           </a:xfrm>
           <a:prstGeom prst="rect">
             <a:avLst/>
@@ -9668,7 +9752,7 @@
           <a:p>
             <a:pPr algn="r"/>
             <a:r>
-              <a:rPr lang="en-US" sz="1600" b="1" dirty="0">
+              <a:rPr lang="en-US" sz="2000" b="1" dirty="0">
                 <a:gradFill>
                   <a:gsLst>
                     <a:gs pos="0">
@@ -9698,7 +9782,7 @@
           <a:p>
             <a:pPr algn="r"/>
             <a:r>
-              <a:rPr lang="en-US" sz="1600" dirty="0">
+              <a:rPr lang="en-US" sz="2000" dirty="0">
                 <a:gradFill>
                   <a:gsLst>
                     <a:gs pos="0">
@@ -9722,7 +9806,7 @@
                   </a:outerShdw>
                 </a:effectLst>
               </a:rPr>
-              <a:t>with business metrics</a:t>
+              <a:t>for business growth</a:t>
             </a:r>
           </a:p>
         </p:txBody>
@@ -9743,8 +9827,8 @@
         </p:nvCxnSpPr>
         <p:spPr>
           <a:xfrm>
-            <a:off x="6079398" y="2273607"/>
-            <a:ext cx="4897" cy="442895"/>
+            <a:off x="6079398" y="2105442"/>
+            <a:ext cx="0" cy="442895"/>
           </a:xfrm>
           <a:prstGeom prst="straightConnector1">
             <a:avLst/>
@@ -9791,7 +9875,7 @@
         </p:nvCxnSpPr>
         <p:spPr>
           <a:xfrm flipH="1">
-            <a:off x="4721374" y="2273607"/>
+            <a:off x="4721374" y="2105442"/>
             <a:ext cx="2716047" cy="0"/>
           </a:xfrm>
           <a:prstGeom prst="straightConnector1">
@@ -9844,8 +9928,8 @@
         </p:nvSpPr>
         <p:spPr>
           <a:xfrm>
-            <a:off x="4046484" y="1899037"/>
-            <a:ext cx="4078014" cy="338554"/>
+            <a:off x="3677551" y="1696796"/>
+            <a:ext cx="4795573" cy="400110"/>
           </a:xfrm>
           <a:prstGeom prst="rect">
             <a:avLst/>
@@ -9867,7 +9951,7 @@
           <a:p>
             <a:pPr algn="ctr"/>
             <a:r>
-              <a:rPr lang="en-US" sz="1600" dirty="0">
+              <a:rPr lang="en-US" sz="2000" dirty="0">
                 <a:gradFill>
                   <a:gsLst>
                     <a:gs pos="0">
@@ -9894,7 +9978,7 @@
               <a:t>Use with </a:t>
             </a:r>
             <a:r>
-              <a:rPr lang="en-US" sz="1600" b="1" dirty="0">
+              <a:rPr lang="en-US" sz="2000" b="1" dirty="0">
                 <a:gradFill>
                   <a:gsLst>
                     <a:gs pos="0">
@@ -9921,7 +10005,7 @@
               <a:t>any </a:t>
             </a:r>
             <a:r>
-              <a:rPr lang="en-US" sz="1600" dirty="0">
+              <a:rPr lang="en-US" sz="2000" dirty="0">
                 <a:gradFill>
                   <a:gsLst>
                     <a:gs pos="0">
@@ -9945,15 +10029,68 @@
                   </a:outerShdw>
                 </a:effectLst>
               </a:rPr>
-              <a:t>app/serverless/ML framework. </a:t>
-            </a:r>
-          </a:p>
-        </p:txBody>
-      </p:sp>
+              <a:t>app/serverless/ML framework</a:t>
+            </a:r>
+          </a:p>
+        </p:txBody>
+      </p:sp>
+      <p:cxnSp>
+        <p:nvCxnSpPr>
+          <p:cNvPr id="17" name="Straight Arrow Connector 16">
+            <a:extLst>
+              <a:ext uri="{FF2B5EF4-FFF2-40B4-BE49-F238E27FC236}">
+                <a16:creationId xmlns:a16="http://schemas.microsoft.com/office/drawing/2014/main" id="{1F33487F-230E-394B-AC71-9D6DE82963E9}"/>
+              </a:ext>
+            </a:extLst>
+          </p:cNvPr>
+          <p:cNvCxnSpPr>
+            <a:cxnSpLocks/>
+            <a:endCxn id="45" idx="5"/>
+          </p:cNvCxnSpPr>
+          <p:nvPr/>
+        </p:nvCxnSpPr>
+        <p:spPr>
+          <a:xfrm flipH="1" flipV="1">
+            <a:off x="6480261" y="3506173"/>
+            <a:ext cx="2944368" cy="0"/>
+          </a:xfrm>
+          <a:prstGeom prst="straightConnector1">
+            <a:avLst/>
+          </a:prstGeom>
+          <a:ln w="31750">
+            <a:gradFill>
+              <a:gsLst>
+                <a:gs pos="0">
+                  <a:schemeClr val="bg1"/>
+                </a:gs>
+                <a:gs pos="100000">
+                  <a:srgbClr val="B70703"/>
+                </a:gs>
+              </a:gsLst>
+              <a:lin ang="0" scaled="0"/>
+            </a:gradFill>
+            <a:tailEnd type="none"/>
+          </a:ln>
+        </p:spPr>
+        <p:style>
+          <a:lnRef idx="1">
+            <a:schemeClr val="accent1"/>
+          </a:lnRef>
+          <a:fillRef idx="0">
+            <a:schemeClr val="accent1"/>
+          </a:fillRef>
+          <a:effectRef idx="0">
+            <a:schemeClr val="accent1"/>
+          </a:effectRef>
+          <a:fontRef idx="minor">
+            <a:schemeClr val="tx1"/>
+          </a:fontRef>
+        </p:style>
+      </p:cxnSp>
     </p:spTree>
     <p:extLst>
       <p:ext uri="{BB962C8B-B14F-4D97-AF65-F5344CB8AC3E}">
-        <p14:creationId xmlns:p14="http://schemas.microsoft.com/office/powerpoint/2010/main" val="3546969742"/>
+        <p14:creationId xmlns:p14="http://schemas.microsoft.com/office/powerpoint/2010/main" val="3682862473"/>
       </p:ext>
     </p:extLst>
   </p:cSld>
@@ -9996,7 +10133,7 @@
         </p:nvSpPr>
         <p:spPr>
           <a:xfrm>
-            <a:off x="5528064" y="2719254"/>
+            <a:off x="5528064" y="2551089"/>
             <a:ext cx="1115568" cy="1118950"/>
           </a:xfrm>
           <a:prstGeom prst="ellipse">
@@ -10071,7 +10208,7 @@
         </p:blipFill>
         <p:spPr>
           <a:xfrm>
-            <a:off x="5711261" y="2892139"/>
+            <a:off x="5711261" y="2723974"/>
             <a:ext cx="746070" cy="746070"/>
           </a:xfrm>
           <a:prstGeom prst="rect">
@@ -10103,8 +10240,8 @@
         </p:nvCxnSpPr>
         <p:spPr>
           <a:xfrm flipH="1" flipV="1">
-            <a:off x="2816772" y="2876683"/>
-            <a:ext cx="2874663" cy="6437"/>
+            <a:off x="2743200" y="2712820"/>
+            <a:ext cx="2948235" cy="2135"/>
           </a:xfrm>
           <a:prstGeom prst="straightConnector1">
             <a:avLst/>
@@ -10153,8 +10290,8 @@
         </p:nvSpPr>
         <p:spPr>
           <a:xfrm>
-            <a:off x="4130562" y="4300629"/>
-            <a:ext cx="3930870" cy="584775"/>
+            <a:off x="4456388" y="4165260"/>
+            <a:ext cx="3273336" cy="707886"/>
           </a:xfrm>
           <a:prstGeom prst="rect">
             <a:avLst/>
@@ -10176,7 +10313,7 @@
           <a:p>
             <a:pPr algn="ctr"/>
             <a:r>
-              <a:rPr lang="en-US" sz="1600" dirty="0">
+              <a:rPr lang="en-US" sz="2000" dirty="0">
                 <a:gradFill>
                   <a:gsLst>
                     <a:gs pos="0">
@@ -10203,7 +10340,7 @@
               <a:t>Run </a:t>
             </a:r>
             <a:r>
-              <a:rPr lang="en-US" sz="1600" b="1" dirty="0">
+              <a:rPr lang="en-US" sz="2000" b="1" dirty="0">
                 <a:gradFill>
                   <a:gsLst>
                     <a:gs pos="0">
@@ -10227,10 +10364,10 @@
                   </a:outerShdw>
                 </a:effectLst>
               </a:rPr>
-              <a:t>anywhere</a:t>
-            </a:r>
-            <a:r>
-              <a:rPr lang="en-US" sz="1600" dirty="0">
+              <a:t>locally</a:t>
+            </a:r>
+            <a:r>
+              <a:rPr lang="en-US" sz="2000" dirty="0">
                 <a:gradFill>
                   <a:gsLst>
                     <a:gs pos="0">
@@ -10254,7 +10391,145 @@
                   </a:outerShdw>
                 </a:effectLst>
               </a:rPr>
-              <a:t>. Local. Container. Kubernetes. CI/CD/GitOps pipeline.</a:t>
+              <a:t> or in </a:t>
+            </a:r>
+            <a:r>
+              <a:rPr lang="en-US" sz="2000" b="1" dirty="0">
+                <a:gradFill>
+                  <a:gsLst>
+                    <a:gs pos="0">
+                      <a:schemeClr val="accent4">
+                        <a:lumMod val="20000"/>
+                        <a:lumOff val="80000"/>
+                      </a:schemeClr>
+                    </a:gs>
+                    <a:gs pos="99000">
+                      <a:schemeClr val="bg1"/>
+                    </a:gs>
+                  </a:gsLst>
+                  <a:lin ang="0" scaled="0"/>
+                </a:gradFill>
+                <a:effectLst>
+                  <a:outerShdw blurRad="50800" dist="38100" dir="2700000" algn="tl" rotWithShape="0">
+                    <a:schemeClr val="accent4">
+                      <a:lumMod val="75000"/>
+                      <a:alpha val="40000"/>
+                    </a:schemeClr>
+                  </a:outerShdw>
+                </a:effectLst>
+              </a:rPr>
+              <a:t>Kubernetes</a:t>
+            </a:r>
+            <a:r>
+              <a:rPr lang="en-US" sz="2000" dirty="0">
+                <a:gradFill>
+                  <a:gsLst>
+                    <a:gs pos="0">
+                      <a:schemeClr val="accent4">
+                        <a:lumMod val="20000"/>
+                        <a:lumOff val="80000"/>
+                      </a:schemeClr>
+                    </a:gs>
+                    <a:gs pos="99000">
+                      <a:schemeClr val="bg1"/>
+                    </a:gs>
+                  </a:gsLst>
+                  <a:lin ang="0" scaled="0"/>
+                </a:gradFill>
+                <a:effectLst>
+                  <a:outerShdw blurRad="50800" dist="38100" dir="2700000" algn="tl" rotWithShape="0">
+                    <a:schemeClr val="accent4">
+                      <a:lumMod val="75000"/>
+                      <a:alpha val="40000"/>
+                    </a:schemeClr>
+                  </a:outerShdw>
+                </a:effectLst>
+              </a:rPr>
+              <a:t> </a:t>
+            </a:r>
+          </a:p>
+          <a:p>
+            <a:pPr algn="ctr"/>
+            <a:r>
+              <a:rPr lang="en-US" sz="2000" b="1" dirty="0">
+                <a:gradFill>
+                  <a:gsLst>
+                    <a:gs pos="0">
+                      <a:schemeClr val="accent4">
+                        <a:lumMod val="20000"/>
+                        <a:lumOff val="80000"/>
+                      </a:schemeClr>
+                    </a:gs>
+                    <a:gs pos="99000">
+                      <a:schemeClr val="bg1"/>
+                    </a:gs>
+                  </a:gsLst>
+                  <a:lin ang="0" scaled="0"/>
+                </a:gradFill>
+                <a:effectLst>
+                  <a:outerShdw blurRad="50800" dist="38100" dir="2700000" algn="tl" rotWithShape="0">
+                    <a:schemeClr val="accent4">
+                      <a:lumMod val="75000"/>
+                      <a:alpha val="40000"/>
+                    </a:schemeClr>
+                  </a:outerShdw>
+                </a:effectLst>
+              </a:rPr>
+              <a:t>Notifications </a:t>
+            </a:r>
+            <a:r>
+              <a:rPr lang="en-US" sz="2000" dirty="0">
+                <a:gradFill>
+                  <a:gsLst>
+                    <a:gs pos="0">
+                      <a:schemeClr val="accent4">
+                        <a:lumMod val="20000"/>
+                        <a:lumOff val="80000"/>
+                      </a:schemeClr>
+                    </a:gs>
+                    <a:gs pos="99000">
+                      <a:schemeClr val="bg1"/>
+                    </a:gs>
+                  </a:gsLst>
+                  <a:lin ang="0" scaled="0"/>
+                </a:gradFill>
+                <a:effectLst>
+                  <a:outerShdw blurRad="50800" dist="38100" dir="2700000" algn="tl" rotWithShape="0">
+                    <a:schemeClr val="accent4">
+                      <a:lumMod val="75000"/>
+                      <a:alpha val="40000"/>
+                    </a:schemeClr>
+                  </a:outerShdw>
+                </a:effectLst>
+              </a:rPr>
+              <a:t>&amp;</a:t>
+            </a:r>
+            <a:r>
+              <a:rPr lang="en-US" sz="2000" b="1" dirty="0">
+                <a:gradFill>
+                  <a:gsLst>
+                    <a:gs pos="0">
+                      <a:schemeClr val="accent4">
+                        <a:lumMod val="20000"/>
+                        <a:lumOff val="80000"/>
+                      </a:schemeClr>
+                    </a:gs>
+                    <a:gs pos="99000">
+                      <a:schemeClr val="bg1"/>
+                    </a:gs>
+                  </a:gsLst>
+                  <a:lin ang="0" scaled="0"/>
+                </a:gradFill>
+                <a:effectLst>
+                  <a:outerShdw blurRad="50800" dist="38100" dir="2700000" algn="tl" rotWithShape="0">
+                    <a:schemeClr val="accent4">
+                      <a:lumMod val="75000"/>
+                      <a:alpha val="40000"/>
+                    </a:schemeClr>
+                  </a:outerShdw>
+                </a:effectLst>
+              </a:rPr>
+              <a:t> Reporting</a:t>
             </a:r>
           </a:p>
         </p:txBody>
@@ -10271,14 +10546,13 @@
           <p:cNvCxnSpPr>
             <a:cxnSpLocks/>
             <a:stCxn id="45" idx="4"/>
-            <a:endCxn id="86" idx="0"/>
           </p:cNvCxnSpPr>
           <p:nvPr/>
         </p:nvCxnSpPr>
         <p:spPr>
           <a:xfrm>
-            <a:off x="6085848" y="3838204"/>
-            <a:ext cx="10149" cy="462425"/>
+            <a:off x="6085848" y="3670039"/>
+            <a:ext cx="0" cy="475141"/>
           </a:xfrm>
           <a:prstGeom prst="straightConnector1">
             <a:avLst/>
@@ -10325,7 +10599,7 @@
         </p:nvCxnSpPr>
         <p:spPr>
           <a:xfrm flipH="1">
-            <a:off x="4726272" y="4278346"/>
+            <a:off x="4737976" y="4145180"/>
             <a:ext cx="2716047" cy="0"/>
           </a:xfrm>
           <a:prstGeom prst="straightConnector1">
@@ -10364,59 +10638,6 @@
           </a:fontRef>
         </p:style>
       </p:cxnSp>
-      <p:cxnSp>
-        <p:nvCxnSpPr>
-          <p:cNvPr id="33" name="Straight Arrow Connector 32">
-            <a:extLst>
-              <a:ext uri="{FF2B5EF4-FFF2-40B4-BE49-F238E27FC236}">
-                <a16:creationId xmlns:a16="http://schemas.microsoft.com/office/drawing/2014/main" id="{FD43408C-8FD1-2A45-BAFA-7C30E55C1B43}"/>
-              </a:ext>
-            </a:extLst>
-          </p:cNvPr>
-          <p:cNvCxnSpPr>
-            <a:cxnSpLocks/>
-            <a:stCxn id="45" idx="5"/>
-          </p:cNvCxnSpPr>
-          <p:nvPr/>
-        </p:nvCxnSpPr>
-        <p:spPr>
-          <a:xfrm>
-            <a:off x="6480261" y="3674338"/>
-            <a:ext cx="2793477" cy="0"/>
-          </a:xfrm>
-          <a:prstGeom prst="straightConnector1">
-            <a:avLst/>
-          </a:prstGeom>
-          <a:ln w="31750">
-            <a:gradFill>
-              <a:gsLst>
-                <a:gs pos="0">
-                  <a:schemeClr val="bg1"/>
-                </a:gs>
-                <a:gs pos="100000">
-                  <a:srgbClr val="B70703"/>
-                </a:gs>
-              </a:gsLst>
-              <a:lin ang="0" scaled="0"/>
-            </a:gradFill>
-            <a:tailEnd type="none"/>
-          </a:ln>
-        </p:spPr>
-        <p:style>
-          <a:lnRef idx="1">
-            <a:schemeClr val="accent1"/>
-          </a:lnRef>
-          <a:fillRef idx="0">
-            <a:schemeClr val="accent1"/>
-          </a:fillRef>
-          <a:effectRef idx="0">
-            <a:schemeClr val="accent1"/>
-          </a:effectRef>
-          <a:fontRef idx="minor">
-            <a:schemeClr val="tx1"/>
-          </a:fontRef>
-        </p:style>
-      </p:cxnSp>
       <p:sp>
         <p:nvSpPr>
           <p:cNvPr id="21" name="TextBox 20">
@@ -10431,8 +10652,8 @@
         </p:nvSpPr>
         <p:spPr>
           <a:xfrm>
-            <a:off x="2712578" y="2889486"/>
-            <a:ext cx="1838401" cy="584775"/>
+            <a:off x="2650292" y="2725465"/>
+            <a:ext cx="2436343" cy="707886"/>
           </a:xfrm>
           <a:prstGeom prst="rect">
             <a:avLst/>
@@ -10453,7 +10674,7 @@
           <a:lstStyle/>
           <a:p>
             <a:r>
-              <a:rPr lang="en-US" sz="1600" b="1" dirty="0">
+              <a:rPr lang="en-US" sz="2000" b="1" dirty="0">
                 <a:gradFill>
                   <a:gsLst>
                     <a:gs pos="0">
@@ -10477,12 +10698,12 @@
                   </a:outerShdw>
                 </a:effectLst>
               </a:rPr>
-              <a:t>Load testing/SLOs</a:t>
-            </a:r>
-          </a:p>
-          <a:p>
-            <a:r>
-              <a:rPr lang="en-US" sz="1600" dirty="0">
+              <a:t>Load testing</a:t>
+            </a:r>
+          </a:p>
+          <a:p>
+            <a:r>
+              <a:rPr lang="en-US" sz="2000" dirty="0">
                 <a:gradFill>
                   <a:gsLst>
                     <a:gs pos="0">
@@ -10506,7 +10727,7 @@
                   </a:outerShdw>
                 </a:effectLst>
               </a:rPr>
-              <a:t>with built-in metrics</a:t>
+              <a:t>with SLO validation</a:t>
             </a:r>
           </a:p>
         </p:txBody>
@@ -10525,8 +10746,8 @@
         </p:nvSpPr>
         <p:spPr>
           <a:xfrm>
-            <a:off x="7262272" y="3068282"/>
-            <a:ext cx="2011466" cy="584775"/>
+            <a:off x="6826829" y="2777831"/>
+            <a:ext cx="2596059" cy="707886"/>
           </a:xfrm>
           <a:prstGeom prst="rect">
             <a:avLst/>
@@ -10548,7 +10769,7 @@
           <a:p>
             <a:pPr algn="r"/>
             <a:r>
-              <a:rPr lang="en-US" sz="1600" b="1" dirty="0">
+              <a:rPr lang="en-US" sz="2000" b="1" dirty="0">
                 <a:gradFill>
                   <a:gsLst>
                     <a:gs pos="0">
@@ -10578,7 +10799,7 @@
           <a:p>
             <a:pPr algn="r"/>
             <a:r>
-              <a:rPr lang="en-US" sz="1600" dirty="0">
+              <a:rPr lang="en-US" sz="2000" dirty="0">
                 <a:gradFill>
                   <a:gsLst>
                     <a:gs pos="0">
@@ -10602,7 +10823,7 @@
                   </a:outerShdw>
                 </a:effectLst>
               </a:rPr>
-              <a:t>with business metrics</a:t>
+              <a:t>for business growth</a:t>
             </a:r>
           </a:p>
         </p:txBody>
@@ -10623,8 +10844,8 @@
         </p:nvCxnSpPr>
         <p:spPr>
           <a:xfrm>
-            <a:off x="6079398" y="2273607"/>
-            <a:ext cx="4897" cy="442895"/>
+            <a:off x="6079398" y="2105442"/>
+            <a:ext cx="0" cy="442895"/>
           </a:xfrm>
           <a:prstGeom prst="straightConnector1">
             <a:avLst/>
@@ -10671,7 +10892,7 @@
         </p:nvCxnSpPr>
         <p:spPr>
           <a:xfrm flipH="1">
-            <a:off x="4721374" y="2273607"/>
+            <a:off x="4721374" y="2105442"/>
             <a:ext cx="2716047" cy="0"/>
           </a:xfrm>
           <a:prstGeom prst="straightConnector1">
@@ -10724,8 +10945,8 @@
         </p:nvSpPr>
         <p:spPr>
           <a:xfrm>
-            <a:off x="4046484" y="1899037"/>
-            <a:ext cx="4078014" cy="338554"/>
+            <a:off x="3677551" y="1696796"/>
+            <a:ext cx="4795573" cy="400110"/>
           </a:xfrm>
           <a:prstGeom prst="rect">
             <a:avLst/>
@@ -10747,7 +10968,7 @@
           <a:p>
             <a:pPr algn="ctr"/>
             <a:r>
-              <a:rPr lang="en-US" sz="1600" dirty="0">
+              <a:rPr lang="en-US" sz="2000" dirty="0">
                 <a:gradFill>
                   <a:gsLst>
                     <a:gs pos="0">
@@ -10774,7 +10995,7 @@
               <a:t>Use with </a:t>
             </a:r>
             <a:r>
-              <a:rPr lang="en-US" sz="1600" b="1" dirty="0">
+              <a:rPr lang="en-US" sz="2000" b="1" dirty="0">
                 <a:gradFill>
                   <a:gsLst>
                     <a:gs pos="0">
@@ -10801,7 +11022,7 @@
               <a:t>any </a:t>
             </a:r>
             <a:r>
-              <a:rPr lang="en-US" sz="1600" dirty="0">
+              <a:rPr lang="en-US" sz="2000" dirty="0">
                 <a:gradFill>
                   <a:gsLst>
                     <a:gs pos="0">
@@ -10825,15 +11046,68 @@
                   </a:outerShdw>
                 </a:effectLst>
               </a:rPr>
-              <a:t>app/serverless/ML framework. </a:t>
-            </a:r>
-          </a:p>
-        </p:txBody>
-      </p:sp>
+              <a:t>app/serverless/ML framework</a:t>
+            </a:r>
+          </a:p>
+        </p:txBody>
+      </p:sp>
+      <p:cxnSp>
+        <p:nvCxnSpPr>
+          <p:cNvPr id="17" name="Straight Arrow Connector 16">
+            <a:extLst>
+              <a:ext uri="{FF2B5EF4-FFF2-40B4-BE49-F238E27FC236}">
+                <a16:creationId xmlns:a16="http://schemas.microsoft.com/office/drawing/2014/main" id="{1F33487F-230E-394B-AC71-9D6DE82963E9}"/>
+              </a:ext>
+            </a:extLst>
+          </p:cNvPr>
+          <p:cNvCxnSpPr>
+            <a:cxnSpLocks/>
+            <a:endCxn id="45" idx="5"/>
+          </p:cNvCxnSpPr>
+          <p:nvPr/>
+        </p:nvCxnSpPr>
+        <p:spPr>
+          <a:xfrm flipH="1" flipV="1">
+            <a:off x="6480261" y="3506173"/>
+            <a:ext cx="2944368" cy="0"/>
+          </a:xfrm>
+          <a:prstGeom prst="straightConnector1">
+            <a:avLst/>
+          </a:prstGeom>
+          <a:ln w="31750">
+            <a:gradFill>
+              <a:gsLst>
+                <a:gs pos="0">
+                  <a:schemeClr val="bg1"/>
+                </a:gs>
+                <a:gs pos="100000">
+                  <a:srgbClr val="B70703"/>
+                </a:gs>
+              </a:gsLst>
+              <a:lin ang="0" scaled="0"/>
+            </a:gradFill>
+            <a:tailEnd type="none"/>
+          </a:ln>
+        </p:spPr>
+        <p:style>
+          <a:lnRef idx="1">
+            <a:schemeClr val="accent1"/>
+          </a:lnRef>
+          <a:fillRef idx="0">
+            <a:schemeClr val="accent1"/>
+          </a:fillRef>
+          <a:effectRef idx="0">
+            <a:schemeClr val="accent1"/>
+          </a:effectRef>
+          <a:fontRef idx="minor">
+            <a:schemeClr val="tx1"/>
+          </a:fontRef>
+        </p:style>
+      </p:cxnSp>
     </p:spTree>
     <p:extLst>
       <p:ext uri="{BB962C8B-B14F-4D97-AF65-F5344CB8AC3E}">
-        <p14:creationId xmlns:p14="http://schemas.microsoft.com/office/powerpoint/2010/main" val="2058438647"/>
+        <p14:creationId xmlns:p14="http://schemas.microsoft.com/office/powerpoint/2010/main" val="3248554908"/>
       </p:ext>
     </p:extLst>
   </p:cSld>

</xml_diff>